<commit_message>
clean up handling of case and plus sign
</commit_message>
<xml_diff>
--- a/doc/TDD Overview.pptx
+++ b/doc/TDD Overview.pptx
@@ -25,8 +25,8 @@
     <p:sldId id="343" r:id="rId16"/>
     <p:sldId id="312" r:id="rId17"/>
     <p:sldId id="321" r:id="rId18"/>
-    <p:sldId id="347" r:id="rId19"/>
-    <p:sldId id="345" r:id="rId20"/>
+    <p:sldId id="345" r:id="rId19"/>
+    <p:sldId id="347" r:id="rId20"/>
     <p:sldId id="349" r:id="rId21"/>
     <p:sldId id="338" r:id="rId22"/>
     <p:sldId id="344" r:id="rId23"/>
@@ -834,6 +834,55 @@
             </a:r>
           </a:p>
           <a:p>
+            <a:pPr marL="1257300" marR="0" lvl="2" indent="-342900" algn="l" defTabSz="914400" rtl="0" eaLnBrk="1" fontAlgn="auto" latinLnBrk="0" hangingPunct="1">
+              <a:lnSpc>
+                <a:spcPct val="100000"/>
+              </a:lnSpc>
+              <a:spcBef>
+                <a:spcPct val="20000"/>
+              </a:spcBef>
+              <a:spcAft>
+                <a:spcPts val="0"/>
+              </a:spcAft>
+              <a:buClrTx/>
+              <a:buSzTx/>
+              <a:buFont typeface="Arial" panose="020B0604020202020204" pitchFamily="34" charset="0"/>
+              <a:buChar char="•"/>
+              <a:tabLst/>
+              <a:defRPr/>
+            </a:pPr>
+            <a:r>
+              <a:rPr lang="en-US" sz="2400" u="none" baseline="0" dirty="0" smtClean="0">
+                <a:solidFill>
+                  <a:prstClr val="black"/>
+                </a:solidFill>
+                <a:latin typeface="Arial" panose="020B0604020202020204" pitchFamily="34" charset="0"/>
+                <a:cs typeface="Arial" panose="020B0604020202020204" pitchFamily="34" charset="0"/>
+              </a:rPr>
+              <a:t>“You can achieve at least half of the benefit of Cucumber just by having the discipline to sit down with your business stakeholders and write scenarios collaboratively.  The conversations sparked by that process will uncover so many potential bugs or schedule overruns that you’ll already have made a huge win, even if you choose never to automate your features.” – </a:t>
+            </a:r>
+            <a:r>
+              <a:rPr lang="en-US" sz="2400" u="sng" baseline="0" dirty="0" smtClean="0">
+                <a:solidFill>
+                  <a:prstClr val="black"/>
+                </a:solidFill>
+                <a:latin typeface="Arial" panose="020B0604020202020204" pitchFamily="34" charset="0"/>
+                <a:cs typeface="Arial" panose="020B0604020202020204" pitchFamily="34" charset="0"/>
+              </a:rPr>
+              <a:t>The Cucumber Book</a:t>
+            </a:r>
+            <a:r>
+              <a:rPr lang="en-US" sz="2400" u="none" baseline="0" dirty="0" smtClean="0">
+                <a:solidFill>
+                  <a:prstClr val="black"/>
+                </a:solidFill>
+                <a:latin typeface="Arial" panose="020B0604020202020204" pitchFamily="34" charset="0"/>
+                <a:cs typeface="Arial" panose="020B0604020202020204" pitchFamily="34" charset="0"/>
+              </a:rPr>
+              <a:t>.</a:t>
+            </a:r>
+          </a:p>
+          <a:p>
             <a:pPr marL="1257300" lvl="2" indent="-342900" defTabSz="914400">
               <a:spcBef>
                 <a:spcPct val="20000"/>
@@ -909,45 +958,6 @@
                 <a:cs typeface="Arial" panose="020B0604020202020204" pitchFamily="34" charset="0"/>
               </a:rPr>
               <a:t>  Instead, get nontechnical stakeholders or analysts to write the first draft of each scenario from a purely business-focused perspective or ideally in a pair with a programmer to help them share their mental model.  With a well-engineered support layer, you can confidently and quickly write new step definitions to match the way the scenario has been expressed.” – </a:t>
-            </a:r>
-            <a:r>
-              <a:rPr lang="en-US" sz="2400" u="sng" baseline="0" dirty="0" smtClean="0">
-                <a:solidFill>
-                  <a:prstClr val="black"/>
-                </a:solidFill>
-                <a:latin typeface="Arial" panose="020B0604020202020204" pitchFamily="34" charset="0"/>
-                <a:cs typeface="Arial" panose="020B0604020202020204" pitchFamily="34" charset="0"/>
-              </a:rPr>
-              <a:t>The Cucumber Book</a:t>
-            </a:r>
-            <a:r>
-              <a:rPr lang="en-US" sz="2400" u="none" baseline="0" dirty="0" smtClean="0">
-                <a:solidFill>
-                  <a:prstClr val="black"/>
-                </a:solidFill>
-                <a:latin typeface="Arial" panose="020B0604020202020204" pitchFamily="34" charset="0"/>
-                <a:cs typeface="Arial" panose="020B0604020202020204" pitchFamily="34" charset="0"/>
-              </a:rPr>
-              <a:t>.</a:t>
-            </a:r>
-          </a:p>
-          <a:p>
-            <a:pPr marL="1257300" lvl="2" indent="-342900" defTabSz="914400">
-              <a:spcBef>
-                <a:spcPct val="20000"/>
-              </a:spcBef>
-              <a:buFont typeface="Arial" panose="020B0604020202020204" pitchFamily="34" charset="0"/>
-              <a:buChar char="•"/>
-            </a:pPr>
-            <a:r>
-              <a:rPr lang="en-US" sz="2400" u="none" baseline="0" dirty="0" smtClean="0">
-                <a:solidFill>
-                  <a:prstClr val="black"/>
-                </a:solidFill>
-                <a:latin typeface="Arial" panose="020B0604020202020204" pitchFamily="34" charset="0"/>
-                <a:cs typeface="Arial" panose="020B0604020202020204" pitchFamily="34" charset="0"/>
-              </a:rPr>
-              <a:t>“You can achieve at least half of the benefit of Cucumber just by having the discipline to sit down with your business stakeholders and write scenarios collaboratively.  The conversations sparked by that process will uncover so many potential bugs or schedule overruns that you’ll already have made a huge win, even if you choose never to automate your features.” – </a:t>
             </a:r>
             <a:r>
               <a:rPr lang="en-US" sz="2400" u="sng" baseline="0" dirty="0" smtClean="0">
@@ -1157,7 +1167,7 @@
     </p:spTree>
     <p:extLst>
       <p:ext uri="{BB962C8B-B14F-4D97-AF65-F5344CB8AC3E}">
-        <p14:creationId xmlns:p14="http://schemas.microsoft.com/office/powerpoint/2010/main" val="1945123710"/>
+        <p14:creationId xmlns:p14="http://schemas.microsoft.com/office/powerpoint/2010/main" val="3867270951"/>
       </p:ext>
     </p:extLst>
   </p:cSld>
@@ -1249,55 +1259,6 @@
             </a:r>
           </a:p>
           <a:p>
-            <a:pPr marL="1257300" marR="0" lvl="2" indent="-342900" algn="l" defTabSz="914400" rtl="0" eaLnBrk="1" fontAlgn="auto" latinLnBrk="0" hangingPunct="1">
-              <a:lnSpc>
-                <a:spcPct val="100000"/>
-              </a:lnSpc>
-              <a:spcBef>
-                <a:spcPct val="20000"/>
-              </a:spcBef>
-              <a:spcAft>
-                <a:spcPts val="0"/>
-              </a:spcAft>
-              <a:buClrTx/>
-              <a:buSzTx/>
-              <a:buFont typeface="Arial" panose="020B0604020202020204" pitchFamily="34" charset="0"/>
-              <a:buChar char="•"/>
-              <a:tabLst/>
-              <a:defRPr/>
-            </a:pPr>
-            <a:r>
-              <a:rPr lang="en-US" sz="2400" u="none" baseline="0" dirty="0" smtClean="0">
-                <a:solidFill>
-                  <a:prstClr val="black"/>
-                </a:solidFill>
-                <a:latin typeface="Arial" panose="020B0604020202020204" pitchFamily="34" charset="0"/>
-                <a:cs typeface="Arial" panose="020B0604020202020204" pitchFamily="34" charset="0"/>
-              </a:rPr>
-              <a:t>“You can achieve at least half of the benefit of Cucumber just by having the discipline to sit down with your business stakeholders and write scenarios collaboratively.  The conversations sparked by that process will uncover so many potential bugs or schedule overruns that you’ll already have made a huge win, even if you choose never to automate your features.” – </a:t>
-            </a:r>
-            <a:r>
-              <a:rPr lang="en-US" sz="2400" u="sng" baseline="0" dirty="0" smtClean="0">
-                <a:solidFill>
-                  <a:prstClr val="black"/>
-                </a:solidFill>
-                <a:latin typeface="Arial" panose="020B0604020202020204" pitchFamily="34" charset="0"/>
-                <a:cs typeface="Arial" panose="020B0604020202020204" pitchFamily="34" charset="0"/>
-              </a:rPr>
-              <a:t>The Cucumber Book</a:t>
-            </a:r>
-            <a:r>
-              <a:rPr lang="en-US" sz="2400" u="none" baseline="0" dirty="0" smtClean="0">
-                <a:solidFill>
-                  <a:prstClr val="black"/>
-                </a:solidFill>
-                <a:latin typeface="Arial" panose="020B0604020202020204" pitchFamily="34" charset="0"/>
-                <a:cs typeface="Arial" panose="020B0604020202020204" pitchFamily="34" charset="0"/>
-              </a:rPr>
-              <a:t>.</a:t>
-            </a:r>
-          </a:p>
-          <a:p>
             <a:pPr marL="1257300" lvl="2" indent="-342900" defTabSz="914400">
               <a:spcBef>
                 <a:spcPct val="20000"/>
@@ -1373,6 +1334,45 @@
                 <a:cs typeface="Arial" panose="020B0604020202020204" pitchFamily="34" charset="0"/>
               </a:rPr>
               <a:t>  Instead, get nontechnical stakeholders or analysts to write the first draft of each scenario from a purely business-focused perspective or ideally in a pair with a programmer to help them share their mental model.  With a well-engineered support layer, you can confidently and quickly write new step definitions to match the way the scenario has been expressed.” – </a:t>
+            </a:r>
+            <a:r>
+              <a:rPr lang="en-US" sz="2400" u="sng" baseline="0" dirty="0" smtClean="0">
+                <a:solidFill>
+                  <a:prstClr val="black"/>
+                </a:solidFill>
+                <a:latin typeface="Arial" panose="020B0604020202020204" pitchFamily="34" charset="0"/>
+                <a:cs typeface="Arial" panose="020B0604020202020204" pitchFamily="34" charset="0"/>
+              </a:rPr>
+              <a:t>The Cucumber Book</a:t>
+            </a:r>
+            <a:r>
+              <a:rPr lang="en-US" sz="2400" u="none" baseline="0" dirty="0" smtClean="0">
+                <a:solidFill>
+                  <a:prstClr val="black"/>
+                </a:solidFill>
+                <a:latin typeface="Arial" panose="020B0604020202020204" pitchFamily="34" charset="0"/>
+                <a:cs typeface="Arial" panose="020B0604020202020204" pitchFamily="34" charset="0"/>
+              </a:rPr>
+              <a:t>.</a:t>
+            </a:r>
+          </a:p>
+          <a:p>
+            <a:pPr marL="1257300" lvl="2" indent="-342900" defTabSz="914400">
+              <a:spcBef>
+                <a:spcPct val="20000"/>
+              </a:spcBef>
+              <a:buFont typeface="Arial" panose="020B0604020202020204" pitchFamily="34" charset="0"/>
+              <a:buChar char="•"/>
+            </a:pPr>
+            <a:r>
+              <a:rPr lang="en-US" sz="2400" u="none" baseline="0" dirty="0" smtClean="0">
+                <a:solidFill>
+                  <a:prstClr val="black"/>
+                </a:solidFill>
+                <a:latin typeface="Arial" panose="020B0604020202020204" pitchFamily="34" charset="0"/>
+                <a:cs typeface="Arial" panose="020B0604020202020204" pitchFamily="34" charset="0"/>
+              </a:rPr>
+              <a:t>“You can achieve at least half of the benefit of Cucumber just by having the discipline to sit down with your business stakeholders and write scenarios collaboratively.  The conversations sparked by that process will uncover so many potential bugs or schedule overruns that you’ll already have made a huge win, even if you choose never to automate your features.” – </a:t>
             </a:r>
             <a:r>
               <a:rPr lang="en-US" sz="2400" u="sng" baseline="0" dirty="0" smtClean="0">
@@ -1582,7 +1582,7 @@
     </p:spTree>
     <p:extLst>
       <p:ext uri="{BB962C8B-B14F-4D97-AF65-F5344CB8AC3E}">
-        <p14:creationId xmlns:p14="http://schemas.microsoft.com/office/powerpoint/2010/main" val="3867270951"/>
+        <p14:creationId xmlns:p14="http://schemas.microsoft.com/office/powerpoint/2010/main" val="1945123710"/>
       </p:ext>
     </p:extLst>
   </p:cSld>
@@ -1660,11 +1660,7 @@
             </a:r>
             <a:r>
               <a:rPr lang="en-US" u="none" baseline="0" dirty="0" smtClean="0"/>
-              <a:t>D – tests should be written first, not stuffed in the solution and made to </a:t>
-            </a:r>
-            <a:r>
-              <a:rPr lang="en-US" u="none" baseline="0" dirty="0" smtClean="0"/>
-              <a:t>pass</a:t>
+              <a:t>D – tests should be written first, not stuffed in the solution and made to pass</a:t>
             </a:r>
           </a:p>
           <a:p>
@@ -1676,7 +1672,6 @@
               <a:rPr lang="en-US" u="none" baseline="0" dirty="0" smtClean="0"/>
               <a:t>But we need to start somewhere – see Feathers.</a:t>
             </a:r>
-            <a:endParaRPr lang="en-US" u="none" baseline="0" dirty="0" smtClean="0"/>
           </a:p>
           <a:p>
             <a:pPr marL="628650" lvl="1" indent="-171450">
@@ -1745,11 +1740,7 @@
             </a:pPr>
             <a:r>
               <a:rPr lang="en-US" u="none" baseline="0" dirty="0" smtClean="0"/>
-              <a:t>Legacy systems require time for tests to be </a:t>
-            </a:r>
-            <a:r>
-              <a:rPr lang="en-US" u="none" baseline="0" dirty="0" smtClean="0"/>
-              <a:t>written</a:t>
+              <a:t>Legacy systems require time for tests to be written</a:t>
             </a:r>
           </a:p>
           <a:p>
@@ -1781,7 +1772,6 @@
               <a:rPr lang="en-US" u="none" baseline="0" dirty="0" smtClean="0"/>
               <a:t>Solid unit tests, relive business-facing tests of trivial clutter and attendant brittleness.</a:t>
             </a:r>
-            <a:endParaRPr lang="en-US" u="none" baseline="0" dirty="0" smtClean="0"/>
           </a:p>
           <a:p>
             <a:pPr marL="171450" lvl="0" indent="-171450">
@@ -2109,11 +2099,7 @@
             </a:pPr>
             <a:r>
               <a:rPr lang="en-US" baseline="0" dirty="0" smtClean="0"/>
-              <a:t>Only </a:t>
-            </a:r>
-            <a:r>
-              <a:rPr lang="en-US" baseline="0" dirty="0" smtClean="0"/>
-              <a:t>this small tip is usually visible.</a:t>
+              <a:t>Only this small tip is usually visible.</a:t>
             </a:r>
           </a:p>
           <a:p>
@@ -3297,17 +3283,7 @@
                 <a:latin typeface="Arial" panose="020B0604020202020204" pitchFamily="34" charset="0"/>
                 <a:cs typeface="Arial" panose="020B0604020202020204" pitchFamily="34" charset="0"/>
               </a:rPr>
-              <a:t>ATDD</a:t>
-            </a:r>
-            <a:r>
-              <a:rPr lang="en-US" sz="2400" baseline="0" dirty="0" smtClean="0">
-                <a:solidFill>
-                  <a:prstClr val="black"/>
-                </a:solidFill>
-                <a:latin typeface="Arial" panose="020B0604020202020204" pitchFamily="34" charset="0"/>
-                <a:cs typeface="Arial" panose="020B0604020202020204" pitchFamily="34" charset="0"/>
-              </a:rPr>
-              <a:t>:  Building the Right Thing</a:t>
+              <a:t>ATDD:  Building the Right Thing</a:t>
             </a:r>
           </a:p>
           <a:p>
@@ -3347,13 +3323,6 @@
               </a:rPr>
               <a:t>Unit TDD:  </a:t>
             </a:r>
-            <a:endParaRPr lang="en-US" sz="2400" dirty="0" smtClean="0">
-              <a:solidFill>
-                <a:prstClr val="black"/>
-              </a:solidFill>
-              <a:latin typeface="Arial" panose="020B0604020202020204" pitchFamily="34" charset="0"/>
-              <a:cs typeface="Arial" panose="020B0604020202020204" pitchFamily="34" charset="0"/>
-            </a:endParaRPr>
           </a:p>
           <a:p>
             <a:pPr marL="800100" lvl="1" indent="-342900" defTabSz="914400">
@@ -3457,17 +3426,7 @@
                 <a:latin typeface="Arial" panose="020B0604020202020204" pitchFamily="34" charset="0"/>
                 <a:cs typeface="Arial" panose="020B0604020202020204" pitchFamily="34" charset="0"/>
               </a:rPr>
-              <a:t>“</a:t>
-            </a:r>
-            <a:r>
-              <a:rPr lang="en-US" sz="2400" dirty="0" smtClean="0">
-                <a:solidFill>
-                  <a:prstClr val="black"/>
-                </a:solidFill>
-                <a:latin typeface="Arial" panose="020B0604020202020204" pitchFamily="34" charset="0"/>
-                <a:cs typeface="Arial" panose="020B0604020202020204" pitchFamily="34" charset="0"/>
-              </a:rPr>
-              <a:t>Arrange, Act, Assert” is not just a vain</a:t>
+              <a:t>“Arrange, Act, Assert” is not just a vain</a:t>
             </a:r>
             <a:r>
               <a:rPr lang="en-US" sz="2400" baseline="0" dirty="0" smtClean="0">
@@ -3645,17 +3604,7 @@
                 <a:latin typeface="Arial" panose="020B0604020202020204" pitchFamily="34" charset="0"/>
                 <a:cs typeface="Arial" panose="020B0604020202020204" pitchFamily="34" charset="0"/>
               </a:rPr>
-              <a:t>What </a:t>
-            </a:r>
-            <a:r>
-              <a:rPr lang="en-US" sz="2400" baseline="0" dirty="0" smtClean="0">
-                <a:solidFill>
-                  <a:prstClr val="black"/>
-                </a:solidFill>
-                <a:latin typeface="Arial" panose="020B0604020202020204" pitchFamily="34" charset="0"/>
-                <a:cs typeface="Arial" panose="020B0604020202020204" pitchFamily="34" charset="0"/>
-              </a:rPr>
-              <a:t>are we building?</a:t>
+              <a:t>What are we building?</a:t>
             </a:r>
           </a:p>
           <a:p>
@@ -3950,17 +3899,7 @@
                 <a:latin typeface="Arial" panose="020B0604020202020204" pitchFamily="34" charset="0"/>
                 <a:cs typeface="Arial" panose="020B0604020202020204" pitchFamily="34" charset="0"/>
               </a:rPr>
-              <a:t>Look too long?  Consider regrouping scenarios into smaller separate stories</a:t>
-            </a:r>
-            <a:r>
-              <a:rPr lang="en-US" sz="2400" baseline="0" dirty="0" smtClean="0">
-                <a:solidFill>
-                  <a:prstClr val="black"/>
-                </a:solidFill>
-                <a:latin typeface="Arial" panose="020B0604020202020204" pitchFamily="34" charset="0"/>
-                <a:cs typeface="Arial" panose="020B0604020202020204" pitchFamily="34" charset="0"/>
-              </a:rPr>
-              <a:t>.</a:t>
+              <a:t>Look too long?  Consider regrouping scenarios into smaller separate stories.</a:t>
             </a:r>
             <a:endParaRPr lang="en-US" sz="2400" dirty="0" smtClean="0"/>
           </a:p>
@@ -4324,26 +4263,17 @@
             </a:pPr>
             <a:r>
               <a:rPr lang="en-US" baseline="0" dirty="0" smtClean="0"/>
-              <a:t>Helps resolve </a:t>
-            </a:r>
+              <a:t>Helps resolve Blockers (e.g. QA early on)  </a:t>
+            </a:r>
+          </a:p>
+          <a:p>
+            <a:pPr marL="628650" lvl="1" indent="-171450">
+              <a:buFont typeface="Arial" panose="020B0604020202020204" pitchFamily="34" charset="0"/>
+              <a:buChar char="•"/>
+            </a:pPr>
             <a:r>
               <a:rPr lang="en-US" baseline="0" dirty="0" smtClean="0"/>
-              <a:t>Blockers (e.g. QA early on)  </a:t>
-            </a:r>
-            <a:endParaRPr lang="en-US" baseline="0" dirty="0" smtClean="0"/>
-          </a:p>
-          <a:p>
-            <a:pPr marL="628650" lvl="1" indent="-171450">
-              <a:buFont typeface="Arial" panose="020B0604020202020204" pitchFamily="34" charset="0"/>
-              <a:buChar char="•"/>
-            </a:pPr>
-            <a:r>
-              <a:rPr lang="en-US" baseline="0" dirty="0" smtClean="0"/>
-              <a:t>Discourages “Fire </a:t>
-            </a:r>
-            <a:r>
-              <a:rPr lang="en-US" baseline="0" dirty="0" smtClean="0"/>
-              <a:t>&amp; Forget” disengagement by stakeholders</a:t>
+              <a:t>Discourages “Fire &amp; Forget” disengagement by stakeholders</a:t>
             </a:r>
           </a:p>
           <a:p>
@@ -4465,11 +4395,7 @@
           <a:p>
             <a:r>
               <a:rPr lang="en-US" dirty="0" smtClean="0"/>
-              <a:t>Learned </a:t>
-            </a:r>
-            <a:r>
-              <a:rPr lang="en-US" dirty="0" smtClean="0"/>
-              <a:t>in the Air Force:</a:t>
+              <a:t>Learned in the Air Force:</a:t>
             </a:r>
           </a:p>
           <a:p>
@@ -7845,7 +7771,7 @@
         <p:spPr>
           <a:xfrm>
             <a:off x="882399" y="1078322"/>
-            <a:ext cx="7727142" cy="5262979"/>
+            <a:ext cx="7727142" cy="2234458"/>
           </a:xfrm>
           <a:prstGeom prst="rect">
             <a:avLst/>
@@ -7870,7 +7796,7 @@
                 <a:latin typeface="Arial" panose="020B0604020202020204" pitchFamily="34" charset="0"/>
                 <a:cs typeface="Arial" panose="020B0604020202020204" pitchFamily="34" charset="0"/>
               </a:rPr>
-              <a:t>ATDD – When do we do what?</a:t>
+              <a:t>The BIG CHANGE:  It’s about COLLABORATION</a:t>
             </a:r>
           </a:p>
           <a:p>
@@ -7889,7 +7815,7 @@
                 <a:latin typeface="Arial" panose="020B0604020202020204" pitchFamily="34" charset="0"/>
                 <a:cs typeface="Arial" panose="020B0604020202020204" pitchFamily="34" charset="0"/>
               </a:rPr>
-              <a:t>Backlog refinement – Main Scenarios</a:t>
+              <a:t>“Three Amigos” – P.O., Developer, Tester</a:t>
             </a:r>
           </a:p>
           <a:p>
@@ -7908,26 +7834,7 @@
                 <a:latin typeface="Arial" panose="020B0604020202020204" pitchFamily="34" charset="0"/>
                 <a:cs typeface="Arial" panose="020B0604020202020204" pitchFamily="34" charset="0"/>
               </a:rPr>
-              <a:t>Sprint Planning – Acceptance Scenarios</a:t>
-            </a:r>
-          </a:p>
-          <a:p>
-            <a:pPr marL="800100" lvl="1" indent="-342900" defTabSz="914400">
-              <a:spcBef>
-                <a:spcPct val="20000"/>
-              </a:spcBef>
-              <a:buFont typeface="Arial" panose="020B0604020202020204" pitchFamily="34" charset="0"/>
-              <a:buChar char="•"/>
-            </a:pPr>
-            <a:r>
-              <a:rPr lang="en-US" sz="2400" dirty="0" smtClean="0">
-                <a:solidFill>
-                  <a:prstClr val="black"/>
-                </a:solidFill>
-                <a:latin typeface="Arial" panose="020B0604020202020204" pitchFamily="34" charset="0"/>
-                <a:cs typeface="Arial" panose="020B0604020202020204" pitchFamily="34" charset="0"/>
-              </a:rPr>
-              <a:t>During the Sprint – Questions &amp; Feedback</a:t>
+              <a:t>Collaborating on Scenarios </a:t>
             </a:r>
           </a:p>
           <a:p>
@@ -7935,8 +7842,8 @@
               <a:spcBef>
                 <a:spcPct val="20000"/>
               </a:spcBef>
-              <a:buFont typeface="Arial" panose="020B0604020202020204" pitchFamily="34" charset="0"/>
-              <a:buChar char="•"/>
+              <a:buFont typeface="Wingdings" panose="05000000000000000000" pitchFamily="2" charset="2"/>
+              <a:buChar char="Ø"/>
             </a:pPr>
             <a:r>
               <a:rPr lang="en-US" sz="2400" dirty="0" smtClean="0">
@@ -7945,161 +7852,11 @@
                 </a:solidFill>
                 <a:latin typeface="Arial" panose="020B0604020202020204" pitchFamily="34" charset="0"/>
                 <a:cs typeface="Arial" panose="020B0604020202020204" pitchFamily="34" charset="0"/>
-              </a:rPr>
-              <a:t>Daily Scrum – Which Tests Now Pass?</a:t>
-            </a:r>
-          </a:p>
-          <a:p>
-            <a:pPr marL="1257300" lvl="2" indent="-342900" defTabSz="914400">
-              <a:spcBef>
-                <a:spcPct val="20000"/>
-              </a:spcBef>
-              <a:buFont typeface="Arial" panose="020B0604020202020204" pitchFamily="34" charset="0"/>
-              <a:buChar char="•"/>
-            </a:pPr>
-            <a:r>
-              <a:rPr lang="en-US" sz="2400" dirty="0" smtClean="0">
-                <a:solidFill>
-                  <a:prstClr val="black"/>
-                </a:solidFill>
-                <a:latin typeface="Arial" panose="020B0604020202020204" pitchFamily="34" charset="0"/>
-                <a:cs typeface="Arial" panose="020B0604020202020204" pitchFamily="34" charset="0"/>
-              </a:rPr>
-              <a:t>Ad Hoc – Questions &amp; Feedback</a:t>
-            </a:r>
-          </a:p>
-          <a:p>
-            <a:pPr marL="800100" lvl="1" indent="-342900" defTabSz="914400">
-              <a:spcBef>
-                <a:spcPct val="20000"/>
-              </a:spcBef>
-              <a:buFont typeface="Arial" panose="020B0604020202020204" pitchFamily="34" charset="0"/>
-              <a:buChar char="•"/>
-            </a:pPr>
-            <a:r>
-              <a:rPr lang="en-US" sz="2400" dirty="0" smtClean="0">
-                <a:solidFill>
-                  <a:prstClr val="black"/>
-                </a:solidFill>
-                <a:latin typeface="Arial" panose="020B0604020202020204" pitchFamily="34" charset="0"/>
-                <a:cs typeface="Arial" panose="020B0604020202020204" pitchFamily="34" charset="0"/>
-              </a:rPr>
-              <a:t>Sprint Demo – Watch ‘</a:t>
-            </a:r>
-            <a:r>
-              <a:rPr lang="en-US" sz="2400" dirty="0" err="1" smtClean="0">
-                <a:solidFill>
-                  <a:prstClr val="black"/>
-                </a:solidFill>
-                <a:latin typeface="Arial" panose="020B0604020202020204" pitchFamily="34" charset="0"/>
-                <a:cs typeface="Arial" panose="020B0604020202020204" pitchFamily="34" charset="0"/>
-              </a:rPr>
-              <a:t>em</a:t>
-            </a:r>
-            <a:r>
-              <a:rPr lang="en-US" sz="2400" dirty="0" smtClean="0">
-                <a:solidFill>
-                  <a:prstClr val="black"/>
-                </a:solidFill>
-                <a:latin typeface="Arial" panose="020B0604020202020204" pitchFamily="34" charset="0"/>
-                <a:cs typeface="Arial" panose="020B0604020202020204" pitchFamily="34" charset="0"/>
-              </a:rPr>
-              <a:t> Run!</a:t>
-            </a:r>
-          </a:p>
-          <a:p>
-            <a:pPr marL="800100" lvl="1" indent="-342900" defTabSz="914400">
-              <a:spcBef>
-                <a:spcPct val="20000"/>
-              </a:spcBef>
-              <a:buFont typeface="Arial" panose="020B0604020202020204" pitchFamily="34" charset="0"/>
-              <a:buChar char="•"/>
-            </a:pPr>
-            <a:r>
-              <a:rPr lang="en-US" sz="2400" dirty="0" smtClean="0">
-                <a:solidFill>
-                  <a:prstClr val="black"/>
-                </a:solidFill>
-                <a:latin typeface="Arial" panose="020B0604020202020204" pitchFamily="34" charset="0"/>
-                <a:cs typeface="Arial" panose="020B0604020202020204" pitchFamily="34" charset="0"/>
-              </a:rPr>
-              <a:t>Retrospective – </a:t>
-            </a:r>
-          </a:p>
-          <a:p>
-            <a:pPr marL="1257300" lvl="2" indent="-342900" defTabSz="914400">
-              <a:spcBef>
-                <a:spcPct val="20000"/>
-              </a:spcBef>
-              <a:buFont typeface="Arial" panose="020B0604020202020204" pitchFamily="34" charset="0"/>
-              <a:buChar char="•"/>
-            </a:pPr>
-            <a:r>
-              <a:rPr lang="en-US" sz="2400" dirty="0" smtClean="0">
-                <a:solidFill>
-                  <a:prstClr val="black"/>
-                </a:solidFill>
-                <a:latin typeface="Arial" panose="020B0604020202020204" pitchFamily="34" charset="0"/>
-                <a:cs typeface="Arial" panose="020B0604020202020204" pitchFamily="34" charset="0"/>
-              </a:rPr>
-              <a:t>Definitions of Done &amp; Ready</a:t>
-            </a:r>
-          </a:p>
-          <a:p>
-            <a:pPr marL="1257300" lvl="2" indent="-342900" defTabSz="914400">
-              <a:spcBef>
-                <a:spcPct val="20000"/>
-              </a:spcBef>
-              <a:buFont typeface="Arial" panose="020B0604020202020204" pitchFamily="34" charset="0"/>
-              <a:buChar char="•"/>
-            </a:pPr>
-            <a:r>
-              <a:rPr lang="en-US" sz="2400" dirty="0" smtClean="0">
-                <a:solidFill>
-                  <a:prstClr val="black"/>
-                </a:solidFill>
-                <a:latin typeface="Arial" panose="020B0604020202020204" pitchFamily="34" charset="0"/>
-                <a:cs typeface="Arial" panose="020B0604020202020204" pitchFamily="34" charset="0"/>
-              </a:rPr>
-              <a:t>Impediment patterns</a:t>
-            </a:r>
-          </a:p>
-          <a:p>
-            <a:pPr defTabSz="914400">
-              <a:spcBef>
-                <a:spcPct val="20000"/>
-              </a:spcBef>
-            </a:pPr>
-            <a:r>
-              <a:rPr lang="en-US" sz="2400" dirty="0" smtClean="0">
-                <a:solidFill>
-                  <a:prstClr val="black"/>
-                </a:solidFill>
-                <a:latin typeface="Arial" panose="020B0604020202020204" pitchFamily="34" charset="0"/>
-                <a:cs typeface="Arial" panose="020B0604020202020204" pitchFamily="34" charset="0"/>
-              </a:rPr>
-              <a:t>Unit TDD – Development Rhythm</a:t>
-            </a:r>
-            <a:br>
-              <a:rPr lang="en-US" sz="2400" dirty="0" smtClean="0">
-                <a:solidFill>
-                  <a:prstClr val="black"/>
-                </a:solidFill>
-                <a:latin typeface="Arial" panose="020B0604020202020204" pitchFamily="34" charset="0"/>
-                <a:cs typeface="Arial" panose="020B0604020202020204" pitchFamily="34" charset="0"/>
-              </a:rPr>
-            </a:br>
-            <a:r>
-              <a:rPr lang="en-US" sz="2400" dirty="0" smtClean="0">
-                <a:solidFill>
-                  <a:prstClr val="black"/>
-                </a:solidFill>
-                <a:latin typeface="Arial" panose="020B0604020202020204" pitchFamily="34" charset="0"/>
-                <a:cs typeface="Arial" panose="020B0604020202020204" pitchFamily="34" charset="0"/>
-              </a:rPr>
-              <a:t>(Red, Green, Refactor)</a:t>
-            </a:r>
-            <a:endParaRPr lang="en-US" sz="2400" dirty="0">
+                <a:sym typeface="Wingdings" panose="05000000000000000000" pitchFamily="2" charset="2"/>
+              </a:rPr>
+              <a:t>Ubiquitous Language</a:t>
+            </a:r>
+            <a:endParaRPr lang="en-US" sz="2400" dirty="0" smtClean="0">
               <a:solidFill>
                 <a:prstClr val="black"/>
               </a:solidFill>
@@ -8107,12 +7864,31 @@
               <a:cs typeface="Arial" panose="020B0604020202020204" pitchFamily="34" charset="0"/>
             </a:endParaRPr>
           </a:p>
+          <a:p>
+            <a:pPr marL="1257300" lvl="2" indent="-342900" defTabSz="914400">
+              <a:spcBef>
+                <a:spcPct val="20000"/>
+              </a:spcBef>
+              <a:buFont typeface="Wingdings" panose="05000000000000000000" pitchFamily="2" charset="2"/>
+              <a:buChar char="Ø"/>
+            </a:pPr>
+            <a:r>
+              <a:rPr lang="en-US" sz="2400" dirty="0" smtClean="0">
+                <a:solidFill>
+                  <a:prstClr val="black"/>
+                </a:solidFill>
+                <a:latin typeface="Arial" panose="020B0604020202020204" pitchFamily="34" charset="0"/>
+                <a:cs typeface="Arial" panose="020B0604020202020204" pitchFamily="34" charset="0"/>
+              </a:rPr>
+              <a:t>Collaboration yields &gt; half the value </a:t>
+            </a:r>
+          </a:p>
         </p:txBody>
       </p:sp>
     </p:spTree>
     <p:extLst>
       <p:ext uri="{BB962C8B-B14F-4D97-AF65-F5344CB8AC3E}">
-        <p14:creationId xmlns:p14="http://schemas.microsoft.com/office/powerpoint/2010/main" val="3458236743"/>
+        <p14:creationId xmlns:p14="http://schemas.microsoft.com/office/powerpoint/2010/main" val="2086784744"/>
       </p:ext>
     </p:extLst>
   </p:cSld>
@@ -8178,7 +7954,7 @@
         <p:spPr>
           <a:xfrm>
             <a:off x="882399" y="1078322"/>
-            <a:ext cx="7727142" cy="2234458"/>
+            <a:ext cx="7727142" cy="5262979"/>
           </a:xfrm>
           <a:prstGeom prst="rect">
             <a:avLst/>
@@ -8203,7 +7979,7 @@
                 <a:latin typeface="Arial" panose="020B0604020202020204" pitchFamily="34" charset="0"/>
                 <a:cs typeface="Arial" panose="020B0604020202020204" pitchFamily="34" charset="0"/>
               </a:rPr>
-              <a:t>The BIG CHANGE:  It’s about COLLABORATION</a:t>
+              <a:t>ATDD – When do we do what?</a:t>
             </a:r>
           </a:p>
           <a:p>
@@ -8222,7 +7998,7 @@
                 <a:latin typeface="Arial" panose="020B0604020202020204" pitchFamily="34" charset="0"/>
                 <a:cs typeface="Arial" panose="020B0604020202020204" pitchFamily="34" charset="0"/>
               </a:rPr>
-              <a:t>“Three Amigos” – P.O., Developer, Tester</a:t>
+              <a:t>Backlog refinement – Main Scenarios</a:t>
             </a:r>
           </a:p>
           <a:p>
@@ -8241,7 +8017,26 @@
                 <a:latin typeface="Arial" panose="020B0604020202020204" pitchFamily="34" charset="0"/>
                 <a:cs typeface="Arial" panose="020B0604020202020204" pitchFamily="34" charset="0"/>
               </a:rPr>
-              <a:t>Collaborating on Scenarios </a:t>
+              <a:t>Sprint Planning – Acceptance Scenarios</a:t>
+            </a:r>
+          </a:p>
+          <a:p>
+            <a:pPr marL="800100" lvl="1" indent="-342900" defTabSz="914400">
+              <a:spcBef>
+                <a:spcPct val="20000"/>
+              </a:spcBef>
+              <a:buFont typeface="Arial" panose="020B0604020202020204" pitchFamily="34" charset="0"/>
+              <a:buChar char="•"/>
+            </a:pPr>
+            <a:r>
+              <a:rPr lang="en-US" sz="2400" dirty="0" smtClean="0">
+                <a:solidFill>
+                  <a:prstClr val="black"/>
+                </a:solidFill>
+                <a:latin typeface="Arial" panose="020B0604020202020204" pitchFamily="34" charset="0"/>
+                <a:cs typeface="Arial" panose="020B0604020202020204" pitchFamily="34" charset="0"/>
+              </a:rPr>
+              <a:t>During the Sprint – Questions &amp; Feedback</a:t>
             </a:r>
           </a:p>
           <a:p>
@@ -8249,8 +8044,8 @@
               <a:spcBef>
                 <a:spcPct val="20000"/>
               </a:spcBef>
-              <a:buFont typeface="Wingdings" panose="05000000000000000000" pitchFamily="2" charset="2"/>
-              <a:buChar char="Ø"/>
+              <a:buFont typeface="Arial" panose="020B0604020202020204" pitchFamily="34" charset="0"/>
+              <a:buChar char="•"/>
             </a:pPr>
             <a:r>
               <a:rPr lang="en-US" sz="2400" dirty="0" smtClean="0">
@@ -8259,11 +8054,161 @@
                 </a:solidFill>
                 <a:latin typeface="Arial" panose="020B0604020202020204" pitchFamily="34" charset="0"/>
                 <a:cs typeface="Arial" panose="020B0604020202020204" pitchFamily="34" charset="0"/>
-                <a:sym typeface="Wingdings" panose="05000000000000000000" pitchFamily="2" charset="2"/>
-              </a:rPr>
-              <a:t>Ubiquitous Language</a:t>
-            </a:r>
-            <a:endParaRPr lang="en-US" sz="2400" dirty="0" smtClean="0">
+              </a:rPr>
+              <a:t>Daily Scrum – Which Tests Now Pass?</a:t>
+            </a:r>
+          </a:p>
+          <a:p>
+            <a:pPr marL="1257300" lvl="2" indent="-342900" defTabSz="914400">
+              <a:spcBef>
+                <a:spcPct val="20000"/>
+              </a:spcBef>
+              <a:buFont typeface="Arial" panose="020B0604020202020204" pitchFamily="34" charset="0"/>
+              <a:buChar char="•"/>
+            </a:pPr>
+            <a:r>
+              <a:rPr lang="en-US" sz="2400" dirty="0" smtClean="0">
+                <a:solidFill>
+                  <a:prstClr val="black"/>
+                </a:solidFill>
+                <a:latin typeface="Arial" panose="020B0604020202020204" pitchFamily="34" charset="0"/>
+                <a:cs typeface="Arial" panose="020B0604020202020204" pitchFamily="34" charset="0"/>
+              </a:rPr>
+              <a:t>Ad Hoc – Questions &amp; Feedback</a:t>
+            </a:r>
+          </a:p>
+          <a:p>
+            <a:pPr marL="800100" lvl="1" indent="-342900" defTabSz="914400">
+              <a:spcBef>
+                <a:spcPct val="20000"/>
+              </a:spcBef>
+              <a:buFont typeface="Arial" panose="020B0604020202020204" pitchFamily="34" charset="0"/>
+              <a:buChar char="•"/>
+            </a:pPr>
+            <a:r>
+              <a:rPr lang="en-US" sz="2400" dirty="0" smtClean="0">
+                <a:solidFill>
+                  <a:prstClr val="black"/>
+                </a:solidFill>
+                <a:latin typeface="Arial" panose="020B0604020202020204" pitchFamily="34" charset="0"/>
+                <a:cs typeface="Arial" panose="020B0604020202020204" pitchFamily="34" charset="0"/>
+              </a:rPr>
+              <a:t>Sprint Demo – Watch ‘</a:t>
+            </a:r>
+            <a:r>
+              <a:rPr lang="en-US" sz="2400" dirty="0" err="1" smtClean="0">
+                <a:solidFill>
+                  <a:prstClr val="black"/>
+                </a:solidFill>
+                <a:latin typeface="Arial" panose="020B0604020202020204" pitchFamily="34" charset="0"/>
+                <a:cs typeface="Arial" panose="020B0604020202020204" pitchFamily="34" charset="0"/>
+              </a:rPr>
+              <a:t>em</a:t>
+            </a:r>
+            <a:r>
+              <a:rPr lang="en-US" sz="2400" dirty="0" smtClean="0">
+                <a:solidFill>
+                  <a:prstClr val="black"/>
+                </a:solidFill>
+                <a:latin typeface="Arial" panose="020B0604020202020204" pitchFamily="34" charset="0"/>
+                <a:cs typeface="Arial" panose="020B0604020202020204" pitchFamily="34" charset="0"/>
+              </a:rPr>
+              <a:t> Run!</a:t>
+            </a:r>
+          </a:p>
+          <a:p>
+            <a:pPr marL="800100" lvl="1" indent="-342900" defTabSz="914400">
+              <a:spcBef>
+                <a:spcPct val="20000"/>
+              </a:spcBef>
+              <a:buFont typeface="Arial" panose="020B0604020202020204" pitchFamily="34" charset="0"/>
+              <a:buChar char="•"/>
+            </a:pPr>
+            <a:r>
+              <a:rPr lang="en-US" sz="2400" dirty="0" smtClean="0">
+                <a:solidFill>
+                  <a:prstClr val="black"/>
+                </a:solidFill>
+                <a:latin typeface="Arial" panose="020B0604020202020204" pitchFamily="34" charset="0"/>
+                <a:cs typeface="Arial" panose="020B0604020202020204" pitchFamily="34" charset="0"/>
+              </a:rPr>
+              <a:t>Retrospective – </a:t>
+            </a:r>
+          </a:p>
+          <a:p>
+            <a:pPr marL="1257300" lvl="2" indent="-342900" defTabSz="914400">
+              <a:spcBef>
+                <a:spcPct val="20000"/>
+              </a:spcBef>
+              <a:buFont typeface="Arial" panose="020B0604020202020204" pitchFamily="34" charset="0"/>
+              <a:buChar char="•"/>
+            </a:pPr>
+            <a:r>
+              <a:rPr lang="en-US" sz="2400" dirty="0" smtClean="0">
+                <a:solidFill>
+                  <a:prstClr val="black"/>
+                </a:solidFill>
+                <a:latin typeface="Arial" panose="020B0604020202020204" pitchFamily="34" charset="0"/>
+                <a:cs typeface="Arial" panose="020B0604020202020204" pitchFamily="34" charset="0"/>
+              </a:rPr>
+              <a:t>Definitions of Done &amp; Ready</a:t>
+            </a:r>
+          </a:p>
+          <a:p>
+            <a:pPr marL="1257300" lvl="2" indent="-342900" defTabSz="914400">
+              <a:spcBef>
+                <a:spcPct val="20000"/>
+              </a:spcBef>
+              <a:buFont typeface="Arial" panose="020B0604020202020204" pitchFamily="34" charset="0"/>
+              <a:buChar char="•"/>
+            </a:pPr>
+            <a:r>
+              <a:rPr lang="en-US" sz="2400" dirty="0" smtClean="0">
+                <a:solidFill>
+                  <a:prstClr val="black"/>
+                </a:solidFill>
+                <a:latin typeface="Arial" panose="020B0604020202020204" pitchFamily="34" charset="0"/>
+                <a:cs typeface="Arial" panose="020B0604020202020204" pitchFamily="34" charset="0"/>
+              </a:rPr>
+              <a:t>Impediment patterns</a:t>
+            </a:r>
+          </a:p>
+          <a:p>
+            <a:pPr defTabSz="914400">
+              <a:spcBef>
+                <a:spcPct val="20000"/>
+              </a:spcBef>
+            </a:pPr>
+            <a:r>
+              <a:rPr lang="en-US" sz="2400" dirty="0" smtClean="0">
+                <a:solidFill>
+                  <a:prstClr val="black"/>
+                </a:solidFill>
+                <a:latin typeface="Arial" panose="020B0604020202020204" pitchFamily="34" charset="0"/>
+                <a:cs typeface="Arial" panose="020B0604020202020204" pitchFamily="34" charset="0"/>
+              </a:rPr>
+              <a:t>Unit TDD – Development Rhythm</a:t>
+            </a:r>
+            <a:br>
+              <a:rPr lang="en-US" sz="2400" dirty="0" smtClean="0">
+                <a:solidFill>
+                  <a:prstClr val="black"/>
+                </a:solidFill>
+                <a:latin typeface="Arial" panose="020B0604020202020204" pitchFamily="34" charset="0"/>
+                <a:cs typeface="Arial" panose="020B0604020202020204" pitchFamily="34" charset="0"/>
+              </a:rPr>
+            </a:br>
+            <a:r>
+              <a:rPr lang="en-US" sz="2400" dirty="0" smtClean="0">
+                <a:solidFill>
+                  <a:prstClr val="black"/>
+                </a:solidFill>
+                <a:latin typeface="Arial" panose="020B0604020202020204" pitchFamily="34" charset="0"/>
+                <a:cs typeface="Arial" panose="020B0604020202020204" pitchFamily="34" charset="0"/>
+              </a:rPr>
+              <a:t>(Red, Green, Refactor)</a:t>
+            </a:r>
+            <a:endParaRPr lang="en-US" sz="2400" dirty="0">
               <a:solidFill>
                 <a:prstClr val="black"/>
               </a:solidFill>
@@ -8271,31 +8216,12 @@
               <a:cs typeface="Arial" panose="020B0604020202020204" pitchFamily="34" charset="0"/>
             </a:endParaRPr>
           </a:p>
-          <a:p>
-            <a:pPr marL="1257300" lvl="2" indent="-342900" defTabSz="914400">
-              <a:spcBef>
-                <a:spcPct val="20000"/>
-              </a:spcBef>
-              <a:buFont typeface="Wingdings" panose="05000000000000000000" pitchFamily="2" charset="2"/>
-              <a:buChar char="Ø"/>
-            </a:pPr>
-            <a:r>
-              <a:rPr lang="en-US" sz="2400" dirty="0" smtClean="0">
-                <a:solidFill>
-                  <a:prstClr val="black"/>
-                </a:solidFill>
-                <a:latin typeface="Arial" panose="020B0604020202020204" pitchFamily="34" charset="0"/>
-                <a:cs typeface="Arial" panose="020B0604020202020204" pitchFamily="34" charset="0"/>
-              </a:rPr>
-              <a:t>Collaboration yields &gt; half the value </a:t>
-            </a:r>
-          </a:p>
         </p:txBody>
       </p:sp>
     </p:spTree>
     <p:extLst>
       <p:ext uri="{BB962C8B-B14F-4D97-AF65-F5344CB8AC3E}">
-        <p14:creationId xmlns:p14="http://schemas.microsoft.com/office/powerpoint/2010/main" val="2086784744"/>
+        <p14:creationId xmlns:p14="http://schemas.microsoft.com/office/powerpoint/2010/main" val="3458236743"/>
       </p:ext>
     </p:extLst>
   </p:cSld>
@@ -8351,11 +8277,7 @@
           <a:p>
             <a:r>
               <a:rPr lang="en-US" dirty="0" smtClean="0"/>
-              <a:t>Common Concerns with </a:t>
-            </a:r>
-            <a:r>
-              <a:rPr lang="en-US" dirty="0" smtClean="0"/>
-              <a:t>TDD</a:t>
+              <a:t>Common Concerns with TDD</a:t>
             </a:r>
             <a:endParaRPr lang="en-US" dirty="0"/>
           </a:p>
@@ -8471,13 +8393,6 @@
               </a:rPr>
               <a:t>What you need is to guide current work and protect it from regressions.  (See Feathers)</a:t>
             </a:r>
-            <a:endParaRPr lang="en-US" sz="2800" dirty="0" smtClean="0">
-              <a:solidFill>
-                <a:prstClr val="black"/>
-              </a:solidFill>
-              <a:latin typeface="Arial" panose="020B0604020202020204" pitchFamily="34" charset="0"/>
-              <a:cs typeface="Arial" panose="020B0604020202020204" pitchFamily="34" charset="0"/>
-            </a:endParaRPr>
           </a:p>
           <a:p>
             <a:pPr marL="457200" indent="-457200">
@@ -8508,17 +8423,7 @@
                 <a:latin typeface="Arial" panose="020B0604020202020204" pitchFamily="34" charset="0"/>
                 <a:cs typeface="Arial" panose="020B0604020202020204" pitchFamily="34" charset="0"/>
               </a:rPr>
-              <a:t>Team needs </a:t>
-            </a:r>
-            <a:r>
-              <a:rPr lang="en-US" sz="2800" dirty="0" smtClean="0">
-                <a:solidFill>
-                  <a:prstClr val="black"/>
-                </a:solidFill>
-                <a:latin typeface="Arial" panose="020B0604020202020204" pitchFamily="34" charset="0"/>
-                <a:cs typeface="Arial" panose="020B0604020202020204" pitchFamily="34" charset="0"/>
-              </a:rPr>
-              <a:t>consensus, not unanimity.</a:t>
+              <a:t>Team needs consensus, not unanimity.</a:t>
             </a:r>
           </a:p>
           <a:p>
@@ -10206,11 +10111,7 @@
             </a:r>
             <a:r>
               <a:rPr lang="en-US" sz="1600" dirty="0" smtClean="0"/>
-              <a:t>, by Kent </a:t>
-            </a:r>
-            <a:r>
-              <a:rPr lang="en-US" sz="1600" dirty="0" smtClean="0"/>
-              <a:t>Beck</a:t>
+              <a:t>, by Kent Beck</a:t>
             </a:r>
           </a:p>
           <a:p>
@@ -10436,6 +10337,70 @@
               </a:rPr>
               <a:t>Conclusion:  Making it So</a:t>
             </a:r>
+          </a:p>
+          <a:p>
+            <a:pPr marL="800100" lvl="1" indent="-342900" defTabSz="914400">
+              <a:spcBef>
+                <a:spcPct val="20000"/>
+              </a:spcBef>
+              <a:buFont typeface="Arial" panose="020B0604020202020204" pitchFamily="34" charset="0"/>
+              <a:buChar char="•"/>
+            </a:pPr>
+            <a:r>
+              <a:rPr lang="en-US" sz="2000" dirty="0">
+                <a:solidFill>
+                  <a:prstClr val="black"/>
+                </a:solidFill>
+                <a:latin typeface="Arial" panose="020B0604020202020204" pitchFamily="34" charset="0"/>
+                <a:cs typeface="Arial" panose="020B0604020202020204" pitchFamily="34" charset="0"/>
+              </a:rPr>
+              <a:t>Context:  Where does it fit in Scrum, etc</a:t>
+            </a:r>
+            <a:r>
+              <a:rPr lang="en-US" sz="2000" dirty="0" smtClean="0">
+                <a:solidFill>
+                  <a:prstClr val="black"/>
+                </a:solidFill>
+                <a:latin typeface="Arial" panose="020B0604020202020204" pitchFamily="34" charset="0"/>
+                <a:cs typeface="Arial" panose="020B0604020202020204" pitchFamily="34" charset="0"/>
+              </a:rPr>
+              <a:t>.</a:t>
+            </a:r>
+          </a:p>
+          <a:p>
+            <a:pPr marL="800100" lvl="1" indent="-342900" defTabSz="914400">
+              <a:spcBef>
+                <a:spcPct val="20000"/>
+              </a:spcBef>
+              <a:buFont typeface="Arial" panose="020B0604020202020204" pitchFamily="34" charset="0"/>
+              <a:buChar char="•"/>
+            </a:pPr>
+            <a:r>
+              <a:rPr lang="en-US" sz="2000" dirty="0" smtClean="0">
+                <a:solidFill>
+                  <a:prstClr val="black"/>
+                </a:solidFill>
+                <a:latin typeface="Arial" panose="020B0604020202020204" pitchFamily="34" charset="0"/>
+                <a:cs typeface="Arial" panose="020B0604020202020204" pitchFamily="34" charset="0"/>
+              </a:rPr>
+              <a:t>Getting Started:  Incremental Adoption for Legacy applications </a:t>
+            </a:r>
+            <a:endParaRPr lang="en-US" sz="2000" dirty="0">
+              <a:solidFill>
+                <a:prstClr val="black"/>
+              </a:solidFill>
+              <a:latin typeface="Arial" panose="020B0604020202020204" pitchFamily="34" charset="0"/>
+              <a:cs typeface="Arial" panose="020B0604020202020204" pitchFamily="34" charset="0"/>
+            </a:endParaRPr>
+          </a:p>
+          <a:p>
+            <a:pPr marL="342900" lvl="0" indent="-342900" defTabSz="914400">
+              <a:spcBef>
+                <a:spcPct val="20000"/>
+              </a:spcBef>
+              <a:buFont typeface="Arial" panose="020B0604020202020204" pitchFamily="34" charset="0"/>
+              <a:buChar char="•"/>
+            </a:pPr>
             <a:endParaRPr lang="en-US" sz="2000" dirty="0" smtClean="0">
               <a:solidFill>
                 <a:prstClr val="black"/>
@@ -10445,71 +10410,6 @@
             </a:endParaRPr>
           </a:p>
           <a:p>
-            <a:pPr marL="800100" lvl="1" indent="-342900" defTabSz="914400">
-              <a:spcBef>
-                <a:spcPct val="20000"/>
-              </a:spcBef>
-              <a:buFont typeface="Arial" panose="020B0604020202020204" pitchFamily="34" charset="0"/>
-              <a:buChar char="•"/>
-            </a:pPr>
-            <a:r>
-              <a:rPr lang="en-US" sz="2000" dirty="0">
-                <a:solidFill>
-                  <a:prstClr val="black"/>
-                </a:solidFill>
-                <a:latin typeface="Arial" panose="020B0604020202020204" pitchFamily="34" charset="0"/>
-                <a:cs typeface="Arial" panose="020B0604020202020204" pitchFamily="34" charset="0"/>
-              </a:rPr>
-              <a:t>Context:  Where does it fit in Scrum, etc</a:t>
-            </a:r>
-            <a:r>
-              <a:rPr lang="en-US" sz="2000" dirty="0" smtClean="0">
-                <a:solidFill>
-                  <a:prstClr val="black"/>
-                </a:solidFill>
-                <a:latin typeface="Arial" panose="020B0604020202020204" pitchFamily="34" charset="0"/>
-                <a:cs typeface="Arial" panose="020B0604020202020204" pitchFamily="34" charset="0"/>
-              </a:rPr>
-              <a:t>.</a:t>
-            </a:r>
-          </a:p>
-          <a:p>
-            <a:pPr marL="800100" lvl="1" indent="-342900" defTabSz="914400">
-              <a:spcBef>
-                <a:spcPct val="20000"/>
-              </a:spcBef>
-              <a:buFont typeface="Arial" panose="020B0604020202020204" pitchFamily="34" charset="0"/>
-              <a:buChar char="•"/>
-            </a:pPr>
-            <a:r>
-              <a:rPr lang="en-US" sz="2000" dirty="0" smtClean="0">
-                <a:solidFill>
-                  <a:prstClr val="black"/>
-                </a:solidFill>
-                <a:latin typeface="Arial" panose="020B0604020202020204" pitchFamily="34" charset="0"/>
-                <a:cs typeface="Arial" panose="020B0604020202020204" pitchFamily="34" charset="0"/>
-              </a:rPr>
-              <a:t>Getting Started:  Incremental </a:t>
-            </a:r>
-            <a:r>
-              <a:rPr lang="en-US" sz="2000" dirty="0" smtClean="0">
-                <a:solidFill>
-                  <a:prstClr val="black"/>
-                </a:solidFill>
-                <a:latin typeface="Arial" panose="020B0604020202020204" pitchFamily="34" charset="0"/>
-                <a:cs typeface="Arial" panose="020B0604020202020204" pitchFamily="34" charset="0"/>
-              </a:rPr>
-              <a:t>Adoption for Legacy applications </a:t>
-            </a:r>
-            <a:endParaRPr lang="en-US" sz="2000" dirty="0">
-              <a:solidFill>
-                <a:prstClr val="black"/>
-              </a:solidFill>
-              <a:latin typeface="Arial" panose="020B0604020202020204" pitchFamily="34" charset="0"/>
-              <a:cs typeface="Arial" panose="020B0604020202020204" pitchFamily="34" charset="0"/>
-            </a:endParaRPr>
-          </a:p>
-          <a:p>
             <a:pPr marL="342900" lvl="0" indent="-342900" defTabSz="914400">
               <a:spcBef>
                 <a:spcPct val="20000"/>
@@ -10517,22 +10417,6 @@
               <a:buFont typeface="Arial" panose="020B0604020202020204" pitchFamily="34" charset="0"/>
               <a:buChar char="•"/>
             </a:pPr>
-            <a:endParaRPr lang="en-US" sz="2000" dirty="0" smtClean="0">
-              <a:solidFill>
-                <a:prstClr val="black"/>
-              </a:solidFill>
-              <a:latin typeface="Arial" panose="020B0604020202020204" pitchFamily="34" charset="0"/>
-              <a:cs typeface="Arial" panose="020B0604020202020204" pitchFamily="34" charset="0"/>
-            </a:endParaRPr>
-          </a:p>
-          <a:p>
-            <a:pPr marL="342900" lvl="0" indent="-342900" defTabSz="914400">
-              <a:spcBef>
-                <a:spcPct val="20000"/>
-              </a:spcBef>
-              <a:buFont typeface="Arial" panose="020B0604020202020204" pitchFamily="34" charset="0"/>
-              <a:buChar char="•"/>
-            </a:pPr>
             <a:r>
               <a:rPr lang="en-US" sz="2000" dirty="0" smtClean="0">
                 <a:solidFill>
@@ -10541,17 +10425,7 @@
                 <a:latin typeface="Arial" panose="020B0604020202020204" pitchFamily="34" charset="0"/>
                 <a:cs typeface="Arial" panose="020B0604020202020204" pitchFamily="34" charset="0"/>
               </a:rPr>
-              <a:t>Questions, Yours &amp; </a:t>
-            </a:r>
-            <a:r>
-              <a:rPr lang="en-US" sz="2000" dirty="0" smtClean="0">
-                <a:solidFill>
-                  <a:prstClr val="black"/>
-                </a:solidFill>
-                <a:latin typeface="Arial" panose="020B0604020202020204" pitchFamily="34" charset="0"/>
-                <a:cs typeface="Arial" panose="020B0604020202020204" pitchFamily="34" charset="0"/>
-              </a:rPr>
-              <a:t>Ours</a:t>
+              <a:t>Questions, Yours &amp; Ours</a:t>
             </a:r>
           </a:p>
           <a:p>
@@ -10668,19 +10542,7 @@
           <a:p>
             <a:r>
               <a:rPr lang="en-US" dirty="0" smtClean="0"/>
-              <a:t>So, If TDD Isn’t </a:t>
-            </a:r>
-            <a:r>
-              <a:rPr lang="en-US" dirty="0" smtClean="0"/>
-              <a:t>About </a:t>
-            </a:r>
-            <a:r>
-              <a:rPr lang="en-US" dirty="0" smtClean="0"/>
-              <a:t>Testing, What IS </a:t>
-            </a:r>
-            <a:r>
-              <a:rPr lang="en-US" dirty="0" smtClean="0"/>
-              <a:t>It?</a:t>
+              <a:t>So, If TDD Isn’t About Testing, What IS It?</a:t>
             </a:r>
             <a:endParaRPr lang="en-US" dirty="0"/>
           </a:p>
@@ -10709,15 +10571,28 @@
           <a:p>
             <a:r>
               <a:rPr lang="en-US" sz="2400" dirty="0" smtClean="0"/>
-              <a:t>It’s about DRIVING </a:t>
-            </a:r>
+              <a:t>It’s about DRIVING DEVELOPMENT</a:t>
+            </a:r>
+          </a:p>
+          <a:p>
+            <a:pPr marL="342900" indent="-342900">
+              <a:buFont typeface="Arial" panose="020B0604020202020204" pitchFamily="34" charset="0"/>
+              <a:buChar char="•"/>
+            </a:pPr>
+            <a:endParaRPr lang="en-US" sz="2400" dirty="0" smtClean="0"/>
+          </a:p>
+          <a:p>
+            <a:pPr marL="800100" lvl="1" indent="-342900">
+              <a:buFont typeface="Arial" panose="020B0604020202020204" pitchFamily="34" charset="0"/>
+              <a:buChar char="•"/>
+            </a:pPr>
             <a:r>
               <a:rPr lang="en-US" sz="2400" dirty="0" smtClean="0"/>
-              <a:t>DEVELOPMENT</a:t>
-            </a:r>
-          </a:p>
-          <a:p>
-            <a:pPr marL="342900" indent="-342900">
+              <a:t>Using CONCRETE EXAMPLES</a:t>
+            </a:r>
+          </a:p>
+          <a:p>
+            <a:pPr marL="800100" lvl="1" indent="-342900">
               <a:buFont typeface="Arial" panose="020B0604020202020204" pitchFamily="34" charset="0"/>
               <a:buChar char="•"/>
             </a:pPr>
@@ -10730,32 +10605,7 @@
             </a:pPr>
             <a:r>
               <a:rPr lang="en-US" sz="2400" dirty="0" smtClean="0"/>
-              <a:t>Using CONCRETE </a:t>
-            </a:r>
-            <a:r>
-              <a:rPr lang="en-US" sz="2400" dirty="0" smtClean="0"/>
-              <a:t>EXAMPLES</a:t>
-            </a:r>
-          </a:p>
-          <a:p>
-            <a:pPr marL="800100" lvl="1" indent="-342900">
-              <a:buFont typeface="Arial" panose="020B0604020202020204" pitchFamily="34" charset="0"/>
-              <a:buChar char="•"/>
-            </a:pPr>
-            <a:endParaRPr lang="en-US" sz="2400" dirty="0" smtClean="0"/>
-          </a:p>
-          <a:p>
-            <a:pPr marL="800100" lvl="1" indent="-342900">
-              <a:buFont typeface="Arial" panose="020B0604020202020204" pitchFamily="34" charset="0"/>
-              <a:buChar char="•"/>
-            </a:pPr>
-            <a:r>
-              <a:rPr lang="en-US" sz="2400" dirty="0" smtClean="0"/>
-              <a:t>To achieve </a:t>
-            </a:r>
-            <a:r>
-              <a:rPr lang="en-US" sz="2400" dirty="0" smtClean="0"/>
-              <a:t>BETTER COLLABORATION</a:t>
+              <a:t>To achieve BETTER COLLABORATION</a:t>
             </a:r>
           </a:p>
           <a:p>
@@ -10785,32 +10635,24 @@
             </a:pPr>
             <a:r>
               <a:rPr lang="en-US" sz="2400" dirty="0" smtClean="0"/>
-              <a:t>Software </a:t>
-            </a:r>
+              <a:t>Software better aligned w/ business</a:t>
+            </a:r>
+          </a:p>
+          <a:p>
+            <a:pPr marL="800100" lvl="1" indent="-342900">
+              <a:buFont typeface="Arial" panose="020B0604020202020204" pitchFamily="34" charset="0"/>
+              <a:buChar char="•"/>
+            </a:pPr>
+            <a:endParaRPr lang="en-US" sz="2400" dirty="0" smtClean="0"/>
+          </a:p>
+          <a:p>
+            <a:pPr marL="800100" lvl="1" indent="-342900">
+              <a:buFont typeface="Arial" panose="020B0604020202020204" pitchFamily="34" charset="0"/>
+              <a:buChar char="•"/>
+            </a:pPr>
             <a:r>
               <a:rPr lang="en-US" sz="2400" dirty="0" smtClean="0"/>
-              <a:t>better aligned w/ business</a:t>
-            </a:r>
-          </a:p>
-          <a:p>
-            <a:pPr marL="800100" lvl="1" indent="-342900">
-              <a:buFont typeface="Arial" panose="020B0604020202020204" pitchFamily="34" charset="0"/>
-              <a:buChar char="•"/>
-            </a:pPr>
-            <a:endParaRPr lang="en-US" sz="2400" dirty="0" smtClean="0"/>
-          </a:p>
-          <a:p>
-            <a:pPr marL="800100" lvl="1" indent="-342900">
-              <a:buFont typeface="Arial" panose="020B0604020202020204" pitchFamily="34" charset="0"/>
-              <a:buChar char="•"/>
-            </a:pPr>
-            <a:r>
-              <a:rPr lang="en-US" sz="2400" dirty="0" smtClean="0"/>
-              <a:t>And BETTER SOFTWARE DESIGN</a:t>
-            </a:r>
-            <a:r>
-              <a:rPr lang="en-US" sz="2400" dirty="0" smtClean="0"/>
-              <a:t>.</a:t>
+              <a:t>And BETTER SOFTWARE DESIGN.</a:t>
             </a:r>
           </a:p>
           <a:p>
@@ -10831,10 +10673,6 @@
             <a:r>
               <a:rPr lang="en-US" sz="2400" dirty="0" smtClean="0"/>
               <a:t>“Early Warning” regression tests.</a:t>
-            </a:r>
-            <a:r>
-              <a:rPr lang="en-US" sz="2400" dirty="0" smtClean="0"/>
-              <a:t/>
             </a:r>
             <a:br>
               <a:rPr lang="en-US" sz="2400" dirty="0" smtClean="0"/>
@@ -10909,11 +10747,7 @@
           <a:p>
             <a:r>
               <a:rPr lang="en-US" dirty="0" smtClean="0"/>
-              <a:t>Well, It’s ABOUT that, but </a:t>
-            </a:r>
-            <a:r>
-              <a:rPr lang="en-US" dirty="0" smtClean="0"/>
-              <a:t>What IS it?</a:t>
+              <a:t>Well, It’s ABOUT that, but What IS it?</a:t>
             </a:r>
             <a:endParaRPr lang="en-US" dirty="0"/>
           </a:p>
@@ -10946,46 +10780,25 @@
             </a:pPr>
             <a:r>
               <a:rPr lang="en-US" sz="2000" dirty="0" smtClean="0"/>
-              <a:t>Acceptance </a:t>
-            </a:r>
+              <a:t>Acceptance &amp; Unit Tests:  Nested Loops</a:t>
+            </a:r>
+          </a:p>
+          <a:p>
+            <a:pPr marL="342900" indent="-342900">
+              <a:buFont typeface="Arial" panose="020B0604020202020204" pitchFamily="34" charset="0"/>
+              <a:buChar char="•"/>
+            </a:pPr>
+            <a:endParaRPr lang="en-US" sz="2000" dirty="0" smtClean="0"/>
+          </a:p>
+          <a:p>
+            <a:pPr marL="800100" lvl="1" indent="-342900">
+              <a:buFont typeface="Arial" panose="020B0604020202020204" pitchFamily="34" charset="0"/>
+              <a:buChar char="•"/>
+            </a:pPr>
             <a:r>
               <a:rPr lang="en-US" sz="2000" dirty="0" smtClean="0"/>
-              <a:t>&amp; Unit Tests:  Nested </a:t>
-            </a:r>
-            <a:r>
-              <a:rPr lang="en-US" sz="2000" dirty="0" smtClean="0"/>
-              <a:t>Loops</a:t>
-            </a:r>
-          </a:p>
-          <a:p>
-            <a:pPr marL="342900" indent="-342900">
-              <a:buFont typeface="Arial" panose="020B0604020202020204" pitchFamily="34" charset="0"/>
-              <a:buChar char="•"/>
-            </a:pPr>
-            <a:endParaRPr lang="en-US" sz="2000" dirty="0" smtClean="0"/>
-          </a:p>
-          <a:p>
-            <a:pPr marL="800100" lvl="1" indent="-342900">
-              <a:buFont typeface="Arial" panose="020B0604020202020204" pitchFamily="34" charset="0"/>
-              <a:buChar char="•"/>
-            </a:pPr>
-            <a:r>
-              <a:rPr lang="en-US" sz="2000" dirty="0" smtClean="0"/>
-              <a:t>ATDD (a.k.a. BDD):  </a:t>
-            </a:r>
-            <a:r>
-              <a:rPr lang="en-US" sz="2000" dirty="0" smtClean="0"/>
-              <a:t>Collaborate to Build </a:t>
-            </a:r>
-            <a:r>
-              <a:rPr lang="en-US" sz="2000" dirty="0" smtClean="0"/>
-              <a:t>the </a:t>
-            </a:r>
-            <a:r>
-              <a:rPr lang="en-US" sz="2000" dirty="0" smtClean="0"/>
-              <a:t>Right Thing</a:t>
-            </a:r>
-            <a:endParaRPr lang="en-US" sz="2000" dirty="0" smtClean="0"/>
+              <a:t>ATDD (a.k.a. BDD):  Collaborate to Build the Right Thing</a:t>
+            </a:r>
           </a:p>
           <a:p>
             <a:pPr marL="1257300" lvl="2" indent="-342900">
@@ -11014,26 +10827,17 @@
             </a:pPr>
             <a:r>
               <a:rPr lang="en-US" sz="2000" dirty="0" smtClean="0"/>
-              <a:t>Ubiquitous </a:t>
-            </a:r>
+              <a:t>Ubiquitous Language for the domain</a:t>
+            </a:r>
+          </a:p>
+          <a:p>
+            <a:pPr marL="1257300" lvl="2" indent="-342900">
+              <a:buFont typeface="Arial" panose="020B0604020202020204" pitchFamily="34" charset="0"/>
+              <a:buChar char="•"/>
+            </a:pPr>
             <a:r>
               <a:rPr lang="en-US" sz="2000" dirty="0" smtClean="0"/>
-              <a:t>Language for the domain</a:t>
-            </a:r>
-            <a:endParaRPr lang="en-US" sz="2000" dirty="0" smtClean="0"/>
-          </a:p>
-          <a:p>
-            <a:pPr marL="1257300" lvl="2" indent="-342900">
-              <a:buFont typeface="Arial" panose="020B0604020202020204" pitchFamily="34" charset="0"/>
-              <a:buChar char="•"/>
-            </a:pPr>
-            <a:r>
-              <a:rPr lang="en-US" sz="2000" dirty="0" smtClean="0"/>
-              <a:t>Tools:  Cucumber</a:t>
-            </a:r>
-            <a:r>
-              <a:rPr lang="en-US" sz="2000" dirty="0" smtClean="0"/>
-              <a:t>, Spock, </a:t>
+              <a:t>Tools:  Cucumber, Spock, </a:t>
             </a:r>
             <a:r>
               <a:rPr lang="en-US" sz="2000" dirty="0" err="1" smtClean="0"/>
@@ -11041,42 +10845,25 @@
             </a:r>
             <a:r>
               <a:rPr lang="en-US" sz="2000" dirty="0" smtClean="0"/>
-              <a:t>, etc</a:t>
-            </a:r>
+              <a:t>, etc.</a:t>
+            </a:r>
+          </a:p>
+          <a:p>
+            <a:pPr marL="1257300" lvl="2" indent="-342900">
+              <a:buFont typeface="Arial" panose="020B0604020202020204" pitchFamily="34" charset="0"/>
+              <a:buChar char="•"/>
+            </a:pPr>
+            <a:endParaRPr lang="en-US" sz="2000" dirty="0" smtClean="0"/>
+          </a:p>
+          <a:p>
+            <a:pPr marL="800100" lvl="1" indent="-342900">
+              <a:buFont typeface="Arial" panose="020B0604020202020204" pitchFamily="34" charset="0"/>
+              <a:buChar char="•"/>
+            </a:pPr>
             <a:r>
               <a:rPr lang="en-US" sz="2000" dirty="0" smtClean="0"/>
-              <a:t>.</a:t>
-            </a:r>
-          </a:p>
-          <a:p>
-            <a:pPr marL="1257300" lvl="2" indent="-342900">
-              <a:buFont typeface="Arial" panose="020B0604020202020204" pitchFamily="34" charset="0"/>
-              <a:buChar char="•"/>
-            </a:pPr>
-            <a:endParaRPr lang="en-US" sz="2000" dirty="0" smtClean="0"/>
-          </a:p>
-          <a:p>
-            <a:pPr marL="800100" lvl="1" indent="-342900">
-              <a:buFont typeface="Arial" panose="020B0604020202020204" pitchFamily="34" charset="0"/>
-              <a:buChar char="•"/>
-            </a:pPr>
-            <a:r>
-              <a:rPr lang="en-US" sz="2000" dirty="0" smtClean="0"/>
-              <a:t>Unit TDD:  </a:t>
-            </a:r>
-            <a:r>
-              <a:rPr lang="en-US" sz="2000" dirty="0" smtClean="0"/>
-              <a:t>Test First to Build </a:t>
-            </a:r>
-            <a:r>
-              <a:rPr lang="en-US" sz="2000" dirty="0" smtClean="0"/>
-              <a:t>the </a:t>
-            </a:r>
-            <a:r>
-              <a:rPr lang="en-US" sz="2000" dirty="0" smtClean="0"/>
-              <a:t>Thing Right</a:t>
-            </a:r>
-            <a:endParaRPr lang="en-US" sz="2000" dirty="0" smtClean="0"/>
+              <a:t>Unit TDD:  Test First to Build the Thing Right</a:t>
+            </a:r>
           </a:p>
           <a:p>
             <a:pPr marL="1257300" lvl="2" indent="-342900">
@@ -11173,7 +10960,6 @@
               <a:rPr lang="en-US" sz="2000" dirty="0" smtClean="0"/>
               <a:t>Tidy up.  (Boy Scouts’ campsite rule)</a:t>
             </a:r>
-            <a:endParaRPr lang="en-US" sz="2000" dirty="0" smtClean="0"/>
           </a:p>
         </p:txBody>
       </p:sp>
@@ -11330,13 +11116,8 @@
             </a:pPr>
             <a:r>
               <a:rPr lang="en-US" sz="2400" dirty="0" smtClean="0"/>
-              <a:t>PO:  “I know it when I see </a:t>
-            </a:r>
-            <a:r>
-              <a:rPr lang="en-US" sz="2400" dirty="0" smtClean="0"/>
-              <a:t>it”</a:t>
-            </a:r>
-            <a:endParaRPr lang="en-US" sz="2400" dirty="0" smtClean="0"/>
+              <a:t>PO:  “I know it when I see it”</a:t>
+            </a:r>
           </a:p>
           <a:p>
             <a:pPr marL="1257300" lvl="2" indent="-342900">
@@ -11481,11 +11262,7 @@
             </a:pPr>
             <a:r>
               <a:rPr lang="en-US" sz="2000" dirty="0" smtClean="0"/>
-              <a:t>Dev realizes, “Clearly</a:t>
-            </a:r>
-            <a:r>
-              <a:rPr lang="en-US" sz="2000" dirty="0" smtClean="0"/>
-              <a:t>, it should…”</a:t>
+              <a:t>Dev realizes, “Clearly, it should…”</a:t>
             </a:r>
           </a:p>
           <a:p>
@@ -11609,13 +11386,8 @@
             </a:pPr>
             <a:r>
               <a:rPr lang="en-US" sz="2000" dirty="0" smtClean="0"/>
-              <a:t>Better:  Split </a:t>
-            </a:r>
-            <a:r>
-              <a:rPr lang="en-US" sz="2000" dirty="0" smtClean="0"/>
-              <a:t>test scenarios into cohesive subgroups</a:t>
-            </a:r>
-            <a:endParaRPr lang="en-US" sz="2000" dirty="0" smtClean="0"/>
+              <a:t>Better:  Split test scenarios into cohesive subgroups</a:t>
+            </a:r>
           </a:p>
         </p:txBody>
       </p:sp>
@@ -14679,21 +14451,6 @@
 </file>
 
 <file path=customXml/item1.xml><?xml version="1.0" encoding="utf-8"?>
-<?mso-contentType ?>
-<FormTemplates xmlns="http://schemas.microsoft.com/sharepoint/v3/contenttype/forms">
-  <Display>DocumentLibraryForm</Display>
-  <Edit>DocumentLibraryForm</Edit>
-  <New>DocumentLibraryForm</New>
-</FormTemplates>
-</file>
-
-<file path=customXml/item2.xml><?xml version="1.0" encoding="utf-8"?>
-<p:properties xmlns:p="http://schemas.microsoft.com/office/2006/metadata/properties" xmlns:xsi="http://www.w3.org/2001/XMLSchema-instance">
-  <documentManagement/>
-</p:properties>
-</file>
-
-<file path=customXml/item3.xml><?xml version="1.0" encoding="utf-8"?>
 <ct:contentTypeSchema xmlns:ct="http://schemas.microsoft.com/office/2006/metadata/contentType" xmlns:ma="http://schemas.microsoft.com/office/2006/metadata/properties/metaAttributes" ct:_="" ma:_="" ma:contentTypeName="Document" ma:contentTypeID="0x010100C185F5ACA656F14087A05F42EBBFA9A8" ma:contentTypeVersion="0" ma:contentTypeDescription="Create a new document." ma:contentTypeScope="" ma:versionID="041bc488044e506d1aa9ac78f8beef06">
   <xsd:schema xmlns:xsd="http://www.w3.org/2001/XMLSchema" xmlns:p="http://schemas.microsoft.com/office/2006/metadata/properties" targetNamespace="http://schemas.microsoft.com/office/2006/metadata/properties" ma:root="true" ma:fieldsID="4aeb20c0e3442673af7ee10786458764">
     <xsd:element name="properties">
@@ -14742,10 +14499,32 @@
 </ct:contentTypeSchema>
 </file>
 
+<file path=customXml/item2.xml><?xml version="1.0" encoding="utf-8"?>
+<p:properties xmlns:p="http://schemas.microsoft.com/office/2006/metadata/properties" xmlns:xsi="http://www.w3.org/2001/XMLSchema-instance">
+  <documentManagement/>
+</p:properties>
+</file>
+
+<file path=customXml/item3.xml><?xml version="1.0" encoding="utf-8"?>
+<?mso-contentType ?>
+<FormTemplates xmlns="http://schemas.microsoft.com/sharepoint/v3/contenttype/forms">
+  <Display>DocumentLibraryForm</Display>
+  <Edit>DocumentLibraryForm</Edit>
+  <New>DocumentLibraryForm</New>
+</FormTemplates>
+</file>
+
 <file path=customXml/itemProps1.xml><?xml version="1.0" encoding="utf-8"?>
-<ds:datastoreItem xmlns:ds="http://schemas.openxmlformats.org/officeDocument/2006/customXml" ds:itemID="{7FD9A7D6-067B-4743-A0EF-B168F7D01ADB}">
+<ds:datastoreItem xmlns:ds="http://schemas.openxmlformats.org/officeDocument/2006/customXml" ds:itemID="{4D535F13-7955-4883-ACF0-A34D95CAB0DB}">
   <ds:schemaRefs>
-    <ds:schemaRef ds:uri="http://schemas.microsoft.com/sharepoint/v3/contenttype/forms"/>
+    <ds:schemaRef ds:uri="http://schemas.microsoft.com/office/2006/metadata/contentType"/>
+    <ds:schemaRef ds:uri="http://schemas.microsoft.com/office/2006/metadata/properties/metaAttributes"/>
+    <ds:schemaRef ds:uri="http://www.w3.org/2001/XMLSchema"/>
+    <ds:schemaRef ds:uri="http://schemas.microsoft.com/office/2006/metadata/properties"/>
+    <ds:schemaRef ds:uri="http://schemas.openxmlformats.org/package/2006/metadata/core-properties"/>
+    <ds:schemaRef ds:uri="http://purl.org/dc/elements/1.1/"/>
+    <ds:schemaRef ds:uri="http://purl.org/dc/terms/"/>
+    <ds:schemaRef ds:uri="http://schemas.microsoft.com/office/internal/2005/internalDocumentation"/>
   </ds:schemaRefs>
 </ds:datastoreItem>
 </file>
@@ -14765,16 +14544,9 @@
 </file>
 
 <file path=customXml/itemProps3.xml><?xml version="1.0" encoding="utf-8"?>
-<ds:datastoreItem xmlns:ds="http://schemas.openxmlformats.org/officeDocument/2006/customXml" ds:itemID="{4D535F13-7955-4883-ACF0-A34D95CAB0DB}">
+<ds:datastoreItem xmlns:ds="http://schemas.openxmlformats.org/officeDocument/2006/customXml" ds:itemID="{7FD9A7D6-067B-4743-A0EF-B168F7D01ADB}">
   <ds:schemaRefs>
-    <ds:schemaRef ds:uri="http://schemas.microsoft.com/office/2006/metadata/contentType"/>
-    <ds:schemaRef ds:uri="http://schemas.microsoft.com/office/2006/metadata/properties/metaAttributes"/>
-    <ds:schemaRef ds:uri="http://www.w3.org/2001/XMLSchema"/>
-    <ds:schemaRef ds:uri="http://schemas.microsoft.com/office/2006/metadata/properties"/>
-    <ds:schemaRef ds:uri="http://schemas.openxmlformats.org/package/2006/metadata/core-properties"/>
-    <ds:schemaRef ds:uri="http://purl.org/dc/elements/1.1/"/>
-    <ds:schemaRef ds:uri="http://purl.org/dc/terms/"/>
-    <ds:schemaRef ds:uri="http://schemas.microsoft.com/office/internal/2005/internalDocumentation"/>
+    <ds:schemaRef ds:uri="http://schemas.microsoft.com/sharepoint/v3/contenttype/forms"/>
   </ds:schemaRefs>
 </ds:datastoreItem>
 </file>
</xml_diff>

<commit_message>
add amazon hyperlinks to reference books
</commit_message>
<xml_diff>
--- a/doc/TDD Overview.pptx
+++ b/doc/TDD Overview.pptx
@@ -10,10 +10,10 @@
     <p:sldMasterId id="2147483680" r:id="rId9"/>
   </p:sldMasterIdLst>
   <p:notesMasterIdLst>
-    <p:notesMasterId r:id="rId28"/>
+    <p:notesMasterId r:id="rId29"/>
   </p:notesMasterIdLst>
   <p:handoutMasterIdLst>
-    <p:handoutMasterId r:id="rId29"/>
+    <p:handoutMasterId r:id="rId30"/>
   </p:handoutMasterIdLst>
   <p:sldIdLst>
     <p:sldId id="292" r:id="rId10"/>
@@ -25,15 +25,16 @@
     <p:sldId id="343" r:id="rId16"/>
     <p:sldId id="312" r:id="rId17"/>
     <p:sldId id="321" r:id="rId18"/>
-    <p:sldId id="345" r:id="rId19"/>
-    <p:sldId id="347" r:id="rId20"/>
-    <p:sldId id="349" r:id="rId21"/>
-    <p:sldId id="338" r:id="rId22"/>
-    <p:sldId id="344" r:id="rId23"/>
-    <p:sldId id="346" r:id="rId24"/>
-    <p:sldId id="340" r:id="rId25"/>
-    <p:sldId id="313" r:id="rId26"/>
-    <p:sldId id="316" r:id="rId27"/>
+    <p:sldId id="351" r:id="rId19"/>
+    <p:sldId id="345" r:id="rId20"/>
+    <p:sldId id="347" r:id="rId21"/>
+    <p:sldId id="349" r:id="rId22"/>
+    <p:sldId id="338" r:id="rId23"/>
+    <p:sldId id="344" r:id="rId24"/>
+    <p:sldId id="346" r:id="rId25"/>
+    <p:sldId id="340" r:id="rId26"/>
+    <p:sldId id="313" r:id="rId27"/>
+    <p:sldId id="316" r:id="rId28"/>
   </p:sldIdLst>
   <p:sldSz cx="9144000" cy="6858000" type="screen4x3"/>
   <p:notesSz cx="6858000" cy="9144000"/>
@@ -233,7 +234,7 @@
           <a:p>
             <a:fld id="{03EC2291-6B67-6F43-B658-89BCABFCDE35}" type="datetime1">
               <a:rPr lang="en-US" smtClean="0"/>
-              <a:t>6/13/2016</a:t>
+              <a:t>6/15/2016</a:t>
             </a:fld>
             <a:endParaRPr lang="en-US"/>
           </a:p>
@@ -399,7 +400,7 @@
           <a:p>
             <a:fld id="{714D06C8-12BB-8D46-9F94-179D66834F58}" type="datetime1">
               <a:rPr lang="en-US" smtClean="0"/>
-              <a:t>6/13/2016</a:t>
+              <a:t>6/15/2016</a:t>
             </a:fld>
             <a:endParaRPr lang="en-US"/>
           </a:p>
@@ -796,348 +797,7 @@
           <a:bodyPr/>
           <a:lstStyle/>
           <a:p>
-            <a:pPr marL="342900" lvl="0" indent="-342900" defTabSz="914400">
-              <a:spcBef>
-                <a:spcPct val="20000"/>
-              </a:spcBef>
-              <a:buFont typeface="Arial" panose="020B0604020202020204" pitchFamily="34" charset="0"/>
-              <a:buChar char="•"/>
-            </a:pPr>
-            <a:r>
-              <a:rPr lang="en-US" sz="2400" baseline="0" dirty="0" smtClean="0">
-                <a:solidFill>
-                  <a:prstClr val="black"/>
-                </a:solidFill>
-                <a:latin typeface="Arial" panose="020B0604020202020204" pitchFamily="34" charset="0"/>
-                <a:cs typeface="Arial" panose="020B0604020202020204" pitchFamily="34" charset="0"/>
-              </a:rPr>
-              <a:t>ATDD</a:t>
-            </a:r>
-          </a:p>
-          <a:p>
-            <a:pPr marL="800100" lvl="1" indent="-342900" defTabSz="914400">
-              <a:spcBef>
-                <a:spcPct val="20000"/>
-              </a:spcBef>
-              <a:buFont typeface="Arial" panose="020B0604020202020204" pitchFamily="34" charset="0"/>
-              <a:buChar char="•"/>
-            </a:pPr>
-            <a:r>
-              <a:rPr lang="en-US" sz="2400" baseline="0" dirty="0" smtClean="0">
-                <a:solidFill>
-                  <a:prstClr val="black"/>
-                </a:solidFill>
-                <a:latin typeface="Arial" panose="020B0604020202020204" pitchFamily="34" charset="0"/>
-                <a:cs typeface="Arial" panose="020B0604020202020204" pitchFamily="34" charset="0"/>
-              </a:rPr>
-              <a:t>Gherkin - Start with the “three amigos” – PO, Dev, Tester</a:t>
-            </a:r>
-          </a:p>
-          <a:p>
-            <a:pPr marL="1257300" marR="0" lvl="2" indent="-342900" algn="l" defTabSz="914400" rtl="0" eaLnBrk="1" fontAlgn="auto" latinLnBrk="0" hangingPunct="1">
-              <a:lnSpc>
-                <a:spcPct val="100000"/>
-              </a:lnSpc>
-              <a:spcBef>
-                <a:spcPct val="20000"/>
-              </a:spcBef>
-              <a:spcAft>
-                <a:spcPts val="0"/>
-              </a:spcAft>
-              <a:buClrTx/>
-              <a:buSzTx/>
-              <a:buFont typeface="Arial" panose="020B0604020202020204" pitchFamily="34" charset="0"/>
-              <a:buChar char="•"/>
-              <a:tabLst/>
-              <a:defRPr/>
-            </a:pPr>
-            <a:r>
-              <a:rPr lang="en-US" sz="2400" u="none" baseline="0" dirty="0" smtClean="0">
-                <a:solidFill>
-                  <a:prstClr val="black"/>
-                </a:solidFill>
-                <a:latin typeface="Arial" panose="020B0604020202020204" pitchFamily="34" charset="0"/>
-                <a:cs typeface="Arial" panose="020B0604020202020204" pitchFamily="34" charset="0"/>
-              </a:rPr>
-              <a:t>“You can achieve at least half of the benefit of Cucumber just by having the discipline to sit down with your business stakeholders and write scenarios collaboratively.  The conversations sparked by that process will uncover so many potential bugs or schedule overruns that you’ll already have made a huge win, even if you choose never to automate your features.” – </a:t>
-            </a:r>
-            <a:r>
-              <a:rPr lang="en-US" sz="2400" u="sng" baseline="0" dirty="0" smtClean="0">
-                <a:solidFill>
-                  <a:prstClr val="black"/>
-                </a:solidFill>
-                <a:latin typeface="Arial" panose="020B0604020202020204" pitchFamily="34" charset="0"/>
-                <a:cs typeface="Arial" panose="020B0604020202020204" pitchFamily="34" charset="0"/>
-              </a:rPr>
-              <a:t>The Cucumber Book</a:t>
-            </a:r>
-            <a:r>
-              <a:rPr lang="en-US" sz="2400" u="none" baseline="0" dirty="0" smtClean="0">
-                <a:solidFill>
-                  <a:prstClr val="black"/>
-                </a:solidFill>
-                <a:latin typeface="Arial" panose="020B0604020202020204" pitchFamily="34" charset="0"/>
-                <a:cs typeface="Arial" panose="020B0604020202020204" pitchFamily="34" charset="0"/>
-              </a:rPr>
-              <a:t>.</a:t>
-            </a:r>
-          </a:p>
-          <a:p>
-            <a:pPr marL="1257300" lvl="2" indent="-342900" defTabSz="914400">
-              <a:spcBef>
-                <a:spcPct val="20000"/>
-              </a:spcBef>
-              <a:buFont typeface="Arial" panose="020B0604020202020204" pitchFamily="34" charset="0"/>
-              <a:buChar char="•"/>
-            </a:pPr>
-            <a:r>
-              <a:rPr lang="en-US" sz="2400" baseline="0" dirty="0" smtClean="0">
-                <a:solidFill>
-                  <a:prstClr val="black"/>
-                </a:solidFill>
-                <a:latin typeface="Arial" panose="020B0604020202020204" pitchFamily="34" charset="0"/>
-                <a:cs typeface="Arial" panose="020B0604020202020204" pitchFamily="34" charset="0"/>
-              </a:rPr>
-              <a:t>“When the team write their acceptance tests collaboratively, they can develop their own ubiquitous language for talking about their problem domain.  This helps them avoid misunderstandings.” – </a:t>
-            </a:r>
-            <a:r>
-              <a:rPr lang="en-US" sz="2400" u="sng" baseline="0" dirty="0" smtClean="0">
-                <a:solidFill>
-                  <a:prstClr val="black"/>
-                </a:solidFill>
-                <a:latin typeface="Arial" panose="020B0604020202020204" pitchFamily="34" charset="0"/>
-                <a:cs typeface="Arial" panose="020B0604020202020204" pitchFamily="34" charset="0"/>
-              </a:rPr>
-              <a:t>The Cucumber Book</a:t>
-            </a:r>
-            <a:r>
-              <a:rPr lang="en-US" sz="2400" u="none" baseline="0" dirty="0" smtClean="0">
-                <a:solidFill>
-                  <a:prstClr val="black"/>
-                </a:solidFill>
-                <a:latin typeface="Arial" panose="020B0604020202020204" pitchFamily="34" charset="0"/>
-                <a:cs typeface="Arial" panose="020B0604020202020204" pitchFamily="34" charset="0"/>
-              </a:rPr>
-              <a:t>.</a:t>
-            </a:r>
-          </a:p>
-          <a:p>
-            <a:pPr marL="1257300" lvl="2" indent="-342900" defTabSz="914400">
-              <a:spcBef>
-                <a:spcPct val="20000"/>
-              </a:spcBef>
-              <a:buFont typeface="Arial" panose="020B0604020202020204" pitchFamily="34" charset="0"/>
-              <a:buChar char="•"/>
-            </a:pPr>
-            <a:r>
-              <a:rPr lang="en-US" sz="2400" u="none" baseline="0" dirty="0" smtClean="0">
-                <a:solidFill>
-                  <a:prstClr val="black"/>
-                </a:solidFill>
-                <a:latin typeface="Arial" panose="020B0604020202020204" pitchFamily="34" charset="0"/>
-                <a:cs typeface="Arial" panose="020B0604020202020204" pitchFamily="34" charset="0"/>
-              </a:rPr>
-              <a:t>“Try to avoid being guided by existing step definitions when you write your scenarios, and just write down exactly what you want to happen, in plain English.  </a:t>
-            </a:r>
-            <a:r>
-              <a:rPr lang="en-US" sz="2400" b="1" u="none" baseline="0" dirty="0" smtClean="0">
-                <a:solidFill>
-                  <a:prstClr val="black"/>
-                </a:solidFill>
-                <a:latin typeface="Arial" panose="020B0604020202020204" pitchFamily="34" charset="0"/>
-                <a:cs typeface="Arial" panose="020B0604020202020204" pitchFamily="34" charset="0"/>
-              </a:rPr>
-              <a:t>In fact, try to avoid programmers or testers writing scenarios on their own.</a:t>
-            </a:r>
-            <a:r>
-              <a:rPr lang="en-US" sz="2400" u="none" baseline="0" dirty="0" smtClean="0">
-                <a:solidFill>
-                  <a:prstClr val="black"/>
-                </a:solidFill>
-                <a:latin typeface="Arial" panose="020B0604020202020204" pitchFamily="34" charset="0"/>
-                <a:cs typeface="Arial" panose="020B0604020202020204" pitchFamily="34" charset="0"/>
-              </a:rPr>
-              <a:t>  Instead, get nontechnical stakeholders or analysts to write the first draft of each scenario from a purely business-focused perspective or ideally in a pair with a programmer to help them share their mental model.  With a well-engineered support layer, you can confidently and quickly write new step definitions to match the way the scenario has been expressed.” – </a:t>
-            </a:r>
-            <a:r>
-              <a:rPr lang="en-US" sz="2400" u="sng" baseline="0" dirty="0" smtClean="0">
-                <a:solidFill>
-                  <a:prstClr val="black"/>
-                </a:solidFill>
-                <a:latin typeface="Arial" panose="020B0604020202020204" pitchFamily="34" charset="0"/>
-                <a:cs typeface="Arial" panose="020B0604020202020204" pitchFamily="34" charset="0"/>
-              </a:rPr>
-              <a:t>The Cucumber Book</a:t>
-            </a:r>
-            <a:r>
-              <a:rPr lang="en-US" sz="2400" u="none" baseline="0" dirty="0" smtClean="0">
-                <a:solidFill>
-                  <a:prstClr val="black"/>
-                </a:solidFill>
-                <a:latin typeface="Arial" panose="020B0604020202020204" pitchFamily="34" charset="0"/>
-                <a:cs typeface="Arial" panose="020B0604020202020204" pitchFamily="34" charset="0"/>
-              </a:rPr>
-              <a:t>.</a:t>
-            </a:r>
-          </a:p>
-          <a:p>
-            <a:pPr marL="1257300" lvl="2" indent="-342900" defTabSz="914400">
-              <a:spcBef>
-                <a:spcPct val="20000"/>
-              </a:spcBef>
-              <a:buFont typeface="Arial" panose="020B0604020202020204" pitchFamily="34" charset="0"/>
-              <a:buChar char="•"/>
-            </a:pPr>
-            <a:r>
-              <a:rPr lang="en-US" sz="2400" u="none" baseline="0" dirty="0" smtClean="0">
-                <a:solidFill>
-                  <a:prstClr val="black"/>
-                </a:solidFill>
-                <a:latin typeface="Arial" panose="020B0604020202020204" pitchFamily="34" charset="0"/>
-                <a:cs typeface="Arial" panose="020B0604020202020204" pitchFamily="34" charset="0"/>
-              </a:rPr>
-              <a:t>“Cucumber might just seem like a testing tool, but at its heart it’s really a collaboration tool.  If you make a genuine effort to write features that work as documentation for the nontechnical stakeholders on your team, you’ll find you are forced to talk with them about details that you might never have otherwise made the time to talk about.  Those conversations reveal insights about their understanding of the problem, insights that will help you build a much better solution than you would have otherwise.  </a:t>
-            </a:r>
-            <a:r>
-              <a:rPr lang="en-US" sz="2400" b="1" u="none" baseline="0" dirty="0" smtClean="0">
-                <a:solidFill>
-                  <a:prstClr val="black"/>
-                </a:solidFill>
-                <a:latin typeface="Arial" panose="020B0604020202020204" pitchFamily="34" charset="0"/>
-                <a:cs typeface="Arial" panose="020B0604020202020204" pitchFamily="34" charset="0"/>
-              </a:rPr>
-              <a:t>This is Cucumber’s big secret:  the tests and documentation are just a happy side effect; the real value lies in the knowledge you discover during those conversations.</a:t>
-            </a:r>
-            <a:r>
-              <a:rPr lang="en-US" sz="2400" u="none" baseline="0" dirty="0" smtClean="0">
-                <a:solidFill>
-                  <a:prstClr val="black"/>
-                </a:solidFill>
-                <a:latin typeface="Arial" panose="020B0604020202020204" pitchFamily="34" charset="0"/>
-                <a:cs typeface="Arial" panose="020B0604020202020204" pitchFamily="34" charset="0"/>
-              </a:rPr>
-              <a:t>” – </a:t>
-            </a:r>
-            <a:r>
-              <a:rPr lang="en-US" sz="2400" u="sng" baseline="0" dirty="0" smtClean="0">
-                <a:solidFill>
-                  <a:prstClr val="black"/>
-                </a:solidFill>
-                <a:latin typeface="Arial" panose="020B0604020202020204" pitchFamily="34" charset="0"/>
-                <a:cs typeface="Arial" panose="020B0604020202020204" pitchFamily="34" charset="0"/>
-              </a:rPr>
-              <a:t>The Cucumber Book</a:t>
-            </a:r>
-            <a:r>
-              <a:rPr lang="en-US" sz="2400" u="none" baseline="0" dirty="0" smtClean="0">
-                <a:solidFill>
-                  <a:prstClr val="black"/>
-                </a:solidFill>
-                <a:latin typeface="Arial" panose="020B0604020202020204" pitchFamily="34" charset="0"/>
-                <a:cs typeface="Arial" panose="020B0604020202020204" pitchFamily="34" charset="0"/>
-              </a:rPr>
-              <a:t>.</a:t>
-            </a:r>
-            <a:endParaRPr lang="en-US" sz="1200" u="none" baseline="0" dirty="0">
-              <a:solidFill>
-                <a:schemeClr val="tx1"/>
-              </a:solidFill>
-              <a:latin typeface="+mn-lt"/>
-              <a:cs typeface="+mn-cs"/>
-            </a:endParaRPr>
-          </a:p>
-          <a:p>
-            <a:pPr marL="342900" lvl="0" indent="-342900" defTabSz="914400">
-              <a:spcBef>
-                <a:spcPct val="20000"/>
-              </a:spcBef>
-              <a:buFont typeface="Arial" panose="020B0604020202020204" pitchFamily="34" charset="0"/>
-              <a:buChar char="•"/>
-            </a:pPr>
-            <a:r>
-              <a:rPr lang="en-US" sz="2400" u="none" baseline="0" dirty="0" smtClean="0">
-                <a:solidFill>
-                  <a:schemeClr val="tx1"/>
-                </a:solidFill>
-                <a:latin typeface="+mn-lt"/>
-                <a:cs typeface="+mn-cs"/>
-              </a:rPr>
-              <a:t>Unit TDD</a:t>
-            </a:r>
-          </a:p>
-          <a:p>
-            <a:pPr marL="800100" lvl="1" indent="-342900" defTabSz="914400">
-              <a:spcBef>
-                <a:spcPct val="20000"/>
-              </a:spcBef>
-              <a:buFont typeface="Arial" panose="020B0604020202020204" pitchFamily="34" charset="0"/>
-              <a:buChar char="•"/>
-            </a:pPr>
-            <a:r>
-              <a:rPr lang="en-US" sz="2400" u="none" baseline="0" dirty="0" smtClean="0">
-                <a:solidFill>
-                  <a:schemeClr val="tx1"/>
-                </a:solidFill>
-                <a:latin typeface="+mn-lt"/>
-                <a:cs typeface="+mn-cs"/>
-              </a:rPr>
-              <a:t>Overheard at my most recent client:  “It takes 2 </a:t>
-            </a:r>
-            <a:r>
-              <a:rPr lang="en-US" sz="2400" u="none" baseline="0" dirty="0" err="1" smtClean="0">
-                <a:solidFill>
-                  <a:schemeClr val="tx1"/>
-                </a:solidFill>
-                <a:latin typeface="+mn-lt"/>
-                <a:cs typeface="+mn-cs"/>
-              </a:rPr>
-              <a:t>hrs</a:t>
-            </a:r>
-            <a:r>
-              <a:rPr lang="en-US" sz="2400" u="none" baseline="0" dirty="0" smtClean="0">
-                <a:solidFill>
-                  <a:schemeClr val="tx1"/>
-                </a:solidFill>
-                <a:latin typeface="+mn-lt"/>
-                <a:cs typeface="+mn-cs"/>
-              </a:rPr>
-              <a:t> to write the code, and 2 DAYS to write the tests.”</a:t>
-            </a:r>
-          </a:p>
-          <a:p>
-            <a:pPr marL="800100" lvl="1" indent="-342900" defTabSz="914400">
-              <a:spcBef>
-                <a:spcPct val="20000"/>
-              </a:spcBef>
-              <a:buFont typeface="Arial" panose="020B0604020202020204" pitchFamily="34" charset="0"/>
-              <a:buChar char="•"/>
-            </a:pPr>
-            <a:r>
-              <a:rPr lang="en-US" sz="2400" u="none" baseline="0" dirty="0" smtClean="0">
-                <a:solidFill>
-                  <a:schemeClr val="tx1"/>
-                </a:solidFill>
-                <a:latin typeface="+mn-lt"/>
-                <a:cs typeface="+mn-cs"/>
-              </a:rPr>
-              <a:t>If you find yourself in that position, you’re doing it wrong – you’re writing brand new legacy code.</a:t>
-            </a:r>
-          </a:p>
-          <a:p>
-            <a:pPr marL="800100" lvl="1" indent="-342900" defTabSz="914400">
-              <a:spcBef>
-                <a:spcPct val="20000"/>
-              </a:spcBef>
-              <a:buFont typeface="Arial" panose="020B0604020202020204" pitchFamily="34" charset="0"/>
-              <a:buChar char="•"/>
-            </a:pPr>
-            <a:endParaRPr lang="en-US" sz="2400" baseline="0" dirty="0" smtClean="0">
-              <a:solidFill>
-                <a:prstClr val="black"/>
-              </a:solidFill>
-              <a:latin typeface="Arial" panose="020B0604020202020204" pitchFamily="34" charset="0"/>
-              <a:cs typeface="Arial" panose="020B0604020202020204" pitchFamily="34" charset="0"/>
-            </a:endParaRPr>
+            <a:endParaRPr lang="en-US" dirty="0" smtClean="0"/>
           </a:p>
         </p:txBody>
       </p:sp>
@@ -1167,7 +827,7 @@
     </p:spTree>
     <p:extLst>
       <p:ext uri="{BB962C8B-B14F-4D97-AF65-F5344CB8AC3E}">
-        <p14:creationId xmlns:p14="http://schemas.microsoft.com/office/powerpoint/2010/main" val="3867270951"/>
+        <p14:creationId xmlns:p14="http://schemas.microsoft.com/office/powerpoint/2010/main" val="2135926101"/>
       </p:ext>
     </p:extLst>
   </p:cSld>
@@ -1259,6 +919,55 @@
             </a:r>
           </a:p>
           <a:p>
+            <a:pPr marL="1257300" marR="0" lvl="2" indent="-342900" algn="l" defTabSz="914400" rtl="0" eaLnBrk="1" fontAlgn="auto" latinLnBrk="0" hangingPunct="1">
+              <a:lnSpc>
+                <a:spcPct val="100000"/>
+              </a:lnSpc>
+              <a:spcBef>
+                <a:spcPct val="20000"/>
+              </a:spcBef>
+              <a:spcAft>
+                <a:spcPts val="0"/>
+              </a:spcAft>
+              <a:buClrTx/>
+              <a:buSzTx/>
+              <a:buFont typeface="Arial" panose="020B0604020202020204" pitchFamily="34" charset="0"/>
+              <a:buChar char="•"/>
+              <a:tabLst/>
+              <a:defRPr/>
+            </a:pPr>
+            <a:r>
+              <a:rPr lang="en-US" sz="2400" u="none" baseline="0" dirty="0" smtClean="0">
+                <a:solidFill>
+                  <a:prstClr val="black"/>
+                </a:solidFill>
+                <a:latin typeface="Arial" panose="020B0604020202020204" pitchFamily="34" charset="0"/>
+                <a:cs typeface="Arial" panose="020B0604020202020204" pitchFamily="34" charset="0"/>
+              </a:rPr>
+              <a:t>“You can achieve at least half of the benefit of Cucumber just by having the discipline to sit down with your business stakeholders and write scenarios collaboratively.  The conversations sparked by that process will uncover so many potential bugs or schedule overruns that you’ll already have made a huge win, even if you choose never to automate your features.” – </a:t>
+            </a:r>
+            <a:r>
+              <a:rPr lang="en-US" sz="2400" u="sng" baseline="0" dirty="0" smtClean="0">
+                <a:solidFill>
+                  <a:prstClr val="black"/>
+                </a:solidFill>
+                <a:latin typeface="Arial" panose="020B0604020202020204" pitchFamily="34" charset="0"/>
+                <a:cs typeface="Arial" panose="020B0604020202020204" pitchFamily="34" charset="0"/>
+              </a:rPr>
+              <a:t>The Cucumber Book</a:t>
+            </a:r>
+            <a:r>
+              <a:rPr lang="en-US" sz="2400" u="none" baseline="0" dirty="0" smtClean="0">
+                <a:solidFill>
+                  <a:prstClr val="black"/>
+                </a:solidFill>
+                <a:latin typeface="Arial" panose="020B0604020202020204" pitchFamily="34" charset="0"/>
+                <a:cs typeface="Arial" panose="020B0604020202020204" pitchFamily="34" charset="0"/>
+              </a:rPr>
+              <a:t>.</a:t>
+            </a:r>
+          </a:p>
+          <a:p>
             <a:pPr marL="1257300" lvl="2" indent="-342900" defTabSz="914400">
               <a:spcBef>
                 <a:spcPct val="20000"/>
@@ -1334,45 +1043,6 @@
                 <a:cs typeface="Arial" panose="020B0604020202020204" pitchFamily="34" charset="0"/>
               </a:rPr>
               <a:t>  Instead, get nontechnical stakeholders or analysts to write the first draft of each scenario from a purely business-focused perspective or ideally in a pair with a programmer to help them share their mental model.  With a well-engineered support layer, you can confidently and quickly write new step definitions to match the way the scenario has been expressed.” – </a:t>
-            </a:r>
-            <a:r>
-              <a:rPr lang="en-US" sz="2400" u="sng" baseline="0" dirty="0" smtClean="0">
-                <a:solidFill>
-                  <a:prstClr val="black"/>
-                </a:solidFill>
-                <a:latin typeface="Arial" panose="020B0604020202020204" pitchFamily="34" charset="0"/>
-                <a:cs typeface="Arial" panose="020B0604020202020204" pitchFamily="34" charset="0"/>
-              </a:rPr>
-              <a:t>The Cucumber Book</a:t>
-            </a:r>
-            <a:r>
-              <a:rPr lang="en-US" sz="2400" u="none" baseline="0" dirty="0" smtClean="0">
-                <a:solidFill>
-                  <a:prstClr val="black"/>
-                </a:solidFill>
-                <a:latin typeface="Arial" panose="020B0604020202020204" pitchFamily="34" charset="0"/>
-                <a:cs typeface="Arial" panose="020B0604020202020204" pitchFamily="34" charset="0"/>
-              </a:rPr>
-              <a:t>.</a:t>
-            </a:r>
-          </a:p>
-          <a:p>
-            <a:pPr marL="1257300" lvl="2" indent="-342900" defTabSz="914400">
-              <a:spcBef>
-                <a:spcPct val="20000"/>
-              </a:spcBef>
-              <a:buFont typeface="Arial" panose="020B0604020202020204" pitchFamily="34" charset="0"/>
-              <a:buChar char="•"/>
-            </a:pPr>
-            <a:r>
-              <a:rPr lang="en-US" sz="2400" u="none" baseline="0" dirty="0" smtClean="0">
-                <a:solidFill>
-                  <a:prstClr val="black"/>
-                </a:solidFill>
-                <a:latin typeface="Arial" panose="020B0604020202020204" pitchFamily="34" charset="0"/>
-                <a:cs typeface="Arial" panose="020B0604020202020204" pitchFamily="34" charset="0"/>
-              </a:rPr>
-              <a:t>“You can achieve at least half of the benefit of Cucumber just by having the discipline to sit down with your business stakeholders and write scenarios collaboratively.  The conversations sparked by that process will uncover so many potential bugs or schedule overruns that you’ll already have made a huge win, even if you choose never to automate your features.” – </a:t>
             </a:r>
             <a:r>
               <a:rPr lang="en-US" sz="2400" u="sng" baseline="0" dirty="0" smtClean="0">
@@ -1582,7 +1252,7 @@
     </p:spTree>
     <p:extLst>
       <p:ext uri="{BB962C8B-B14F-4D97-AF65-F5344CB8AC3E}">
-        <p14:creationId xmlns:p14="http://schemas.microsoft.com/office/powerpoint/2010/main" val="1945123710"/>
+        <p14:creationId xmlns:p14="http://schemas.microsoft.com/office/powerpoint/2010/main" val="3867270951"/>
       </p:ext>
     </p:extLst>
   </p:cSld>
@@ -1636,176 +1306,338 @@
           <a:bodyPr/>
           <a:lstStyle/>
           <a:p>
-            <a:pPr marL="171450" indent="-171450">
-              <a:buFont typeface="Arial" panose="020B0604020202020204" pitchFamily="34" charset="0"/>
-              <a:buChar char="•"/>
-            </a:pPr>
-            <a:r>
-              <a:rPr lang="en-US" dirty="0" smtClean="0"/>
-              <a:t>Working around scalability</a:t>
-            </a:r>
-          </a:p>
-          <a:p>
-            <a:pPr marL="628650" lvl="1" indent="-171450">
-              <a:buFont typeface="Arial" panose="020B0604020202020204" pitchFamily="34" charset="0"/>
-              <a:buChar char="•"/>
-            </a:pPr>
-            <a:r>
-              <a:rPr lang="en-US" baseline="0" dirty="0" smtClean="0"/>
-              <a:t>T</a:t>
-            </a:r>
-            <a:r>
-              <a:rPr lang="en-US" u="sng" baseline="0" dirty="0" smtClean="0"/>
-              <a:t>D</a:t>
-            </a:r>
-            <a:r>
-              <a:rPr lang="en-US" u="none" baseline="0" dirty="0" smtClean="0"/>
-              <a:t>D – tests should be written first, not stuffed in the solution and made to pass</a:t>
-            </a:r>
-          </a:p>
-          <a:p>
-            <a:pPr marL="1085850" lvl="2" indent="-171450">
-              <a:buFont typeface="Arial" panose="020B0604020202020204" pitchFamily="34" charset="0"/>
-              <a:buChar char="•"/>
-            </a:pPr>
-            <a:r>
-              <a:rPr lang="en-US" u="none" baseline="0" dirty="0" smtClean="0"/>
-              <a:t>But we need to start somewhere – see Feathers.</a:t>
-            </a:r>
-          </a:p>
-          <a:p>
-            <a:pPr marL="628650" lvl="1" indent="-171450">
-              <a:buFont typeface="Arial" panose="020B0604020202020204" pitchFamily="34" charset="0"/>
-              <a:buChar char="•"/>
-            </a:pPr>
-            <a:r>
-              <a:rPr lang="en-US" u="none" baseline="0" dirty="0" smtClean="0"/>
-              <a:t>Testing suite can be modular, split by features or new features and old features</a:t>
-            </a:r>
-          </a:p>
-          <a:p>
-            <a:pPr marL="1085850" lvl="2" indent="-171450">
-              <a:buFont typeface="Arial" panose="020B0604020202020204" pitchFamily="34" charset="0"/>
-              <a:buChar char="•"/>
-            </a:pPr>
-            <a:r>
-              <a:rPr lang="en-US" u="none" baseline="0" dirty="0" smtClean="0"/>
-              <a:t>New features suite takes the stage, old features suite tested all the time, but to the side</a:t>
-            </a:r>
-          </a:p>
-          <a:p>
-            <a:pPr marL="171450" lvl="0" indent="-171450">
-              <a:buFont typeface="Arial" panose="020B0604020202020204" pitchFamily="34" charset="0"/>
-              <a:buChar char="•"/>
-            </a:pPr>
-            <a:r>
-              <a:rPr lang="en-US" u="none" baseline="0" dirty="0" smtClean="0"/>
-              <a:t>Full test coverage is a nice goal, but is not required.</a:t>
-            </a:r>
-          </a:p>
-          <a:p>
-            <a:pPr marL="628650" lvl="1" indent="-171450">
-              <a:buFont typeface="Arial" panose="020B0604020202020204" pitchFamily="34" charset="0"/>
-              <a:buChar char="•"/>
-            </a:pPr>
-            <a:r>
-              <a:rPr lang="en-US" u="none" baseline="0" dirty="0" smtClean="0"/>
-              <a:t>Accept that:</a:t>
-            </a:r>
-          </a:p>
-          <a:p>
-            <a:pPr marL="1085850" lvl="2" indent="-171450">
-              <a:buFont typeface="Arial" panose="020B0604020202020204" pitchFamily="34" charset="0"/>
-              <a:buChar char="•"/>
-            </a:pPr>
-            <a:r>
-              <a:rPr lang="en-US" u="none" baseline="0" dirty="0" smtClean="0"/>
-              <a:t>External libraries don’t have comprehensive tests</a:t>
-            </a:r>
-          </a:p>
-          <a:p>
-            <a:pPr marL="1085850" lvl="2" indent="-171450">
-              <a:buFont typeface="Arial" panose="020B0604020202020204" pitchFamily="34" charset="0"/>
-              <a:buChar char="•"/>
-            </a:pPr>
-            <a:r>
-              <a:rPr lang="en-US" u="none" baseline="0" dirty="0" smtClean="0"/>
-              <a:t>Testing isn’t always easy (UI)</a:t>
-            </a:r>
-          </a:p>
-          <a:p>
-            <a:pPr marL="1085850" lvl="2" indent="-171450">
-              <a:buFont typeface="Arial" panose="020B0604020202020204" pitchFamily="34" charset="0"/>
-              <a:buChar char="•"/>
-            </a:pPr>
-            <a:r>
-              <a:rPr lang="en-US" u="none" baseline="0" dirty="0" smtClean="0"/>
-              <a:t>Legacy systems require time for tests to be written</a:t>
-            </a:r>
-          </a:p>
-          <a:p>
-            <a:pPr marL="628650" lvl="1" indent="-171450">
-              <a:buFont typeface="Arial" panose="020B0604020202020204" pitchFamily="34" charset="0"/>
-              <a:buChar char="•"/>
-            </a:pPr>
-            <a:r>
-              <a:rPr lang="en-US" u="none" baseline="0" dirty="0" smtClean="0"/>
-              <a:t>Coverage is mostly applicable to UNIT tests.</a:t>
-            </a:r>
-          </a:p>
-          <a:p>
-            <a:pPr marL="1085850" lvl="2" indent="-171450">
-              <a:buFont typeface="Arial" panose="020B0604020202020204" pitchFamily="34" charset="0"/>
-              <a:buChar char="•"/>
-            </a:pPr>
-            <a:r>
-              <a:rPr lang="en-US" u="none" baseline="0" dirty="0" smtClean="0"/>
-              <a:t>Without solid unit tests, coverage at the system level is intractable.</a:t>
-            </a:r>
-          </a:p>
-          <a:p>
-            <a:pPr marL="1085850" lvl="2" indent="-171450">
-              <a:buFont typeface="Arial" panose="020B0604020202020204" pitchFamily="34" charset="0"/>
-              <a:buChar char="•"/>
-            </a:pPr>
-            <a:r>
-              <a:rPr lang="en-US" u="none" baseline="0" dirty="0" smtClean="0"/>
-              <a:t>Solid unit tests, relive business-facing tests of trivial clutter and attendant brittleness.</a:t>
-            </a:r>
-          </a:p>
-          <a:p>
-            <a:pPr marL="171450" lvl="0" indent="-171450">
-              <a:buFont typeface="Arial" panose="020B0604020202020204" pitchFamily="34" charset="0"/>
-              <a:buChar char="•"/>
-            </a:pPr>
-            <a:r>
-              <a:rPr lang="en-US" baseline="0" dirty="0" smtClean="0"/>
-              <a:t>Make a decision: team should not pursue TDD or everyone must agree on using TDD.</a:t>
-            </a:r>
-          </a:p>
-          <a:p>
-            <a:pPr marL="628650" lvl="1" indent="-171450">
-              <a:buFont typeface="Arial" panose="020B0604020202020204" pitchFamily="34" charset="0"/>
-              <a:buChar char="•"/>
-            </a:pPr>
-            <a:r>
-              <a:rPr lang="en-US" baseline="0" dirty="0" smtClean="0"/>
-              <a:t>Don’t have TDD be implemented by half the team.</a:t>
-            </a:r>
-          </a:p>
-          <a:p>
-            <a:pPr marL="171450" lvl="0" indent="-171450">
-              <a:buFont typeface="Arial" panose="020B0604020202020204" pitchFamily="34" charset="0"/>
-              <a:buChar char="•"/>
-            </a:pPr>
-            <a:endParaRPr lang="en-US" baseline="0" dirty="0" smtClean="0"/>
-          </a:p>
-          <a:p>
-            <a:pPr marL="628650" lvl="1" indent="-171450">
-              <a:buFont typeface="Arial" panose="020B0604020202020204" pitchFamily="34" charset="0"/>
-              <a:buChar char="•"/>
-            </a:pPr>
-            <a:endParaRPr lang="en-US" dirty="0" smtClean="0"/>
+            <a:pPr marL="342900" lvl="0" indent="-342900" defTabSz="914400">
+              <a:spcBef>
+                <a:spcPct val="20000"/>
+              </a:spcBef>
+              <a:buFont typeface="Arial" panose="020B0604020202020204" pitchFamily="34" charset="0"/>
+              <a:buChar char="•"/>
+            </a:pPr>
+            <a:r>
+              <a:rPr lang="en-US" sz="2400" baseline="0" dirty="0" smtClean="0">
+                <a:solidFill>
+                  <a:prstClr val="black"/>
+                </a:solidFill>
+                <a:latin typeface="Arial" panose="020B0604020202020204" pitchFamily="34" charset="0"/>
+                <a:cs typeface="Arial" panose="020B0604020202020204" pitchFamily="34" charset="0"/>
+              </a:rPr>
+              <a:t>ATDD</a:t>
+            </a:r>
+          </a:p>
+          <a:p>
+            <a:pPr marL="800100" lvl="1" indent="-342900" defTabSz="914400">
+              <a:spcBef>
+                <a:spcPct val="20000"/>
+              </a:spcBef>
+              <a:buFont typeface="Arial" panose="020B0604020202020204" pitchFamily="34" charset="0"/>
+              <a:buChar char="•"/>
+            </a:pPr>
+            <a:r>
+              <a:rPr lang="en-US" sz="2400" baseline="0" dirty="0" smtClean="0">
+                <a:solidFill>
+                  <a:prstClr val="black"/>
+                </a:solidFill>
+                <a:latin typeface="Arial" panose="020B0604020202020204" pitchFamily="34" charset="0"/>
+                <a:cs typeface="Arial" panose="020B0604020202020204" pitchFamily="34" charset="0"/>
+              </a:rPr>
+              <a:t>Gherkin - Start with the “three amigos” – PO, Dev, Tester</a:t>
+            </a:r>
+          </a:p>
+          <a:p>
+            <a:pPr marL="1257300" lvl="2" indent="-342900" defTabSz="914400">
+              <a:spcBef>
+                <a:spcPct val="20000"/>
+              </a:spcBef>
+              <a:buFont typeface="Arial" panose="020B0604020202020204" pitchFamily="34" charset="0"/>
+              <a:buChar char="•"/>
+            </a:pPr>
+            <a:r>
+              <a:rPr lang="en-US" sz="2400" baseline="0" dirty="0" smtClean="0">
+                <a:solidFill>
+                  <a:prstClr val="black"/>
+                </a:solidFill>
+                <a:latin typeface="Arial" panose="020B0604020202020204" pitchFamily="34" charset="0"/>
+                <a:cs typeface="Arial" panose="020B0604020202020204" pitchFamily="34" charset="0"/>
+              </a:rPr>
+              <a:t>“When the team write their acceptance tests collaboratively, they can develop their own ubiquitous language for talking about their problem domain.  This helps them avoid misunderstandings.” – </a:t>
+            </a:r>
+            <a:r>
+              <a:rPr lang="en-US" sz="2400" u="sng" baseline="0" dirty="0" smtClean="0">
+                <a:solidFill>
+                  <a:prstClr val="black"/>
+                </a:solidFill>
+                <a:latin typeface="Arial" panose="020B0604020202020204" pitchFamily="34" charset="0"/>
+                <a:cs typeface="Arial" panose="020B0604020202020204" pitchFamily="34" charset="0"/>
+              </a:rPr>
+              <a:t>The Cucumber Book</a:t>
+            </a:r>
+            <a:r>
+              <a:rPr lang="en-US" sz="2400" u="none" baseline="0" dirty="0" smtClean="0">
+                <a:solidFill>
+                  <a:prstClr val="black"/>
+                </a:solidFill>
+                <a:latin typeface="Arial" panose="020B0604020202020204" pitchFamily="34" charset="0"/>
+                <a:cs typeface="Arial" panose="020B0604020202020204" pitchFamily="34" charset="0"/>
+              </a:rPr>
+              <a:t>.</a:t>
+            </a:r>
+          </a:p>
+          <a:p>
+            <a:pPr marL="1257300" lvl="2" indent="-342900" defTabSz="914400">
+              <a:spcBef>
+                <a:spcPct val="20000"/>
+              </a:spcBef>
+              <a:buFont typeface="Arial" panose="020B0604020202020204" pitchFamily="34" charset="0"/>
+              <a:buChar char="•"/>
+            </a:pPr>
+            <a:r>
+              <a:rPr lang="en-US" sz="2400" u="none" baseline="0" dirty="0" smtClean="0">
+                <a:solidFill>
+                  <a:prstClr val="black"/>
+                </a:solidFill>
+                <a:latin typeface="Arial" panose="020B0604020202020204" pitchFamily="34" charset="0"/>
+                <a:cs typeface="Arial" panose="020B0604020202020204" pitchFamily="34" charset="0"/>
+              </a:rPr>
+              <a:t>“Try to avoid being guided by existing step definitions when you write your scenarios, and just write down exactly what you want to happen, in plain English.  </a:t>
+            </a:r>
+            <a:r>
+              <a:rPr lang="en-US" sz="2400" b="1" u="none" baseline="0" dirty="0" smtClean="0">
+                <a:solidFill>
+                  <a:prstClr val="black"/>
+                </a:solidFill>
+                <a:latin typeface="Arial" panose="020B0604020202020204" pitchFamily="34" charset="0"/>
+                <a:cs typeface="Arial" panose="020B0604020202020204" pitchFamily="34" charset="0"/>
+              </a:rPr>
+              <a:t>In fact, try to avoid programmers or testers writing scenarios on their own.</a:t>
+            </a:r>
+            <a:r>
+              <a:rPr lang="en-US" sz="2400" u="none" baseline="0" dirty="0" smtClean="0">
+                <a:solidFill>
+                  <a:prstClr val="black"/>
+                </a:solidFill>
+                <a:latin typeface="Arial" panose="020B0604020202020204" pitchFamily="34" charset="0"/>
+                <a:cs typeface="Arial" panose="020B0604020202020204" pitchFamily="34" charset="0"/>
+              </a:rPr>
+              <a:t>  Instead, get nontechnical stakeholders or analysts to write the first draft of each scenario from a purely business-focused perspective or ideally in a pair with a programmer to help them share their mental model.  With a well-engineered support layer, you can confidently and quickly write new step definitions to match the way the scenario has been expressed.” – </a:t>
+            </a:r>
+            <a:r>
+              <a:rPr lang="en-US" sz="2400" u="sng" baseline="0" dirty="0" smtClean="0">
+                <a:solidFill>
+                  <a:prstClr val="black"/>
+                </a:solidFill>
+                <a:latin typeface="Arial" panose="020B0604020202020204" pitchFamily="34" charset="0"/>
+                <a:cs typeface="Arial" panose="020B0604020202020204" pitchFamily="34" charset="0"/>
+              </a:rPr>
+              <a:t>The Cucumber Book</a:t>
+            </a:r>
+            <a:r>
+              <a:rPr lang="en-US" sz="2400" u="none" baseline="0" dirty="0" smtClean="0">
+                <a:solidFill>
+                  <a:prstClr val="black"/>
+                </a:solidFill>
+                <a:latin typeface="Arial" panose="020B0604020202020204" pitchFamily="34" charset="0"/>
+                <a:cs typeface="Arial" panose="020B0604020202020204" pitchFamily="34" charset="0"/>
+              </a:rPr>
+              <a:t>.</a:t>
+            </a:r>
+          </a:p>
+          <a:p>
+            <a:pPr marL="1257300" lvl="2" indent="-342900" defTabSz="914400">
+              <a:spcBef>
+                <a:spcPct val="20000"/>
+              </a:spcBef>
+              <a:buFont typeface="Arial" panose="020B0604020202020204" pitchFamily="34" charset="0"/>
+              <a:buChar char="•"/>
+            </a:pPr>
+            <a:r>
+              <a:rPr lang="en-US" sz="2400" u="none" baseline="0" dirty="0" smtClean="0">
+                <a:solidFill>
+                  <a:prstClr val="black"/>
+                </a:solidFill>
+                <a:latin typeface="Arial" panose="020B0604020202020204" pitchFamily="34" charset="0"/>
+                <a:cs typeface="Arial" panose="020B0604020202020204" pitchFamily="34" charset="0"/>
+              </a:rPr>
+              <a:t>“You can achieve at least half of the benefit of Cucumber just by having the discipline to sit down with your business stakeholders and write scenarios collaboratively.  The conversations sparked by that process will uncover so many potential bugs or schedule overruns that you’ll already have made a huge win, even if you choose never to automate your features.” – </a:t>
+            </a:r>
+            <a:r>
+              <a:rPr lang="en-US" sz="2400" u="sng" baseline="0" dirty="0" smtClean="0">
+                <a:solidFill>
+                  <a:prstClr val="black"/>
+                </a:solidFill>
+                <a:latin typeface="Arial" panose="020B0604020202020204" pitchFamily="34" charset="0"/>
+                <a:cs typeface="Arial" panose="020B0604020202020204" pitchFamily="34" charset="0"/>
+              </a:rPr>
+              <a:t>The Cucumber Book</a:t>
+            </a:r>
+            <a:r>
+              <a:rPr lang="en-US" sz="2400" u="none" baseline="0" dirty="0" smtClean="0">
+                <a:solidFill>
+                  <a:prstClr val="black"/>
+                </a:solidFill>
+                <a:latin typeface="Arial" panose="020B0604020202020204" pitchFamily="34" charset="0"/>
+                <a:cs typeface="Arial" panose="020B0604020202020204" pitchFamily="34" charset="0"/>
+              </a:rPr>
+              <a:t>.</a:t>
+            </a:r>
+          </a:p>
+          <a:p>
+            <a:pPr marL="1257300" lvl="2" indent="-342900" defTabSz="914400">
+              <a:spcBef>
+                <a:spcPct val="20000"/>
+              </a:spcBef>
+              <a:buFont typeface="Arial" panose="020B0604020202020204" pitchFamily="34" charset="0"/>
+              <a:buChar char="•"/>
+            </a:pPr>
+            <a:r>
+              <a:rPr lang="en-US" sz="2400" u="none" baseline="0" dirty="0" smtClean="0">
+                <a:solidFill>
+                  <a:prstClr val="black"/>
+                </a:solidFill>
+                <a:latin typeface="Arial" panose="020B0604020202020204" pitchFamily="34" charset="0"/>
+                <a:cs typeface="Arial" panose="020B0604020202020204" pitchFamily="34" charset="0"/>
+              </a:rPr>
+              <a:t>“Cucumber might just seem like a testing tool, but at its heart it’s really a collaboration tool.  If you make a genuine effort to write features that work as documentation for the nontechnical stakeholders on your team, you’ll find you are forced to talk with them about details that you might never have otherwise made the time to talk about.  Those conversations reveal insights about their understanding of the problem, insights that will help you build a much better solution than you would have otherwise.  </a:t>
+            </a:r>
+            <a:r>
+              <a:rPr lang="en-US" sz="2400" b="1" u="none" baseline="0" dirty="0" smtClean="0">
+                <a:solidFill>
+                  <a:prstClr val="black"/>
+                </a:solidFill>
+                <a:latin typeface="Arial" panose="020B0604020202020204" pitchFamily="34" charset="0"/>
+                <a:cs typeface="Arial" panose="020B0604020202020204" pitchFamily="34" charset="0"/>
+              </a:rPr>
+              <a:t>This is Cucumber’s big secret:  the tests and documentation are just a happy side effect; the real value lies in the knowledge you discover during those conversations.</a:t>
+            </a:r>
+            <a:r>
+              <a:rPr lang="en-US" sz="2400" u="none" baseline="0" dirty="0" smtClean="0">
+                <a:solidFill>
+                  <a:prstClr val="black"/>
+                </a:solidFill>
+                <a:latin typeface="Arial" panose="020B0604020202020204" pitchFamily="34" charset="0"/>
+                <a:cs typeface="Arial" panose="020B0604020202020204" pitchFamily="34" charset="0"/>
+              </a:rPr>
+              <a:t>” – </a:t>
+            </a:r>
+            <a:r>
+              <a:rPr lang="en-US" sz="2400" u="sng" baseline="0" dirty="0" smtClean="0">
+                <a:solidFill>
+                  <a:prstClr val="black"/>
+                </a:solidFill>
+                <a:latin typeface="Arial" panose="020B0604020202020204" pitchFamily="34" charset="0"/>
+                <a:cs typeface="Arial" panose="020B0604020202020204" pitchFamily="34" charset="0"/>
+              </a:rPr>
+              <a:t>The Cucumber Book</a:t>
+            </a:r>
+            <a:r>
+              <a:rPr lang="en-US" sz="2400" u="none" baseline="0" dirty="0" smtClean="0">
+                <a:solidFill>
+                  <a:prstClr val="black"/>
+                </a:solidFill>
+                <a:latin typeface="Arial" panose="020B0604020202020204" pitchFamily="34" charset="0"/>
+                <a:cs typeface="Arial" panose="020B0604020202020204" pitchFamily="34" charset="0"/>
+              </a:rPr>
+              <a:t>.</a:t>
+            </a:r>
+            <a:endParaRPr lang="en-US" sz="1200" u="none" baseline="0" dirty="0">
+              <a:solidFill>
+                <a:schemeClr val="tx1"/>
+              </a:solidFill>
+              <a:latin typeface="+mn-lt"/>
+              <a:cs typeface="+mn-cs"/>
+            </a:endParaRPr>
+          </a:p>
+          <a:p>
+            <a:pPr marL="342900" lvl="0" indent="-342900" defTabSz="914400">
+              <a:spcBef>
+                <a:spcPct val="20000"/>
+              </a:spcBef>
+              <a:buFont typeface="Arial" panose="020B0604020202020204" pitchFamily="34" charset="0"/>
+              <a:buChar char="•"/>
+            </a:pPr>
+            <a:r>
+              <a:rPr lang="en-US" sz="2400" u="none" baseline="0" dirty="0" smtClean="0">
+                <a:solidFill>
+                  <a:schemeClr val="tx1"/>
+                </a:solidFill>
+                <a:latin typeface="+mn-lt"/>
+                <a:cs typeface="+mn-cs"/>
+              </a:rPr>
+              <a:t>Unit TDD</a:t>
+            </a:r>
+          </a:p>
+          <a:p>
+            <a:pPr marL="800100" lvl="1" indent="-342900" defTabSz="914400">
+              <a:spcBef>
+                <a:spcPct val="20000"/>
+              </a:spcBef>
+              <a:buFont typeface="Arial" panose="020B0604020202020204" pitchFamily="34" charset="0"/>
+              <a:buChar char="•"/>
+            </a:pPr>
+            <a:r>
+              <a:rPr lang="en-US" sz="2400" u="none" baseline="0" dirty="0" smtClean="0">
+                <a:solidFill>
+                  <a:schemeClr val="tx1"/>
+                </a:solidFill>
+                <a:latin typeface="+mn-lt"/>
+                <a:cs typeface="+mn-cs"/>
+              </a:rPr>
+              <a:t>Overheard at my most recent client:  “It takes 2 </a:t>
+            </a:r>
+            <a:r>
+              <a:rPr lang="en-US" sz="2400" u="none" baseline="0" dirty="0" err="1" smtClean="0">
+                <a:solidFill>
+                  <a:schemeClr val="tx1"/>
+                </a:solidFill>
+                <a:latin typeface="+mn-lt"/>
+                <a:cs typeface="+mn-cs"/>
+              </a:rPr>
+              <a:t>hrs</a:t>
+            </a:r>
+            <a:r>
+              <a:rPr lang="en-US" sz="2400" u="none" baseline="0" dirty="0" smtClean="0">
+                <a:solidFill>
+                  <a:schemeClr val="tx1"/>
+                </a:solidFill>
+                <a:latin typeface="+mn-lt"/>
+                <a:cs typeface="+mn-cs"/>
+              </a:rPr>
+              <a:t> to write the code, and 2 DAYS to write the tests.”</a:t>
+            </a:r>
+          </a:p>
+          <a:p>
+            <a:pPr marL="800100" lvl="1" indent="-342900" defTabSz="914400">
+              <a:spcBef>
+                <a:spcPct val="20000"/>
+              </a:spcBef>
+              <a:buFont typeface="Arial" panose="020B0604020202020204" pitchFamily="34" charset="0"/>
+              <a:buChar char="•"/>
+            </a:pPr>
+            <a:r>
+              <a:rPr lang="en-US" sz="2400" u="none" baseline="0" dirty="0" smtClean="0">
+                <a:solidFill>
+                  <a:schemeClr val="tx1"/>
+                </a:solidFill>
+                <a:latin typeface="+mn-lt"/>
+                <a:cs typeface="+mn-cs"/>
+              </a:rPr>
+              <a:t>If you find yourself in that position, you’re doing it wrong – you’re writing brand new legacy code.</a:t>
+            </a:r>
+          </a:p>
+          <a:p>
+            <a:pPr marL="800100" lvl="1" indent="-342900" defTabSz="914400">
+              <a:spcBef>
+                <a:spcPct val="20000"/>
+              </a:spcBef>
+              <a:buFont typeface="Arial" panose="020B0604020202020204" pitchFamily="34" charset="0"/>
+              <a:buChar char="•"/>
+            </a:pPr>
+            <a:endParaRPr lang="en-US" sz="2400" baseline="0" dirty="0" smtClean="0">
+              <a:solidFill>
+                <a:prstClr val="black"/>
+              </a:solidFill>
+              <a:latin typeface="Arial" panose="020B0604020202020204" pitchFamily="34" charset="0"/>
+              <a:cs typeface="Arial" panose="020B0604020202020204" pitchFamily="34" charset="0"/>
+            </a:endParaRPr>
           </a:p>
         </p:txBody>
       </p:sp>
@@ -1835,7 +1667,7 @@
     </p:spTree>
     <p:extLst>
       <p:ext uri="{BB962C8B-B14F-4D97-AF65-F5344CB8AC3E}">
-        <p14:creationId xmlns:p14="http://schemas.microsoft.com/office/powerpoint/2010/main" val="437793297"/>
+        <p14:creationId xmlns:p14="http://schemas.microsoft.com/office/powerpoint/2010/main" val="1945123710"/>
       </p:ext>
     </p:extLst>
   </p:cSld>
@@ -1889,28 +1721,151 @@
           <a:bodyPr/>
           <a:lstStyle/>
           <a:p>
+            <a:pPr marL="171450" indent="-171450">
+              <a:buFont typeface="Arial" panose="020B0604020202020204" pitchFamily="34" charset="0"/>
+              <a:buChar char="•"/>
+            </a:pPr>
             <a:r>
               <a:rPr lang="en-US" dirty="0" smtClean="0"/>
-              <a:t>Cover this one from the bottom up.  </a:t>
-            </a:r>
+              <a:t>Working around scalability</a:t>
+            </a:r>
+          </a:p>
+          <a:p>
+            <a:pPr marL="628650" lvl="1" indent="-171450">
+              <a:buFont typeface="Arial" panose="020B0604020202020204" pitchFamily="34" charset="0"/>
+              <a:buChar char="•"/>
+            </a:pPr>
             <a:r>
               <a:rPr lang="en-US" baseline="0" dirty="0" smtClean="0"/>
-              <a:t>The steps also make a natural implementation progression	</a:t>
-            </a:r>
-            <a:endParaRPr lang="en-US" dirty="0" smtClean="0"/>
-          </a:p>
-          <a:p>
-            <a:pPr marL="171450" indent="-171450">
-              <a:buFont typeface="Arial" panose="020B0604020202020204" pitchFamily="34" charset="0"/>
-              <a:buChar char="•"/>
-            </a:pPr>
-            <a:r>
-              <a:rPr lang="en-US" dirty="0" smtClean="0"/>
-              <a:t>At least half the value comes from the COLLABORATION</a:t>
-            </a:r>
+              <a:t>T</a:t>
+            </a:r>
+            <a:r>
+              <a:rPr lang="en-US" u="sng" baseline="0" dirty="0" smtClean="0"/>
+              <a:t>D</a:t>
+            </a:r>
+            <a:r>
+              <a:rPr lang="en-US" u="none" baseline="0" dirty="0" smtClean="0"/>
+              <a:t>D – tests should be written first, not stuffed in the solution and made to pass</a:t>
+            </a:r>
+          </a:p>
+          <a:p>
+            <a:pPr marL="1085850" lvl="2" indent="-171450">
+              <a:buFont typeface="Arial" panose="020B0604020202020204" pitchFamily="34" charset="0"/>
+              <a:buChar char="•"/>
+            </a:pPr>
+            <a:r>
+              <a:rPr lang="en-US" u="none" baseline="0" dirty="0" smtClean="0"/>
+              <a:t>But we need to start somewhere – see Feathers.</a:t>
+            </a:r>
+          </a:p>
+          <a:p>
+            <a:pPr marL="628650" lvl="1" indent="-171450">
+              <a:buFont typeface="Arial" panose="020B0604020202020204" pitchFamily="34" charset="0"/>
+              <a:buChar char="•"/>
+            </a:pPr>
+            <a:r>
+              <a:rPr lang="en-US" u="none" baseline="0" dirty="0" smtClean="0"/>
+              <a:t>Testing suite can be modular, split by features or new features and old features</a:t>
+            </a:r>
+          </a:p>
+          <a:p>
+            <a:pPr marL="1085850" lvl="2" indent="-171450">
+              <a:buFont typeface="Arial" panose="020B0604020202020204" pitchFamily="34" charset="0"/>
+              <a:buChar char="•"/>
+            </a:pPr>
+            <a:r>
+              <a:rPr lang="en-US" u="none" baseline="0" dirty="0" smtClean="0"/>
+              <a:t>New features suite takes the stage, old features suite tested all the time, but to the side</a:t>
+            </a:r>
+          </a:p>
+          <a:p>
+            <a:pPr marL="171450" lvl="0" indent="-171450">
+              <a:buFont typeface="Arial" panose="020B0604020202020204" pitchFamily="34" charset="0"/>
+              <a:buChar char="•"/>
+            </a:pPr>
+            <a:r>
+              <a:rPr lang="en-US" u="none" baseline="0" dirty="0" smtClean="0"/>
+              <a:t>Full test coverage is a nice goal, but is not required.</a:t>
+            </a:r>
+          </a:p>
+          <a:p>
+            <a:pPr marL="628650" lvl="1" indent="-171450">
+              <a:buFont typeface="Arial" panose="020B0604020202020204" pitchFamily="34" charset="0"/>
+              <a:buChar char="•"/>
+            </a:pPr>
+            <a:r>
+              <a:rPr lang="en-US" u="none" baseline="0" dirty="0" smtClean="0"/>
+              <a:t>Accept that:</a:t>
+            </a:r>
+          </a:p>
+          <a:p>
+            <a:pPr marL="1085850" lvl="2" indent="-171450">
+              <a:buFont typeface="Arial" panose="020B0604020202020204" pitchFamily="34" charset="0"/>
+              <a:buChar char="•"/>
+            </a:pPr>
+            <a:r>
+              <a:rPr lang="en-US" u="none" baseline="0" dirty="0" smtClean="0"/>
+              <a:t>External libraries don’t have comprehensive tests</a:t>
+            </a:r>
+          </a:p>
+          <a:p>
+            <a:pPr marL="1085850" lvl="2" indent="-171450">
+              <a:buFont typeface="Arial" panose="020B0604020202020204" pitchFamily="34" charset="0"/>
+              <a:buChar char="•"/>
+            </a:pPr>
+            <a:r>
+              <a:rPr lang="en-US" u="none" baseline="0" dirty="0" smtClean="0"/>
+              <a:t>Testing isn’t always easy (UI)</a:t>
+            </a:r>
+          </a:p>
+          <a:p>
+            <a:pPr marL="1085850" lvl="2" indent="-171450">
+              <a:buFont typeface="Arial" panose="020B0604020202020204" pitchFamily="34" charset="0"/>
+              <a:buChar char="•"/>
+            </a:pPr>
+            <a:r>
+              <a:rPr lang="en-US" u="none" baseline="0" dirty="0" smtClean="0"/>
+              <a:t>Legacy systems require time for tests to be written</a:t>
+            </a:r>
+          </a:p>
+          <a:p>
+            <a:pPr marL="628650" lvl="1" indent="-171450">
+              <a:buFont typeface="Arial" panose="020B0604020202020204" pitchFamily="34" charset="0"/>
+              <a:buChar char="•"/>
+            </a:pPr>
+            <a:r>
+              <a:rPr lang="en-US" u="none" baseline="0" dirty="0" smtClean="0"/>
+              <a:t>Coverage is mostly applicable to UNIT tests.</a:t>
+            </a:r>
+          </a:p>
+          <a:p>
+            <a:pPr marL="1085850" lvl="2" indent="-171450">
+              <a:buFont typeface="Arial" panose="020B0604020202020204" pitchFamily="34" charset="0"/>
+              <a:buChar char="•"/>
+            </a:pPr>
+            <a:r>
+              <a:rPr lang="en-US" u="none" baseline="0" dirty="0" smtClean="0"/>
+              <a:t>Without solid unit tests, coverage at the system level is intractable.</a:t>
+            </a:r>
+          </a:p>
+          <a:p>
+            <a:pPr marL="1085850" lvl="2" indent="-171450">
+              <a:buFont typeface="Arial" panose="020B0604020202020204" pitchFamily="34" charset="0"/>
+              <a:buChar char="•"/>
+            </a:pPr>
+            <a:r>
+              <a:rPr lang="en-US" u="none" baseline="0" dirty="0" smtClean="0"/>
+              <a:t>Solid unit tests, relive business-facing tests of trivial clutter and attendant brittleness.</a:t>
+            </a:r>
+          </a:p>
+          <a:p>
+            <a:pPr marL="171450" lvl="0" indent="-171450">
+              <a:buFont typeface="Arial" panose="020B0604020202020204" pitchFamily="34" charset="0"/>
+              <a:buChar char="•"/>
+            </a:pPr>
             <a:r>
               <a:rPr lang="en-US" baseline="0" dirty="0" smtClean="0"/>
-              <a:t> of GETTING TO Gherkin specs.</a:t>
+              <a:t>Make a decision: team should not pursue TDD or everyone must agree on using TDD.</a:t>
             </a:r>
           </a:p>
           <a:p>
@@ -1920,213 +1875,18 @@
             </a:pPr>
             <a:r>
               <a:rPr lang="en-US" baseline="0" dirty="0" smtClean="0"/>
-              <a:t>UBIQUITOUS LANGUAGE provides clarity around WHAT you need to build</a:t>
-            </a:r>
+              <a:t>Don’t have TDD be implemented by half the team.</a:t>
+            </a:r>
+          </a:p>
+          <a:p>
+            <a:pPr marL="171450" lvl="0" indent="-171450">
+              <a:buFont typeface="Arial" panose="020B0604020202020204" pitchFamily="34" charset="0"/>
+              <a:buChar char="•"/>
+            </a:pPr>
+            <a:endParaRPr lang="en-US" baseline="0" dirty="0" smtClean="0"/>
           </a:p>
           <a:p>
             <a:pPr marL="628650" lvl="1" indent="-171450">
-              <a:buFont typeface="Arial" panose="020B0604020202020204" pitchFamily="34" charset="0"/>
-              <a:buChar char="•"/>
-            </a:pPr>
-            <a:r>
-              <a:rPr lang="en-US" baseline="0" dirty="0" smtClean="0"/>
-              <a:t>Identify corner cases early</a:t>
-            </a:r>
-          </a:p>
-          <a:p>
-            <a:pPr marL="1085850" lvl="2" indent="-171450">
-              <a:buFont typeface="Arial" panose="020B0604020202020204" pitchFamily="34" charset="0"/>
-              <a:buChar char="•"/>
-            </a:pPr>
-            <a:r>
-              <a:rPr lang="en-US" baseline="0" dirty="0" smtClean="0"/>
-              <a:t>Replace assumptions with answers.</a:t>
-            </a:r>
-          </a:p>
-          <a:p>
-            <a:pPr marL="1085850" lvl="2" indent="-171450">
-              <a:buFont typeface="Arial" panose="020B0604020202020204" pitchFamily="34" charset="0"/>
-              <a:buChar char="•"/>
-            </a:pPr>
-            <a:r>
-              <a:rPr lang="en-US" baseline="0" dirty="0" smtClean="0"/>
-              <a:t>Make intentional scope &amp; priority decisions</a:t>
-            </a:r>
-          </a:p>
-          <a:p>
-            <a:pPr marL="628650" marR="0" lvl="1" indent="-171450" algn="l" defTabSz="457200" rtl="0" eaLnBrk="1" fontAlgn="auto" latinLnBrk="0" hangingPunct="1">
-              <a:lnSpc>
-                <a:spcPct val="100000"/>
-              </a:lnSpc>
-              <a:spcBef>
-                <a:spcPts val="0"/>
-              </a:spcBef>
-              <a:spcAft>
-                <a:spcPts val="0"/>
-              </a:spcAft>
-              <a:buClrTx/>
-              <a:buSzTx/>
-              <a:buFont typeface="Arial" panose="020B0604020202020204" pitchFamily="34" charset="0"/>
-              <a:buChar char="•"/>
-              <a:tabLst/>
-              <a:defRPr/>
-            </a:pPr>
-            <a:r>
-              <a:rPr lang="en-US" baseline="0" dirty="0" smtClean="0"/>
-              <a:t>When a feature too big, we have a ready alternative to layer-based splitting.</a:t>
-            </a:r>
-          </a:p>
-          <a:p>
-            <a:pPr marL="628650" lvl="1" indent="-171450">
-              <a:buFont typeface="Arial" panose="020B0604020202020204" pitchFamily="34" charset="0"/>
-              <a:buChar char="•"/>
-            </a:pPr>
-            <a:r>
-              <a:rPr lang="en-US" baseline="0" dirty="0" smtClean="0"/>
-              <a:t>Consistently sized “chunks” facilitate consistent development flow/velocity.</a:t>
-            </a:r>
-          </a:p>
-          <a:p>
-            <a:pPr marL="171450" lvl="0" indent="-171450">
-              <a:buFont typeface="Arial" panose="020B0604020202020204" pitchFamily="34" charset="0"/>
-              <a:buChar char="•"/>
-            </a:pPr>
-            <a:r>
-              <a:rPr lang="en-US" baseline="0" dirty="0" smtClean="0"/>
-              <a:t>Half the rest comes from the focus it brings to development.</a:t>
-            </a:r>
-          </a:p>
-          <a:p>
-            <a:pPr marL="628650" lvl="1" indent="-171450">
-              <a:buFont typeface="Arial" panose="020B0604020202020204" pitchFamily="34" charset="0"/>
-              <a:buChar char="•"/>
-            </a:pPr>
-            <a:r>
-              <a:rPr lang="en-US" baseline="0" dirty="0" smtClean="0"/>
-              <a:t>“Need” something not in a scenario?  ASK THE PO!  You’re either missing a scenario or off-scope.</a:t>
-            </a:r>
-          </a:p>
-          <a:p>
-            <a:pPr marL="628650" lvl="1" indent="-171450">
-              <a:buFont typeface="Arial" panose="020B0604020202020204" pitchFamily="34" charset="0"/>
-              <a:buChar char="•"/>
-            </a:pPr>
-            <a:r>
-              <a:rPr lang="en-US" baseline="0" dirty="0" smtClean="0"/>
-              <a:t>Building to the tests greatly reduce “failure demand”</a:t>
-            </a:r>
-          </a:p>
-          <a:p>
-            <a:pPr marL="171450" lvl="0" indent="-171450">
-              <a:buFont typeface="Arial" panose="020B0604020202020204" pitchFamily="34" charset="0"/>
-              <a:buChar char="•"/>
-            </a:pPr>
-            <a:r>
-              <a:rPr lang="en-US" baseline="0" dirty="0" smtClean="0"/>
-              <a:t>We have the scenarios, so why not share them with QA?</a:t>
-            </a:r>
-          </a:p>
-          <a:p>
-            <a:pPr marL="628650" lvl="1" indent="-171450">
-              <a:buFont typeface="Arial" panose="020B0604020202020204" pitchFamily="34" charset="0"/>
-              <a:buChar char="•"/>
-            </a:pPr>
-            <a:r>
-              <a:rPr lang="en-US" baseline="0" dirty="0" smtClean="0"/>
-              <a:t>Let them get started while development proceeds.</a:t>
-            </a:r>
-          </a:p>
-          <a:p>
-            <a:pPr marL="628650" lvl="1" indent="-171450">
-              <a:buFont typeface="Arial" panose="020B0604020202020204" pitchFamily="34" charset="0"/>
-              <a:buChar char="•"/>
-            </a:pPr>
-            <a:r>
-              <a:rPr lang="en-US" baseline="0" dirty="0" smtClean="0"/>
-              <a:t>Provoke QA questions and feedback while there’s still time to address them.</a:t>
-            </a:r>
-          </a:p>
-          <a:p>
-            <a:pPr marL="171450" lvl="0" indent="-171450">
-              <a:buFont typeface="Arial" panose="020B0604020202020204" pitchFamily="34" charset="0"/>
-              <a:buChar char="•"/>
-            </a:pPr>
-            <a:r>
-              <a:rPr lang="en-US" baseline="0" dirty="0" smtClean="0"/>
-              <a:t>The LAST 10% comes from actually automating test execution. Like the Iceberg…</a:t>
-            </a:r>
-          </a:p>
-          <a:p>
-            <a:pPr marL="628650" marR="0" lvl="1" indent="-171450" algn="l" defTabSz="457200" rtl="0" eaLnBrk="1" fontAlgn="auto" latinLnBrk="0" hangingPunct="1">
-              <a:lnSpc>
-                <a:spcPct val="100000"/>
-              </a:lnSpc>
-              <a:spcBef>
-                <a:spcPts val="0"/>
-              </a:spcBef>
-              <a:spcAft>
-                <a:spcPts val="0"/>
-              </a:spcAft>
-              <a:buClrTx/>
-              <a:buSzTx/>
-              <a:buFont typeface="Arial" panose="020B0604020202020204" pitchFamily="34" charset="0"/>
-              <a:buChar char="•"/>
-              <a:tabLst/>
-              <a:defRPr/>
-            </a:pPr>
-            <a:r>
-              <a:rPr lang="en-US" baseline="0" dirty="0" smtClean="0"/>
-              <a:t>Rally experience:  Dropping “Bug Bash”</a:t>
-            </a:r>
-          </a:p>
-          <a:p>
-            <a:pPr marL="628650" marR="0" lvl="1" indent="-171450" algn="l" defTabSz="457200" rtl="0" eaLnBrk="1" fontAlgn="auto" latinLnBrk="0" hangingPunct="1">
-              <a:lnSpc>
-                <a:spcPct val="100000"/>
-              </a:lnSpc>
-              <a:spcBef>
-                <a:spcPts val="0"/>
-              </a:spcBef>
-              <a:spcAft>
-                <a:spcPts val="0"/>
-              </a:spcAft>
-              <a:buClrTx/>
-              <a:buSzTx/>
-              <a:buFont typeface="Arial" panose="020B0604020202020204" pitchFamily="34" charset="0"/>
-              <a:buChar char="•"/>
-              <a:tabLst/>
-              <a:defRPr/>
-            </a:pPr>
-            <a:r>
-              <a:rPr lang="en-US" baseline="0" dirty="0" smtClean="0"/>
-              <a:t>Only this small tip is usually visible.</a:t>
-            </a:r>
-          </a:p>
-          <a:p>
-            <a:pPr marL="628650" marR="0" lvl="1" indent="-171450" algn="l" defTabSz="457200" rtl="0" eaLnBrk="1" fontAlgn="auto" latinLnBrk="0" hangingPunct="1">
-              <a:lnSpc>
-                <a:spcPct val="100000"/>
-              </a:lnSpc>
-              <a:spcBef>
-                <a:spcPts val="0"/>
-              </a:spcBef>
-              <a:spcAft>
-                <a:spcPts val="0"/>
-              </a:spcAft>
-              <a:buClrTx/>
-              <a:buSzTx/>
-              <a:buFont typeface="Arial" panose="020B0604020202020204" pitchFamily="34" charset="0"/>
-              <a:buChar char="•"/>
-              <a:tabLst/>
-              <a:defRPr/>
-            </a:pPr>
-            <a:r>
-              <a:rPr lang="en-US" baseline="0" dirty="0" smtClean="0"/>
-              <a:t>But it’s only visible BECAUSE it’s riding on what’s below.  That’s what’s actually floating.</a:t>
-            </a:r>
-          </a:p>
-          <a:p>
-            <a:pPr marL="171450" lvl="0" indent="-171450">
               <a:buFont typeface="Arial" panose="020B0604020202020204" pitchFamily="34" charset="0"/>
               <a:buChar char="•"/>
             </a:pPr>
@@ -2160,7 +1920,7 @@
     </p:spTree>
     <p:extLst>
       <p:ext uri="{BB962C8B-B14F-4D97-AF65-F5344CB8AC3E}">
-        <p14:creationId xmlns:p14="http://schemas.microsoft.com/office/powerpoint/2010/main" val="901864340"/>
+        <p14:creationId xmlns:p14="http://schemas.microsoft.com/office/powerpoint/2010/main" val="437793297"/>
       </p:ext>
     </p:extLst>
   </p:cSld>
@@ -2214,19 +1974,29 @@
           <a:bodyPr/>
           <a:lstStyle/>
           <a:p>
+            <a:r>
+              <a:rPr lang="en-US" dirty="0" smtClean="0"/>
+              <a:t>Cover this one from the bottom up.  </a:t>
+            </a:r>
+            <a:r>
+              <a:rPr lang="en-US" baseline="0" dirty="0" smtClean="0"/>
+              <a:t>The steps also make a natural implementation progression	</a:t>
+            </a:r>
+            <a:endParaRPr lang="en-US" dirty="0" smtClean="0"/>
+          </a:p>
+          <a:p>
             <a:pPr marL="171450" indent="-171450">
               <a:buFont typeface="Arial" panose="020B0604020202020204" pitchFamily="34" charset="0"/>
               <a:buChar char="•"/>
             </a:pPr>
             <a:r>
               <a:rPr lang="en-US" dirty="0" smtClean="0"/>
-              <a:t>When we taught the program to learn a new word, we started with it’s</a:t>
+              <a:t>At least half the value comes from the COLLABORATION</a:t>
             </a:r>
             <a:r>
               <a:rPr lang="en-US" baseline="0" dirty="0" smtClean="0"/>
-              <a:t> “Ok, got it.”</a:t>
-            </a:r>
-            <a:endParaRPr lang="en-US" dirty="0" smtClean="0"/>
+              <a:t> of GETTING TO Gherkin specs.</a:t>
+            </a:r>
           </a:p>
           <a:p>
             <a:pPr marL="628650" lvl="1" indent="-171450">
@@ -2234,12 +2004,8 @@
               <a:buChar char="•"/>
             </a:pPr>
             <a:r>
-              <a:rPr lang="en-US" dirty="0" smtClean="0"/>
-              <a:t>The first “implementation” simply returned</a:t>
-            </a:r>
-            <a:r>
               <a:rPr lang="en-US" baseline="0" dirty="0" smtClean="0"/>
-              <a:t> the, “Ok, got it.”</a:t>
+              <a:t>UBIQUITOUS LANGUAGE provides clarity around WHAT you need to build</a:t>
             </a:r>
           </a:p>
           <a:p>
@@ -2249,7 +2015,50 @@
             </a:pPr>
             <a:r>
               <a:rPr lang="en-US" baseline="0" dirty="0" smtClean="0"/>
-              <a:t>We KNEW we hadn’t implemented the solve/recall piece, but we made the first step pass “for real.” and got that feedback right away.</a:t>
+              <a:t>Identify corner cases early</a:t>
+            </a:r>
+          </a:p>
+          <a:p>
+            <a:pPr marL="1085850" lvl="2" indent="-171450">
+              <a:buFont typeface="Arial" panose="020B0604020202020204" pitchFamily="34" charset="0"/>
+              <a:buChar char="•"/>
+            </a:pPr>
+            <a:r>
+              <a:rPr lang="en-US" baseline="0" dirty="0" smtClean="0"/>
+              <a:t>Replace assumptions with answers.</a:t>
+            </a:r>
+          </a:p>
+          <a:p>
+            <a:pPr marL="1085850" lvl="2" indent="-171450">
+              <a:buFont typeface="Arial" panose="020B0604020202020204" pitchFamily="34" charset="0"/>
+              <a:buChar char="•"/>
+            </a:pPr>
+            <a:r>
+              <a:rPr lang="en-US" baseline="0" dirty="0" smtClean="0"/>
+              <a:t>Make intentional scope &amp; priority decisions</a:t>
+            </a:r>
+          </a:p>
+          <a:p>
+            <a:pPr marL="628650" marR="0" lvl="1" indent="-171450" algn="l" defTabSz="457200" rtl="0" eaLnBrk="1" fontAlgn="auto" latinLnBrk="0" hangingPunct="1">
+              <a:lnSpc>
+                <a:spcPct val="100000"/>
+              </a:lnSpc>
+              <a:spcBef>
+                <a:spcPts val="0"/>
+              </a:spcBef>
+              <a:spcAft>
+                <a:spcPts val="0"/>
+              </a:spcAft>
+              <a:buClrTx/>
+              <a:buSzTx/>
+              <a:buFont typeface="Arial" panose="020B0604020202020204" pitchFamily="34" charset="0"/>
+              <a:buChar char="•"/>
+              <a:tabLst/>
+              <a:defRPr/>
+            </a:pPr>
+            <a:r>
+              <a:rPr lang="en-US" baseline="0" dirty="0" smtClean="0"/>
+              <a:t>When a feature too big, we have a ready alternative to layer-based splitting.</a:t>
             </a:r>
           </a:p>
           <a:p>
@@ -2259,7 +2068,17 @@
             </a:pPr>
             <a:r>
               <a:rPr lang="en-US" baseline="0" dirty="0" smtClean="0"/>
-              <a:t>Only then did we add the solve/recall step</a:t>
+              <a:t>Consistently sized “chunks” facilitate consistent development flow/velocity.</a:t>
+            </a:r>
+          </a:p>
+          <a:p>
+            <a:pPr marL="171450" lvl="0" indent="-171450">
+              <a:buFont typeface="Arial" panose="020B0604020202020204" pitchFamily="34" charset="0"/>
+              <a:buChar char="•"/>
+            </a:pPr>
+            <a:r>
+              <a:rPr lang="en-US" baseline="0" dirty="0" smtClean="0"/>
+              <a:t>Half the rest comes from the focus it brings to development.</a:t>
             </a:r>
           </a:p>
           <a:p>
@@ -2269,7 +2088,17 @@
             </a:pPr>
             <a:r>
               <a:rPr lang="en-US" baseline="0" dirty="0" smtClean="0"/>
-              <a:t>AT BOTH STAGES, WE FOCUSED ON ONE THING AT A TIME.</a:t>
+              <a:t>“Need” something not in a scenario?  ASK THE PO!  You’re either missing a scenario or off-scope.</a:t>
+            </a:r>
+          </a:p>
+          <a:p>
+            <a:pPr marL="628650" lvl="1" indent="-171450">
+              <a:buFont typeface="Arial" panose="020B0604020202020204" pitchFamily="34" charset="0"/>
+              <a:buChar char="•"/>
+            </a:pPr>
+            <a:r>
+              <a:rPr lang="en-US" baseline="0" dirty="0" smtClean="0"/>
+              <a:t>Building to the tests greatly reduce “failure demand”</a:t>
             </a:r>
           </a:p>
           <a:p>
@@ -2279,15 +2108,17 @@
             </a:pPr>
             <a:r>
               <a:rPr lang="en-US" baseline="0" dirty="0" smtClean="0"/>
-              <a:t>In contrast, when we started the solver with solving “</a:t>
-            </a:r>
-            <a:r>
-              <a:rPr lang="en-US" baseline="0" dirty="0" err="1" smtClean="0"/>
-              <a:t>beljum</a:t>
-            </a:r>
+              <a:t>We have the scenarios, so why not share them with QA?</a:t>
+            </a:r>
+          </a:p>
+          <a:p>
+            <a:pPr marL="628650" lvl="1" indent="-171450">
+              <a:buFont typeface="Arial" panose="020B0604020202020204" pitchFamily="34" charset="0"/>
+              <a:buChar char="•"/>
+            </a:pPr>
             <a:r>
               <a:rPr lang="en-US" baseline="0" dirty="0" smtClean="0"/>
-              <a:t>” as “JUMBLE” we did NOT simply implement ‘return “JUMBLE” ‘</a:t>
+              <a:t>Let them get started while development proceeds.</a:t>
             </a:r>
           </a:p>
           <a:p>
@@ -2297,82 +2128,93 @@
             </a:pPr>
             <a:r>
               <a:rPr lang="en-US" baseline="0" dirty="0" smtClean="0"/>
-              <a:t>That would have passed the scenario, but without making any useful progress</a:t>
-            </a:r>
-          </a:p>
-          <a:p>
-            <a:pPr marL="628650" lvl="1" indent="-171450">
+              <a:t>Provoke QA questions and feedback while there’s still time to address them.</a:t>
+            </a:r>
+          </a:p>
+          <a:p>
+            <a:pPr marL="171450" lvl="0" indent="-171450">
               <a:buFont typeface="Arial" panose="020B0604020202020204" pitchFamily="34" charset="0"/>
               <a:buChar char="•"/>
             </a:pPr>
             <a:r>
               <a:rPr lang="en-US" baseline="0" dirty="0" smtClean="0"/>
-              <a:t>Instead, we took “When I enter “</a:t>
-            </a:r>
-            <a:r>
-              <a:rPr lang="en-US" baseline="0" dirty="0" err="1" smtClean="0"/>
-              <a:t>beljum</a:t>
-            </a:r>
+              <a:t>The LAST 10% comes from actually automating test execution. Like the Iceberg…</a:t>
+            </a:r>
+          </a:p>
+          <a:p>
+            <a:pPr marL="628650" marR="0" lvl="1" indent="-171450" algn="l" defTabSz="457200" rtl="0" eaLnBrk="1" fontAlgn="auto" latinLnBrk="0" hangingPunct="1">
+              <a:lnSpc>
+                <a:spcPct val="100000"/>
+              </a:lnSpc>
+              <a:spcBef>
+                <a:spcPts val="0"/>
+              </a:spcBef>
+              <a:spcAft>
+                <a:spcPts val="0"/>
+              </a:spcAft>
+              <a:buClrTx/>
+              <a:buSzTx/>
+              <a:buFont typeface="Arial" panose="020B0604020202020204" pitchFamily="34" charset="0"/>
+              <a:buChar char="•"/>
+              <a:tabLst/>
+              <a:defRPr/>
+            </a:pPr>
             <a:r>
               <a:rPr lang="en-US" baseline="0" dirty="0" smtClean="0"/>
-              <a:t>” as far as passing the input to a stub solve( ) method that just returned its input.</a:t>
-            </a:r>
-          </a:p>
-          <a:p>
-            <a:pPr marL="1085850" lvl="2" indent="-171450">
-              <a:buFont typeface="Arial" panose="020B0604020202020204" pitchFamily="34" charset="0"/>
-              <a:buChar char="•"/>
+              <a:t>Rally experience:  Dropping “Bug Bash”</a:t>
+            </a:r>
+          </a:p>
+          <a:p>
+            <a:pPr marL="628650" marR="0" lvl="1" indent="-171450" algn="l" defTabSz="457200" rtl="0" eaLnBrk="1" fontAlgn="auto" latinLnBrk="0" hangingPunct="1">
+              <a:lnSpc>
+                <a:spcPct val="100000"/>
+              </a:lnSpc>
+              <a:spcBef>
+                <a:spcPts val="0"/>
+              </a:spcBef>
+              <a:spcAft>
+                <a:spcPts val="0"/>
+              </a:spcAft>
+              <a:buClrTx/>
+              <a:buSzTx/>
+              <a:buFont typeface="Arial" panose="020B0604020202020204" pitchFamily="34" charset="0"/>
+              <a:buChar char="•"/>
+              <a:tabLst/>
+              <a:defRPr/>
             </a:pPr>
             <a:r>
               <a:rPr lang="en-US" baseline="0" dirty="0" smtClean="0"/>
-              <a:t>This confirmed the input was received and dispatched without damage.</a:t>
-            </a:r>
-          </a:p>
-          <a:p>
-            <a:pPr marL="628650" lvl="1" indent="-171450">
-              <a:buFont typeface="Arial" panose="020B0604020202020204" pitchFamily="34" charset="0"/>
-              <a:buChar char="•"/>
+              <a:t>Only this small tip is usually visible.</a:t>
+            </a:r>
+          </a:p>
+          <a:p>
+            <a:pPr marL="628650" marR="0" lvl="1" indent="-171450" algn="l" defTabSz="457200" rtl="0" eaLnBrk="1" fontAlgn="auto" latinLnBrk="0" hangingPunct="1">
+              <a:lnSpc>
+                <a:spcPct val="100000"/>
+              </a:lnSpc>
+              <a:spcBef>
+                <a:spcPts val="0"/>
+              </a:spcBef>
+              <a:spcAft>
+                <a:spcPts val="0"/>
+              </a:spcAft>
+              <a:buClrTx/>
+              <a:buSzTx/>
+              <a:buFont typeface="Arial" panose="020B0604020202020204" pitchFamily="34" charset="0"/>
+              <a:buChar char="•"/>
+              <a:tabLst/>
+              <a:defRPr/>
             </a:pPr>
             <a:r>
               <a:rPr lang="en-US" baseline="0" dirty="0" smtClean="0"/>
-              <a:t>Then, we started on the “Then the output should be “JUMBLE”</a:t>
-            </a:r>
-          </a:p>
-          <a:p>
-            <a:pPr marL="1085850" lvl="2" indent="-171450">
-              <a:buFont typeface="Arial" panose="020B0604020202020204" pitchFamily="34" charset="0"/>
-              <a:buChar char="•"/>
-            </a:pPr>
-            <a:r>
-              <a:rPr lang="en-US" baseline="0" dirty="0" smtClean="0"/>
-              <a:t>This was where we dropped into our UNIT tests, to drive out the </a:t>
-            </a:r>
-            <a:r>
-              <a:rPr lang="en-US" baseline="0" dirty="0" err="1" smtClean="0"/>
-              <a:t>makeKey</a:t>
-            </a:r>
-            <a:r>
-              <a:rPr lang="en-US" baseline="0" dirty="0" smtClean="0"/>
-              <a:t>( ) and </a:t>
-            </a:r>
-            <a:r>
-              <a:rPr lang="en-US" baseline="0" dirty="0" err="1" smtClean="0"/>
-              <a:t>lookupKey</a:t>
-            </a:r>
-            <a:r>
-              <a:rPr lang="en-US" baseline="0" dirty="0" smtClean="0"/>
-              <a:t>( ) methods.</a:t>
-            </a:r>
-          </a:p>
-          <a:p>
-            <a:pPr marL="628650" lvl="1" indent="-171450">
-              <a:buFont typeface="Arial" panose="020B0604020202020204" pitchFamily="34" charset="0"/>
-              <a:buChar char="•"/>
-            </a:pPr>
-            <a:r>
-              <a:rPr lang="en-US" baseline="0" dirty="0" smtClean="0"/>
-              <a:t>Once those unit tests passed, so did our Acceptance Test</a:t>
-            </a:r>
+              <a:t>But it’s only visible BECAUSE it’s riding on what’s below.  That’s what’s actually floating.</a:t>
+            </a:r>
+          </a:p>
+          <a:p>
+            <a:pPr marL="171450" lvl="0" indent="-171450">
+              <a:buFont typeface="Arial" panose="020B0604020202020204" pitchFamily="34" charset="0"/>
+              <a:buChar char="•"/>
+            </a:pPr>
             <a:endParaRPr lang="en-US" dirty="0" smtClean="0"/>
           </a:p>
         </p:txBody>
@@ -2403,7 +2245,7 @@
     </p:spTree>
     <p:extLst>
       <p:ext uri="{BB962C8B-B14F-4D97-AF65-F5344CB8AC3E}">
-        <p14:creationId xmlns:p14="http://schemas.microsoft.com/office/powerpoint/2010/main" val="2372302056"/>
+        <p14:creationId xmlns:p14="http://schemas.microsoft.com/office/powerpoint/2010/main" val="901864340"/>
       </p:ext>
     </p:extLst>
   </p:cSld>
@@ -2457,6 +2299,157 @@
           <a:bodyPr/>
           <a:lstStyle/>
           <a:p>
+            <a:pPr marL="171450" indent="-171450">
+              <a:buFont typeface="Arial" panose="020B0604020202020204" pitchFamily="34" charset="0"/>
+              <a:buChar char="•"/>
+            </a:pPr>
+            <a:r>
+              <a:rPr lang="en-US" dirty="0" smtClean="0"/>
+              <a:t>When we taught the program to learn a new word, we started with it’s</a:t>
+            </a:r>
+            <a:r>
+              <a:rPr lang="en-US" baseline="0" dirty="0" smtClean="0"/>
+              <a:t> “Ok, got it.”</a:t>
+            </a:r>
+            <a:endParaRPr lang="en-US" dirty="0" smtClean="0"/>
+          </a:p>
+          <a:p>
+            <a:pPr marL="628650" lvl="1" indent="-171450">
+              <a:buFont typeface="Arial" panose="020B0604020202020204" pitchFamily="34" charset="0"/>
+              <a:buChar char="•"/>
+            </a:pPr>
+            <a:r>
+              <a:rPr lang="en-US" dirty="0" smtClean="0"/>
+              <a:t>The first “implementation” simply returned</a:t>
+            </a:r>
+            <a:r>
+              <a:rPr lang="en-US" baseline="0" dirty="0" smtClean="0"/>
+              <a:t> the, “Ok, got it.”</a:t>
+            </a:r>
+          </a:p>
+          <a:p>
+            <a:pPr marL="628650" lvl="1" indent="-171450">
+              <a:buFont typeface="Arial" panose="020B0604020202020204" pitchFamily="34" charset="0"/>
+              <a:buChar char="•"/>
+            </a:pPr>
+            <a:r>
+              <a:rPr lang="en-US" baseline="0" dirty="0" smtClean="0"/>
+              <a:t>We KNEW we hadn’t implemented the solve/recall piece, but we made the first step pass “for real.” and got that feedback right away.</a:t>
+            </a:r>
+          </a:p>
+          <a:p>
+            <a:pPr marL="628650" lvl="1" indent="-171450">
+              <a:buFont typeface="Arial" panose="020B0604020202020204" pitchFamily="34" charset="0"/>
+              <a:buChar char="•"/>
+            </a:pPr>
+            <a:r>
+              <a:rPr lang="en-US" baseline="0" dirty="0" smtClean="0"/>
+              <a:t>Only then did we add the solve/recall step</a:t>
+            </a:r>
+          </a:p>
+          <a:p>
+            <a:pPr marL="628650" lvl="1" indent="-171450">
+              <a:buFont typeface="Arial" panose="020B0604020202020204" pitchFamily="34" charset="0"/>
+              <a:buChar char="•"/>
+            </a:pPr>
+            <a:r>
+              <a:rPr lang="en-US" baseline="0" dirty="0" smtClean="0"/>
+              <a:t>AT BOTH STAGES, WE FOCUSED ON ONE THING AT A TIME.</a:t>
+            </a:r>
+          </a:p>
+          <a:p>
+            <a:pPr marL="171450" lvl="0" indent="-171450">
+              <a:buFont typeface="Arial" panose="020B0604020202020204" pitchFamily="34" charset="0"/>
+              <a:buChar char="•"/>
+            </a:pPr>
+            <a:r>
+              <a:rPr lang="en-US" baseline="0" dirty="0" smtClean="0"/>
+              <a:t>In contrast, when we started the solver with solving “</a:t>
+            </a:r>
+            <a:r>
+              <a:rPr lang="en-US" baseline="0" dirty="0" err="1" smtClean="0"/>
+              <a:t>beljum</a:t>
+            </a:r>
+            <a:r>
+              <a:rPr lang="en-US" baseline="0" dirty="0" smtClean="0"/>
+              <a:t>” as “JUMBLE” we did NOT simply implement ‘return “JUMBLE” ‘</a:t>
+            </a:r>
+          </a:p>
+          <a:p>
+            <a:pPr marL="628650" lvl="1" indent="-171450">
+              <a:buFont typeface="Arial" panose="020B0604020202020204" pitchFamily="34" charset="0"/>
+              <a:buChar char="•"/>
+            </a:pPr>
+            <a:r>
+              <a:rPr lang="en-US" baseline="0" dirty="0" smtClean="0"/>
+              <a:t>That would have passed the scenario, but without making any useful progress</a:t>
+            </a:r>
+          </a:p>
+          <a:p>
+            <a:pPr marL="628650" lvl="1" indent="-171450">
+              <a:buFont typeface="Arial" panose="020B0604020202020204" pitchFamily="34" charset="0"/>
+              <a:buChar char="•"/>
+            </a:pPr>
+            <a:r>
+              <a:rPr lang="en-US" baseline="0" dirty="0" smtClean="0"/>
+              <a:t>Instead, we took “When I enter “</a:t>
+            </a:r>
+            <a:r>
+              <a:rPr lang="en-US" baseline="0" dirty="0" err="1" smtClean="0"/>
+              <a:t>beljum</a:t>
+            </a:r>
+            <a:r>
+              <a:rPr lang="en-US" baseline="0" dirty="0" smtClean="0"/>
+              <a:t>” as far as passing the input to a stub solve( ) method that just returned its input.</a:t>
+            </a:r>
+          </a:p>
+          <a:p>
+            <a:pPr marL="1085850" lvl="2" indent="-171450">
+              <a:buFont typeface="Arial" panose="020B0604020202020204" pitchFamily="34" charset="0"/>
+              <a:buChar char="•"/>
+            </a:pPr>
+            <a:r>
+              <a:rPr lang="en-US" baseline="0" dirty="0" smtClean="0"/>
+              <a:t>This confirmed the input was received and dispatched without damage.</a:t>
+            </a:r>
+          </a:p>
+          <a:p>
+            <a:pPr marL="628650" lvl="1" indent="-171450">
+              <a:buFont typeface="Arial" panose="020B0604020202020204" pitchFamily="34" charset="0"/>
+              <a:buChar char="•"/>
+            </a:pPr>
+            <a:r>
+              <a:rPr lang="en-US" baseline="0" dirty="0" smtClean="0"/>
+              <a:t>Then, we started on the “Then the output should be “JUMBLE”</a:t>
+            </a:r>
+          </a:p>
+          <a:p>
+            <a:pPr marL="1085850" lvl="2" indent="-171450">
+              <a:buFont typeface="Arial" panose="020B0604020202020204" pitchFamily="34" charset="0"/>
+              <a:buChar char="•"/>
+            </a:pPr>
+            <a:r>
+              <a:rPr lang="en-US" baseline="0" dirty="0" smtClean="0"/>
+              <a:t>This was where we dropped into our UNIT tests, to drive out the </a:t>
+            </a:r>
+            <a:r>
+              <a:rPr lang="en-US" baseline="0" dirty="0" err="1" smtClean="0"/>
+              <a:t>makeKey</a:t>
+            </a:r>
+            <a:r>
+              <a:rPr lang="en-US" baseline="0" dirty="0" smtClean="0"/>
+              <a:t>( ) and solve( ) methods.</a:t>
+            </a:r>
+          </a:p>
+          <a:p>
+            <a:pPr marL="628650" lvl="1" indent="-171450">
+              <a:buFont typeface="Arial" panose="020B0604020202020204" pitchFamily="34" charset="0"/>
+              <a:buChar char="•"/>
+            </a:pPr>
+            <a:r>
+              <a:rPr lang="en-US" baseline="0" dirty="0" smtClean="0"/>
+              <a:t>Once those unit tests passed, so did our Acceptance Test</a:t>
+            </a:r>
             <a:endParaRPr lang="en-US" dirty="0" smtClean="0"/>
           </a:p>
         </p:txBody>
@@ -2487,7 +2480,7 @@
     </p:spTree>
     <p:extLst>
       <p:ext uri="{BB962C8B-B14F-4D97-AF65-F5344CB8AC3E}">
-        <p14:creationId xmlns:p14="http://schemas.microsoft.com/office/powerpoint/2010/main" val="2200448088"/>
+        <p14:creationId xmlns:p14="http://schemas.microsoft.com/office/powerpoint/2010/main" val="2372302056"/>
       </p:ext>
     </p:extLst>
   </p:cSld>
@@ -2571,7 +2564,7 @@
     </p:spTree>
     <p:extLst>
       <p:ext uri="{BB962C8B-B14F-4D97-AF65-F5344CB8AC3E}">
-        <p14:creationId xmlns:p14="http://schemas.microsoft.com/office/powerpoint/2010/main" val="901864340"/>
+        <p14:creationId xmlns:p14="http://schemas.microsoft.com/office/powerpoint/2010/main" val="2200448088"/>
       </p:ext>
     </p:extLst>
   </p:cSld>
@@ -2625,10 +2618,7 @@
           <a:bodyPr/>
           <a:lstStyle/>
           <a:p>
-            <a:r>
-              <a:rPr lang="en-US" dirty="0" smtClean="0"/>
-              <a:t>Alyse</a:t>
-            </a:r>
+            <a:endParaRPr lang="en-US" dirty="0" smtClean="0"/>
           </a:p>
         </p:txBody>
       </p:sp>
@@ -2712,217 +2702,10 @@
           <a:bodyPr/>
           <a:lstStyle/>
           <a:p>
-            <a:pPr marL="171450" indent="-171450">
-              <a:buFont typeface="Arial" panose="020B0604020202020204" pitchFamily="34" charset="0"/>
-              <a:buChar char="•"/>
-            </a:pPr>
             <a:r>
               <a:rPr lang="en-US" dirty="0" smtClean="0"/>
-              <a:t>Growing</a:t>
-            </a:r>
-            <a:r>
-              <a:rPr lang="en-US" baseline="0" dirty="0" smtClean="0"/>
-              <a:t> OO S/W Guided by Tests:</a:t>
-            </a:r>
-          </a:p>
-          <a:p>
-            <a:pPr marL="628650" lvl="1" indent="-171450">
-              <a:buFont typeface="Arial" panose="020B0604020202020204" pitchFamily="34" charset="0"/>
-              <a:buChar char="•"/>
-            </a:pPr>
-            <a:r>
-              <a:rPr lang="en-US" baseline="0" dirty="0" smtClean="0"/>
-              <a:t>Tool agnostic, but uses JUnit for the examples.</a:t>
-            </a:r>
-          </a:p>
-          <a:p>
-            <a:pPr marL="628650" lvl="1" indent="-171450">
-              <a:buFont typeface="Arial" panose="020B0604020202020204" pitchFamily="34" charset="0"/>
-              <a:buChar char="•"/>
-            </a:pPr>
-            <a:r>
-              <a:rPr lang="en-US" baseline="0" dirty="0" smtClean="0"/>
-              <a:t>Excellent deep-dive into actually doing it in a way that reaps the benefits</a:t>
-            </a:r>
-          </a:p>
-          <a:p>
-            <a:pPr marL="171450" lvl="0" indent="-171450">
-              <a:buFont typeface="Arial" panose="020B0604020202020204" pitchFamily="34" charset="0"/>
-              <a:buChar char="•"/>
-            </a:pPr>
-            <a:r>
-              <a:rPr lang="en-US" baseline="0" dirty="0" smtClean="0"/>
-              <a:t>The Cucumber Book</a:t>
-            </a:r>
-          </a:p>
-          <a:p>
-            <a:pPr marL="628650" lvl="1" indent="-171450">
-              <a:buFont typeface="Arial" panose="020B0604020202020204" pitchFamily="34" charset="0"/>
-              <a:buChar char="•"/>
-            </a:pPr>
-            <a:r>
-              <a:rPr lang="en-US" baseline="0" dirty="0" smtClean="0"/>
-              <a:t>Examples in Ruby – much cleaner than Java, and you learn Ruby for free!</a:t>
-            </a:r>
-          </a:p>
-          <a:p>
-            <a:pPr marL="171450" lvl="0" indent="-171450">
-              <a:buFont typeface="Arial" panose="020B0604020202020204" pitchFamily="34" charset="0"/>
-              <a:buChar char="•"/>
-            </a:pPr>
-            <a:r>
-              <a:rPr lang="en-US" baseline="0" dirty="0" smtClean="0"/>
-              <a:t>The Cucumber </a:t>
-            </a:r>
-            <a:r>
-              <a:rPr lang="en-US" b="1" baseline="0" dirty="0" smtClean="0"/>
-              <a:t>For Java </a:t>
-            </a:r>
-            <a:r>
-              <a:rPr lang="en-US" baseline="0" dirty="0" smtClean="0"/>
-              <a:t>Book</a:t>
-            </a:r>
-          </a:p>
-          <a:p>
-            <a:pPr marL="628650" lvl="1" indent="-171450">
-              <a:buFont typeface="Arial" panose="020B0604020202020204" pitchFamily="34" charset="0"/>
-              <a:buChar char="•"/>
-            </a:pPr>
-            <a:r>
-              <a:rPr lang="en-US" baseline="0" dirty="0" smtClean="0"/>
-              <a:t>Full substitute for the Ruby version, may be more accessible to Java/C# folks.</a:t>
-            </a:r>
-          </a:p>
-          <a:p>
-            <a:pPr marL="628650" lvl="1" indent="-171450">
-              <a:buFont typeface="Arial" panose="020B0604020202020204" pitchFamily="34" charset="0"/>
-              <a:buChar char="•"/>
-            </a:pPr>
-            <a:r>
-              <a:rPr lang="en-US" baseline="0" dirty="0" smtClean="0"/>
-              <a:t>No matter your role or language preference, AT LEAST CHECK OUT “UNCLE BOB” MARTIN’S FORWARD</a:t>
-            </a:r>
-          </a:p>
-          <a:p>
-            <a:pPr marL="171450" lvl="0" indent="-171450">
-              <a:buFont typeface="Arial" panose="020B0604020202020204" pitchFamily="34" charset="0"/>
-              <a:buChar char="•"/>
-            </a:pPr>
-            <a:r>
-              <a:rPr lang="en-US" u="sng" baseline="0" dirty="0" smtClean="0"/>
-              <a:t>Cucumber </a:t>
-            </a:r>
-            <a:r>
-              <a:rPr lang="en-US" u="sng" baseline="0" dirty="0" err="1" smtClean="0"/>
-              <a:t>Recipies</a:t>
-            </a:r>
-            <a:endParaRPr lang="en-US" u="none" baseline="0" dirty="0" smtClean="0"/>
-          </a:p>
-          <a:p>
-            <a:pPr marL="628650" lvl="1" indent="-171450">
-              <a:buFont typeface="Arial" panose="020B0604020202020204" pitchFamily="34" charset="0"/>
-              <a:buChar char="•"/>
-            </a:pPr>
-            <a:r>
-              <a:rPr lang="en-US" u="none" baseline="0" dirty="0" smtClean="0"/>
-              <a:t>“Canned” solutions (at least, starter solutions) to many real-world needs that might bog down without a helping hand.</a:t>
-            </a:r>
-          </a:p>
-          <a:p>
-            <a:pPr marL="628650" lvl="1" indent="-171450">
-              <a:buFont typeface="Arial" panose="020B0604020202020204" pitchFamily="34" charset="0"/>
-              <a:buChar char="•"/>
-            </a:pPr>
-            <a:r>
-              <a:rPr lang="en-US" u="none" baseline="0" dirty="0" smtClean="0"/>
-              <a:t>43 </a:t>
-            </a:r>
-            <a:r>
-              <a:rPr lang="en-US" u="none" baseline="0" dirty="0" err="1" smtClean="0"/>
-              <a:t>Recipies</a:t>
-            </a:r>
-            <a:r>
-              <a:rPr lang="en-US" u="none" baseline="0" dirty="0" smtClean="0"/>
-              <a:t> of many types</a:t>
-            </a:r>
-          </a:p>
-          <a:p>
-            <a:pPr marL="1085850" lvl="2" indent="-171450">
-              <a:buFont typeface="Arial" panose="020B0604020202020204" pitchFamily="34" charset="0"/>
-              <a:buChar char="•"/>
-            </a:pPr>
-            <a:r>
-              <a:rPr lang="en-US" u="none" baseline="0" dirty="0" smtClean="0"/>
-              <a:t>CI (reports/docs, parallel testing, even wire protocol)</a:t>
-            </a:r>
-          </a:p>
-          <a:p>
-            <a:pPr marL="1085850" lvl="2" indent="-171450">
-              <a:buFont typeface="Arial" panose="020B0604020202020204" pitchFamily="34" charset="0"/>
-              <a:buChar char="•"/>
-            </a:pPr>
-            <a:r>
-              <a:rPr lang="en-US" u="none" baseline="0" dirty="0" smtClean="0"/>
-              <a:t>Platforms (Android, iOS, PHP, Flash, .NET, Web, Windows, Mac, even Arduino)</a:t>
-            </a:r>
-          </a:p>
-          <a:p>
-            <a:pPr marL="1085850" lvl="2" indent="-171450">
-              <a:buFont typeface="Arial" panose="020B0604020202020204" pitchFamily="34" charset="0"/>
-              <a:buChar char="•"/>
-            </a:pPr>
-            <a:r>
-              <a:rPr lang="en-US" u="none" baseline="0" dirty="0" smtClean="0"/>
-              <a:t>Frameworks (Hibernate, Spring, Swing</a:t>
-            </a:r>
-          </a:p>
-          <a:p>
-            <a:pPr marL="1085850" lvl="2" indent="-171450">
-              <a:buFont typeface="Arial" panose="020B0604020202020204" pitchFamily="34" charset="0"/>
-              <a:buChar char="•"/>
-            </a:pPr>
-            <a:r>
-              <a:rPr lang="en-US" u="none" baseline="0" dirty="0" smtClean="0"/>
-              <a:t>Languages (JavaScript, </a:t>
-            </a:r>
-            <a:r>
-              <a:rPr lang="en-US" u="none" baseline="0" dirty="0" err="1" smtClean="0"/>
-              <a:t>Erlang</a:t>
-            </a:r>
-            <a:r>
-              <a:rPr lang="en-US" u="none" baseline="0" dirty="0" smtClean="0"/>
-              <a:t>, </a:t>
-            </a:r>
-            <a:r>
-              <a:rPr lang="en-US" u="none" baseline="0" dirty="0" err="1" smtClean="0"/>
-              <a:t>Lua</a:t>
-            </a:r>
-            <a:r>
-              <a:rPr lang="en-US" u="none" baseline="0" dirty="0" smtClean="0"/>
-              <a:t>, </a:t>
-            </a:r>
-            <a:r>
-              <a:rPr lang="en-US" u="none" baseline="0" dirty="0" err="1" smtClean="0"/>
-              <a:t>Clojure</a:t>
-            </a:r>
-            <a:r>
-              <a:rPr lang="en-US" u="none" baseline="0" dirty="0" smtClean="0"/>
-              <a:t>, Scala, HTML)</a:t>
-            </a:r>
-          </a:p>
-          <a:p>
-            <a:pPr marL="1085850" lvl="2" indent="-171450">
-              <a:buFont typeface="Arial" panose="020B0604020202020204" pitchFamily="34" charset="0"/>
-              <a:buChar char="•"/>
-            </a:pPr>
-            <a:endParaRPr lang="en-US" u="none" baseline="0" dirty="0" smtClean="0"/>
-          </a:p>
-          <a:p>
-            <a:pPr marL="628650" lvl="1" indent="-171450">
-              <a:buFont typeface="Arial" panose="020B0604020202020204" pitchFamily="34" charset="0"/>
-              <a:buChar char="•"/>
-            </a:pPr>
-            <a:endParaRPr lang="en-US" u="sng" dirty="0" smtClean="0"/>
+              <a:t>Alyse</a:t>
+            </a:r>
           </a:p>
         </p:txBody>
       </p:sp>
@@ -2944,6 +2727,300 @@
             <a:fld id="{E21DFC0F-C2D6-4D4F-833C-833AEE8F6822}" type="slidenum">
               <a:rPr lang="en-US" smtClean="0"/>
               <a:t>18</a:t>
+            </a:fld>
+            <a:endParaRPr lang="en-US"/>
+          </a:p>
+        </p:txBody>
+      </p:sp>
+    </p:spTree>
+    <p:extLst>
+      <p:ext uri="{BB962C8B-B14F-4D97-AF65-F5344CB8AC3E}">
+        <p14:creationId xmlns:p14="http://schemas.microsoft.com/office/powerpoint/2010/main" val="901864340"/>
+      </p:ext>
+    </p:extLst>
+  </p:cSld>
+  <p:clrMapOvr>
+    <a:masterClrMapping/>
+  </p:clrMapOvr>
+</p:notes>
+</file>
+
+<file path=ppt/notesSlides/notesSlide19.xml><?xml version="1.0" encoding="utf-8"?>
+<p:notes xmlns:a="http://schemas.openxmlformats.org/drawingml/2006/main" xmlns:r="http://schemas.openxmlformats.org/officeDocument/2006/relationships" xmlns:p="http://schemas.openxmlformats.org/presentationml/2006/main">
+  <p:cSld>
+    <p:spTree>
+      <p:nvGrpSpPr>
+        <p:cNvPr id="1" name=""/>
+        <p:cNvGrpSpPr/>
+        <p:nvPr/>
+      </p:nvGrpSpPr>
+      <p:grpSpPr>
+        <a:xfrm>
+          <a:off x="0" y="0"/>
+          <a:ext cx="0" cy="0"/>
+          <a:chOff x="0" y="0"/>
+          <a:chExt cx="0" cy="0"/>
+        </a:xfrm>
+      </p:grpSpPr>
+      <p:sp>
+        <p:nvSpPr>
+          <p:cNvPr id="2" name="Slide Image Placeholder 1"/>
+          <p:cNvSpPr>
+            <a:spLocks noGrp="1" noRot="1" noChangeAspect="1"/>
+          </p:cNvSpPr>
+          <p:nvPr>
+            <p:ph type="sldImg"/>
+          </p:nvPr>
+        </p:nvSpPr>
+        <p:spPr/>
+      </p:sp>
+      <p:sp>
+        <p:nvSpPr>
+          <p:cNvPr id="3" name="Notes Placeholder 2"/>
+          <p:cNvSpPr>
+            <a:spLocks noGrp="1"/>
+          </p:cNvSpPr>
+          <p:nvPr>
+            <p:ph type="body" idx="1"/>
+          </p:nvPr>
+        </p:nvSpPr>
+        <p:spPr/>
+        <p:txBody>
+          <a:bodyPr/>
+          <a:lstStyle/>
+          <a:p>
+            <a:pPr marL="171450" indent="-171450">
+              <a:buFont typeface="Arial" panose="020B0604020202020204" pitchFamily="34" charset="0"/>
+              <a:buChar char="•"/>
+            </a:pPr>
+            <a:r>
+              <a:rPr lang="en-US" dirty="0" smtClean="0"/>
+              <a:t>Growing</a:t>
+            </a:r>
+            <a:r>
+              <a:rPr lang="en-US" baseline="0" dirty="0" smtClean="0"/>
+              <a:t> OO S/W Guided by Tests:</a:t>
+            </a:r>
+          </a:p>
+          <a:p>
+            <a:pPr marL="628650" lvl="1" indent="-171450">
+              <a:buFont typeface="Arial" panose="020B0604020202020204" pitchFamily="34" charset="0"/>
+              <a:buChar char="•"/>
+            </a:pPr>
+            <a:r>
+              <a:rPr lang="en-US" baseline="0" dirty="0" smtClean="0"/>
+              <a:t>Tool agnostic, but uses JUnit for the examples.</a:t>
+            </a:r>
+          </a:p>
+          <a:p>
+            <a:pPr marL="628650" lvl="1" indent="-171450">
+              <a:buFont typeface="Arial" panose="020B0604020202020204" pitchFamily="34" charset="0"/>
+              <a:buChar char="•"/>
+            </a:pPr>
+            <a:r>
+              <a:rPr lang="en-US" baseline="0" dirty="0" smtClean="0"/>
+              <a:t>Excellent deep-dive into actually doing it in a way that reaps the benefits</a:t>
+            </a:r>
+          </a:p>
+          <a:p>
+            <a:pPr marL="171450" lvl="0" indent="-171450">
+              <a:buFont typeface="Arial" panose="020B0604020202020204" pitchFamily="34" charset="0"/>
+              <a:buChar char="•"/>
+            </a:pPr>
+            <a:r>
+              <a:rPr lang="en-US" baseline="0" dirty="0" smtClean="0"/>
+              <a:t>The Cucumber Book</a:t>
+            </a:r>
+          </a:p>
+          <a:p>
+            <a:pPr marL="628650" lvl="1" indent="-171450">
+              <a:buFont typeface="Arial" panose="020B0604020202020204" pitchFamily="34" charset="0"/>
+              <a:buChar char="•"/>
+            </a:pPr>
+            <a:r>
+              <a:rPr lang="en-US" baseline="0" dirty="0" smtClean="0"/>
+              <a:t>Examples in Ruby – much cleaner than Java, and you learn Ruby for free!</a:t>
+            </a:r>
+          </a:p>
+          <a:p>
+            <a:pPr marL="171450" lvl="0" indent="-171450">
+              <a:buFont typeface="Arial" panose="020B0604020202020204" pitchFamily="34" charset="0"/>
+              <a:buChar char="•"/>
+            </a:pPr>
+            <a:r>
+              <a:rPr lang="en-US" baseline="0" dirty="0" smtClean="0"/>
+              <a:t>The Cucumber </a:t>
+            </a:r>
+            <a:r>
+              <a:rPr lang="en-US" b="1" baseline="0" dirty="0" smtClean="0"/>
+              <a:t>For Java </a:t>
+            </a:r>
+            <a:r>
+              <a:rPr lang="en-US" baseline="0" dirty="0" smtClean="0"/>
+              <a:t>Book</a:t>
+            </a:r>
+          </a:p>
+          <a:p>
+            <a:pPr marL="628650" lvl="1" indent="-171450">
+              <a:buFont typeface="Arial" panose="020B0604020202020204" pitchFamily="34" charset="0"/>
+              <a:buChar char="•"/>
+            </a:pPr>
+            <a:r>
+              <a:rPr lang="en-US" baseline="0" dirty="0" smtClean="0"/>
+              <a:t>Full substitute for the Ruby version, may be more accessible to Java/C# folks.</a:t>
+            </a:r>
+          </a:p>
+          <a:p>
+            <a:pPr marL="628650" lvl="1" indent="-171450">
+              <a:buFont typeface="Arial" panose="020B0604020202020204" pitchFamily="34" charset="0"/>
+              <a:buChar char="•"/>
+            </a:pPr>
+            <a:r>
+              <a:rPr lang="en-US" baseline="0" dirty="0" smtClean="0"/>
+              <a:t>No matter your role or language preference, AT LEAST CHECK OUT “UNCLE BOB” MARTIN’S FORWARD</a:t>
+            </a:r>
+          </a:p>
+          <a:p>
+            <a:pPr marL="171450" lvl="0" indent="-171450">
+              <a:buFont typeface="Arial" panose="020B0604020202020204" pitchFamily="34" charset="0"/>
+              <a:buChar char="•"/>
+            </a:pPr>
+            <a:r>
+              <a:rPr lang="en-US" u="sng" baseline="0" dirty="0" smtClean="0"/>
+              <a:t>Cucumber </a:t>
+            </a:r>
+            <a:r>
+              <a:rPr lang="en-US" u="sng" baseline="0" dirty="0" err="1" smtClean="0"/>
+              <a:t>Recipies</a:t>
+            </a:r>
+            <a:endParaRPr lang="en-US" u="none" baseline="0" dirty="0" smtClean="0"/>
+          </a:p>
+          <a:p>
+            <a:pPr marL="628650" lvl="1" indent="-171450">
+              <a:buFont typeface="Arial" panose="020B0604020202020204" pitchFamily="34" charset="0"/>
+              <a:buChar char="•"/>
+            </a:pPr>
+            <a:r>
+              <a:rPr lang="en-US" u="none" baseline="0" dirty="0" smtClean="0"/>
+              <a:t>“Canned” solutions (at least, starter solutions) to many real-world needs that might bog down without a helping hand.</a:t>
+            </a:r>
+          </a:p>
+          <a:p>
+            <a:pPr marL="628650" lvl="1" indent="-171450">
+              <a:buFont typeface="Arial" panose="020B0604020202020204" pitchFamily="34" charset="0"/>
+              <a:buChar char="•"/>
+            </a:pPr>
+            <a:r>
+              <a:rPr lang="en-US" u="none" baseline="0" dirty="0" smtClean="0"/>
+              <a:t>43 </a:t>
+            </a:r>
+            <a:r>
+              <a:rPr lang="en-US" u="none" baseline="0" dirty="0" err="1" smtClean="0"/>
+              <a:t>Recipies</a:t>
+            </a:r>
+            <a:r>
+              <a:rPr lang="en-US" u="none" baseline="0" dirty="0" smtClean="0"/>
+              <a:t> of many types</a:t>
+            </a:r>
+          </a:p>
+          <a:p>
+            <a:pPr marL="1085850" lvl="2" indent="-171450">
+              <a:buFont typeface="Arial" panose="020B0604020202020204" pitchFamily="34" charset="0"/>
+              <a:buChar char="•"/>
+            </a:pPr>
+            <a:r>
+              <a:rPr lang="en-US" u="none" baseline="0" dirty="0" smtClean="0"/>
+              <a:t>CI (reports/docs, parallel testing, even wire protocol)</a:t>
+            </a:r>
+          </a:p>
+          <a:p>
+            <a:pPr marL="1085850" lvl="2" indent="-171450">
+              <a:buFont typeface="Arial" panose="020B0604020202020204" pitchFamily="34" charset="0"/>
+              <a:buChar char="•"/>
+            </a:pPr>
+            <a:r>
+              <a:rPr lang="en-US" u="none" baseline="0" dirty="0" smtClean="0"/>
+              <a:t>Platforms (Android, iOS, PHP, Flash, .NET, Web, Windows, Mac, even Arduino)</a:t>
+            </a:r>
+          </a:p>
+          <a:p>
+            <a:pPr marL="1085850" lvl="2" indent="-171450">
+              <a:buFont typeface="Arial" panose="020B0604020202020204" pitchFamily="34" charset="0"/>
+              <a:buChar char="•"/>
+            </a:pPr>
+            <a:r>
+              <a:rPr lang="en-US" u="none" baseline="0" dirty="0" smtClean="0"/>
+              <a:t>Frameworks (Hibernate, Spring, Swing</a:t>
+            </a:r>
+          </a:p>
+          <a:p>
+            <a:pPr marL="1085850" lvl="2" indent="-171450">
+              <a:buFont typeface="Arial" panose="020B0604020202020204" pitchFamily="34" charset="0"/>
+              <a:buChar char="•"/>
+            </a:pPr>
+            <a:r>
+              <a:rPr lang="en-US" u="none" baseline="0" dirty="0" smtClean="0"/>
+              <a:t>Languages (JavaScript, </a:t>
+            </a:r>
+            <a:r>
+              <a:rPr lang="en-US" u="none" baseline="0" dirty="0" err="1" smtClean="0"/>
+              <a:t>Erlang</a:t>
+            </a:r>
+            <a:r>
+              <a:rPr lang="en-US" u="none" baseline="0" dirty="0" smtClean="0"/>
+              <a:t>, </a:t>
+            </a:r>
+            <a:r>
+              <a:rPr lang="en-US" u="none" baseline="0" dirty="0" err="1" smtClean="0"/>
+              <a:t>Lua</a:t>
+            </a:r>
+            <a:r>
+              <a:rPr lang="en-US" u="none" baseline="0" dirty="0" smtClean="0"/>
+              <a:t>, </a:t>
+            </a:r>
+            <a:r>
+              <a:rPr lang="en-US" u="none" baseline="0" dirty="0" err="1" smtClean="0"/>
+              <a:t>Clojure</a:t>
+            </a:r>
+            <a:r>
+              <a:rPr lang="en-US" u="none" baseline="0" dirty="0" smtClean="0"/>
+              <a:t>, Scala, HTML)</a:t>
+            </a:r>
+          </a:p>
+          <a:p>
+            <a:pPr marL="1085850" lvl="2" indent="-171450">
+              <a:buFont typeface="Arial" panose="020B0604020202020204" pitchFamily="34" charset="0"/>
+              <a:buChar char="•"/>
+            </a:pPr>
+            <a:endParaRPr lang="en-US" u="none" baseline="0" dirty="0" smtClean="0"/>
+          </a:p>
+          <a:p>
+            <a:pPr marL="628650" lvl="1" indent="-171450">
+              <a:buFont typeface="Arial" panose="020B0604020202020204" pitchFamily="34" charset="0"/>
+              <a:buChar char="•"/>
+            </a:pPr>
+            <a:endParaRPr lang="en-US" u="sng" dirty="0" smtClean="0"/>
+          </a:p>
+        </p:txBody>
+      </p:sp>
+      <p:sp>
+        <p:nvSpPr>
+          <p:cNvPr id="4" name="Slide Number Placeholder 3"/>
+          <p:cNvSpPr>
+            <a:spLocks noGrp="1"/>
+          </p:cNvSpPr>
+          <p:nvPr>
+            <p:ph type="sldNum" sz="quarter" idx="10"/>
+          </p:nvPr>
+        </p:nvSpPr>
+        <p:spPr/>
+        <p:txBody>
+          <a:bodyPr/>
+          <a:lstStyle/>
+          <a:p>
+            <a:fld id="{E21DFC0F-C2D6-4D4F-833C-833AEE8F6822}" type="slidenum">
+              <a:rPr lang="en-US" smtClean="0"/>
+              <a:t>19</a:t>
             </a:fld>
             <a:endParaRPr lang="en-US"/>
           </a:p>
@@ -7741,7 +7818,7 @@
       </p:grpSpPr>
       <p:sp>
         <p:nvSpPr>
-          <p:cNvPr id="5" name="Title 4"/>
+          <p:cNvPr id="2" name="Title 1"/>
           <p:cNvSpPr>
             <a:spLocks noGrp="1"/>
           </p:cNvSpPr>
@@ -7749,19 +7826,65 @@
             <p:ph type="ctrTitle"/>
           </p:nvPr>
         </p:nvSpPr>
-        <p:spPr/>
+        <p:spPr>
+          <a:xfrm>
+            <a:off x="-142240" y="241034"/>
+            <a:ext cx="9144000" cy="623917"/>
+          </a:xfrm>
+        </p:spPr>
         <p:txBody>
           <a:bodyPr/>
           <a:lstStyle/>
           <a:p>
             <a:r>
               <a:rPr lang="en-US" dirty="0" smtClean="0"/>
-              <a:t>Context:  TDD &amp; Scrum</a:t>
+              <a:t>Questions so far?</a:t>
             </a:r>
             <a:endParaRPr lang="en-US" dirty="0"/>
           </a:p>
         </p:txBody>
       </p:sp>
+      <p:pic>
+        <p:nvPicPr>
+          <p:cNvPr id="1029" name="Picture 5" descr="C:\Users\arecord27272\AppData\Local\Microsoft\Windows\Temporary Internet Files\Content.IE5\2POWQ8G7\questions[1].jpg"/>
+          <p:cNvPicPr>
+            <a:picLocks noChangeAspect="1" noChangeArrowheads="1"/>
+          </p:cNvPicPr>
+          <p:nvPr/>
+        </p:nvPicPr>
+        <p:blipFill>
+          <a:blip r:embed="rId3">
+            <a:extLst>
+              <a:ext uri="{28A0092B-C50C-407E-A947-70E740481C1C}">
+                <a14:useLocalDpi xmlns:a14="http://schemas.microsoft.com/office/drawing/2010/main" val="0"/>
+              </a:ext>
+            </a:extLst>
+          </a:blip>
+          <a:srcRect/>
+          <a:stretch>
+            <a:fillRect/>
+          </a:stretch>
+        </p:blipFill>
+        <p:spPr bwMode="auto">
+          <a:xfrm>
+            <a:off x="2323783" y="2321878"/>
+            <a:ext cx="4699000" cy="2997200"/>
+          </a:xfrm>
+          <a:prstGeom prst="rect">
+            <a:avLst/>
+          </a:prstGeom>
+          <a:noFill/>
+          <a:extLst>
+            <a:ext uri="{909E8E84-426E-40DD-AFC4-6F175D3DCCD1}">
+              <a14:hiddenFill xmlns:a14="http://schemas.microsoft.com/office/drawing/2010/main">
+                <a:solidFill>
+                  <a:srgbClr val="FFFFFF"/>
+                </a:solidFill>
+              </a14:hiddenFill>
+            </a:ext>
+          </a:extLst>
+        </p:spPr>
+      </p:pic>
       <p:sp>
         <p:nvSpPr>
           <p:cNvPr id="3" name="Rectangle 2"/>
@@ -7770,8 +7893,8 @@
         </p:nvSpPr>
         <p:spPr>
           <a:xfrm>
-            <a:off x="882399" y="1078322"/>
-            <a:ext cx="7727142" cy="2234458"/>
+            <a:off x="1148677" y="1041156"/>
+            <a:ext cx="6562165" cy="769441"/>
           </a:xfrm>
           <a:prstGeom prst="rect">
             <a:avLst/>
@@ -7783,112 +7906,36 @@
           </a:bodyPr>
           <a:lstStyle/>
           <a:p>
-            <a:pPr defTabSz="914400">
-              <a:spcBef>
-                <a:spcPct val="20000"/>
-              </a:spcBef>
-            </a:pPr>
-            <a:r>
-              <a:rPr lang="en-US" sz="2400" dirty="0" smtClean="0">
-                <a:solidFill>
-                  <a:prstClr val="black"/>
-                </a:solidFill>
-                <a:latin typeface="Arial" panose="020B0604020202020204" pitchFamily="34" charset="0"/>
-                <a:cs typeface="Arial" panose="020B0604020202020204" pitchFamily="34" charset="0"/>
-              </a:rPr>
-              <a:t>The BIG CHANGE:  It’s about COLLABORATION</a:t>
-            </a:r>
-          </a:p>
-          <a:p>
-            <a:pPr marL="800100" lvl="1" indent="-342900" defTabSz="914400">
-              <a:spcBef>
-                <a:spcPct val="20000"/>
-              </a:spcBef>
-              <a:buFont typeface="Arial" panose="020B0604020202020204" pitchFamily="34" charset="0"/>
-              <a:buChar char="•"/>
-            </a:pPr>
-            <a:r>
-              <a:rPr lang="en-US" sz="2400" dirty="0" smtClean="0">
-                <a:solidFill>
-                  <a:prstClr val="black"/>
-                </a:solidFill>
-                <a:latin typeface="Arial" panose="020B0604020202020204" pitchFamily="34" charset="0"/>
-                <a:cs typeface="Arial" panose="020B0604020202020204" pitchFamily="34" charset="0"/>
-              </a:rPr>
-              <a:t>“Three Amigos” – P.O., Developer, Tester</a:t>
-            </a:r>
-          </a:p>
-          <a:p>
-            <a:pPr marL="800100" lvl="1" indent="-342900" defTabSz="914400">
-              <a:spcBef>
-                <a:spcPct val="20000"/>
-              </a:spcBef>
-              <a:buFont typeface="Arial" panose="020B0604020202020204" pitchFamily="34" charset="0"/>
-              <a:buChar char="•"/>
-            </a:pPr>
-            <a:r>
-              <a:rPr lang="en-US" sz="2400" dirty="0" smtClean="0">
-                <a:solidFill>
-                  <a:prstClr val="black"/>
-                </a:solidFill>
-                <a:latin typeface="Arial" panose="020B0604020202020204" pitchFamily="34" charset="0"/>
-                <a:cs typeface="Arial" panose="020B0604020202020204" pitchFamily="34" charset="0"/>
-              </a:rPr>
-              <a:t>Collaborating on Scenarios </a:t>
-            </a:r>
-          </a:p>
-          <a:p>
-            <a:pPr marL="1257300" lvl="2" indent="-342900" defTabSz="914400">
-              <a:spcBef>
-                <a:spcPct val="20000"/>
-              </a:spcBef>
-              <a:buFont typeface="Wingdings" panose="05000000000000000000" pitchFamily="2" charset="2"/>
-              <a:buChar char="Ø"/>
-            </a:pPr>
-            <a:r>
-              <a:rPr lang="en-US" sz="2400" dirty="0" smtClean="0">
-                <a:solidFill>
-                  <a:prstClr val="black"/>
-                </a:solidFill>
-                <a:latin typeface="Arial" panose="020B0604020202020204" pitchFamily="34" charset="0"/>
-                <a:cs typeface="Arial" panose="020B0604020202020204" pitchFamily="34" charset="0"/>
-                <a:sym typeface="Wingdings" panose="05000000000000000000" pitchFamily="2" charset="2"/>
-              </a:rPr>
-              <a:t>Ubiquitous Language</a:t>
-            </a:r>
-            <a:endParaRPr lang="en-US" sz="2400" dirty="0" smtClean="0">
-              <a:solidFill>
-                <a:prstClr val="black"/>
-              </a:solidFill>
-              <a:latin typeface="Arial" panose="020B0604020202020204" pitchFamily="34" charset="0"/>
-              <a:cs typeface="Arial" panose="020B0604020202020204" pitchFamily="34" charset="0"/>
-            </a:endParaRPr>
-          </a:p>
-          <a:p>
-            <a:pPr marL="1257300" lvl="2" indent="-342900" defTabSz="914400">
-              <a:spcBef>
-                <a:spcPct val="20000"/>
-              </a:spcBef>
-              <a:buFont typeface="Wingdings" panose="05000000000000000000" pitchFamily="2" charset="2"/>
-              <a:buChar char="Ø"/>
-            </a:pPr>
-            <a:r>
-              <a:rPr lang="en-US" sz="2400" dirty="0" smtClean="0">
-                <a:solidFill>
-                  <a:prstClr val="black"/>
-                </a:solidFill>
-                <a:latin typeface="Arial" panose="020B0604020202020204" pitchFamily="34" charset="0"/>
-                <a:cs typeface="Arial" panose="020B0604020202020204" pitchFamily="34" charset="0"/>
-              </a:rPr>
-              <a:t>Collaboration yields &gt; half the value </a:t>
-            </a:r>
+            <a:pPr lvl="1"/>
+            <a:r>
+              <a:rPr lang="en-US" sz="2400" dirty="0"/>
+              <a:t>Code is available on </a:t>
+            </a:r>
+            <a:r>
+              <a:rPr lang="en-US" sz="2400" dirty="0" err="1"/>
+              <a:t>github</a:t>
+            </a:r>
+            <a:r>
+              <a:rPr lang="en-US" sz="2400" dirty="0"/>
+              <a:t> at:</a:t>
+            </a:r>
+            <a:br>
+              <a:rPr lang="en-US" sz="2400" dirty="0"/>
+            </a:br>
+            <a:r>
+              <a:rPr lang="en-US" sz="2000" dirty="0">
+                <a:hlinkClick r:id="rId4"/>
+              </a:rPr>
+              <a:t>https://github.com/LanceZant/atdd-cucumber-jvm.git</a:t>
+            </a:r>
+            <a:endParaRPr lang="en-US" sz="2000" dirty="0"/>
           </a:p>
         </p:txBody>
       </p:sp>
     </p:spTree>
     <p:extLst>
       <p:ext uri="{BB962C8B-B14F-4D97-AF65-F5344CB8AC3E}">
-        <p14:creationId xmlns:p14="http://schemas.microsoft.com/office/powerpoint/2010/main" val="2086784744"/>
+        <p14:creationId xmlns:p14="http://schemas.microsoft.com/office/powerpoint/2010/main" val="569317264"/>
       </p:ext>
     </p:extLst>
   </p:cSld>
@@ -7954,7 +8001,7 @@
         <p:spPr>
           <a:xfrm>
             <a:off x="882399" y="1078322"/>
-            <a:ext cx="7727142" cy="5262979"/>
+            <a:ext cx="7727142" cy="2234458"/>
           </a:xfrm>
           <a:prstGeom prst="rect">
             <a:avLst/>
@@ -7979,7 +8026,7 @@
                 <a:latin typeface="Arial" panose="020B0604020202020204" pitchFamily="34" charset="0"/>
                 <a:cs typeface="Arial" panose="020B0604020202020204" pitchFamily="34" charset="0"/>
               </a:rPr>
-              <a:t>ATDD – When do we do what?</a:t>
+              <a:t>The BIG CHANGE:  It’s about COLLABORATION</a:t>
             </a:r>
           </a:p>
           <a:p>
@@ -7998,7 +8045,7 @@
                 <a:latin typeface="Arial" panose="020B0604020202020204" pitchFamily="34" charset="0"/>
                 <a:cs typeface="Arial" panose="020B0604020202020204" pitchFamily="34" charset="0"/>
               </a:rPr>
-              <a:t>Backlog refinement – Main Scenarios</a:t>
+              <a:t>“Three Amigos” – P.O., Developer, Tester</a:t>
             </a:r>
           </a:p>
           <a:p>
@@ -8017,26 +8064,7 @@
                 <a:latin typeface="Arial" panose="020B0604020202020204" pitchFamily="34" charset="0"/>
                 <a:cs typeface="Arial" panose="020B0604020202020204" pitchFamily="34" charset="0"/>
               </a:rPr>
-              <a:t>Sprint Planning – Acceptance Scenarios</a:t>
-            </a:r>
-          </a:p>
-          <a:p>
-            <a:pPr marL="800100" lvl="1" indent="-342900" defTabSz="914400">
-              <a:spcBef>
-                <a:spcPct val="20000"/>
-              </a:spcBef>
-              <a:buFont typeface="Arial" panose="020B0604020202020204" pitchFamily="34" charset="0"/>
-              <a:buChar char="•"/>
-            </a:pPr>
-            <a:r>
-              <a:rPr lang="en-US" sz="2400" dirty="0" smtClean="0">
-                <a:solidFill>
-                  <a:prstClr val="black"/>
-                </a:solidFill>
-                <a:latin typeface="Arial" panose="020B0604020202020204" pitchFamily="34" charset="0"/>
-                <a:cs typeface="Arial" panose="020B0604020202020204" pitchFamily="34" charset="0"/>
-              </a:rPr>
-              <a:t>During the Sprint – Questions &amp; Feedback</a:t>
+              <a:t>Collaborating on Scenarios </a:t>
             </a:r>
           </a:p>
           <a:p>
@@ -8044,8 +8072,8 @@
               <a:spcBef>
                 <a:spcPct val="20000"/>
               </a:spcBef>
-              <a:buFont typeface="Arial" panose="020B0604020202020204" pitchFamily="34" charset="0"/>
-              <a:buChar char="•"/>
+              <a:buFont typeface="Wingdings" panose="05000000000000000000" pitchFamily="2" charset="2"/>
+              <a:buChar char="Ø"/>
             </a:pPr>
             <a:r>
               <a:rPr lang="en-US" sz="2400" dirty="0" smtClean="0">
@@ -8054,161 +8082,11 @@
                 </a:solidFill>
                 <a:latin typeface="Arial" panose="020B0604020202020204" pitchFamily="34" charset="0"/>
                 <a:cs typeface="Arial" panose="020B0604020202020204" pitchFamily="34" charset="0"/>
-              </a:rPr>
-              <a:t>Daily Scrum – Which Tests Now Pass?</a:t>
-            </a:r>
-          </a:p>
-          <a:p>
-            <a:pPr marL="1257300" lvl="2" indent="-342900" defTabSz="914400">
-              <a:spcBef>
-                <a:spcPct val="20000"/>
-              </a:spcBef>
-              <a:buFont typeface="Arial" panose="020B0604020202020204" pitchFamily="34" charset="0"/>
-              <a:buChar char="•"/>
-            </a:pPr>
-            <a:r>
-              <a:rPr lang="en-US" sz="2400" dirty="0" smtClean="0">
-                <a:solidFill>
-                  <a:prstClr val="black"/>
-                </a:solidFill>
-                <a:latin typeface="Arial" panose="020B0604020202020204" pitchFamily="34" charset="0"/>
-                <a:cs typeface="Arial" panose="020B0604020202020204" pitchFamily="34" charset="0"/>
-              </a:rPr>
-              <a:t>Ad Hoc – Questions &amp; Feedback</a:t>
-            </a:r>
-          </a:p>
-          <a:p>
-            <a:pPr marL="800100" lvl="1" indent="-342900" defTabSz="914400">
-              <a:spcBef>
-                <a:spcPct val="20000"/>
-              </a:spcBef>
-              <a:buFont typeface="Arial" panose="020B0604020202020204" pitchFamily="34" charset="0"/>
-              <a:buChar char="•"/>
-            </a:pPr>
-            <a:r>
-              <a:rPr lang="en-US" sz="2400" dirty="0" smtClean="0">
-                <a:solidFill>
-                  <a:prstClr val="black"/>
-                </a:solidFill>
-                <a:latin typeface="Arial" panose="020B0604020202020204" pitchFamily="34" charset="0"/>
-                <a:cs typeface="Arial" panose="020B0604020202020204" pitchFamily="34" charset="0"/>
-              </a:rPr>
-              <a:t>Sprint Demo – Watch ‘</a:t>
-            </a:r>
-            <a:r>
-              <a:rPr lang="en-US" sz="2400" dirty="0" err="1" smtClean="0">
-                <a:solidFill>
-                  <a:prstClr val="black"/>
-                </a:solidFill>
-                <a:latin typeface="Arial" panose="020B0604020202020204" pitchFamily="34" charset="0"/>
-                <a:cs typeface="Arial" panose="020B0604020202020204" pitchFamily="34" charset="0"/>
-              </a:rPr>
-              <a:t>em</a:t>
-            </a:r>
-            <a:r>
-              <a:rPr lang="en-US" sz="2400" dirty="0" smtClean="0">
-                <a:solidFill>
-                  <a:prstClr val="black"/>
-                </a:solidFill>
-                <a:latin typeface="Arial" panose="020B0604020202020204" pitchFamily="34" charset="0"/>
-                <a:cs typeface="Arial" panose="020B0604020202020204" pitchFamily="34" charset="0"/>
-              </a:rPr>
-              <a:t> Run!</a:t>
-            </a:r>
-          </a:p>
-          <a:p>
-            <a:pPr marL="800100" lvl="1" indent="-342900" defTabSz="914400">
-              <a:spcBef>
-                <a:spcPct val="20000"/>
-              </a:spcBef>
-              <a:buFont typeface="Arial" panose="020B0604020202020204" pitchFamily="34" charset="0"/>
-              <a:buChar char="•"/>
-            </a:pPr>
-            <a:r>
-              <a:rPr lang="en-US" sz="2400" dirty="0" smtClean="0">
-                <a:solidFill>
-                  <a:prstClr val="black"/>
-                </a:solidFill>
-                <a:latin typeface="Arial" panose="020B0604020202020204" pitchFamily="34" charset="0"/>
-                <a:cs typeface="Arial" panose="020B0604020202020204" pitchFamily="34" charset="0"/>
-              </a:rPr>
-              <a:t>Retrospective – </a:t>
-            </a:r>
-          </a:p>
-          <a:p>
-            <a:pPr marL="1257300" lvl="2" indent="-342900" defTabSz="914400">
-              <a:spcBef>
-                <a:spcPct val="20000"/>
-              </a:spcBef>
-              <a:buFont typeface="Arial" panose="020B0604020202020204" pitchFamily="34" charset="0"/>
-              <a:buChar char="•"/>
-            </a:pPr>
-            <a:r>
-              <a:rPr lang="en-US" sz="2400" dirty="0" smtClean="0">
-                <a:solidFill>
-                  <a:prstClr val="black"/>
-                </a:solidFill>
-                <a:latin typeface="Arial" panose="020B0604020202020204" pitchFamily="34" charset="0"/>
-                <a:cs typeface="Arial" panose="020B0604020202020204" pitchFamily="34" charset="0"/>
-              </a:rPr>
-              <a:t>Definitions of Done &amp; Ready</a:t>
-            </a:r>
-          </a:p>
-          <a:p>
-            <a:pPr marL="1257300" lvl="2" indent="-342900" defTabSz="914400">
-              <a:spcBef>
-                <a:spcPct val="20000"/>
-              </a:spcBef>
-              <a:buFont typeface="Arial" panose="020B0604020202020204" pitchFamily="34" charset="0"/>
-              <a:buChar char="•"/>
-            </a:pPr>
-            <a:r>
-              <a:rPr lang="en-US" sz="2400" dirty="0" smtClean="0">
-                <a:solidFill>
-                  <a:prstClr val="black"/>
-                </a:solidFill>
-                <a:latin typeface="Arial" panose="020B0604020202020204" pitchFamily="34" charset="0"/>
-                <a:cs typeface="Arial" panose="020B0604020202020204" pitchFamily="34" charset="0"/>
-              </a:rPr>
-              <a:t>Impediment patterns</a:t>
-            </a:r>
-          </a:p>
-          <a:p>
-            <a:pPr defTabSz="914400">
-              <a:spcBef>
-                <a:spcPct val="20000"/>
-              </a:spcBef>
-            </a:pPr>
-            <a:r>
-              <a:rPr lang="en-US" sz="2400" dirty="0" smtClean="0">
-                <a:solidFill>
-                  <a:prstClr val="black"/>
-                </a:solidFill>
-                <a:latin typeface="Arial" panose="020B0604020202020204" pitchFamily="34" charset="0"/>
-                <a:cs typeface="Arial" panose="020B0604020202020204" pitchFamily="34" charset="0"/>
-              </a:rPr>
-              <a:t>Unit TDD – Development Rhythm</a:t>
-            </a:r>
-            <a:br>
-              <a:rPr lang="en-US" sz="2400" dirty="0" smtClean="0">
-                <a:solidFill>
-                  <a:prstClr val="black"/>
-                </a:solidFill>
-                <a:latin typeface="Arial" panose="020B0604020202020204" pitchFamily="34" charset="0"/>
-                <a:cs typeface="Arial" panose="020B0604020202020204" pitchFamily="34" charset="0"/>
-              </a:rPr>
-            </a:br>
-            <a:r>
-              <a:rPr lang="en-US" sz="2400" dirty="0" smtClean="0">
-                <a:solidFill>
-                  <a:prstClr val="black"/>
-                </a:solidFill>
-                <a:latin typeface="Arial" panose="020B0604020202020204" pitchFamily="34" charset="0"/>
-                <a:cs typeface="Arial" panose="020B0604020202020204" pitchFamily="34" charset="0"/>
-              </a:rPr>
-              <a:t>(Red, Green, Refactor)</a:t>
-            </a:r>
-            <a:endParaRPr lang="en-US" sz="2400" dirty="0">
+                <a:sym typeface="Wingdings" panose="05000000000000000000" pitchFamily="2" charset="2"/>
+              </a:rPr>
+              <a:t>Ubiquitous Language</a:t>
+            </a:r>
+            <a:endParaRPr lang="en-US" sz="2400" dirty="0" smtClean="0">
               <a:solidFill>
                 <a:prstClr val="black"/>
               </a:solidFill>
@@ -8216,12 +8094,31 @@
               <a:cs typeface="Arial" panose="020B0604020202020204" pitchFamily="34" charset="0"/>
             </a:endParaRPr>
           </a:p>
+          <a:p>
+            <a:pPr marL="1257300" lvl="2" indent="-342900" defTabSz="914400">
+              <a:spcBef>
+                <a:spcPct val="20000"/>
+              </a:spcBef>
+              <a:buFont typeface="Wingdings" panose="05000000000000000000" pitchFamily="2" charset="2"/>
+              <a:buChar char="Ø"/>
+            </a:pPr>
+            <a:r>
+              <a:rPr lang="en-US" sz="2400" dirty="0" smtClean="0">
+                <a:solidFill>
+                  <a:prstClr val="black"/>
+                </a:solidFill>
+                <a:latin typeface="Arial" panose="020B0604020202020204" pitchFamily="34" charset="0"/>
+                <a:cs typeface="Arial" panose="020B0604020202020204" pitchFamily="34" charset="0"/>
+              </a:rPr>
+              <a:t>Collaboration yields &gt; half the value </a:t>
+            </a:r>
+          </a:p>
         </p:txBody>
       </p:sp>
     </p:spTree>
     <p:extLst>
       <p:ext uri="{BB962C8B-B14F-4D97-AF65-F5344CB8AC3E}">
-        <p14:creationId xmlns:p14="http://schemas.microsoft.com/office/powerpoint/2010/main" val="3458236743"/>
+        <p14:creationId xmlns:p14="http://schemas.microsoft.com/office/powerpoint/2010/main" val="2086784744"/>
       </p:ext>
     </p:extLst>
   </p:cSld>
@@ -8257,6 +8154,339 @@
       </p:grpSpPr>
       <p:sp>
         <p:nvSpPr>
+          <p:cNvPr id="5" name="Title 4"/>
+          <p:cNvSpPr>
+            <a:spLocks noGrp="1"/>
+          </p:cNvSpPr>
+          <p:nvPr>
+            <p:ph type="ctrTitle"/>
+          </p:nvPr>
+        </p:nvSpPr>
+        <p:spPr/>
+        <p:txBody>
+          <a:bodyPr/>
+          <a:lstStyle/>
+          <a:p>
+            <a:r>
+              <a:rPr lang="en-US" dirty="0" smtClean="0"/>
+              <a:t>Context:  TDD &amp; Scrum</a:t>
+            </a:r>
+            <a:endParaRPr lang="en-US" dirty="0"/>
+          </a:p>
+        </p:txBody>
+      </p:sp>
+      <p:sp>
+        <p:nvSpPr>
+          <p:cNvPr id="3" name="Rectangle 2"/>
+          <p:cNvSpPr/>
+          <p:nvPr/>
+        </p:nvSpPr>
+        <p:spPr>
+          <a:xfrm>
+            <a:off x="882399" y="1078322"/>
+            <a:ext cx="7727142" cy="5262979"/>
+          </a:xfrm>
+          <a:prstGeom prst="rect">
+            <a:avLst/>
+          </a:prstGeom>
+        </p:spPr>
+        <p:txBody>
+          <a:bodyPr wrap="square">
+            <a:spAutoFit/>
+          </a:bodyPr>
+          <a:lstStyle/>
+          <a:p>
+            <a:pPr defTabSz="914400">
+              <a:spcBef>
+                <a:spcPct val="20000"/>
+              </a:spcBef>
+            </a:pPr>
+            <a:r>
+              <a:rPr lang="en-US" sz="2400" dirty="0" smtClean="0">
+                <a:solidFill>
+                  <a:prstClr val="black"/>
+                </a:solidFill>
+                <a:latin typeface="Arial" panose="020B0604020202020204" pitchFamily="34" charset="0"/>
+                <a:cs typeface="Arial" panose="020B0604020202020204" pitchFamily="34" charset="0"/>
+              </a:rPr>
+              <a:t>ATDD – When do we do what?</a:t>
+            </a:r>
+          </a:p>
+          <a:p>
+            <a:pPr marL="800100" lvl="1" indent="-342900" defTabSz="914400">
+              <a:spcBef>
+                <a:spcPct val="20000"/>
+              </a:spcBef>
+              <a:buFont typeface="Arial" panose="020B0604020202020204" pitchFamily="34" charset="0"/>
+              <a:buChar char="•"/>
+            </a:pPr>
+            <a:r>
+              <a:rPr lang="en-US" sz="2400" dirty="0" smtClean="0">
+                <a:solidFill>
+                  <a:prstClr val="black"/>
+                </a:solidFill>
+                <a:latin typeface="Arial" panose="020B0604020202020204" pitchFamily="34" charset="0"/>
+                <a:cs typeface="Arial" panose="020B0604020202020204" pitchFamily="34" charset="0"/>
+              </a:rPr>
+              <a:t>Backlog refinement – Main Scenarios</a:t>
+            </a:r>
+          </a:p>
+          <a:p>
+            <a:pPr marL="800100" lvl="1" indent="-342900" defTabSz="914400">
+              <a:spcBef>
+                <a:spcPct val="20000"/>
+              </a:spcBef>
+              <a:buFont typeface="Arial" panose="020B0604020202020204" pitchFamily="34" charset="0"/>
+              <a:buChar char="•"/>
+            </a:pPr>
+            <a:r>
+              <a:rPr lang="en-US" sz="2400" dirty="0" smtClean="0">
+                <a:solidFill>
+                  <a:prstClr val="black"/>
+                </a:solidFill>
+                <a:latin typeface="Arial" panose="020B0604020202020204" pitchFamily="34" charset="0"/>
+                <a:cs typeface="Arial" panose="020B0604020202020204" pitchFamily="34" charset="0"/>
+              </a:rPr>
+              <a:t>Sprint Planning – Acceptance Scenarios</a:t>
+            </a:r>
+          </a:p>
+          <a:p>
+            <a:pPr marL="800100" lvl="1" indent="-342900" defTabSz="914400">
+              <a:spcBef>
+                <a:spcPct val="20000"/>
+              </a:spcBef>
+              <a:buFont typeface="Arial" panose="020B0604020202020204" pitchFamily="34" charset="0"/>
+              <a:buChar char="•"/>
+            </a:pPr>
+            <a:r>
+              <a:rPr lang="en-US" sz="2400" dirty="0" smtClean="0">
+                <a:solidFill>
+                  <a:prstClr val="black"/>
+                </a:solidFill>
+                <a:latin typeface="Arial" panose="020B0604020202020204" pitchFamily="34" charset="0"/>
+                <a:cs typeface="Arial" panose="020B0604020202020204" pitchFamily="34" charset="0"/>
+              </a:rPr>
+              <a:t>During the Sprint – Questions &amp; Feedback</a:t>
+            </a:r>
+          </a:p>
+          <a:p>
+            <a:pPr marL="1257300" lvl="2" indent="-342900" defTabSz="914400">
+              <a:spcBef>
+                <a:spcPct val="20000"/>
+              </a:spcBef>
+              <a:buFont typeface="Arial" panose="020B0604020202020204" pitchFamily="34" charset="0"/>
+              <a:buChar char="•"/>
+            </a:pPr>
+            <a:r>
+              <a:rPr lang="en-US" sz="2400" dirty="0" smtClean="0">
+                <a:solidFill>
+                  <a:prstClr val="black"/>
+                </a:solidFill>
+                <a:latin typeface="Arial" panose="020B0604020202020204" pitchFamily="34" charset="0"/>
+                <a:cs typeface="Arial" panose="020B0604020202020204" pitchFamily="34" charset="0"/>
+              </a:rPr>
+              <a:t>Daily Scrum – Which Tests Now Pass?</a:t>
+            </a:r>
+          </a:p>
+          <a:p>
+            <a:pPr marL="1257300" lvl="2" indent="-342900" defTabSz="914400">
+              <a:spcBef>
+                <a:spcPct val="20000"/>
+              </a:spcBef>
+              <a:buFont typeface="Arial" panose="020B0604020202020204" pitchFamily="34" charset="0"/>
+              <a:buChar char="•"/>
+            </a:pPr>
+            <a:r>
+              <a:rPr lang="en-US" sz="2400" dirty="0" smtClean="0">
+                <a:solidFill>
+                  <a:prstClr val="black"/>
+                </a:solidFill>
+                <a:latin typeface="Arial" panose="020B0604020202020204" pitchFamily="34" charset="0"/>
+                <a:cs typeface="Arial" panose="020B0604020202020204" pitchFamily="34" charset="0"/>
+              </a:rPr>
+              <a:t>Ad Hoc – Questions &amp; Feedback</a:t>
+            </a:r>
+          </a:p>
+          <a:p>
+            <a:pPr marL="800100" lvl="1" indent="-342900" defTabSz="914400">
+              <a:spcBef>
+                <a:spcPct val="20000"/>
+              </a:spcBef>
+              <a:buFont typeface="Arial" panose="020B0604020202020204" pitchFamily="34" charset="0"/>
+              <a:buChar char="•"/>
+            </a:pPr>
+            <a:r>
+              <a:rPr lang="en-US" sz="2400" dirty="0" smtClean="0">
+                <a:solidFill>
+                  <a:prstClr val="black"/>
+                </a:solidFill>
+                <a:latin typeface="Arial" panose="020B0604020202020204" pitchFamily="34" charset="0"/>
+                <a:cs typeface="Arial" panose="020B0604020202020204" pitchFamily="34" charset="0"/>
+              </a:rPr>
+              <a:t>Sprint Demo – Watch ‘</a:t>
+            </a:r>
+            <a:r>
+              <a:rPr lang="en-US" sz="2400" dirty="0" err="1" smtClean="0">
+                <a:solidFill>
+                  <a:prstClr val="black"/>
+                </a:solidFill>
+                <a:latin typeface="Arial" panose="020B0604020202020204" pitchFamily="34" charset="0"/>
+                <a:cs typeface="Arial" panose="020B0604020202020204" pitchFamily="34" charset="0"/>
+              </a:rPr>
+              <a:t>em</a:t>
+            </a:r>
+            <a:r>
+              <a:rPr lang="en-US" sz="2400" dirty="0" smtClean="0">
+                <a:solidFill>
+                  <a:prstClr val="black"/>
+                </a:solidFill>
+                <a:latin typeface="Arial" panose="020B0604020202020204" pitchFamily="34" charset="0"/>
+                <a:cs typeface="Arial" panose="020B0604020202020204" pitchFamily="34" charset="0"/>
+              </a:rPr>
+              <a:t> Run!</a:t>
+            </a:r>
+          </a:p>
+          <a:p>
+            <a:pPr marL="800100" lvl="1" indent="-342900" defTabSz="914400">
+              <a:spcBef>
+                <a:spcPct val="20000"/>
+              </a:spcBef>
+              <a:buFont typeface="Arial" panose="020B0604020202020204" pitchFamily="34" charset="0"/>
+              <a:buChar char="•"/>
+            </a:pPr>
+            <a:r>
+              <a:rPr lang="en-US" sz="2400" dirty="0" smtClean="0">
+                <a:solidFill>
+                  <a:prstClr val="black"/>
+                </a:solidFill>
+                <a:latin typeface="Arial" panose="020B0604020202020204" pitchFamily="34" charset="0"/>
+                <a:cs typeface="Arial" panose="020B0604020202020204" pitchFamily="34" charset="0"/>
+              </a:rPr>
+              <a:t>Retrospective – </a:t>
+            </a:r>
+          </a:p>
+          <a:p>
+            <a:pPr marL="1257300" lvl="2" indent="-342900" defTabSz="914400">
+              <a:spcBef>
+                <a:spcPct val="20000"/>
+              </a:spcBef>
+              <a:buFont typeface="Arial" panose="020B0604020202020204" pitchFamily="34" charset="0"/>
+              <a:buChar char="•"/>
+            </a:pPr>
+            <a:r>
+              <a:rPr lang="en-US" sz="2400" dirty="0" smtClean="0">
+                <a:solidFill>
+                  <a:prstClr val="black"/>
+                </a:solidFill>
+                <a:latin typeface="Arial" panose="020B0604020202020204" pitchFamily="34" charset="0"/>
+                <a:cs typeface="Arial" panose="020B0604020202020204" pitchFamily="34" charset="0"/>
+              </a:rPr>
+              <a:t>Definitions of Done &amp; Ready</a:t>
+            </a:r>
+          </a:p>
+          <a:p>
+            <a:pPr marL="1257300" lvl="2" indent="-342900" defTabSz="914400">
+              <a:spcBef>
+                <a:spcPct val="20000"/>
+              </a:spcBef>
+              <a:buFont typeface="Arial" panose="020B0604020202020204" pitchFamily="34" charset="0"/>
+              <a:buChar char="•"/>
+            </a:pPr>
+            <a:r>
+              <a:rPr lang="en-US" sz="2400" dirty="0" smtClean="0">
+                <a:solidFill>
+                  <a:prstClr val="black"/>
+                </a:solidFill>
+                <a:latin typeface="Arial" panose="020B0604020202020204" pitchFamily="34" charset="0"/>
+                <a:cs typeface="Arial" panose="020B0604020202020204" pitchFamily="34" charset="0"/>
+              </a:rPr>
+              <a:t>Impediment patterns</a:t>
+            </a:r>
+          </a:p>
+          <a:p>
+            <a:pPr defTabSz="914400">
+              <a:spcBef>
+                <a:spcPct val="20000"/>
+              </a:spcBef>
+            </a:pPr>
+            <a:r>
+              <a:rPr lang="en-US" sz="2400" dirty="0" smtClean="0">
+                <a:solidFill>
+                  <a:prstClr val="black"/>
+                </a:solidFill>
+                <a:latin typeface="Arial" panose="020B0604020202020204" pitchFamily="34" charset="0"/>
+                <a:cs typeface="Arial" panose="020B0604020202020204" pitchFamily="34" charset="0"/>
+              </a:rPr>
+              <a:t>Unit TDD – Development Rhythm</a:t>
+            </a:r>
+            <a:br>
+              <a:rPr lang="en-US" sz="2400" dirty="0" smtClean="0">
+                <a:solidFill>
+                  <a:prstClr val="black"/>
+                </a:solidFill>
+                <a:latin typeface="Arial" panose="020B0604020202020204" pitchFamily="34" charset="0"/>
+                <a:cs typeface="Arial" panose="020B0604020202020204" pitchFamily="34" charset="0"/>
+              </a:rPr>
+            </a:br>
+            <a:r>
+              <a:rPr lang="en-US" sz="2400" dirty="0" smtClean="0">
+                <a:solidFill>
+                  <a:prstClr val="black"/>
+                </a:solidFill>
+                <a:latin typeface="Arial" panose="020B0604020202020204" pitchFamily="34" charset="0"/>
+                <a:cs typeface="Arial" panose="020B0604020202020204" pitchFamily="34" charset="0"/>
+              </a:rPr>
+              <a:t>(Red, Green, Refactor)</a:t>
+            </a:r>
+            <a:endParaRPr lang="en-US" sz="2400" dirty="0">
+              <a:solidFill>
+                <a:prstClr val="black"/>
+              </a:solidFill>
+              <a:latin typeface="Arial" panose="020B0604020202020204" pitchFamily="34" charset="0"/>
+              <a:cs typeface="Arial" panose="020B0604020202020204" pitchFamily="34" charset="0"/>
+            </a:endParaRPr>
+          </a:p>
+        </p:txBody>
+      </p:sp>
+    </p:spTree>
+    <p:extLst>
+      <p:ext uri="{BB962C8B-B14F-4D97-AF65-F5344CB8AC3E}">
+        <p14:creationId xmlns:p14="http://schemas.microsoft.com/office/powerpoint/2010/main" val="3458236743"/>
+      </p:ext>
+    </p:extLst>
+  </p:cSld>
+  <p:clrMapOvr>
+    <a:masterClrMapping/>
+  </p:clrMapOvr>
+  <p:timing>
+    <p:tnLst>
+      <p:par>
+        <p:cTn id="1" dur="indefinite" restart="never" nodeType="tmRoot"/>
+      </p:par>
+    </p:tnLst>
+  </p:timing>
+</p:sld>
+</file>
+
+<file path=ppt/slides/slide13.xml><?xml version="1.0" encoding="utf-8"?>
+<p:sld xmlns:a="http://schemas.openxmlformats.org/drawingml/2006/main" xmlns:r="http://schemas.openxmlformats.org/officeDocument/2006/relationships" xmlns:p="http://schemas.openxmlformats.org/presentationml/2006/main">
+  <p:cSld>
+    <p:spTree>
+      <p:nvGrpSpPr>
+        <p:cNvPr id="1" name=""/>
+        <p:cNvGrpSpPr/>
+        <p:nvPr/>
+      </p:nvGrpSpPr>
+      <p:grpSpPr>
+        <a:xfrm>
+          <a:off x="0" y="0"/>
+          <a:ext cx="0" cy="0"/>
+          <a:chOff x="0" y="0"/>
+          <a:chExt cx="0" cy="0"/>
+        </a:xfrm>
+      </p:grpSpPr>
+      <p:sp>
+        <p:nvSpPr>
           <p:cNvPr id="2" name="Title 1"/>
           <p:cNvSpPr>
             <a:spLocks noGrp="1"/>
@@ -8519,7 +8749,7 @@
 </p:sld>
 </file>
 
-<file path=ppt/slides/slide13.xml><?xml version="1.0" encoding="utf-8"?>
+<file path=ppt/slides/slide14.xml><?xml version="1.0" encoding="utf-8"?>
 <p:sld xmlns:a="http://schemas.openxmlformats.org/drawingml/2006/main" xmlns:r="http://schemas.openxmlformats.org/officeDocument/2006/relationships" xmlns:p="http://schemas.openxmlformats.org/presentationml/2006/main">
   <p:cSld>
     <p:spTree>
@@ -9084,318 +9314,6 @@
 </p:sld>
 </file>
 
-<file path=ppt/slides/slide14.xml><?xml version="1.0" encoding="utf-8"?>
-<p:sld xmlns:a="http://schemas.openxmlformats.org/drawingml/2006/main" xmlns:r="http://schemas.openxmlformats.org/officeDocument/2006/relationships" xmlns:p="http://schemas.openxmlformats.org/presentationml/2006/main">
-  <p:cSld>
-    <p:spTree>
-      <p:nvGrpSpPr>
-        <p:cNvPr id="1" name=""/>
-        <p:cNvGrpSpPr/>
-        <p:nvPr/>
-      </p:nvGrpSpPr>
-      <p:grpSpPr>
-        <a:xfrm>
-          <a:off x="0" y="0"/>
-          <a:ext cx="0" cy="0"/>
-          <a:chOff x="0" y="0"/>
-          <a:chExt cx="0" cy="0"/>
-        </a:xfrm>
-      </p:grpSpPr>
-      <p:sp>
-        <p:nvSpPr>
-          <p:cNvPr id="2" name="Title 1"/>
-          <p:cNvSpPr>
-            <a:spLocks noGrp="1"/>
-          </p:cNvSpPr>
-          <p:nvPr>
-            <p:ph type="ctrTitle"/>
-          </p:nvPr>
-        </p:nvSpPr>
-        <p:spPr>
-          <a:xfrm>
-            <a:off x="-3340" y="241034"/>
-            <a:ext cx="9144000" cy="623917"/>
-          </a:xfrm>
-        </p:spPr>
-        <p:txBody>
-          <a:bodyPr/>
-          <a:lstStyle/>
-          <a:p>
-            <a:r>
-              <a:rPr lang="en-US" dirty="0" smtClean="0"/>
-              <a:t>Odds &amp; Ends</a:t>
-            </a:r>
-            <a:endParaRPr lang="en-US" dirty="0"/>
-          </a:p>
-        </p:txBody>
-      </p:sp>
-      <p:sp>
-        <p:nvSpPr>
-          <p:cNvPr id="3" name="TextBox 2"/>
-          <p:cNvSpPr txBox="1"/>
-          <p:nvPr/>
-        </p:nvSpPr>
-        <p:spPr>
-          <a:xfrm>
-            <a:off x="457200" y="1711570"/>
-            <a:ext cx="8381999" cy="3539430"/>
-          </a:xfrm>
-          <a:prstGeom prst="rect">
-            <a:avLst/>
-          </a:prstGeom>
-          <a:noFill/>
-        </p:spPr>
-        <p:txBody>
-          <a:bodyPr wrap="square" rtlCol="0">
-            <a:spAutoFit/>
-          </a:bodyPr>
-          <a:lstStyle/>
-          <a:p>
-            <a:pPr marL="457200" indent="-457200">
-              <a:buFont typeface="Arial" panose="020B0604020202020204" pitchFamily="34" charset="0"/>
-              <a:buChar char="•"/>
-            </a:pPr>
-            <a:r>
-              <a:rPr lang="en-US" sz="2800" dirty="0" smtClean="0"/>
-              <a:t>Footnote:  </a:t>
-            </a:r>
-            <a:r>
-              <a:rPr lang="en-US" sz="2800" i="1" dirty="0" smtClean="0">
-                <a:solidFill>
-                  <a:prstClr val="black"/>
-                </a:solidFill>
-                <a:latin typeface="Arial" panose="020B0604020202020204" pitchFamily="34" charset="0"/>
-                <a:cs typeface="Arial" panose="020B0604020202020204" pitchFamily="34" charset="0"/>
-              </a:rPr>
-              <a:t>TDD </a:t>
-            </a:r>
-            <a:r>
-              <a:rPr lang="en-US" sz="2800" i="1" dirty="0">
-                <a:solidFill>
-                  <a:prstClr val="black"/>
-                </a:solidFill>
-                <a:latin typeface="Arial" panose="020B0604020202020204" pitchFamily="34" charset="0"/>
-                <a:cs typeface="Arial" panose="020B0604020202020204" pitchFamily="34" charset="0"/>
-              </a:rPr>
-              <a:t>proceeds in tiny steps.  </a:t>
-            </a:r>
-            <a:endParaRPr lang="en-US" sz="2800" i="1" dirty="0" smtClean="0">
-              <a:solidFill>
-                <a:prstClr val="black"/>
-              </a:solidFill>
-              <a:latin typeface="Arial" panose="020B0604020202020204" pitchFamily="34" charset="0"/>
-              <a:cs typeface="Arial" panose="020B0604020202020204" pitchFamily="34" charset="0"/>
-            </a:endParaRPr>
-          </a:p>
-          <a:p>
-            <a:pPr marL="914400" lvl="1" indent="-457200">
-              <a:buFont typeface="Arial" panose="020B0604020202020204" pitchFamily="34" charset="0"/>
-              <a:buChar char="•"/>
-            </a:pPr>
-            <a:r>
-              <a:rPr lang="en-US" sz="2800" i="1" dirty="0" smtClean="0">
-                <a:solidFill>
-                  <a:prstClr val="black"/>
-                </a:solidFill>
-                <a:latin typeface="Arial" panose="020B0604020202020204" pitchFamily="34" charset="0"/>
-                <a:cs typeface="Arial" panose="020B0604020202020204" pitchFamily="34" charset="0"/>
-              </a:rPr>
-              <a:t>How </a:t>
-            </a:r>
-            <a:r>
-              <a:rPr lang="en-US" sz="2800" i="1" dirty="0">
-                <a:solidFill>
-                  <a:prstClr val="black"/>
-                </a:solidFill>
-                <a:latin typeface="Arial" panose="020B0604020202020204" pitchFamily="34" charset="0"/>
-                <a:cs typeface="Arial" panose="020B0604020202020204" pitchFamily="34" charset="0"/>
-              </a:rPr>
-              <a:t>tiny is up to </a:t>
-            </a:r>
-            <a:r>
-              <a:rPr lang="en-US" sz="2800" i="1" dirty="0" smtClean="0">
-                <a:solidFill>
-                  <a:prstClr val="black"/>
-                </a:solidFill>
-                <a:latin typeface="Arial" panose="020B0604020202020204" pitchFamily="34" charset="0"/>
-                <a:cs typeface="Arial" panose="020B0604020202020204" pitchFamily="34" charset="0"/>
-              </a:rPr>
-              <a:t>you, but take care.  </a:t>
-            </a:r>
-          </a:p>
-          <a:p>
-            <a:pPr marL="914400" lvl="1" indent="-457200">
-              <a:buFont typeface="Arial" panose="020B0604020202020204" pitchFamily="34" charset="0"/>
-              <a:buChar char="•"/>
-            </a:pPr>
-            <a:r>
-              <a:rPr lang="en-US" sz="2800" i="1" dirty="0" smtClean="0">
-                <a:solidFill>
-                  <a:prstClr val="black"/>
-                </a:solidFill>
-                <a:latin typeface="Arial" panose="020B0604020202020204" pitchFamily="34" charset="0"/>
-                <a:cs typeface="Arial" panose="020B0604020202020204" pitchFamily="34" charset="0"/>
-              </a:rPr>
-              <a:t>The </a:t>
-            </a:r>
-            <a:r>
-              <a:rPr lang="en-US" sz="2800" i="1" dirty="0">
-                <a:solidFill>
-                  <a:prstClr val="black"/>
-                </a:solidFill>
-                <a:latin typeface="Arial" panose="020B0604020202020204" pitchFamily="34" charset="0"/>
-                <a:cs typeface="Arial" panose="020B0604020202020204" pitchFamily="34" charset="0"/>
-              </a:rPr>
-              <a:t>common problem is to bite off too much.  </a:t>
-            </a:r>
-            <a:endParaRPr lang="en-US" sz="2800" i="1" dirty="0" smtClean="0">
-              <a:solidFill>
-                <a:prstClr val="black"/>
-              </a:solidFill>
-              <a:latin typeface="Arial" panose="020B0604020202020204" pitchFamily="34" charset="0"/>
-              <a:cs typeface="Arial" panose="020B0604020202020204" pitchFamily="34" charset="0"/>
-            </a:endParaRPr>
-          </a:p>
-          <a:p>
-            <a:pPr marL="914400" lvl="1" indent="-457200">
-              <a:buFont typeface="Arial" panose="020B0604020202020204" pitchFamily="34" charset="0"/>
-              <a:buChar char="•"/>
-            </a:pPr>
-            <a:r>
-              <a:rPr lang="en-US" sz="2800" i="1" dirty="0" smtClean="0">
-                <a:solidFill>
-                  <a:prstClr val="black"/>
-                </a:solidFill>
-                <a:latin typeface="Arial" panose="020B0604020202020204" pitchFamily="34" charset="0"/>
-                <a:cs typeface="Arial" panose="020B0604020202020204" pitchFamily="34" charset="0"/>
-              </a:rPr>
-              <a:t>Resist that</a:t>
-            </a:r>
-            <a:r>
-              <a:rPr lang="en-US" sz="2800" i="1" dirty="0">
-                <a:solidFill>
-                  <a:prstClr val="black"/>
-                </a:solidFill>
-                <a:latin typeface="Arial" panose="020B0604020202020204" pitchFamily="34" charset="0"/>
-                <a:cs typeface="Arial" panose="020B0604020202020204" pitchFamily="34" charset="0"/>
-              </a:rPr>
-              <a:t>, but don’t </a:t>
-            </a:r>
-            <a:r>
-              <a:rPr lang="en-US" sz="2800" i="1" dirty="0" smtClean="0">
-                <a:solidFill>
-                  <a:prstClr val="black"/>
-                </a:solidFill>
-                <a:latin typeface="Arial" panose="020B0604020202020204" pitchFamily="34" charset="0"/>
-                <a:cs typeface="Arial" panose="020B0604020202020204" pitchFamily="34" charset="0"/>
-              </a:rPr>
-              <a:t>cheat</a:t>
-            </a:r>
-          </a:p>
-          <a:p>
-            <a:pPr marL="1371600" lvl="2" indent="-457200">
-              <a:buFont typeface="Arial" panose="020B0604020202020204" pitchFamily="34" charset="0"/>
-              <a:buChar char="•"/>
-            </a:pPr>
-            <a:r>
-              <a:rPr lang="en-US" sz="2800" i="1" dirty="0" smtClean="0">
-                <a:solidFill>
-                  <a:prstClr val="black"/>
-                </a:solidFill>
-                <a:latin typeface="Arial" panose="020B0604020202020204" pitchFamily="34" charset="0"/>
-                <a:cs typeface="Arial" panose="020B0604020202020204" pitchFamily="34" charset="0"/>
-              </a:rPr>
-              <a:t>Doing the minimum isn’t lazy, it’s discipline</a:t>
-            </a:r>
-          </a:p>
-          <a:p>
-            <a:pPr marL="1371600" lvl="2" indent="-457200">
-              <a:buFont typeface="Arial" panose="020B0604020202020204" pitchFamily="34" charset="0"/>
-              <a:buChar char="•"/>
-            </a:pPr>
-            <a:r>
-              <a:rPr lang="en-US" sz="2800" i="1" dirty="0" smtClean="0">
-                <a:solidFill>
-                  <a:prstClr val="black"/>
-                </a:solidFill>
-                <a:latin typeface="Arial" panose="020B0604020202020204" pitchFamily="34" charset="0"/>
-                <a:cs typeface="Arial" panose="020B0604020202020204" pitchFamily="34" charset="0"/>
-              </a:rPr>
-              <a:t>Never trust a test you haven’t seen fail.</a:t>
-            </a:r>
-          </a:p>
-          <a:p>
-            <a:pPr marL="1371600" lvl="2" indent="-457200">
-              <a:buFont typeface="Arial" panose="020B0604020202020204" pitchFamily="34" charset="0"/>
-              <a:buChar char="•"/>
-            </a:pPr>
-            <a:r>
-              <a:rPr lang="en-US" sz="2800" i="1" dirty="0" smtClean="0">
-                <a:solidFill>
-                  <a:prstClr val="black"/>
-                </a:solidFill>
-                <a:latin typeface="Arial" panose="020B0604020202020204" pitchFamily="34" charset="0"/>
-                <a:cs typeface="Arial" panose="020B0604020202020204" pitchFamily="34" charset="0"/>
-              </a:rPr>
-              <a:t>But </a:t>
-            </a:r>
-            <a:r>
-              <a:rPr lang="en-US" sz="2800" i="1" dirty="0">
-                <a:solidFill>
-                  <a:prstClr val="black"/>
-                </a:solidFill>
-                <a:latin typeface="Arial" panose="020B0604020202020204" pitchFamily="34" charset="0"/>
-                <a:cs typeface="Arial" panose="020B0604020202020204" pitchFamily="34" charset="0"/>
-              </a:rPr>
-              <a:t>always do </a:t>
-            </a:r>
-            <a:r>
-              <a:rPr lang="en-US" sz="2800" b="1" i="1" dirty="0">
-                <a:solidFill>
-                  <a:prstClr val="black"/>
-                </a:solidFill>
-                <a:latin typeface="Arial" panose="020B0604020202020204" pitchFamily="34" charset="0"/>
-                <a:cs typeface="Arial" panose="020B0604020202020204" pitchFamily="34" charset="0"/>
-              </a:rPr>
-              <a:t>some</a:t>
-            </a:r>
-            <a:r>
-              <a:rPr lang="en-US" sz="2800" i="1" dirty="0">
-                <a:solidFill>
-                  <a:prstClr val="black"/>
-                </a:solidFill>
-                <a:latin typeface="Arial" panose="020B0604020202020204" pitchFamily="34" charset="0"/>
-                <a:cs typeface="Arial" panose="020B0604020202020204" pitchFamily="34" charset="0"/>
-              </a:rPr>
-              <a:t> useful work.</a:t>
-            </a:r>
-          </a:p>
-          <a:p>
-            <a:pPr lvl="1"/>
-            <a:endParaRPr lang="en-US" sz="2800" dirty="0" smtClean="0"/>
-          </a:p>
-        </p:txBody>
-      </p:sp>
-    </p:spTree>
-    <p:extLst>
-      <p:ext uri="{BB962C8B-B14F-4D97-AF65-F5344CB8AC3E}">
-        <p14:creationId xmlns:p14="http://schemas.microsoft.com/office/powerpoint/2010/main" val="3587906280"/>
-      </p:ext>
-    </p:extLst>
-  </p:cSld>
-  <p:clrMapOvr>
-    <a:masterClrMapping/>
-  </p:clrMapOvr>
-  <p:timing>
-    <p:tnLst>
-      <p:par>
-        <p:cTn id="1" dur="indefinite" restart="never" nodeType="tmRoot"/>
-      </p:par>
-    </p:tnLst>
-  </p:timing>
-</p:sld>
-</file>
-
 <file path=ppt/slides/slide15.xml><?xml version="1.0" encoding="utf-8"?>
 <p:sld xmlns:a="http://schemas.openxmlformats.org/drawingml/2006/main" xmlns:r="http://schemas.openxmlformats.org/officeDocument/2006/relationships" xmlns:p="http://schemas.openxmlformats.org/presentationml/2006/main">
   <p:cSld>
@@ -9435,53 +9353,12 @@
           <a:p>
             <a:r>
               <a:rPr lang="en-US" dirty="0" smtClean="0"/>
-              <a:t>Questions &amp; Discussion</a:t>
+              <a:t>Odds &amp; Ends</a:t>
             </a:r>
             <a:endParaRPr lang="en-US" dirty="0"/>
           </a:p>
         </p:txBody>
       </p:sp>
-      <p:pic>
-        <p:nvPicPr>
-          <p:cNvPr id="1029" name="Picture 5" descr="C:\Users\arecord27272\AppData\Local\Microsoft\Windows\Temporary Internet Files\Content.IE5\2POWQ8G7\questions[1].jpg"/>
-          <p:cNvPicPr>
-            <a:picLocks noChangeAspect="1" noChangeArrowheads="1"/>
-          </p:cNvPicPr>
-          <p:nvPr/>
-        </p:nvPicPr>
-        <p:blipFill>
-          <a:blip r:embed="rId3">
-            <a:extLst>
-              <a:ext uri="{28A0092B-C50C-407E-A947-70E740481C1C}">
-                <a14:useLocalDpi xmlns:a14="http://schemas.microsoft.com/office/drawing/2010/main" val="0"/>
-              </a:ext>
-            </a:extLst>
-          </a:blip>
-          <a:srcRect/>
-          <a:stretch>
-            <a:fillRect/>
-          </a:stretch>
-        </p:blipFill>
-        <p:spPr bwMode="auto">
-          <a:xfrm>
-            <a:off x="663179" y="2645946"/>
-            <a:ext cx="2619283" cy="1670677"/>
-          </a:xfrm>
-          <a:prstGeom prst="rect">
-            <a:avLst/>
-          </a:prstGeom>
-          <a:noFill/>
-          <a:extLst>
-            <a:ext uri="{909E8E84-426E-40DD-AFC4-6F175D3DCCD1}">
-              <a14:hiddenFill xmlns:a14="http://schemas.microsoft.com/office/drawing/2010/main">
-                <a:solidFill>
-                  <a:srgbClr val="FFFFFF"/>
-                </a:solidFill>
-              </a14:hiddenFill>
-            </a:ext>
-          </a:extLst>
-        </p:spPr>
-      </p:pic>
       <p:sp>
         <p:nvSpPr>
           <p:cNvPr id="3" name="TextBox 2"/>
@@ -9490,8 +9367,8 @@
         </p:nvSpPr>
         <p:spPr>
           <a:xfrm>
-            <a:off x="3493476" y="1711570"/>
-            <a:ext cx="5345723" cy="3539430"/>
+            <a:off x="457200" y="1711570"/>
+            <a:ext cx="8381999" cy="3539430"/>
           </a:xfrm>
           <a:prstGeom prst="rect">
             <a:avLst/>
@@ -9510,72 +9387,219 @@
             </a:pPr>
             <a:r>
               <a:rPr lang="en-US" sz="2800" dirty="0" smtClean="0"/>
-              <a:t>Your Questions?</a:t>
-            </a:r>
-          </a:p>
-          <a:p>
-            <a:pPr marL="457200" indent="-457200">
-              <a:buFont typeface="Arial" panose="020B0604020202020204" pitchFamily="34" charset="0"/>
-              <a:buChar char="•"/>
-            </a:pPr>
+              <a:t>Footnote:  </a:t>
+            </a:r>
+            <a:r>
+              <a:rPr lang="en-US" sz="2800" i="1" dirty="0" smtClean="0">
+                <a:solidFill>
+                  <a:prstClr val="black"/>
+                </a:solidFill>
+                <a:latin typeface="Arial" panose="020B0604020202020204" pitchFamily="34" charset="0"/>
+                <a:cs typeface="Arial" panose="020B0604020202020204" pitchFamily="34" charset="0"/>
+              </a:rPr>
+              <a:t>TDD </a:t>
+            </a:r>
+            <a:r>
+              <a:rPr lang="en-US" sz="2800" i="1" dirty="0">
+                <a:solidFill>
+                  <a:prstClr val="black"/>
+                </a:solidFill>
+                <a:latin typeface="Arial" panose="020B0604020202020204" pitchFamily="34" charset="0"/>
+                <a:cs typeface="Arial" panose="020B0604020202020204" pitchFamily="34" charset="0"/>
+              </a:rPr>
+              <a:t>proceeds in tiny steps.  </a:t>
+            </a:r>
+            <a:endParaRPr lang="en-US" sz="2800" i="1" dirty="0" smtClean="0">
+              <a:solidFill>
+                <a:prstClr val="black"/>
+              </a:solidFill>
+              <a:latin typeface="Arial" panose="020B0604020202020204" pitchFamily="34" charset="0"/>
+              <a:cs typeface="Arial" panose="020B0604020202020204" pitchFamily="34" charset="0"/>
+            </a:endParaRPr>
+          </a:p>
+          <a:p>
+            <a:pPr marL="914400" lvl="1" indent="-457200">
+              <a:buFont typeface="Arial" panose="020B0604020202020204" pitchFamily="34" charset="0"/>
+              <a:buChar char="•"/>
+            </a:pPr>
+            <a:r>
+              <a:rPr lang="en-US" sz="2800" i="1" dirty="0" smtClean="0">
+                <a:solidFill>
+                  <a:prstClr val="black"/>
+                </a:solidFill>
+                <a:latin typeface="Arial" panose="020B0604020202020204" pitchFamily="34" charset="0"/>
+                <a:cs typeface="Arial" panose="020B0604020202020204" pitchFamily="34" charset="0"/>
+              </a:rPr>
+              <a:t>How </a:t>
+            </a:r>
+            <a:r>
+              <a:rPr lang="en-US" sz="2800" i="1" dirty="0">
+                <a:solidFill>
+                  <a:prstClr val="black"/>
+                </a:solidFill>
+                <a:latin typeface="Arial" panose="020B0604020202020204" pitchFamily="34" charset="0"/>
+                <a:cs typeface="Arial" panose="020B0604020202020204" pitchFamily="34" charset="0"/>
+              </a:rPr>
+              <a:t>tiny is up to </a:t>
+            </a:r>
+            <a:r>
+              <a:rPr lang="en-US" sz="2800" i="1" dirty="0" smtClean="0">
+                <a:solidFill>
+                  <a:prstClr val="black"/>
+                </a:solidFill>
+                <a:latin typeface="Arial" panose="020B0604020202020204" pitchFamily="34" charset="0"/>
+                <a:cs typeface="Arial" panose="020B0604020202020204" pitchFamily="34" charset="0"/>
+              </a:rPr>
+              <a:t>you, but take care.  </a:t>
+            </a:r>
+          </a:p>
+          <a:p>
+            <a:pPr marL="914400" lvl="1" indent="-457200">
+              <a:buFont typeface="Arial" panose="020B0604020202020204" pitchFamily="34" charset="0"/>
+              <a:buChar char="•"/>
+            </a:pPr>
+            <a:r>
+              <a:rPr lang="en-US" sz="2800" i="1" dirty="0" smtClean="0">
+                <a:solidFill>
+                  <a:prstClr val="black"/>
+                </a:solidFill>
+                <a:latin typeface="Arial" panose="020B0604020202020204" pitchFamily="34" charset="0"/>
+                <a:cs typeface="Arial" panose="020B0604020202020204" pitchFamily="34" charset="0"/>
+              </a:rPr>
+              <a:t>The </a:t>
+            </a:r>
+            <a:r>
+              <a:rPr lang="en-US" sz="2800" i="1" dirty="0">
+                <a:solidFill>
+                  <a:prstClr val="black"/>
+                </a:solidFill>
+                <a:latin typeface="Arial" panose="020B0604020202020204" pitchFamily="34" charset="0"/>
+                <a:cs typeface="Arial" panose="020B0604020202020204" pitchFamily="34" charset="0"/>
+              </a:rPr>
+              <a:t>common problem is to bite off too much.  </a:t>
+            </a:r>
+            <a:endParaRPr lang="en-US" sz="2800" i="1" dirty="0" smtClean="0">
+              <a:solidFill>
+                <a:prstClr val="black"/>
+              </a:solidFill>
+              <a:latin typeface="Arial" panose="020B0604020202020204" pitchFamily="34" charset="0"/>
+              <a:cs typeface="Arial" panose="020B0604020202020204" pitchFamily="34" charset="0"/>
+            </a:endParaRPr>
+          </a:p>
+          <a:p>
+            <a:pPr marL="914400" lvl="1" indent="-457200">
+              <a:buFont typeface="Arial" panose="020B0604020202020204" pitchFamily="34" charset="0"/>
+              <a:buChar char="•"/>
+            </a:pPr>
+            <a:r>
+              <a:rPr lang="en-US" sz="2800" i="1" dirty="0" smtClean="0">
+                <a:solidFill>
+                  <a:prstClr val="black"/>
+                </a:solidFill>
+                <a:latin typeface="Arial" panose="020B0604020202020204" pitchFamily="34" charset="0"/>
+                <a:cs typeface="Arial" panose="020B0604020202020204" pitchFamily="34" charset="0"/>
+              </a:rPr>
+              <a:t>Resist that</a:t>
+            </a:r>
+            <a:r>
+              <a:rPr lang="en-US" sz="2800" i="1" dirty="0">
+                <a:solidFill>
+                  <a:prstClr val="black"/>
+                </a:solidFill>
+                <a:latin typeface="Arial" panose="020B0604020202020204" pitchFamily="34" charset="0"/>
+                <a:cs typeface="Arial" panose="020B0604020202020204" pitchFamily="34" charset="0"/>
+              </a:rPr>
+              <a:t>, but don’t </a:t>
+            </a:r>
+            <a:r>
+              <a:rPr lang="en-US" sz="2800" i="1" dirty="0" smtClean="0">
+                <a:solidFill>
+                  <a:prstClr val="black"/>
+                </a:solidFill>
+                <a:latin typeface="Arial" panose="020B0604020202020204" pitchFamily="34" charset="0"/>
+                <a:cs typeface="Arial" panose="020B0604020202020204" pitchFamily="34" charset="0"/>
+              </a:rPr>
+              <a:t>cheat</a:t>
+            </a:r>
+          </a:p>
+          <a:p>
+            <a:pPr marL="1371600" lvl="2" indent="-457200">
+              <a:buFont typeface="Arial" panose="020B0604020202020204" pitchFamily="34" charset="0"/>
+              <a:buChar char="•"/>
+            </a:pPr>
+            <a:r>
+              <a:rPr lang="en-US" sz="2800" i="1" dirty="0" smtClean="0">
+                <a:solidFill>
+                  <a:prstClr val="black"/>
+                </a:solidFill>
+                <a:latin typeface="Arial" panose="020B0604020202020204" pitchFamily="34" charset="0"/>
+                <a:cs typeface="Arial" panose="020B0604020202020204" pitchFamily="34" charset="0"/>
+              </a:rPr>
+              <a:t>Doing the minimum isn’t lazy, it’s discipline</a:t>
+            </a:r>
+          </a:p>
+          <a:p>
+            <a:pPr marL="1371600" lvl="2" indent="-457200">
+              <a:buFont typeface="Arial" panose="020B0604020202020204" pitchFamily="34" charset="0"/>
+              <a:buChar char="•"/>
+            </a:pPr>
+            <a:r>
+              <a:rPr lang="en-US" sz="2800" i="1" dirty="0">
+                <a:solidFill>
+                  <a:prstClr val="black"/>
+                </a:solidFill>
+                <a:latin typeface="Arial" panose="020B0604020202020204" pitchFamily="34" charset="0"/>
+                <a:cs typeface="Arial" panose="020B0604020202020204" pitchFamily="34" charset="0"/>
+              </a:rPr>
+              <a:t>But always do </a:t>
+            </a:r>
+            <a:r>
+              <a:rPr lang="en-US" sz="2800" b="1" i="1" dirty="0">
+                <a:solidFill>
+                  <a:prstClr val="black"/>
+                </a:solidFill>
+                <a:latin typeface="Arial" panose="020B0604020202020204" pitchFamily="34" charset="0"/>
+                <a:cs typeface="Arial" panose="020B0604020202020204" pitchFamily="34" charset="0"/>
+              </a:rPr>
+              <a:t>some</a:t>
+            </a:r>
+            <a:r>
+              <a:rPr lang="en-US" sz="2800" i="1" dirty="0">
+                <a:solidFill>
+                  <a:prstClr val="black"/>
+                </a:solidFill>
+                <a:latin typeface="Arial" panose="020B0604020202020204" pitchFamily="34" charset="0"/>
+                <a:cs typeface="Arial" panose="020B0604020202020204" pitchFamily="34" charset="0"/>
+              </a:rPr>
+              <a:t> useful work.</a:t>
+            </a:r>
+          </a:p>
+          <a:p>
+            <a:pPr marL="1371600" lvl="2" indent="-457200">
+              <a:buFont typeface="Arial" panose="020B0604020202020204" pitchFamily="34" charset="0"/>
+              <a:buChar char="•"/>
+            </a:pPr>
+            <a:r>
+              <a:rPr lang="en-US" sz="2800" i="1" dirty="0" smtClean="0">
+                <a:solidFill>
+                  <a:prstClr val="black"/>
+                </a:solidFill>
+                <a:latin typeface="Arial" panose="020B0604020202020204" pitchFamily="34" charset="0"/>
+                <a:cs typeface="Arial" panose="020B0604020202020204" pitchFamily="34" charset="0"/>
+              </a:rPr>
+              <a:t>Never trust a test you haven’t seen fail.</a:t>
+            </a:r>
+          </a:p>
+          <a:p>
+            <a:pPr lvl="1"/>
             <a:endParaRPr lang="en-US" sz="2800" dirty="0" smtClean="0"/>
-          </a:p>
-          <a:p>
-            <a:pPr marL="457200" indent="-457200">
-              <a:buFont typeface="Arial" panose="020B0604020202020204" pitchFamily="34" charset="0"/>
-              <a:buChar char="•"/>
-            </a:pPr>
-            <a:r>
-              <a:rPr lang="en-US" sz="2800" dirty="0" smtClean="0"/>
-              <a:t>Our Question – Next steps?</a:t>
-            </a:r>
-          </a:p>
-          <a:p>
-            <a:pPr marL="914400" lvl="1" indent="-457200">
-              <a:buFont typeface="Arial" panose="020B0604020202020204" pitchFamily="34" charset="0"/>
-              <a:buChar char="•"/>
-            </a:pPr>
-            <a:r>
-              <a:rPr lang="en-US" sz="2800" dirty="0" smtClean="0"/>
-              <a:t>Further sessions?</a:t>
-            </a:r>
-          </a:p>
-          <a:p>
-            <a:pPr marL="1371600" lvl="2" indent="-457200">
-              <a:buFont typeface="Arial" panose="020B0604020202020204" pitchFamily="34" charset="0"/>
-              <a:buChar char="•"/>
-            </a:pPr>
-            <a:r>
-              <a:rPr lang="en-US" sz="2800" dirty="0" smtClean="0"/>
-              <a:t>Unit TDD?</a:t>
-            </a:r>
-          </a:p>
-          <a:p>
-            <a:pPr marL="1371600" lvl="2" indent="-457200">
-              <a:buFont typeface="Arial" panose="020B0604020202020204" pitchFamily="34" charset="0"/>
-              <a:buChar char="•"/>
-            </a:pPr>
-            <a:r>
-              <a:rPr lang="en-US" sz="2800" dirty="0" smtClean="0"/>
-              <a:t>Working with Legacy Code?</a:t>
-            </a:r>
-          </a:p>
-          <a:p>
-            <a:pPr marL="914400" lvl="1" indent="-457200">
-              <a:buFont typeface="Arial" panose="020B0604020202020204" pitchFamily="34" charset="0"/>
-              <a:buChar char="•"/>
-            </a:pPr>
-            <a:r>
-              <a:rPr lang="en-US" sz="2800" dirty="0" smtClean="0"/>
-              <a:t>Open Source Project?</a:t>
-            </a:r>
           </a:p>
         </p:txBody>
       </p:sp>
     </p:spTree>
     <p:extLst>
       <p:ext uri="{BB962C8B-B14F-4D97-AF65-F5344CB8AC3E}">
-        <p14:creationId xmlns:p14="http://schemas.microsoft.com/office/powerpoint/2010/main" val="2282141227"/>
+        <p14:creationId xmlns:p14="http://schemas.microsoft.com/office/powerpoint/2010/main" val="3587906280"/>
       </p:ext>
     </p:extLst>
   </p:cSld>
@@ -9631,65 +9655,131 @@
           <a:p>
             <a:r>
               <a:rPr lang="en-US" dirty="0" smtClean="0"/>
-              <a:t>60</a:t>
-            </a:r>
-            <a:r>
-              <a:rPr lang="en-US" baseline="30000" dirty="0" smtClean="0"/>
-              <a:t>th</a:t>
-            </a:r>
-            <a:r>
-              <a:rPr lang="en-US" dirty="0" smtClean="0"/>
-              <a:t> Minute: feedback</a:t>
+              <a:t>Questions &amp; Discussion</a:t>
             </a:r>
             <a:endParaRPr lang="en-US" dirty="0"/>
           </a:p>
         </p:txBody>
       </p:sp>
-      <p:pic>
-        <p:nvPicPr>
-          <p:cNvPr id="1029" name="Picture 5" descr="C:\Users\arecord27272\AppData\Local\Microsoft\Windows\Temporary Internet Files\Content.IE5\2POWQ8G7\questions[1].jpg"/>
-          <p:cNvPicPr>
-            <a:picLocks noChangeAspect="1" noChangeArrowheads="1"/>
-          </p:cNvPicPr>
+      <p:sp>
+        <p:nvSpPr>
+          <p:cNvPr id="3" name="TextBox 2"/>
+          <p:cNvSpPr txBox="1"/>
           <p:nvPr/>
-        </p:nvPicPr>
-        <p:blipFill>
-          <a:blip r:embed="rId3">
-            <a:extLst>
-              <a:ext uri="{28A0092B-C50C-407E-A947-70E740481C1C}">
-                <a14:useLocalDpi xmlns:a14="http://schemas.microsoft.com/office/drawing/2010/main" val="0"/>
-              </a:ext>
-            </a:extLst>
-          </a:blip>
-          <a:srcRect/>
-          <a:stretch>
-            <a:fillRect/>
-          </a:stretch>
-        </p:blipFill>
-        <p:spPr bwMode="auto">
+        </p:nvSpPr>
+        <p:spPr>
           <a:xfrm>
-            <a:off x="2323783" y="1864678"/>
-            <a:ext cx="4699000" cy="2997200"/>
+            <a:off x="524435" y="1711570"/>
+            <a:ext cx="8027893" cy="3970318"/>
           </a:xfrm>
           <a:prstGeom prst="rect">
             <a:avLst/>
           </a:prstGeom>
           <a:noFill/>
-          <a:extLst>
-            <a:ext uri="{909E8E84-426E-40DD-AFC4-6F175D3DCCD1}">
-              <a14:hiddenFill xmlns:a14="http://schemas.microsoft.com/office/drawing/2010/main">
-                <a:solidFill>
-                  <a:srgbClr val="FFFFFF"/>
-                </a:solidFill>
-              </a14:hiddenFill>
-            </a:ext>
-          </a:extLst>
         </p:spPr>
-      </p:pic>
+        <p:txBody>
+          <a:bodyPr wrap="square" rtlCol="0">
+            <a:spAutoFit/>
+          </a:bodyPr>
+          <a:lstStyle/>
+          <a:p>
+            <a:pPr marL="457200" indent="-457200">
+              <a:buFont typeface="Arial" panose="020B0604020202020204" pitchFamily="34" charset="0"/>
+              <a:buChar char="•"/>
+            </a:pPr>
+            <a:r>
+              <a:rPr lang="en-US" sz="2800" dirty="0" smtClean="0"/>
+              <a:t>Your Questions?</a:t>
+            </a:r>
+          </a:p>
+          <a:p>
+            <a:pPr marL="457200" indent="-457200">
+              <a:buFont typeface="Arial" panose="020B0604020202020204" pitchFamily="34" charset="0"/>
+              <a:buChar char="•"/>
+            </a:pPr>
+            <a:endParaRPr lang="en-US" sz="2800" dirty="0" smtClean="0"/>
+          </a:p>
+          <a:p>
+            <a:pPr marL="457200" indent="-457200">
+              <a:buFont typeface="Arial" panose="020B0604020202020204" pitchFamily="34" charset="0"/>
+              <a:buChar char="•"/>
+            </a:pPr>
+            <a:r>
+              <a:rPr lang="en-US" sz="2800" dirty="0" smtClean="0"/>
+              <a:t>Our Question – Next steps?</a:t>
+            </a:r>
+          </a:p>
+          <a:p>
+            <a:pPr marL="914400" lvl="1" indent="-457200">
+              <a:buFont typeface="Arial" panose="020B0604020202020204" pitchFamily="34" charset="0"/>
+              <a:buChar char="•"/>
+            </a:pPr>
+            <a:r>
+              <a:rPr lang="en-US" sz="2800" dirty="0" smtClean="0"/>
+              <a:t>Future topics?</a:t>
+            </a:r>
+          </a:p>
+          <a:p>
+            <a:pPr marL="1371600" lvl="2" indent="-457200">
+              <a:buFont typeface="Arial" panose="020B0604020202020204" pitchFamily="34" charset="0"/>
+              <a:buChar char="•"/>
+            </a:pPr>
+            <a:r>
+              <a:rPr lang="en-US" sz="2800" dirty="0" smtClean="0"/>
+              <a:t>Unit TDD?</a:t>
+            </a:r>
+          </a:p>
+          <a:p>
+            <a:pPr marL="1371600" lvl="2" indent="-457200">
+              <a:buFont typeface="Arial" panose="020B0604020202020204" pitchFamily="34" charset="0"/>
+              <a:buChar char="•"/>
+            </a:pPr>
+            <a:r>
+              <a:rPr lang="en-US" sz="2800" dirty="0" smtClean="0"/>
+              <a:t>Working with Legacy Code?</a:t>
+            </a:r>
+          </a:p>
+          <a:p>
+            <a:pPr marL="1371600" lvl="2" indent="-457200">
+              <a:buFont typeface="Arial" panose="020B0604020202020204" pitchFamily="34" charset="0"/>
+              <a:buChar char="•"/>
+            </a:pPr>
+            <a:r>
+              <a:rPr lang="en-US" sz="2800" dirty="0" smtClean="0"/>
+              <a:t>Real-world technology?</a:t>
+            </a:r>
+            <a:br>
+              <a:rPr lang="en-US" sz="2800" dirty="0" smtClean="0"/>
+            </a:br>
+            <a:r>
+              <a:rPr lang="en-US" sz="2800" dirty="0" smtClean="0"/>
+              <a:t>(Mocks, Web, DB, </a:t>
+            </a:r>
+            <a:r>
+              <a:rPr lang="en-US" sz="2800" dirty="0" err="1" smtClean="0"/>
+              <a:t>asynch</a:t>
+            </a:r>
+            <a:r>
+              <a:rPr lang="en-US" sz="2800" dirty="0" smtClean="0"/>
+              <a:t>., etc.)</a:t>
+            </a:r>
+          </a:p>
+          <a:p>
+            <a:pPr marL="914400" lvl="1" indent="-457200">
+              <a:buFont typeface="Arial" panose="020B0604020202020204" pitchFamily="34" charset="0"/>
+              <a:buChar char="•"/>
+            </a:pPr>
+            <a:r>
+              <a:rPr lang="en-US" sz="2800" dirty="0" smtClean="0"/>
+              <a:t>Open Source Project?</a:t>
+            </a:r>
+          </a:p>
+        </p:txBody>
+      </p:sp>
     </p:spTree>
     <p:extLst>
       <p:ext uri="{BB962C8B-B14F-4D97-AF65-F5344CB8AC3E}">
-        <p14:creationId xmlns:p14="http://schemas.microsoft.com/office/powerpoint/2010/main" val="3131825279"/>
+        <p14:creationId xmlns:p14="http://schemas.microsoft.com/office/powerpoint/2010/main" val="2282141227"/>
       </p:ext>
     </p:extLst>
   </p:cSld>
@@ -9735,7 +9825,7 @@
         </p:nvSpPr>
         <p:spPr>
           <a:xfrm>
-            <a:off x="0" y="2821674"/>
+            <a:off x="-3340" y="241034"/>
             <a:ext cx="9144000" cy="623917"/>
           </a:xfrm>
         </p:spPr>
@@ -9745,16 +9835,65 @@
           <a:p>
             <a:r>
               <a:rPr lang="en-US" dirty="0" smtClean="0"/>
-              <a:t>Appendix</a:t>
+              <a:t>60</a:t>
+            </a:r>
+            <a:r>
+              <a:rPr lang="en-US" baseline="30000" dirty="0" smtClean="0"/>
+              <a:t>th</a:t>
+            </a:r>
+            <a:r>
+              <a:rPr lang="en-US" dirty="0" smtClean="0"/>
+              <a:t> Minute: feedback</a:t>
             </a:r>
             <a:endParaRPr lang="en-US" dirty="0"/>
           </a:p>
         </p:txBody>
       </p:sp>
+      <p:pic>
+        <p:nvPicPr>
+          <p:cNvPr id="1029" name="Picture 5" descr="C:\Users\arecord27272\AppData\Local\Microsoft\Windows\Temporary Internet Files\Content.IE5\2POWQ8G7\questions[1].jpg"/>
+          <p:cNvPicPr>
+            <a:picLocks noChangeAspect="1" noChangeArrowheads="1"/>
+          </p:cNvPicPr>
+          <p:nvPr/>
+        </p:nvPicPr>
+        <p:blipFill>
+          <a:blip r:embed="rId3">
+            <a:extLst>
+              <a:ext uri="{28A0092B-C50C-407E-A947-70E740481C1C}">
+                <a14:useLocalDpi xmlns:a14="http://schemas.microsoft.com/office/drawing/2010/main" val="0"/>
+              </a:ext>
+            </a:extLst>
+          </a:blip>
+          <a:srcRect/>
+          <a:stretch>
+            <a:fillRect/>
+          </a:stretch>
+        </p:blipFill>
+        <p:spPr bwMode="auto">
+          <a:xfrm>
+            <a:off x="2323783" y="1864678"/>
+            <a:ext cx="4699000" cy="2997200"/>
+          </a:xfrm>
+          <a:prstGeom prst="rect">
+            <a:avLst/>
+          </a:prstGeom>
+          <a:noFill/>
+          <a:extLst>
+            <a:ext uri="{909E8E84-426E-40DD-AFC4-6F175D3DCCD1}">
+              <a14:hiddenFill xmlns:a14="http://schemas.microsoft.com/office/drawing/2010/main">
+                <a:solidFill>
+                  <a:srgbClr val="FFFFFF"/>
+                </a:solidFill>
+              </a14:hiddenFill>
+            </a:ext>
+          </a:extLst>
+        </p:spPr>
+      </p:pic>
     </p:spTree>
     <p:extLst>
       <p:ext uri="{BB962C8B-B14F-4D97-AF65-F5344CB8AC3E}">
-        <p14:creationId xmlns:p14="http://schemas.microsoft.com/office/powerpoint/2010/main" val="36540371"/>
+        <p14:creationId xmlns:p14="http://schemas.microsoft.com/office/powerpoint/2010/main" val="3131825279"/>
       </p:ext>
     </p:extLst>
   </p:cSld>
@@ -9790,6 +9929,71 @@
       </p:grpSpPr>
       <p:sp>
         <p:nvSpPr>
+          <p:cNvPr id="2" name="Title 1"/>
+          <p:cNvSpPr>
+            <a:spLocks noGrp="1"/>
+          </p:cNvSpPr>
+          <p:nvPr>
+            <p:ph type="ctrTitle"/>
+          </p:nvPr>
+        </p:nvSpPr>
+        <p:spPr>
+          <a:xfrm>
+            <a:off x="0" y="2821674"/>
+            <a:ext cx="9144000" cy="623917"/>
+          </a:xfrm>
+        </p:spPr>
+        <p:txBody>
+          <a:bodyPr/>
+          <a:lstStyle/>
+          <a:p>
+            <a:r>
+              <a:rPr lang="en-US" dirty="0" smtClean="0"/>
+              <a:t>Appendix</a:t>
+            </a:r>
+            <a:endParaRPr lang="en-US" dirty="0"/>
+          </a:p>
+        </p:txBody>
+      </p:sp>
+    </p:spTree>
+    <p:extLst>
+      <p:ext uri="{BB962C8B-B14F-4D97-AF65-F5344CB8AC3E}">
+        <p14:creationId xmlns:p14="http://schemas.microsoft.com/office/powerpoint/2010/main" val="36540371"/>
+      </p:ext>
+    </p:extLst>
+  </p:cSld>
+  <p:clrMapOvr>
+    <a:masterClrMapping/>
+  </p:clrMapOvr>
+  <p:timing>
+    <p:tnLst>
+      <p:par>
+        <p:cTn id="1" dur="indefinite" restart="never" nodeType="tmRoot"/>
+      </p:par>
+    </p:tnLst>
+  </p:timing>
+</p:sld>
+</file>
+
+<file path=ppt/slides/slide19.xml><?xml version="1.0" encoding="utf-8"?>
+<p:sld xmlns:a="http://schemas.openxmlformats.org/drawingml/2006/main" xmlns:r="http://schemas.openxmlformats.org/officeDocument/2006/relationships" xmlns:p="http://schemas.openxmlformats.org/presentationml/2006/main">
+  <p:cSld>
+    <p:spTree>
+      <p:nvGrpSpPr>
+        <p:cNvPr id="1" name=""/>
+        <p:cNvGrpSpPr/>
+        <p:nvPr/>
+      </p:nvGrpSpPr>
+      <p:grpSpPr>
+        <a:xfrm>
+          <a:off x="0" y="0"/>
+          <a:ext cx="0" cy="0"/>
+          <a:chOff x="0" y="0"/>
+          <a:chExt cx="0" cy="0"/>
+        </a:xfrm>
+      </p:grpSpPr>
+      <p:sp>
+        <p:nvSpPr>
           <p:cNvPr id="5" name="Title 4"/>
           <p:cNvSpPr>
             <a:spLocks noGrp="1"/>
@@ -9837,9 +10041,18 @@
               <a:buChar char="•"/>
             </a:pPr>
             <a:r>
+              <a:rPr lang="en-US" sz="2000" dirty="0"/>
+              <a:t>ATDD/TDD </a:t>
+            </a:r>
+            <a:r>
               <a:rPr lang="en-US" sz="2000" dirty="0" smtClean="0"/>
-              <a:t>ATDD (tools)</a:t>
-            </a:r>
+              <a:t>T</a:t>
+            </a:r>
+            <a:r>
+              <a:rPr lang="en-US" sz="2000" dirty="0" smtClean="0"/>
+              <a:t>ools</a:t>
+            </a:r>
+            <a:endParaRPr lang="en-US" sz="2000" dirty="0" smtClean="0"/>
           </a:p>
           <a:p>
             <a:pPr marL="800100" lvl="1" indent="-342900">
@@ -9915,7 +10128,11 @@
             </a:pPr>
             <a:r>
               <a:rPr lang="en-US" sz="2000" dirty="0" smtClean="0"/>
-              <a:t>ATDD/TDD (How-to)</a:t>
+              <a:t>ATDD/TDD </a:t>
+            </a:r>
+            <a:r>
+              <a:rPr lang="en-US" sz="2000" dirty="0" smtClean="0"/>
+              <a:t>How-to</a:t>
             </a:r>
             <a:endParaRPr lang="en-US" sz="2000" dirty="0"/>
           </a:p>
@@ -9925,7 +10142,9 @@
               <a:buChar char="o"/>
             </a:pPr>
             <a:r>
-              <a:rPr lang="en-US" sz="1600" u="sng" dirty="0"/>
+              <a:rPr lang="en-US" sz="1600" dirty="0">
+                <a:hlinkClick r:id="rId6"/>
+              </a:rPr>
               <a:t>Growing Object Oriented Software Guided by Tests</a:t>
             </a:r>
             <a:r>
@@ -9939,15 +10158,21 @@
               <a:buChar char="o"/>
             </a:pPr>
             <a:r>
-              <a:rPr lang="en-US" sz="1600" u="sng" dirty="0"/>
+              <a:rPr lang="en-US" sz="1600" dirty="0">
+                <a:hlinkClick r:id="rId7"/>
+              </a:rPr>
               <a:t>The Cucumber </a:t>
             </a:r>
             <a:r>
-              <a:rPr lang="en-US" sz="1600" u="sng" dirty="0" smtClean="0"/>
+              <a:rPr lang="en-US" sz="1600" dirty="0" smtClean="0">
+                <a:hlinkClick r:id="rId7"/>
+              </a:rPr>
               <a:t>Book</a:t>
             </a:r>
             <a:r>
-              <a:rPr lang="en-US" sz="1600" u="sng" dirty="0"/>
+              <a:rPr lang="en-US" sz="1600" dirty="0">
+                <a:hlinkClick r:id="rId7"/>
+              </a:rPr>
               <a:t>: Behavior-Driven Development for Testers and Developers</a:t>
             </a:r>
             <a:r>
@@ -9978,19 +10203,27 @@
               <a:buChar char="o"/>
             </a:pPr>
             <a:r>
-              <a:rPr lang="en-US" sz="1600" u="sng" dirty="0" smtClean="0"/>
+              <a:rPr lang="en-US" sz="1600" dirty="0" smtClean="0">
+                <a:hlinkClick r:id="rId7"/>
+              </a:rPr>
               <a:t>The Cucumber </a:t>
             </a:r>
             <a:r>
-              <a:rPr lang="en-US" sz="1600" b="1" u="sng" dirty="0" smtClean="0"/>
+              <a:rPr lang="en-US" sz="1600" b="1" dirty="0" smtClean="0">
+                <a:hlinkClick r:id="rId7"/>
+              </a:rPr>
               <a:t>For Java </a:t>
             </a:r>
             <a:r>
-              <a:rPr lang="en-US" sz="1600" u="sng" dirty="0" smtClean="0"/>
+              <a:rPr lang="en-US" sz="1600" dirty="0" smtClean="0">
+                <a:hlinkClick r:id="rId7"/>
+              </a:rPr>
               <a:t>Book: </a:t>
             </a:r>
             <a:r>
-              <a:rPr lang="en-US" sz="1600" u="sng" dirty="0"/>
+              <a:rPr lang="en-US" sz="1600" dirty="0">
+                <a:hlinkClick r:id="rId7"/>
+              </a:rPr>
               <a:t>Behavior-Driven Development for Testers and Developers</a:t>
             </a:r>
             <a:r>
@@ -10033,24 +10266,34 @@
               <a:buChar char="o"/>
             </a:pPr>
             <a:r>
-              <a:rPr lang="en-US" sz="1600" u="sng" dirty="0" smtClean="0"/>
+              <a:rPr lang="en-US" sz="1600" dirty="0" smtClean="0">
+                <a:hlinkClick r:id="rId8"/>
+              </a:rPr>
               <a:t>Cucumber </a:t>
             </a:r>
             <a:r>
-              <a:rPr lang="en-US" sz="1600" u="sng" dirty="0" err="1" smtClean="0"/>
+              <a:rPr lang="en-US" sz="1600" dirty="0" err="1" smtClean="0">
+                <a:hlinkClick r:id="rId8"/>
+              </a:rPr>
               <a:t>Recipies</a:t>
             </a:r>
             <a:r>
-              <a:rPr lang="en-US" sz="1600" u="sng" dirty="0" smtClean="0"/>
+              <a:rPr lang="en-US" sz="1600" dirty="0" smtClean="0">
+                <a:hlinkClick r:id="rId8"/>
+              </a:rPr>
               <a:t>:  Automate </a:t>
             </a:r>
             <a:r>
-              <a:rPr lang="en-US" sz="1600" u="sng" dirty="0" err="1" smtClean="0"/>
-              <a:t>Anyting</a:t>
-            </a:r>
-            <a:r>
-              <a:rPr lang="en-US" sz="1600" u="sng" dirty="0" smtClean="0"/>
-              <a:t> with BDD Tools and Techniques</a:t>
+              <a:rPr lang="en-US" sz="1600" dirty="0" smtClean="0">
+                <a:hlinkClick r:id="rId8"/>
+              </a:rPr>
+              <a:t>Anything </a:t>
+            </a:r>
+            <a:r>
+              <a:rPr lang="en-US" sz="1600" dirty="0" smtClean="0">
+                <a:hlinkClick r:id="rId8"/>
+              </a:rPr>
+              <a:t>with BDD Tools and Techniques</a:t>
             </a:r>
             <a:r>
               <a:rPr lang="en-US" sz="1600" dirty="0" smtClean="0"/>
@@ -10085,13 +10328,13 @@
             </a:r>
             <a:r>
               <a:rPr lang="en-US" sz="1600" dirty="0">
-                <a:hlinkClick r:id="rId6"/>
+                <a:hlinkClick r:id="rId9"/>
               </a:rPr>
               <a:t>http://</a:t>
             </a:r>
             <a:r>
               <a:rPr lang="en-US" sz="1600" dirty="0" smtClean="0">
-                <a:hlinkClick r:id="rId6"/>
+                <a:hlinkClick r:id="rId9"/>
               </a:rPr>
               <a:t>c2.com/cgi/wiki?TestDrivenDevelopment</a:t>
             </a:r>
@@ -10106,12 +10349,24 @@
               <a:buChar char="o"/>
             </a:pPr>
             <a:r>
-              <a:rPr lang="en-US" sz="1600" u="sng" dirty="0" smtClean="0"/>
-              <a:t>Test Driven Development</a:t>
+              <a:rPr lang="en-US" sz="1600" dirty="0" smtClean="0">
+                <a:hlinkClick r:id="rId10"/>
+              </a:rPr>
+              <a:t>Test Driven </a:t>
+            </a:r>
+            <a:r>
+              <a:rPr lang="en-US" sz="1600" dirty="0" smtClean="0">
+                <a:hlinkClick r:id="rId10"/>
+              </a:rPr>
+              <a:t>Development By Example</a:t>
             </a:r>
             <a:r>
               <a:rPr lang="en-US" sz="1600" dirty="0" smtClean="0"/>
-              <a:t>, by Kent Beck</a:t>
+              <a:t>, </a:t>
+            </a:r>
+            <a:r>
+              <a:rPr lang="en-US" sz="1600" dirty="0" smtClean="0"/>
+              <a:t>by Kent Beck</a:t>
             </a:r>
           </a:p>
           <a:p>
@@ -10120,7 +10375,9 @@
               <a:buChar char="o"/>
             </a:pPr>
             <a:r>
-              <a:rPr lang="en-US" sz="1600" u="sng" dirty="0" smtClean="0"/>
+              <a:rPr lang="en-US" sz="1600" dirty="0" smtClean="0">
+                <a:hlinkClick r:id="rId11"/>
+              </a:rPr>
               <a:t>Working Effectively with Legacy Code</a:t>
             </a:r>
             <a:r>
@@ -11764,7 +12021,7 @@
         <p:spPr>
           <a:xfrm>
             <a:off x="751840" y="1539016"/>
-            <a:ext cx="7620000" cy="3046988"/>
+            <a:ext cx="7854278" cy="3046988"/>
           </a:xfrm>
           <a:prstGeom prst="rect">
             <a:avLst/>
@@ -14451,6 +14708,21 @@
 </file>
 
 <file path=customXml/item1.xml><?xml version="1.0" encoding="utf-8"?>
+<p:properties xmlns:p="http://schemas.microsoft.com/office/2006/metadata/properties" xmlns:xsi="http://www.w3.org/2001/XMLSchema-instance">
+  <documentManagement/>
+</p:properties>
+</file>
+
+<file path=customXml/item2.xml><?xml version="1.0" encoding="utf-8"?>
+<?mso-contentType ?>
+<FormTemplates xmlns="http://schemas.microsoft.com/sharepoint/v3/contenttype/forms">
+  <Display>DocumentLibraryForm</Display>
+  <Edit>DocumentLibraryForm</Edit>
+  <New>DocumentLibraryForm</New>
+</FormTemplates>
+</file>
+
+<file path=customXml/item3.xml><?xml version="1.0" encoding="utf-8"?>
 <ct:contentTypeSchema xmlns:ct="http://schemas.microsoft.com/office/2006/metadata/contentType" xmlns:ma="http://schemas.microsoft.com/office/2006/metadata/properties/metaAttributes" ct:_="" ma:_="" ma:contentTypeName="Document" ma:contentTypeID="0x010100C185F5ACA656F14087A05F42EBBFA9A8" ma:contentTypeVersion="0" ma:contentTypeDescription="Create a new document." ma:contentTypeScope="" ma:versionID="041bc488044e506d1aa9ac78f8beef06">
   <xsd:schema xmlns:xsd="http://www.w3.org/2001/XMLSchema" xmlns:p="http://schemas.microsoft.com/office/2006/metadata/properties" targetNamespace="http://schemas.microsoft.com/office/2006/metadata/properties" ma:root="true" ma:fieldsID="4aeb20c0e3442673af7ee10786458764">
     <xsd:element name="properties">
@@ -14499,37 +14771,7 @@
 </ct:contentTypeSchema>
 </file>
 
-<file path=customXml/item2.xml><?xml version="1.0" encoding="utf-8"?>
-<p:properties xmlns:p="http://schemas.microsoft.com/office/2006/metadata/properties" xmlns:xsi="http://www.w3.org/2001/XMLSchema-instance">
-  <documentManagement/>
-</p:properties>
-</file>
-
-<file path=customXml/item3.xml><?xml version="1.0" encoding="utf-8"?>
-<?mso-contentType ?>
-<FormTemplates xmlns="http://schemas.microsoft.com/sharepoint/v3/contenttype/forms">
-  <Display>DocumentLibraryForm</Display>
-  <Edit>DocumentLibraryForm</Edit>
-  <New>DocumentLibraryForm</New>
-</FormTemplates>
-</file>
-
 <file path=customXml/itemProps1.xml><?xml version="1.0" encoding="utf-8"?>
-<ds:datastoreItem xmlns:ds="http://schemas.openxmlformats.org/officeDocument/2006/customXml" ds:itemID="{4D535F13-7955-4883-ACF0-A34D95CAB0DB}">
-  <ds:schemaRefs>
-    <ds:schemaRef ds:uri="http://schemas.microsoft.com/office/2006/metadata/contentType"/>
-    <ds:schemaRef ds:uri="http://schemas.microsoft.com/office/2006/metadata/properties/metaAttributes"/>
-    <ds:schemaRef ds:uri="http://www.w3.org/2001/XMLSchema"/>
-    <ds:schemaRef ds:uri="http://schemas.microsoft.com/office/2006/metadata/properties"/>
-    <ds:schemaRef ds:uri="http://schemas.openxmlformats.org/package/2006/metadata/core-properties"/>
-    <ds:schemaRef ds:uri="http://purl.org/dc/elements/1.1/"/>
-    <ds:schemaRef ds:uri="http://purl.org/dc/terms/"/>
-    <ds:schemaRef ds:uri="http://schemas.microsoft.com/office/internal/2005/internalDocumentation"/>
-  </ds:schemaRefs>
-</ds:datastoreItem>
-</file>
-
-<file path=customXml/itemProps2.xml><?xml version="1.0" encoding="utf-8"?>
 <ds:datastoreItem xmlns:ds="http://schemas.openxmlformats.org/officeDocument/2006/customXml" ds:itemID="{A06689F3-4B38-45F6-AEEA-96699B64EAA5}">
   <ds:schemaRefs>
     <ds:schemaRef ds:uri="http://schemas.microsoft.com/office/2006/metadata/properties"/>
@@ -14543,10 +14785,25 @@
 </ds:datastoreItem>
 </file>
 
-<file path=customXml/itemProps3.xml><?xml version="1.0" encoding="utf-8"?>
+<file path=customXml/itemProps2.xml><?xml version="1.0" encoding="utf-8"?>
 <ds:datastoreItem xmlns:ds="http://schemas.openxmlformats.org/officeDocument/2006/customXml" ds:itemID="{7FD9A7D6-067B-4743-A0EF-B168F7D01ADB}">
   <ds:schemaRefs>
     <ds:schemaRef ds:uri="http://schemas.microsoft.com/sharepoint/v3/contenttype/forms"/>
   </ds:schemaRefs>
 </ds:datastoreItem>
+</file>
+
+<file path=customXml/itemProps3.xml><?xml version="1.0" encoding="utf-8"?>
+<ds:datastoreItem xmlns:ds="http://schemas.openxmlformats.org/officeDocument/2006/customXml" ds:itemID="{4D535F13-7955-4883-ACF0-A34D95CAB0DB}">
+  <ds:schemaRefs>
+    <ds:schemaRef ds:uri="http://schemas.microsoft.com/office/2006/metadata/contentType"/>
+    <ds:schemaRef ds:uri="http://schemas.microsoft.com/office/2006/metadata/properties/metaAttributes"/>
+    <ds:schemaRef ds:uri="http://www.w3.org/2001/XMLSchema"/>
+    <ds:schemaRef ds:uri="http://schemas.microsoft.com/office/2006/metadata/properties"/>
+    <ds:schemaRef ds:uri="http://schemas.openxmlformats.org/package/2006/metadata/core-properties"/>
+    <ds:schemaRef ds:uri="http://purl.org/dc/elements/1.1/"/>
+    <ds:schemaRef ds:uri="http://purl.org/dc/terms/"/>
+    <ds:schemaRef ds:uri="http://schemas.microsoft.com/office/internal/2005/internalDocumentation"/>
+  </ds:schemaRefs>
+</ds:datastoreItem>
 </file>
</xml_diff>

<commit_message>
update ppt, clean up solve feature and stringToList() support function
</commit_message>
<xml_diff>
--- a/doc/TDD Overview.pptx
+++ b/doc/TDD Overview.pptx
@@ -10,10 +10,10 @@
     <p:sldMasterId id="2147483680" r:id="rId9"/>
   </p:sldMasterIdLst>
   <p:notesMasterIdLst>
-    <p:notesMasterId r:id="rId29"/>
+    <p:notesMasterId r:id="rId28"/>
   </p:notesMasterIdLst>
   <p:handoutMasterIdLst>
-    <p:handoutMasterId r:id="rId30"/>
+    <p:handoutMasterId r:id="rId29"/>
   </p:handoutMasterIdLst>
   <p:sldIdLst>
     <p:sldId id="292" r:id="rId10"/>
@@ -28,13 +28,12 @@
     <p:sldId id="351" r:id="rId19"/>
     <p:sldId id="345" r:id="rId20"/>
     <p:sldId id="347" r:id="rId21"/>
-    <p:sldId id="349" r:id="rId22"/>
-    <p:sldId id="338" r:id="rId23"/>
+    <p:sldId id="338" r:id="rId22"/>
+    <p:sldId id="349" r:id="rId23"/>
     <p:sldId id="344" r:id="rId24"/>
-    <p:sldId id="346" r:id="rId25"/>
-    <p:sldId id="340" r:id="rId26"/>
-    <p:sldId id="313" r:id="rId27"/>
-    <p:sldId id="316" r:id="rId28"/>
+    <p:sldId id="316" r:id="rId25"/>
+    <p:sldId id="346" r:id="rId26"/>
+    <p:sldId id="340" r:id="rId27"/>
   </p:sldIdLst>
   <p:sldSz cx="9144000" cy="6858000" type="screen4x3"/>
   <p:notesSz cx="6858000" cy="9144000"/>
@@ -881,6 +880,25 @@
           <a:bodyPr/>
           <a:lstStyle/>
           <a:p>
+            <a:pPr marL="0" lvl="0" indent="0" defTabSz="914400">
+              <a:spcBef>
+                <a:spcPct val="20000"/>
+              </a:spcBef>
+              <a:buFont typeface="Arial" panose="020B0604020202020204" pitchFamily="34" charset="0"/>
+              <a:buNone/>
+            </a:pPr>
+            <a:r>
+              <a:rPr lang="en-US" sz="2400" baseline="0" dirty="0" smtClean="0">
+                <a:solidFill>
+                  <a:prstClr val="black"/>
+                </a:solidFill>
+                <a:latin typeface="Arial" panose="020B0604020202020204" pitchFamily="34" charset="0"/>
+                <a:cs typeface="Arial" panose="020B0604020202020204" pitchFamily="34" charset="0"/>
+              </a:rPr>
+              <a:t>(Daniel)</a:t>
+            </a:r>
+          </a:p>
+          <a:p>
             <a:pPr marL="342900" lvl="0" indent="-342900" defTabSz="914400">
               <a:spcBef>
                 <a:spcPct val="20000"/>
@@ -898,6 +916,13 @@
               </a:rPr>
               <a:t>ATDD</a:t>
             </a:r>
+            <a:endParaRPr lang="en-US" sz="2400" baseline="0" dirty="0" smtClean="0">
+              <a:solidFill>
+                <a:prstClr val="black"/>
+              </a:solidFill>
+              <a:latin typeface="Arial" panose="020B0604020202020204" pitchFamily="34" charset="0"/>
+              <a:cs typeface="Arial" panose="020B0604020202020204" pitchFamily="34" charset="0"/>
+            </a:endParaRPr>
           </a:p>
           <a:p>
             <a:pPr marL="800100" lvl="1" indent="-342900" defTabSz="914400">
@@ -1306,6 +1331,35 @@
           <a:bodyPr/>
           <a:lstStyle/>
           <a:p>
+            <a:pPr marL="0" marR="0" lvl="0" indent="0" algn="l" defTabSz="914400" rtl="0" eaLnBrk="1" fontAlgn="auto" latinLnBrk="0" hangingPunct="1">
+              <a:lnSpc>
+                <a:spcPct val="100000"/>
+              </a:lnSpc>
+              <a:spcBef>
+                <a:spcPct val="20000"/>
+              </a:spcBef>
+              <a:spcAft>
+                <a:spcPts val="0"/>
+              </a:spcAft>
+              <a:buClrTx/>
+              <a:buSzTx/>
+              <a:buFont typeface="Arial" panose="020B0604020202020204" pitchFamily="34" charset="0"/>
+              <a:buNone/>
+              <a:tabLst/>
+              <a:defRPr/>
+            </a:pPr>
+            <a:r>
+              <a:rPr lang="en-US" sz="2400" baseline="0" dirty="0" smtClean="0">
+                <a:solidFill>
+                  <a:prstClr val="black"/>
+                </a:solidFill>
+                <a:latin typeface="Arial" panose="020B0604020202020204" pitchFamily="34" charset="0"/>
+                <a:cs typeface="Arial" panose="020B0604020202020204" pitchFamily="34" charset="0"/>
+              </a:rPr>
+              <a:t>(Daniel)</a:t>
+            </a:r>
+          </a:p>
+          <a:p>
             <a:pPr marL="342900" lvl="0" indent="-342900" defTabSz="914400">
               <a:spcBef>
                 <a:spcPct val="20000"/>
@@ -1323,6 +1377,13 @@
               </a:rPr>
               <a:t>ATDD</a:t>
             </a:r>
+            <a:endParaRPr lang="en-US" sz="2400" baseline="0" dirty="0" smtClean="0">
+              <a:solidFill>
+                <a:prstClr val="black"/>
+              </a:solidFill>
+              <a:latin typeface="Arial" panose="020B0604020202020204" pitchFamily="34" charset="0"/>
+              <a:cs typeface="Arial" panose="020B0604020202020204" pitchFamily="34" charset="0"/>
+            </a:endParaRPr>
           </a:p>
           <a:p>
             <a:pPr marL="800100" lvl="1" indent="-342900" defTabSz="914400">
@@ -1721,13 +1782,38 @@
           <a:bodyPr/>
           <a:lstStyle/>
           <a:p>
+            <a:r>
+              <a:rPr lang="en-US" dirty="0" smtClean="0"/>
+              <a:t>(Lance)</a:t>
+            </a:r>
+          </a:p>
+          <a:p>
+            <a:r>
+              <a:rPr lang="en-US" dirty="0" smtClean="0"/>
+              <a:t>Cover </a:t>
+            </a:r>
+            <a:r>
+              <a:rPr lang="en-US" dirty="0" smtClean="0"/>
+              <a:t>this one from the bottom up.  </a:t>
+            </a:r>
+            <a:r>
+              <a:rPr lang="en-US" baseline="0" dirty="0" smtClean="0"/>
+              <a:t>The steps also make a natural implementation progression	</a:t>
+            </a:r>
+            <a:endParaRPr lang="en-US" dirty="0" smtClean="0"/>
+          </a:p>
+          <a:p>
             <a:pPr marL="171450" indent="-171450">
               <a:buFont typeface="Arial" panose="020B0604020202020204" pitchFamily="34" charset="0"/>
               <a:buChar char="•"/>
             </a:pPr>
             <a:r>
               <a:rPr lang="en-US" dirty="0" smtClean="0"/>
-              <a:t>Working around scalability</a:t>
+              <a:t>At least half the value comes from the COLLABORATION</a:t>
+            </a:r>
+            <a:r>
+              <a:rPr lang="en-US" baseline="0" dirty="0" smtClean="0"/>
+              <a:t> of GETTING TO Gherkin specs.</a:t>
             </a:r>
           </a:p>
           <a:p>
@@ -1737,15 +1823,17 @@
             </a:pPr>
             <a:r>
               <a:rPr lang="en-US" baseline="0" dirty="0" smtClean="0"/>
-              <a:t>T</a:t>
-            </a:r>
-            <a:r>
-              <a:rPr lang="en-US" u="sng" baseline="0" dirty="0" smtClean="0"/>
-              <a:t>D</a:t>
-            </a:r>
-            <a:r>
-              <a:rPr lang="en-US" u="none" baseline="0" dirty="0" smtClean="0"/>
-              <a:t>D – tests should be written first, not stuffed in the solution and made to pass</a:t>
+              <a:t>UBIQUITOUS LANGUAGE provides clarity around WHAT you need to build</a:t>
+            </a:r>
+          </a:p>
+          <a:p>
+            <a:pPr marL="628650" lvl="1" indent="-171450">
+              <a:buFont typeface="Arial" panose="020B0604020202020204" pitchFamily="34" charset="0"/>
+              <a:buChar char="•"/>
+            </a:pPr>
+            <a:r>
+              <a:rPr lang="en-US" baseline="0" dirty="0" smtClean="0"/>
+              <a:t>Identify corner cases early</a:t>
             </a:r>
           </a:p>
           <a:p>
@@ -1754,8 +1842,41 @@
               <a:buChar char="•"/>
             </a:pPr>
             <a:r>
-              <a:rPr lang="en-US" u="none" baseline="0" dirty="0" smtClean="0"/>
-              <a:t>But we need to start somewhere – see Feathers.</a:t>
+              <a:rPr lang="en-US" baseline="0" dirty="0" smtClean="0"/>
+              <a:t>Replace assumptions with answers.</a:t>
+            </a:r>
+          </a:p>
+          <a:p>
+            <a:pPr marL="1085850" lvl="2" indent="-171450">
+              <a:buFont typeface="Arial" panose="020B0604020202020204" pitchFamily="34" charset="0"/>
+              <a:buChar char="•"/>
+            </a:pPr>
+            <a:r>
+              <a:rPr lang="en-US" baseline="0" dirty="0" smtClean="0"/>
+              <a:t>Make intentional scope &amp; priority decisions</a:t>
+            </a:r>
+          </a:p>
+          <a:p>
+            <a:pPr marL="628650" marR="0" lvl="1" indent="-171450" algn="l" defTabSz="457200" rtl="0" eaLnBrk="1" fontAlgn="auto" latinLnBrk="0" hangingPunct="1">
+              <a:lnSpc>
+                <a:spcPct val="100000"/>
+              </a:lnSpc>
+              <a:spcBef>
+                <a:spcPts val="0"/>
+              </a:spcBef>
+              <a:spcAft>
+                <a:spcPts val="0"/>
+              </a:spcAft>
+              <a:buClrTx/>
+              <a:buSzTx/>
+              <a:buFont typeface="Arial" panose="020B0604020202020204" pitchFamily="34" charset="0"/>
+              <a:buChar char="•"/>
+              <a:tabLst/>
+              <a:defRPr/>
+            </a:pPr>
+            <a:r>
+              <a:rPr lang="en-US" baseline="0" dirty="0" smtClean="0"/>
+              <a:t>When a feature too big, we have a ready alternative to layer-based splitting.</a:t>
             </a:r>
           </a:p>
           <a:p>
@@ -1764,18 +1885,8 @@
               <a:buChar char="•"/>
             </a:pPr>
             <a:r>
-              <a:rPr lang="en-US" u="none" baseline="0" dirty="0" smtClean="0"/>
-              <a:t>Testing suite can be modular, split by features or new features and old features</a:t>
-            </a:r>
-          </a:p>
-          <a:p>
-            <a:pPr marL="1085850" lvl="2" indent="-171450">
-              <a:buFont typeface="Arial" panose="020B0604020202020204" pitchFamily="34" charset="0"/>
-              <a:buChar char="•"/>
-            </a:pPr>
-            <a:r>
-              <a:rPr lang="en-US" u="none" baseline="0" dirty="0" smtClean="0"/>
-              <a:t>New features suite takes the stage, old features suite tested all the time, but to the side</a:t>
+              <a:rPr lang="en-US" baseline="0" dirty="0" smtClean="0"/>
+              <a:t>Consistently sized “chunks” facilitate consistent development flow/velocity.</a:t>
             </a:r>
           </a:p>
           <a:p>
@@ -1784,8 +1895,8 @@
               <a:buChar char="•"/>
             </a:pPr>
             <a:r>
-              <a:rPr lang="en-US" u="none" baseline="0" dirty="0" smtClean="0"/>
-              <a:t>Full test coverage is a nice goal, but is not required.</a:t>
+              <a:rPr lang="en-US" baseline="0" dirty="0" smtClean="0"/>
+              <a:t>Half the rest comes from the focus it brings to development.</a:t>
             </a:r>
           </a:p>
           <a:p>
@@ -1794,38 +1905,8 @@
               <a:buChar char="•"/>
             </a:pPr>
             <a:r>
-              <a:rPr lang="en-US" u="none" baseline="0" dirty="0" smtClean="0"/>
-              <a:t>Accept that:</a:t>
-            </a:r>
-          </a:p>
-          <a:p>
-            <a:pPr marL="1085850" lvl="2" indent="-171450">
-              <a:buFont typeface="Arial" panose="020B0604020202020204" pitchFamily="34" charset="0"/>
-              <a:buChar char="•"/>
-            </a:pPr>
-            <a:r>
-              <a:rPr lang="en-US" u="none" baseline="0" dirty="0" smtClean="0"/>
-              <a:t>External libraries don’t have comprehensive tests</a:t>
-            </a:r>
-          </a:p>
-          <a:p>
-            <a:pPr marL="1085850" lvl="2" indent="-171450">
-              <a:buFont typeface="Arial" panose="020B0604020202020204" pitchFamily="34" charset="0"/>
-              <a:buChar char="•"/>
-            </a:pPr>
-            <a:r>
-              <a:rPr lang="en-US" u="none" baseline="0" dirty="0" smtClean="0"/>
-              <a:t>Testing isn’t always easy (UI)</a:t>
-            </a:r>
-          </a:p>
-          <a:p>
-            <a:pPr marL="1085850" lvl="2" indent="-171450">
-              <a:buFont typeface="Arial" panose="020B0604020202020204" pitchFamily="34" charset="0"/>
-              <a:buChar char="•"/>
-            </a:pPr>
-            <a:r>
-              <a:rPr lang="en-US" u="none" baseline="0" dirty="0" smtClean="0"/>
-              <a:t>Legacy systems require time for tests to be written</a:t>
+              <a:rPr lang="en-US" baseline="0" dirty="0" smtClean="0"/>
+              <a:t>“Need” something not in a scenario?  ASK THE PO!  You’re either missing a scenario or off-scope.</a:t>
             </a:r>
           </a:p>
           <a:p>
@@ -1834,28 +1915,8 @@
               <a:buChar char="•"/>
             </a:pPr>
             <a:r>
-              <a:rPr lang="en-US" u="none" baseline="0" dirty="0" smtClean="0"/>
-              <a:t>Coverage is mostly applicable to UNIT tests.</a:t>
-            </a:r>
-          </a:p>
-          <a:p>
-            <a:pPr marL="1085850" lvl="2" indent="-171450">
-              <a:buFont typeface="Arial" panose="020B0604020202020204" pitchFamily="34" charset="0"/>
-              <a:buChar char="•"/>
-            </a:pPr>
-            <a:r>
-              <a:rPr lang="en-US" u="none" baseline="0" dirty="0" smtClean="0"/>
-              <a:t>Without solid unit tests, coverage at the system level is intractable.</a:t>
-            </a:r>
-          </a:p>
-          <a:p>
-            <a:pPr marL="1085850" lvl="2" indent="-171450">
-              <a:buFont typeface="Arial" panose="020B0604020202020204" pitchFamily="34" charset="0"/>
-              <a:buChar char="•"/>
-            </a:pPr>
-            <a:r>
-              <a:rPr lang="en-US" u="none" baseline="0" dirty="0" smtClean="0"/>
-              <a:t>Solid unit tests, relive business-facing tests of trivial clutter and attendant brittleness.</a:t>
+              <a:rPr lang="en-US" baseline="0" dirty="0" smtClean="0"/>
+              <a:t>Building to the tests greatly reduce “failure demand”</a:t>
             </a:r>
           </a:p>
           <a:p>
@@ -1865,7 +1926,7 @@
             </a:pPr>
             <a:r>
               <a:rPr lang="en-US" baseline="0" dirty="0" smtClean="0"/>
-              <a:t>Make a decision: team should not pursue TDD or everyone must agree on using TDD.</a:t>
+              <a:t>We have the scenarios, so why not share them with QA?</a:t>
             </a:r>
           </a:p>
           <a:p>
@@ -1875,7 +1936,17 @@
             </a:pPr>
             <a:r>
               <a:rPr lang="en-US" baseline="0" dirty="0" smtClean="0"/>
-              <a:t>Don’t have TDD be implemented by half the team.</a:t>
+              <a:t>Let them get started while development proceeds.</a:t>
+            </a:r>
+          </a:p>
+          <a:p>
+            <a:pPr marL="628650" lvl="1" indent="-171450">
+              <a:buFont typeface="Arial" panose="020B0604020202020204" pitchFamily="34" charset="0"/>
+              <a:buChar char="•"/>
+            </a:pPr>
+            <a:r>
+              <a:rPr lang="en-US" baseline="0" dirty="0" smtClean="0"/>
+              <a:t>Provoke QA questions and feedback while there’s still time to address them.</a:t>
             </a:r>
           </a:p>
           <a:p>
@@ -1883,10 +1954,82 @@
               <a:buFont typeface="Arial" panose="020B0604020202020204" pitchFamily="34" charset="0"/>
               <a:buChar char="•"/>
             </a:pPr>
-            <a:endParaRPr lang="en-US" baseline="0" dirty="0" smtClean="0"/>
-          </a:p>
-          <a:p>
-            <a:pPr marL="628650" lvl="1" indent="-171450">
+            <a:r>
+              <a:rPr lang="en-US" baseline="0" dirty="0" smtClean="0"/>
+              <a:t>The LAST 10% comes from actually automating test execution. Like the Iceberg…</a:t>
+            </a:r>
+          </a:p>
+          <a:p>
+            <a:pPr marL="628650" marR="0" lvl="1" indent="-171450" algn="l" defTabSz="457200" rtl="0" eaLnBrk="1" fontAlgn="auto" latinLnBrk="0" hangingPunct="1">
+              <a:lnSpc>
+                <a:spcPct val="100000"/>
+              </a:lnSpc>
+              <a:spcBef>
+                <a:spcPts val="0"/>
+              </a:spcBef>
+              <a:spcAft>
+                <a:spcPts val="0"/>
+              </a:spcAft>
+              <a:buClrTx/>
+              <a:buSzTx/>
+              <a:buFont typeface="Arial" panose="020B0604020202020204" pitchFamily="34" charset="0"/>
+              <a:buChar char="•"/>
+              <a:tabLst/>
+              <a:defRPr/>
+            </a:pPr>
+            <a:r>
+              <a:rPr lang="en-US" baseline="0" dirty="0" smtClean="0"/>
+              <a:t>Rally experience:  Dropping “Bug Bash”</a:t>
+            </a:r>
+          </a:p>
+          <a:p>
+            <a:pPr marL="628650" marR="0" lvl="1" indent="-171450" algn="l" defTabSz="457200" rtl="0" eaLnBrk="1" fontAlgn="auto" latinLnBrk="0" hangingPunct="1">
+              <a:lnSpc>
+                <a:spcPct val="100000"/>
+              </a:lnSpc>
+              <a:spcBef>
+                <a:spcPts val="0"/>
+              </a:spcBef>
+              <a:spcAft>
+                <a:spcPts val="0"/>
+              </a:spcAft>
+              <a:buClrTx/>
+              <a:buSzTx/>
+              <a:buFont typeface="Arial" panose="020B0604020202020204" pitchFamily="34" charset="0"/>
+              <a:buChar char="•"/>
+              <a:tabLst/>
+              <a:defRPr/>
+            </a:pPr>
+            <a:r>
+              <a:rPr lang="en-US" baseline="0" dirty="0" smtClean="0"/>
+              <a:t>Only this small tip is usually visible.</a:t>
+            </a:r>
+          </a:p>
+          <a:p>
+            <a:pPr marL="628650" marR="0" lvl="1" indent="-171450" algn="l" defTabSz="457200" rtl="0" eaLnBrk="1" fontAlgn="auto" latinLnBrk="0" hangingPunct="1">
+              <a:lnSpc>
+                <a:spcPct val="100000"/>
+              </a:lnSpc>
+              <a:spcBef>
+                <a:spcPts val="0"/>
+              </a:spcBef>
+              <a:spcAft>
+                <a:spcPts val="0"/>
+              </a:spcAft>
+              <a:buClrTx/>
+              <a:buSzTx/>
+              <a:buFont typeface="Arial" panose="020B0604020202020204" pitchFamily="34" charset="0"/>
+              <a:buChar char="•"/>
+              <a:tabLst/>
+              <a:defRPr/>
+            </a:pPr>
+            <a:r>
+              <a:rPr lang="en-US" baseline="0" dirty="0" smtClean="0"/>
+              <a:t>But it’s only visible BECAUSE it’s riding on what’s below.  That’s what’s actually floating.</a:t>
+            </a:r>
+          </a:p>
+          <a:p>
+            <a:pPr marL="171450" lvl="0" indent="-171450">
               <a:buFont typeface="Arial" panose="020B0604020202020204" pitchFamily="34" charset="0"/>
               <a:buChar char="•"/>
             </a:pPr>
@@ -1920,7 +2063,7 @@
     </p:spTree>
     <p:extLst>
       <p:ext uri="{BB962C8B-B14F-4D97-AF65-F5344CB8AC3E}">
-        <p14:creationId xmlns:p14="http://schemas.microsoft.com/office/powerpoint/2010/main" val="437793297"/>
+        <p14:creationId xmlns:p14="http://schemas.microsoft.com/office/powerpoint/2010/main" val="901864340"/>
       </p:ext>
     </p:extLst>
   </p:cSld>
@@ -1974,72 +2117,7 @@
           <a:bodyPr/>
           <a:lstStyle/>
           <a:p>
-            <a:r>
-              <a:rPr lang="en-US" dirty="0" smtClean="0"/>
-              <a:t>Cover this one from the bottom up.  </a:t>
-            </a:r>
-            <a:r>
-              <a:rPr lang="en-US" baseline="0" dirty="0" smtClean="0"/>
-              <a:t>The steps also make a natural implementation progression	</a:t>
-            </a:r>
-            <a:endParaRPr lang="en-US" dirty="0" smtClean="0"/>
-          </a:p>
-          <a:p>
-            <a:pPr marL="171450" indent="-171450">
-              <a:buFont typeface="Arial" panose="020B0604020202020204" pitchFamily="34" charset="0"/>
-              <a:buChar char="•"/>
-            </a:pPr>
-            <a:r>
-              <a:rPr lang="en-US" dirty="0" smtClean="0"/>
-              <a:t>At least half the value comes from the COLLABORATION</a:t>
-            </a:r>
-            <a:r>
-              <a:rPr lang="en-US" baseline="0" dirty="0" smtClean="0"/>
-              <a:t> of GETTING TO Gherkin specs.</a:t>
-            </a:r>
-          </a:p>
-          <a:p>
-            <a:pPr marL="628650" lvl="1" indent="-171450">
-              <a:buFont typeface="Arial" panose="020B0604020202020204" pitchFamily="34" charset="0"/>
-              <a:buChar char="•"/>
-            </a:pPr>
-            <a:r>
-              <a:rPr lang="en-US" baseline="0" dirty="0" smtClean="0"/>
-              <a:t>UBIQUITOUS LANGUAGE provides clarity around WHAT you need to build</a:t>
-            </a:r>
-          </a:p>
-          <a:p>
-            <a:pPr marL="628650" lvl="1" indent="-171450">
-              <a:buFont typeface="Arial" panose="020B0604020202020204" pitchFamily="34" charset="0"/>
-              <a:buChar char="•"/>
-            </a:pPr>
-            <a:r>
-              <a:rPr lang="en-US" baseline="0" dirty="0" smtClean="0"/>
-              <a:t>Identify corner cases early</a:t>
-            </a:r>
-          </a:p>
-          <a:p>
-            <a:pPr marL="1085850" lvl="2" indent="-171450">
-              <a:buFont typeface="Arial" panose="020B0604020202020204" pitchFamily="34" charset="0"/>
-              <a:buChar char="•"/>
-            </a:pPr>
-            <a:r>
-              <a:rPr lang="en-US" baseline="0" dirty="0" smtClean="0"/>
-              <a:t>Replace assumptions with answers.</a:t>
-            </a:r>
-          </a:p>
-          <a:p>
-            <a:pPr marL="1085850" lvl="2" indent="-171450">
-              <a:buFont typeface="Arial" panose="020B0604020202020204" pitchFamily="34" charset="0"/>
-              <a:buChar char="•"/>
-            </a:pPr>
-            <a:r>
-              <a:rPr lang="en-US" baseline="0" dirty="0" smtClean="0"/>
-              <a:t>Make intentional scope &amp; priority decisions</a:t>
-            </a:r>
-          </a:p>
-          <a:p>
-            <a:pPr marL="628650" marR="0" lvl="1" indent="-171450" algn="l" defTabSz="457200" rtl="0" eaLnBrk="1" fontAlgn="auto" latinLnBrk="0" hangingPunct="1">
+            <a:pPr marL="0" marR="0" lvl="0" indent="0" algn="l" defTabSz="457200" rtl="0" eaLnBrk="1" fontAlgn="auto" latinLnBrk="0" hangingPunct="1">
               <a:lnSpc>
                 <a:spcPct val="100000"/>
               </a:lnSpc>
@@ -2052,13 +2130,61 @@
               <a:buClrTx/>
               <a:buSzTx/>
               <a:buFont typeface="Arial" panose="020B0604020202020204" pitchFamily="34" charset="0"/>
-              <a:buChar char="•"/>
+              <a:buNone/>
               <a:tabLst/>
               <a:defRPr/>
             </a:pPr>
             <a:r>
+              <a:rPr lang="en-US" sz="1200" baseline="0" dirty="0" smtClean="0">
+                <a:solidFill>
+                  <a:prstClr val="black"/>
+                </a:solidFill>
+                <a:latin typeface="Arial" panose="020B0604020202020204" pitchFamily="34" charset="0"/>
+                <a:cs typeface="Arial" panose="020B0604020202020204" pitchFamily="34" charset="0"/>
+              </a:rPr>
+              <a:t>(Daniel)</a:t>
+            </a:r>
+          </a:p>
+          <a:p>
+            <a:pPr marL="171450" indent="-171450">
+              <a:buFont typeface="Arial" panose="020B0604020202020204" pitchFamily="34" charset="0"/>
+              <a:buChar char="•"/>
+            </a:pPr>
+            <a:r>
+              <a:rPr lang="en-US" dirty="0" smtClean="0"/>
+              <a:t>Working </a:t>
+            </a:r>
+            <a:r>
+              <a:rPr lang="en-US" dirty="0" smtClean="0"/>
+              <a:t>around scalability</a:t>
+            </a:r>
+          </a:p>
+          <a:p>
+            <a:pPr marL="628650" lvl="1" indent="-171450">
+              <a:buFont typeface="Arial" panose="020B0604020202020204" pitchFamily="34" charset="0"/>
+              <a:buChar char="•"/>
+            </a:pPr>
+            <a:r>
               <a:rPr lang="en-US" baseline="0" dirty="0" smtClean="0"/>
-              <a:t>When a feature too big, we have a ready alternative to layer-based splitting.</a:t>
+              <a:t>T</a:t>
+            </a:r>
+            <a:r>
+              <a:rPr lang="en-US" u="sng" baseline="0" dirty="0" smtClean="0"/>
+              <a:t>D</a:t>
+            </a:r>
+            <a:r>
+              <a:rPr lang="en-US" u="none" baseline="0" dirty="0" smtClean="0"/>
+              <a:t>D – tests should be written first, not stuffed in the solution and made to pass</a:t>
+            </a:r>
+          </a:p>
+          <a:p>
+            <a:pPr marL="1085850" lvl="2" indent="-171450">
+              <a:buFont typeface="Arial" panose="020B0604020202020204" pitchFamily="34" charset="0"/>
+              <a:buChar char="•"/>
+            </a:pPr>
+            <a:r>
+              <a:rPr lang="en-US" u="none" baseline="0" dirty="0" smtClean="0"/>
+              <a:t>But we need to start somewhere – see Feathers.</a:t>
             </a:r>
           </a:p>
           <a:p>
@@ -2067,8 +2193,118 @@
               <a:buChar char="•"/>
             </a:pPr>
             <a:r>
+              <a:rPr lang="en-US" u="none" baseline="0" dirty="0" smtClean="0"/>
+              <a:t>Testing suite can be modular, split by features or new features and old features</a:t>
+            </a:r>
+          </a:p>
+          <a:p>
+            <a:pPr marL="1085850" lvl="2" indent="-171450">
+              <a:buFont typeface="Arial" panose="020B0604020202020204" pitchFamily="34" charset="0"/>
+              <a:buChar char="•"/>
+            </a:pPr>
+            <a:r>
+              <a:rPr lang="en-US" u="none" baseline="0" dirty="0" smtClean="0"/>
+              <a:t>New features suite takes the stage, old features suite tested all the time, but to the side</a:t>
+            </a:r>
+          </a:p>
+          <a:p>
+            <a:pPr marL="171450" lvl="0" indent="-171450">
+              <a:buFont typeface="Arial" panose="020B0604020202020204" pitchFamily="34" charset="0"/>
+              <a:buChar char="•"/>
+            </a:pPr>
+            <a:r>
+              <a:rPr lang="en-US" u="none" baseline="0" dirty="0" smtClean="0"/>
+              <a:t>Full test coverage is a nice goal, but is not required.</a:t>
+            </a:r>
+          </a:p>
+          <a:p>
+            <a:pPr marL="628650" lvl="1" indent="-171450">
+              <a:buFont typeface="Arial" panose="020B0604020202020204" pitchFamily="34" charset="0"/>
+              <a:buChar char="•"/>
+            </a:pPr>
+            <a:r>
+              <a:rPr lang="en-US" u="none" baseline="0" dirty="0" smtClean="0"/>
+              <a:t>Accept that:</a:t>
+            </a:r>
+          </a:p>
+          <a:p>
+            <a:pPr marL="1085850" lvl="2" indent="-171450">
+              <a:buFont typeface="Arial" panose="020B0604020202020204" pitchFamily="34" charset="0"/>
+              <a:buChar char="•"/>
+            </a:pPr>
+            <a:r>
+              <a:rPr lang="en-US" u="none" baseline="0" dirty="0" smtClean="0"/>
+              <a:t>External libraries don’t have comprehensive tests</a:t>
+            </a:r>
+          </a:p>
+          <a:p>
+            <a:pPr marL="1085850" lvl="2" indent="-171450">
+              <a:buFont typeface="Arial" panose="020B0604020202020204" pitchFamily="34" charset="0"/>
+              <a:buChar char="•"/>
+            </a:pPr>
+            <a:r>
+              <a:rPr lang="en-US" u="none" baseline="0" dirty="0" smtClean="0"/>
+              <a:t>Testing isn’t always easy (UI)</a:t>
+            </a:r>
+          </a:p>
+          <a:p>
+            <a:pPr marL="1085850" lvl="2" indent="-171450">
+              <a:buFont typeface="Arial" panose="020B0604020202020204" pitchFamily="34" charset="0"/>
+              <a:buChar char="•"/>
+            </a:pPr>
+            <a:r>
+              <a:rPr lang="en-US" u="none" baseline="0" dirty="0" smtClean="0"/>
+              <a:t>Legacy systems require time for tests to be written</a:t>
+            </a:r>
+          </a:p>
+          <a:p>
+            <a:pPr marL="628650" lvl="1" indent="-171450">
+              <a:buFont typeface="Arial" panose="020B0604020202020204" pitchFamily="34" charset="0"/>
+              <a:buChar char="•"/>
+            </a:pPr>
+            <a:r>
+              <a:rPr lang="en-US" u="none" baseline="0" dirty="0" smtClean="0"/>
+              <a:t>Coverage is mostly applicable to UNIT tests.</a:t>
+            </a:r>
+          </a:p>
+          <a:p>
+            <a:pPr marL="1085850" lvl="2" indent="-171450">
+              <a:buFont typeface="Arial" panose="020B0604020202020204" pitchFamily="34" charset="0"/>
+              <a:buChar char="•"/>
+            </a:pPr>
+            <a:r>
+              <a:rPr lang="en-US" u="none" baseline="0" dirty="0" smtClean="0"/>
+              <a:t>Without solid unit tests, coverage at the system level is intractable.</a:t>
+            </a:r>
+          </a:p>
+          <a:p>
+            <a:pPr marL="1085850" lvl="2" indent="-171450">
+              <a:buFont typeface="Arial" panose="020B0604020202020204" pitchFamily="34" charset="0"/>
+              <a:buChar char="•"/>
+            </a:pPr>
+            <a:r>
+              <a:rPr lang="en-US" u="none" baseline="0" dirty="0" smtClean="0"/>
+              <a:t>Solid unit tests, relive business-facing tests of trivial clutter and attendant brittleness.</a:t>
+            </a:r>
+          </a:p>
+          <a:p>
+            <a:pPr marL="171450" lvl="0" indent="-171450">
+              <a:buFont typeface="Arial" panose="020B0604020202020204" pitchFamily="34" charset="0"/>
+              <a:buChar char="•"/>
+            </a:pPr>
+            <a:r>
               <a:rPr lang="en-US" baseline="0" dirty="0" smtClean="0"/>
-              <a:t>Consistently sized “chunks” facilitate consistent development flow/velocity.</a:t>
+              <a:t>Make a decision: team should not pursue TDD or everyone must agree on using TDD.</a:t>
+            </a:r>
+          </a:p>
+          <a:p>
+            <a:pPr marL="628650" lvl="1" indent="-171450">
+              <a:buFont typeface="Arial" panose="020B0604020202020204" pitchFamily="34" charset="0"/>
+              <a:buChar char="•"/>
+            </a:pPr>
+            <a:r>
+              <a:rPr lang="en-US" baseline="0" dirty="0" smtClean="0"/>
+              <a:t>Don’t have TDD be implemented by half the team.</a:t>
             </a:r>
           </a:p>
           <a:p>
@@ -2076,142 +2312,10 @@
               <a:buFont typeface="Arial" panose="020B0604020202020204" pitchFamily="34" charset="0"/>
               <a:buChar char="•"/>
             </a:pPr>
-            <a:r>
-              <a:rPr lang="en-US" baseline="0" dirty="0" smtClean="0"/>
-              <a:t>Half the rest comes from the focus it brings to development.</a:t>
-            </a:r>
+            <a:endParaRPr lang="en-US" baseline="0" dirty="0" smtClean="0"/>
           </a:p>
           <a:p>
             <a:pPr marL="628650" lvl="1" indent="-171450">
-              <a:buFont typeface="Arial" panose="020B0604020202020204" pitchFamily="34" charset="0"/>
-              <a:buChar char="•"/>
-            </a:pPr>
-            <a:r>
-              <a:rPr lang="en-US" baseline="0" dirty="0" smtClean="0"/>
-              <a:t>“Need” something not in a scenario?  ASK THE PO!  You’re either missing a scenario or off-scope.</a:t>
-            </a:r>
-          </a:p>
-          <a:p>
-            <a:pPr marL="628650" lvl="1" indent="-171450">
-              <a:buFont typeface="Arial" panose="020B0604020202020204" pitchFamily="34" charset="0"/>
-              <a:buChar char="•"/>
-            </a:pPr>
-            <a:r>
-              <a:rPr lang="en-US" baseline="0" dirty="0" smtClean="0"/>
-              <a:t>Building to the tests greatly reduce “failure demand”</a:t>
-            </a:r>
-          </a:p>
-          <a:p>
-            <a:pPr marL="171450" lvl="0" indent="-171450">
-              <a:buFont typeface="Arial" panose="020B0604020202020204" pitchFamily="34" charset="0"/>
-              <a:buChar char="•"/>
-            </a:pPr>
-            <a:r>
-              <a:rPr lang="en-US" baseline="0" dirty="0" smtClean="0"/>
-              <a:t>We have the scenarios, so why not share them with QA?</a:t>
-            </a:r>
-          </a:p>
-          <a:p>
-            <a:pPr marL="628650" lvl="1" indent="-171450">
-              <a:buFont typeface="Arial" panose="020B0604020202020204" pitchFamily="34" charset="0"/>
-              <a:buChar char="•"/>
-            </a:pPr>
-            <a:r>
-              <a:rPr lang="en-US" baseline="0" dirty="0" smtClean="0"/>
-              <a:t>Let them get started while development proceeds.</a:t>
-            </a:r>
-          </a:p>
-          <a:p>
-            <a:pPr marL="628650" lvl="1" indent="-171450">
-              <a:buFont typeface="Arial" panose="020B0604020202020204" pitchFamily="34" charset="0"/>
-              <a:buChar char="•"/>
-            </a:pPr>
-            <a:r>
-              <a:rPr lang="en-US" baseline="0" dirty="0" smtClean="0"/>
-              <a:t>Provoke QA questions and feedback while there’s still time to address them.</a:t>
-            </a:r>
-          </a:p>
-          <a:p>
-            <a:pPr marL="171450" lvl="0" indent="-171450">
-              <a:buFont typeface="Arial" panose="020B0604020202020204" pitchFamily="34" charset="0"/>
-              <a:buChar char="•"/>
-            </a:pPr>
-            <a:r>
-              <a:rPr lang="en-US" baseline="0" dirty="0" smtClean="0"/>
-              <a:t>The LAST 10% comes from actually automating test execution. Like the Iceberg…</a:t>
-            </a:r>
-          </a:p>
-          <a:p>
-            <a:pPr marL="628650" marR="0" lvl="1" indent="-171450" algn="l" defTabSz="457200" rtl="0" eaLnBrk="1" fontAlgn="auto" latinLnBrk="0" hangingPunct="1">
-              <a:lnSpc>
-                <a:spcPct val="100000"/>
-              </a:lnSpc>
-              <a:spcBef>
-                <a:spcPts val="0"/>
-              </a:spcBef>
-              <a:spcAft>
-                <a:spcPts val="0"/>
-              </a:spcAft>
-              <a:buClrTx/>
-              <a:buSzTx/>
-              <a:buFont typeface="Arial" panose="020B0604020202020204" pitchFamily="34" charset="0"/>
-              <a:buChar char="•"/>
-              <a:tabLst/>
-              <a:defRPr/>
-            </a:pPr>
-            <a:r>
-              <a:rPr lang="en-US" baseline="0" dirty="0" smtClean="0"/>
-              <a:t>Rally experience:  Dropping “Bug Bash”</a:t>
-            </a:r>
-          </a:p>
-          <a:p>
-            <a:pPr marL="628650" marR="0" lvl="1" indent="-171450" algn="l" defTabSz="457200" rtl="0" eaLnBrk="1" fontAlgn="auto" latinLnBrk="0" hangingPunct="1">
-              <a:lnSpc>
-                <a:spcPct val="100000"/>
-              </a:lnSpc>
-              <a:spcBef>
-                <a:spcPts val="0"/>
-              </a:spcBef>
-              <a:spcAft>
-                <a:spcPts val="0"/>
-              </a:spcAft>
-              <a:buClrTx/>
-              <a:buSzTx/>
-              <a:buFont typeface="Arial" panose="020B0604020202020204" pitchFamily="34" charset="0"/>
-              <a:buChar char="•"/>
-              <a:tabLst/>
-              <a:defRPr/>
-            </a:pPr>
-            <a:r>
-              <a:rPr lang="en-US" baseline="0" dirty="0" smtClean="0"/>
-              <a:t>Only this small tip is usually visible.</a:t>
-            </a:r>
-          </a:p>
-          <a:p>
-            <a:pPr marL="628650" marR="0" lvl="1" indent="-171450" algn="l" defTabSz="457200" rtl="0" eaLnBrk="1" fontAlgn="auto" latinLnBrk="0" hangingPunct="1">
-              <a:lnSpc>
-                <a:spcPct val="100000"/>
-              </a:lnSpc>
-              <a:spcBef>
-                <a:spcPts val="0"/>
-              </a:spcBef>
-              <a:spcAft>
-                <a:spcPts val="0"/>
-              </a:spcAft>
-              <a:buClrTx/>
-              <a:buSzTx/>
-              <a:buFont typeface="Arial" panose="020B0604020202020204" pitchFamily="34" charset="0"/>
-              <a:buChar char="•"/>
-              <a:tabLst/>
-              <a:defRPr/>
-            </a:pPr>
-            <a:r>
-              <a:rPr lang="en-US" baseline="0" dirty="0" smtClean="0"/>
-              <a:t>But it’s only visible BECAUSE it’s riding on what’s below.  That’s what’s actually floating.</a:t>
-            </a:r>
-          </a:p>
-          <a:p>
-            <a:pPr marL="171450" lvl="0" indent="-171450">
               <a:buFont typeface="Arial" panose="020B0604020202020204" pitchFamily="34" charset="0"/>
               <a:buChar char="•"/>
             </a:pPr>
@@ -2245,7 +2349,7 @@
     </p:spTree>
     <p:extLst>
       <p:ext uri="{BB962C8B-B14F-4D97-AF65-F5344CB8AC3E}">
-        <p14:creationId xmlns:p14="http://schemas.microsoft.com/office/powerpoint/2010/main" val="901864340"/>
+        <p14:creationId xmlns:p14="http://schemas.microsoft.com/office/powerpoint/2010/main" val="437793297"/>
       </p:ext>
     </p:extLst>
   </p:cSld>
@@ -2299,13 +2403,27 @@
           <a:bodyPr/>
           <a:lstStyle/>
           <a:p>
+            <a:pPr marL="0" indent="0">
+              <a:buFont typeface="Arial" panose="020B0604020202020204" pitchFamily="34" charset="0"/>
+              <a:buNone/>
+            </a:pPr>
+            <a:r>
+              <a:rPr lang="en-US" dirty="0" smtClean="0"/>
+              <a:t>(Lance)</a:t>
+            </a:r>
+          </a:p>
+          <a:p>
             <a:pPr marL="171450" indent="-171450">
               <a:buFont typeface="Arial" panose="020B0604020202020204" pitchFamily="34" charset="0"/>
               <a:buChar char="•"/>
             </a:pPr>
             <a:r>
               <a:rPr lang="en-US" dirty="0" smtClean="0"/>
-              <a:t>When we taught the program to learn a new word, we started with it’s</a:t>
+              <a:t>When </a:t>
+            </a:r>
+            <a:r>
+              <a:rPr lang="en-US" dirty="0" smtClean="0"/>
+              <a:t>we taught the program to learn a new word, we started with it’s</a:t>
             </a:r>
             <a:r>
               <a:rPr lang="en-US" baseline="0" dirty="0" smtClean="0"/>
@@ -2534,7 +2652,217 @@
           <a:bodyPr/>
           <a:lstStyle/>
           <a:p>
-            <a:endParaRPr lang="en-US" dirty="0" smtClean="0"/>
+            <a:pPr marL="171450" indent="-171450">
+              <a:buFont typeface="Arial" panose="020B0604020202020204" pitchFamily="34" charset="0"/>
+              <a:buChar char="•"/>
+            </a:pPr>
+            <a:r>
+              <a:rPr lang="en-US" dirty="0" smtClean="0"/>
+              <a:t>Growing</a:t>
+            </a:r>
+            <a:r>
+              <a:rPr lang="en-US" baseline="0" dirty="0" smtClean="0"/>
+              <a:t> OO S/W Guided by Tests:</a:t>
+            </a:r>
+          </a:p>
+          <a:p>
+            <a:pPr marL="628650" lvl="1" indent="-171450">
+              <a:buFont typeface="Arial" panose="020B0604020202020204" pitchFamily="34" charset="0"/>
+              <a:buChar char="•"/>
+            </a:pPr>
+            <a:r>
+              <a:rPr lang="en-US" baseline="0" dirty="0" smtClean="0"/>
+              <a:t>Tool agnostic, but uses JUnit for the examples.</a:t>
+            </a:r>
+          </a:p>
+          <a:p>
+            <a:pPr marL="628650" lvl="1" indent="-171450">
+              <a:buFont typeface="Arial" panose="020B0604020202020204" pitchFamily="34" charset="0"/>
+              <a:buChar char="•"/>
+            </a:pPr>
+            <a:r>
+              <a:rPr lang="en-US" baseline="0" dirty="0" smtClean="0"/>
+              <a:t>Excellent deep-dive into actually doing it in a way that reaps the benefits</a:t>
+            </a:r>
+          </a:p>
+          <a:p>
+            <a:pPr marL="171450" lvl="0" indent="-171450">
+              <a:buFont typeface="Arial" panose="020B0604020202020204" pitchFamily="34" charset="0"/>
+              <a:buChar char="•"/>
+            </a:pPr>
+            <a:r>
+              <a:rPr lang="en-US" baseline="0" dirty="0" smtClean="0"/>
+              <a:t>The Cucumber Book</a:t>
+            </a:r>
+          </a:p>
+          <a:p>
+            <a:pPr marL="628650" lvl="1" indent="-171450">
+              <a:buFont typeface="Arial" panose="020B0604020202020204" pitchFamily="34" charset="0"/>
+              <a:buChar char="•"/>
+            </a:pPr>
+            <a:r>
+              <a:rPr lang="en-US" baseline="0" dirty="0" smtClean="0"/>
+              <a:t>Examples in Ruby – much cleaner than Java, and you learn Ruby for free!</a:t>
+            </a:r>
+          </a:p>
+          <a:p>
+            <a:pPr marL="171450" lvl="0" indent="-171450">
+              <a:buFont typeface="Arial" panose="020B0604020202020204" pitchFamily="34" charset="0"/>
+              <a:buChar char="•"/>
+            </a:pPr>
+            <a:r>
+              <a:rPr lang="en-US" baseline="0" dirty="0" smtClean="0"/>
+              <a:t>The Cucumber </a:t>
+            </a:r>
+            <a:r>
+              <a:rPr lang="en-US" b="1" baseline="0" dirty="0" smtClean="0"/>
+              <a:t>For Java </a:t>
+            </a:r>
+            <a:r>
+              <a:rPr lang="en-US" baseline="0" dirty="0" smtClean="0"/>
+              <a:t>Book</a:t>
+            </a:r>
+          </a:p>
+          <a:p>
+            <a:pPr marL="628650" lvl="1" indent="-171450">
+              <a:buFont typeface="Arial" panose="020B0604020202020204" pitchFamily="34" charset="0"/>
+              <a:buChar char="•"/>
+            </a:pPr>
+            <a:r>
+              <a:rPr lang="en-US" baseline="0" dirty="0" smtClean="0"/>
+              <a:t>Full substitute for the Ruby version, may be more accessible to Java/C# folks.</a:t>
+            </a:r>
+          </a:p>
+          <a:p>
+            <a:pPr marL="628650" lvl="1" indent="-171450">
+              <a:buFont typeface="Arial" panose="020B0604020202020204" pitchFamily="34" charset="0"/>
+              <a:buChar char="•"/>
+            </a:pPr>
+            <a:r>
+              <a:rPr lang="en-US" baseline="0" dirty="0" smtClean="0"/>
+              <a:t>No matter your role or language preference, AT LEAST CHECK OUT “UNCLE BOB” MARTIN’S FORWARD</a:t>
+            </a:r>
+          </a:p>
+          <a:p>
+            <a:pPr marL="171450" lvl="0" indent="-171450">
+              <a:buFont typeface="Arial" panose="020B0604020202020204" pitchFamily="34" charset="0"/>
+              <a:buChar char="•"/>
+            </a:pPr>
+            <a:r>
+              <a:rPr lang="en-US" u="sng" baseline="0" dirty="0" smtClean="0"/>
+              <a:t>Cucumber </a:t>
+            </a:r>
+            <a:r>
+              <a:rPr lang="en-US" u="sng" baseline="0" dirty="0" err="1" smtClean="0"/>
+              <a:t>Recipies</a:t>
+            </a:r>
+            <a:endParaRPr lang="en-US" u="none" baseline="0" dirty="0" smtClean="0"/>
+          </a:p>
+          <a:p>
+            <a:pPr marL="628650" lvl="1" indent="-171450">
+              <a:buFont typeface="Arial" panose="020B0604020202020204" pitchFamily="34" charset="0"/>
+              <a:buChar char="•"/>
+            </a:pPr>
+            <a:r>
+              <a:rPr lang="en-US" u="none" baseline="0" dirty="0" smtClean="0"/>
+              <a:t>“Canned” solutions (at least, starter solutions) to many real-world needs that might bog down without a helping hand.</a:t>
+            </a:r>
+          </a:p>
+          <a:p>
+            <a:pPr marL="628650" lvl="1" indent="-171450">
+              <a:buFont typeface="Arial" panose="020B0604020202020204" pitchFamily="34" charset="0"/>
+              <a:buChar char="•"/>
+            </a:pPr>
+            <a:r>
+              <a:rPr lang="en-US" u="none" baseline="0" dirty="0" smtClean="0"/>
+              <a:t>43 </a:t>
+            </a:r>
+            <a:r>
+              <a:rPr lang="en-US" u="none" baseline="0" dirty="0" err="1" smtClean="0"/>
+              <a:t>Recipies</a:t>
+            </a:r>
+            <a:r>
+              <a:rPr lang="en-US" u="none" baseline="0" dirty="0" smtClean="0"/>
+              <a:t> of many types</a:t>
+            </a:r>
+          </a:p>
+          <a:p>
+            <a:pPr marL="1085850" lvl="2" indent="-171450">
+              <a:buFont typeface="Arial" panose="020B0604020202020204" pitchFamily="34" charset="0"/>
+              <a:buChar char="•"/>
+            </a:pPr>
+            <a:r>
+              <a:rPr lang="en-US" u="none" baseline="0" dirty="0" smtClean="0"/>
+              <a:t>CI (reports/docs, parallel testing, even wire protocol)</a:t>
+            </a:r>
+          </a:p>
+          <a:p>
+            <a:pPr marL="1085850" lvl="2" indent="-171450">
+              <a:buFont typeface="Arial" panose="020B0604020202020204" pitchFamily="34" charset="0"/>
+              <a:buChar char="•"/>
+            </a:pPr>
+            <a:r>
+              <a:rPr lang="en-US" u="none" baseline="0" dirty="0" smtClean="0"/>
+              <a:t>Platforms (Android, iOS, PHP, Flash, .NET, Web, Windows, Mac, even Arduino)</a:t>
+            </a:r>
+          </a:p>
+          <a:p>
+            <a:pPr marL="1085850" lvl="2" indent="-171450">
+              <a:buFont typeface="Arial" panose="020B0604020202020204" pitchFamily="34" charset="0"/>
+              <a:buChar char="•"/>
+            </a:pPr>
+            <a:r>
+              <a:rPr lang="en-US" u="none" baseline="0" dirty="0" smtClean="0"/>
+              <a:t>Frameworks (Hibernate, Spring, Swing</a:t>
+            </a:r>
+          </a:p>
+          <a:p>
+            <a:pPr marL="1085850" lvl="2" indent="-171450">
+              <a:buFont typeface="Arial" panose="020B0604020202020204" pitchFamily="34" charset="0"/>
+              <a:buChar char="•"/>
+            </a:pPr>
+            <a:r>
+              <a:rPr lang="en-US" u="none" baseline="0" dirty="0" smtClean="0"/>
+              <a:t>Languages (JavaScript, </a:t>
+            </a:r>
+            <a:r>
+              <a:rPr lang="en-US" u="none" baseline="0" dirty="0" err="1" smtClean="0"/>
+              <a:t>Erlang</a:t>
+            </a:r>
+            <a:r>
+              <a:rPr lang="en-US" u="none" baseline="0" dirty="0" smtClean="0"/>
+              <a:t>, </a:t>
+            </a:r>
+            <a:r>
+              <a:rPr lang="en-US" u="none" baseline="0" dirty="0" err="1" smtClean="0"/>
+              <a:t>Lua</a:t>
+            </a:r>
+            <a:r>
+              <a:rPr lang="en-US" u="none" baseline="0" dirty="0" smtClean="0"/>
+              <a:t>, </a:t>
+            </a:r>
+            <a:r>
+              <a:rPr lang="en-US" u="none" baseline="0" dirty="0" err="1" smtClean="0"/>
+              <a:t>Clojure</a:t>
+            </a:r>
+            <a:r>
+              <a:rPr lang="en-US" u="none" baseline="0" dirty="0" smtClean="0"/>
+              <a:t>, Scala, HTML)</a:t>
+            </a:r>
+          </a:p>
+          <a:p>
+            <a:pPr marL="1085850" lvl="2" indent="-171450">
+              <a:buFont typeface="Arial" panose="020B0604020202020204" pitchFamily="34" charset="0"/>
+              <a:buChar char="•"/>
+            </a:pPr>
+            <a:endParaRPr lang="en-US" u="none" baseline="0" dirty="0" smtClean="0"/>
+          </a:p>
+          <a:p>
+            <a:pPr marL="628650" lvl="1" indent="-171450">
+              <a:buFont typeface="Arial" panose="020B0604020202020204" pitchFamily="34" charset="0"/>
+              <a:buChar char="•"/>
+            </a:pPr>
+            <a:endParaRPr lang="en-US" u="sng" dirty="0" smtClean="0"/>
           </a:p>
         </p:txBody>
       </p:sp>
@@ -2564,7 +2892,7 @@
     </p:spTree>
     <p:extLst>
       <p:ext uri="{BB962C8B-B14F-4D97-AF65-F5344CB8AC3E}">
-        <p14:creationId xmlns:p14="http://schemas.microsoft.com/office/powerpoint/2010/main" val="2200448088"/>
+        <p14:creationId xmlns:p14="http://schemas.microsoft.com/office/powerpoint/2010/main" val="901864340"/>
       </p:ext>
     </p:extLst>
   </p:cSld>
@@ -2648,7 +2976,7 @@
     </p:spTree>
     <p:extLst>
       <p:ext uri="{BB962C8B-B14F-4D97-AF65-F5344CB8AC3E}">
-        <p14:creationId xmlns:p14="http://schemas.microsoft.com/office/powerpoint/2010/main" val="901864340"/>
+        <p14:creationId xmlns:p14="http://schemas.microsoft.com/office/powerpoint/2010/main" val="2200448088"/>
       </p:ext>
     </p:extLst>
   </p:cSld>
@@ -2702,10 +3030,7 @@
           <a:bodyPr/>
           <a:lstStyle/>
           <a:p>
-            <a:r>
-              <a:rPr lang="en-US" dirty="0" smtClean="0"/>
-              <a:t>Alyse</a:t>
-            </a:r>
+            <a:endParaRPr lang="en-US" dirty="0" smtClean="0"/>
           </a:p>
         </p:txBody>
       </p:sp>
@@ -2727,300 +3052,6 @@
             <a:fld id="{E21DFC0F-C2D6-4D4F-833C-833AEE8F6822}" type="slidenum">
               <a:rPr lang="en-US" smtClean="0"/>
               <a:t>18</a:t>
-            </a:fld>
-            <a:endParaRPr lang="en-US"/>
-          </a:p>
-        </p:txBody>
-      </p:sp>
-    </p:spTree>
-    <p:extLst>
-      <p:ext uri="{BB962C8B-B14F-4D97-AF65-F5344CB8AC3E}">
-        <p14:creationId xmlns:p14="http://schemas.microsoft.com/office/powerpoint/2010/main" val="901864340"/>
-      </p:ext>
-    </p:extLst>
-  </p:cSld>
-  <p:clrMapOvr>
-    <a:masterClrMapping/>
-  </p:clrMapOvr>
-</p:notes>
-</file>
-
-<file path=ppt/notesSlides/notesSlide19.xml><?xml version="1.0" encoding="utf-8"?>
-<p:notes xmlns:a="http://schemas.openxmlformats.org/drawingml/2006/main" xmlns:r="http://schemas.openxmlformats.org/officeDocument/2006/relationships" xmlns:p="http://schemas.openxmlformats.org/presentationml/2006/main">
-  <p:cSld>
-    <p:spTree>
-      <p:nvGrpSpPr>
-        <p:cNvPr id="1" name=""/>
-        <p:cNvGrpSpPr/>
-        <p:nvPr/>
-      </p:nvGrpSpPr>
-      <p:grpSpPr>
-        <a:xfrm>
-          <a:off x="0" y="0"/>
-          <a:ext cx="0" cy="0"/>
-          <a:chOff x="0" y="0"/>
-          <a:chExt cx="0" cy="0"/>
-        </a:xfrm>
-      </p:grpSpPr>
-      <p:sp>
-        <p:nvSpPr>
-          <p:cNvPr id="2" name="Slide Image Placeholder 1"/>
-          <p:cNvSpPr>
-            <a:spLocks noGrp="1" noRot="1" noChangeAspect="1"/>
-          </p:cNvSpPr>
-          <p:nvPr>
-            <p:ph type="sldImg"/>
-          </p:nvPr>
-        </p:nvSpPr>
-        <p:spPr/>
-      </p:sp>
-      <p:sp>
-        <p:nvSpPr>
-          <p:cNvPr id="3" name="Notes Placeholder 2"/>
-          <p:cNvSpPr>
-            <a:spLocks noGrp="1"/>
-          </p:cNvSpPr>
-          <p:nvPr>
-            <p:ph type="body" idx="1"/>
-          </p:nvPr>
-        </p:nvSpPr>
-        <p:spPr/>
-        <p:txBody>
-          <a:bodyPr/>
-          <a:lstStyle/>
-          <a:p>
-            <a:pPr marL="171450" indent="-171450">
-              <a:buFont typeface="Arial" panose="020B0604020202020204" pitchFamily="34" charset="0"/>
-              <a:buChar char="•"/>
-            </a:pPr>
-            <a:r>
-              <a:rPr lang="en-US" dirty="0" smtClean="0"/>
-              <a:t>Growing</a:t>
-            </a:r>
-            <a:r>
-              <a:rPr lang="en-US" baseline="0" dirty="0" smtClean="0"/>
-              <a:t> OO S/W Guided by Tests:</a:t>
-            </a:r>
-          </a:p>
-          <a:p>
-            <a:pPr marL="628650" lvl="1" indent="-171450">
-              <a:buFont typeface="Arial" panose="020B0604020202020204" pitchFamily="34" charset="0"/>
-              <a:buChar char="•"/>
-            </a:pPr>
-            <a:r>
-              <a:rPr lang="en-US" baseline="0" dirty="0" smtClean="0"/>
-              <a:t>Tool agnostic, but uses JUnit for the examples.</a:t>
-            </a:r>
-          </a:p>
-          <a:p>
-            <a:pPr marL="628650" lvl="1" indent="-171450">
-              <a:buFont typeface="Arial" panose="020B0604020202020204" pitchFamily="34" charset="0"/>
-              <a:buChar char="•"/>
-            </a:pPr>
-            <a:r>
-              <a:rPr lang="en-US" baseline="0" dirty="0" smtClean="0"/>
-              <a:t>Excellent deep-dive into actually doing it in a way that reaps the benefits</a:t>
-            </a:r>
-          </a:p>
-          <a:p>
-            <a:pPr marL="171450" lvl="0" indent="-171450">
-              <a:buFont typeface="Arial" panose="020B0604020202020204" pitchFamily="34" charset="0"/>
-              <a:buChar char="•"/>
-            </a:pPr>
-            <a:r>
-              <a:rPr lang="en-US" baseline="0" dirty="0" smtClean="0"/>
-              <a:t>The Cucumber Book</a:t>
-            </a:r>
-          </a:p>
-          <a:p>
-            <a:pPr marL="628650" lvl="1" indent="-171450">
-              <a:buFont typeface="Arial" panose="020B0604020202020204" pitchFamily="34" charset="0"/>
-              <a:buChar char="•"/>
-            </a:pPr>
-            <a:r>
-              <a:rPr lang="en-US" baseline="0" dirty="0" smtClean="0"/>
-              <a:t>Examples in Ruby – much cleaner than Java, and you learn Ruby for free!</a:t>
-            </a:r>
-          </a:p>
-          <a:p>
-            <a:pPr marL="171450" lvl="0" indent="-171450">
-              <a:buFont typeface="Arial" panose="020B0604020202020204" pitchFamily="34" charset="0"/>
-              <a:buChar char="•"/>
-            </a:pPr>
-            <a:r>
-              <a:rPr lang="en-US" baseline="0" dirty="0" smtClean="0"/>
-              <a:t>The Cucumber </a:t>
-            </a:r>
-            <a:r>
-              <a:rPr lang="en-US" b="1" baseline="0" dirty="0" smtClean="0"/>
-              <a:t>For Java </a:t>
-            </a:r>
-            <a:r>
-              <a:rPr lang="en-US" baseline="0" dirty="0" smtClean="0"/>
-              <a:t>Book</a:t>
-            </a:r>
-          </a:p>
-          <a:p>
-            <a:pPr marL="628650" lvl="1" indent="-171450">
-              <a:buFont typeface="Arial" panose="020B0604020202020204" pitchFamily="34" charset="0"/>
-              <a:buChar char="•"/>
-            </a:pPr>
-            <a:r>
-              <a:rPr lang="en-US" baseline="0" dirty="0" smtClean="0"/>
-              <a:t>Full substitute for the Ruby version, may be more accessible to Java/C# folks.</a:t>
-            </a:r>
-          </a:p>
-          <a:p>
-            <a:pPr marL="628650" lvl="1" indent="-171450">
-              <a:buFont typeface="Arial" panose="020B0604020202020204" pitchFamily="34" charset="0"/>
-              <a:buChar char="•"/>
-            </a:pPr>
-            <a:r>
-              <a:rPr lang="en-US" baseline="0" dirty="0" smtClean="0"/>
-              <a:t>No matter your role or language preference, AT LEAST CHECK OUT “UNCLE BOB” MARTIN’S FORWARD</a:t>
-            </a:r>
-          </a:p>
-          <a:p>
-            <a:pPr marL="171450" lvl="0" indent="-171450">
-              <a:buFont typeface="Arial" panose="020B0604020202020204" pitchFamily="34" charset="0"/>
-              <a:buChar char="•"/>
-            </a:pPr>
-            <a:r>
-              <a:rPr lang="en-US" u="sng" baseline="0" dirty="0" smtClean="0"/>
-              <a:t>Cucumber </a:t>
-            </a:r>
-            <a:r>
-              <a:rPr lang="en-US" u="sng" baseline="0" dirty="0" err="1" smtClean="0"/>
-              <a:t>Recipies</a:t>
-            </a:r>
-            <a:endParaRPr lang="en-US" u="none" baseline="0" dirty="0" smtClean="0"/>
-          </a:p>
-          <a:p>
-            <a:pPr marL="628650" lvl="1" indent="-171450">
-              <a:buFont typeface="Arial" panose="020B0604020202020204" pitchFamily="34" charset="0"/>
-              <a:buChar char="•"/>
-            </a:pPr>
-            <a:r>
-              <a:rPr lang="en-US" u="none" baseline="0" dirty="0" smtClean="0"/>
-              <a:t>“Canned” solutions (at least, starter solutions) to many real-world needs that might bog down without a helping hand.</a:t>
-            </a:r>
-          </a:p>
-          <a:p>
-            <a:pPr marL="628650" lvl="1" indent="-171450">
-              <a:buFont typeface="Arial" panose="020B0604020202020204" pitchFamily="34" charset="0"/>
-              <a:buChar char="•"/>
-            </a:pPr>
-            <a:r>
-              <a:rPr lang="en-US" u="none" baseline="0" dirty="0" smtClean="0"/>
-              <a:t>43 </a:t>
-            </a:r>
-            <a:r>
-              <a:rPr lang="en-US" u="none" baseline="0" dirty="0" err="1" smtClean="0"/>
-              <a:t>Recipies</a:t>
-            </a:r>
-            <a:r>
-              <a:rPr lang="en-US" u="none" baseline="0" dirty="0" smtClean="0"/>
-              <a:t> of many types</a:t>
-            </a:r>
-          </a:p>
-          <a:p>
-            <a:pPr marL="1085850" lvl="2" indent="-171450">
-              <a:buFont typeface="Arial" panose="020B0604020202020204" pitchFamily="34" charset="0"/>
-              <a:buChar char="•"/>
-            </a:pPr>
-            <a:r>
-              <a:rPr lang="en-US" u="none" baseline="0" dirty="0" smtClean="0"/>
-              <a:t>CI (reports/docs, parallel testing, even wire protocol)</a:t>
-            </a:r>
-          </a:p>
-          <a:p>
-            <a:pPr marL="1085850" lvl="2" indent="-171450">
-              <a:buFont typeface="Arial" panose="020B0604020202020204" pitchFamily="34" charset="0"/>
-              <a:buChar char="•"/>
-            </a:pPr>
-            <a:r>
-              <a:rPr lang="en-US" u="none" baseline="0" dirty="0" smtClean="0"/>
-              <a:t>Platforms (Android, iOS, PHP, Flash, .NET, Web, Windows, Mac, even Arduino)</a:t>
-            </a:r>
-          </a:p>
-          <a:p>
-            <a:pPr marL="1085850" lvl="2" indent="-171450">
-              <a:buFont typeface="Arial" panose="020B0604020202020204" pitchFamily="34" charset="0"/>
-              <a:buChar char="•"/>
-            </a:pPr>
-            <a:r>
-              <a:rPr lang="en-US" u="none" baseline="0" dirty="0" smtClean="0"/>
-              <a:t>Frameworks (Hibernate, Spring, Swing</a:t>
-            </a:r>
-          </a:p>
-          <a:p>
-            <a:pPr marL="1085850" lvl="2" indent="-171450">
-              <a:buFont typeface="Arial" panose="020B0604020202020204" pitchFamily="34" charset="0"/>
-              <a:buChar char="•"/>
-            </a:pPr>
-            <a:r>
-              <a:rPr lang="en-US" u="none" baseline="0" dirty="0" smtClean="0"/>
-              <a:t>Languages (JavaScript, </a:t>
-            </a:r>
-            <a:r>
-              <a:rPr lang="en-US" u="none" baseline="0" dirty="0" err="1" smtClean="0"/>
-              <a:t>Erlang</a:t>
-            </a:r>
-            <a:r>
-              <a:rPr lang="en-US" u="none" baseline="0" dirty="0" smtClean="0"/>
-              <a:t>, </a:t>
-            </a:r>
-            <a:r>
-              <a:rPr lang="en-US" u="none" baseline="0" dirty="0" err="1" smtClean="0"/>
-              <a:t>Lua</a:t>
-            </a:r>
-            <a:r>
-              <a:rPr lang="en-US" u="none" baseline="0" dirty="0" smtClean="0"/>
-              <a:t>, </a:t>
-            </a:r>
-            <a:r>
-              <a:rPr lang="en-US" u="none" baseline="0" dirty="0" err="1" smtClean="0"/>
-              <a:t>Clojure</a:t>
-            </a:r>
-            <a:r>
-              <a:rPr lang="en-US" u="none" baseline="0" dirty="0" smtClean="0"/>
-              <a:t>, Scala, HTML)</a:t>
-            </a:r>
-          </a:p>
-          <a:p>
-            <a:pPr marL="1085850" lvl="2" indent="-171450">
-              <a:buFont typeface="Arial" panose="020B0604020202020204" pitchFamily="34" charset="0"/>
-              <a:buChar char="•"/>
-            </a:pPr>
-            <a:endParaRPr lang="en-US" u="none" baseline="0" dirty="0" smtClean="0"/>
-          </a:p>
-          <a:p>
-            <a:pPr marL="628650" lvl="1" indent="-171450">
-              <a:buFont typeface="Arial" panose="020B0604020202020204" pitchFamily="34" charset="0"/>
-              <a:buChar char="•"/>
-            </a:pPr>
-            <a:endParaRPr lang="en-US" u="sng" dirty="0" smtClean="0"/>
-          </a:p>
-        </p:txBody>
-      </p:sp>
-      <p:sp>
-        <p:nvSpPr>
-          <p:cNvPr id="4" name="Slide Number Placeholder 3"/>
-          <p:cNvSpPr>
-            <a:spLocks noGrp="1"/>
-          </p:cNvSpPr>
-          <p:nvPr>
-            <p:ph type="sldNum" sz="quarter" idx="10"/>
-          </p:nvPr>
-        </p:nvSpPr>
-        <p:spPr/>
-        <p:txBody>
-          <a:bodyPr/>
-          <a:lstStyle/>
-          <a:p>
-            <a:fld id="{E21DFC0F-C2D6-4D4F-833C-833AEE8F6822}" type="slidenum">
-              <a:rPr lang="en-US" smtClean="0"/>
-              <a:t>19</a:t>
             </a:fld>
             <a:endParaRPr lang="en-US"/>
           </a:p>
@@ -3184,7 +3215,19 @@
                 <a:ea typeface="+mn-ea"/>
                 <a:cs typeface="+mn-cs"/>
               </a:rPr>
-              <a:t>Gall’s Law:  </a:t>
+              <a:t>Gall’s </a:t>
+            </a:r>
+            <a:r>
+              <a:rPr lang="en-US" sz="1200" b="0" i="0" kern="1200" dirty="0" smtClean="0">
+                <a:solidFill>
+                  <a:schemeClr val="tx1"/>
+                </a:solidFill>
+                <a:effectLst/>
+                <a:latin typeface="+mn-lt"/>
+                <a:ea typeface="+mn-ea"/>
+                <a:cs typeface="+mn-cs"/>
+              </a:rPr>
+              <a:t>Law:  </a:t>
             </a:r>
             <a:r>
               <a:rPr lang="en-US" sz="1200" b="0" i="1" kern="1200" dirty="0" smtClean="0">
@@ -3360,7 +3403,17 @@
                 <a:latin typeface="Arial" panose="020B0604020202020204" pitchFamily="34" charset="0"/>
                 <a:cs typeface="Arial" panose="020B0604020202020204" pitchFamily="34" charset="0"/>
               </a:rPr>
-              <a:t>ATDD:  Building the Right Thing</a:t>
+              <a:t>ATDD</a:t>
+            </a:r>
+            <a:r>
+              <a:rPr lang="en-US" sz="2400" baseline="0" dirty="0" smtClean="0">
+                <a:solidFill>
+                  <a:prstClr val="black"/>
+                </a:solidFill>
+                <a:latin typeface="Arial" panose="020B0604020202020204" pitchFamily="34" charset="0"/>
+                <a:cs typeface="Arial" panose="020B0604020202020204" pitchFamily="34" charset="0"/>
+              </a:rPr>
+              <a:t>:  Building the Right Thing</a:t>
             </a:r>
           </a:p>
           <a:p>
@@ -8506,287 +8559,6 @@
           <a:lstStyle/>
           <a:p>
             <a:r>
-              <a:rPr lang="en-US" dirty="0" smtClean="0"/>
-              <a:t>Common Concerns with TDD</a:t>
-            </a:r>
-            <a:endParaRPr lang="en-US" dirty="0"/>
-          </a:p>
-        </p:txBody>
-      </p:sp>
-      <p:sp>
-        <p:nvSpPr>
-          <p:cNvPr id="3" name="TextBox 2"/>
-          <p:cNvSpPr txBox="1"/>
-          <p:nvPr/>
-        </p:nvSpPr>
-        <p:spPr>
-          <a:xfrm>
-            <a:off x="457200" y="1184032"/>
-            <a:ext cx="8381999" cy="5693866"/>
-          </a:xfrm>
-          <a:prstGeom prst="rect">
-            <a:avLst/>
-          </a:prstGeom>
-          <a:noFill/>
-        </p:spPr>
-        <p:txBody>
-          <a:bodyPr wrap="square" rtlCol="0">
-            <a:spAutoFit/>
-          </a:bodyPr>
-          <a:lstStyle/>
-          <a:p>
-            <a:pPr marL="457200" indent="-457200">
-              <a:buFont typeface="Arial" panose="020B0604020202020204" pitchFamily="34" charset="0"/>
-              <a:buChar char="•"/>
-            </a:pPr>
-            <a:r>
-              <a:rPr lang="en-US" sz="2800" dirty="0" smtClean="0"/>
-              <a:t>“It’s not scalable”</a:t>
-            </a:r>
-          </a:p>
-          <a:p>
-            <a:pPr marL="914400" lvl="1" indent="-457200">
-              <a:buFont typeface="Arial" panose="020B0604020202020204" pitchFamily="34" charset="0"/>
-              <a:buChar char="•"/>
-            </a:pPr>
-            <a:r>
-              <a:rPr lang="en-US" sz="2800" dirty="0" smtClean="0">
-                <a:solidFill>
-                  <a:prstClr val="black"/>
-                </a:solidFill>
-                <a:latin typeface="Arial" panose="020B0604020202020204" pitchFamily="34" charset="0"/>
-                <a:cs typeface="Arial" panose="020B0604020202020204" pitchFamily="34" charset="0"/>
-              </a:rPr>
-              <a:t>Tests take too long to write and/or run</a:t>
-            </a:r>
-          </a:p>
-          <a:p>
-            <a:pPr marL="914400" lvl="1" indent="-457200">
-              <a:buFont typeface="Wingdings" panose="05000000000000000000" pitchFamily="2" charset="2"/>
-              <a:buChar char="ü"/>
-            </a:pPr>
-            <a:r>
-              <a:rPr lang="en-US" sz="2800" dirty="0" smtClean="0">
-                <a:solidFill>
-                  <a:prstClr val="black"/>
-                </a:solidFill>
-                <a:latin typeface="Arial" panose="020B0604020202020204" pitchFamily="34" charset="0"/>
-                <a:cs typeface="Arial" panose="020B0604020202020204" pitchFamily="34" charset="0"/>
-              </a:rPr>
-              <a:t>Work around and through scalability</a:t>
-            </a:r>
-          </a:p>
-          <a:p>
-            <a:pPr marL="457200" indent="-457200">
-              <a:buFont typeface="Arial" panose="020B0604020202020204" pitchFamily="34" charset="0"/>
-              <a:buChar char="•"/>
-            </a:pPr>
-            <a:r>
-              <a:rPr lang="en-US" sz="2800" dirty="0" smtClean="0">
-                <a:solidFill>
-                  <a:prstClr val="black"/>
-                </a:solidFill>
-                <a:latin typeface="Arial" panose="020B0604020202020204" pitchFamily="34" charset="0"/>
-                <a:cs typeface="Arial" panose="020B0604020202020204" pitchFamily="34" charset="0"/>
-              </a:rPr>
-              <a:t>“We need 100% test coverage”</a:t>
-            </a:r>
-          </a:p>
-          <a:p>
-            <a:pPr marL="914400" lvl="1" indent="-457200">
-              <a:buFont typeface="Wingdings" panose="05000000000000000000" pitchFamily="2" charset="2"/>
-              <a:buChar char="ü"/>
-            </a:pPr>
-            <a:r>
-              <a:rPr lang="en-US" sz="2800" dirty="0" smtClean="0">
-                <a:solidFill>
-                  <a:prstClr val="black"/>
-                </a:solidFill>
-                <a:latin typeface="Arial" panose="020B0604020202020204" pitchFamily="34" charset="0"/>
-                <a:cs typeface="Arial" panose="020B0604020202020204" pitchFamily="34" charset="0"/>
-              </a:rPr>
-              <a:t>Well, then more is better, so let’s start.</a:t>
-            </a:r>
-          </a:p>
-          <a:p>
-            <a:pPr marL="914400" lvl="1" indent="-457200">
-              <a:buFont typeface="Wingdings" panose="05000000000000000000" pitchFamily="2" charset="2"/>
-              <a:buChar char="ü"/>
-            </a:pPr>
-            <a:r>
-              <a:rPr lang="en-US" sz="2800" dirty="0" smtClean="0">
-                <a:solidFill>
-                  <a:prstClr val="black"/>
-                </a:solidFill>
-                <a:latin typeface="Arial" panose="020B0604020202020204" pitchFamily="34" charset="0"/>
-                <a:cs typeface="Arial" panose="020B0604020202020204" pitchFamily="34" charset="0"/>
-              </a:rPr>
-              <a:t>What you need is to guide current work and protect it from regressions.  (See Feathers)</a:t>
-            </a:r>
-          </a:p>
-          <a:p>
-            <a:pPr marL="457200" indent="-457200">
-              <a:buFont typeface="Arial" panose="020B0604020202020204" pitchFamily="34" charset="0"/>
-              <a:buChar char="•"/>
-            </a:pPr>
-            <a:r>
-              <a:rPr lang="en-US" sz="2800" dirty="0" smtClean="0">
-                <a:solidFill>
-                  <a:prstClr val="black"/>
-                </a:solidFill>
-                <a:latin typeface="Arial" panose="020B0604020202020204" pitchFamily="34" charset="0"/>
-                <a:cs typeface="Arial" panose="020B0604020202020204" pitchFamily="34" charset="0"/>
-              </a:rPr>
-              <a:t>Everyone’s not utilizing TDD</a:t>
-            </a:r>
-          </a:p>
-          <a:p>
-            <a:pPr marL="914400" lvl="1" indent="-457200">
-              <a:buFont typeface="Wingdings" panose="05000000000000000000" pitchFamily="2" charset="2"/>
-              <a:buChar char="ü"/>
-            </a:pPr>
-            <a:r>
-              <a:rPr lang="en-US" sz="2800" dirty="0" smtClean="0">
-                <a:solidFill>
-                  <a:prstClr val="black"/>
-                </a:solidFill>
-                <a:latin typeface="Arial" panose="020B0604020202020204" pitchFamily="34" charset="0"/>
-                <a:cs typeface="Arial" panose="020B0604020202020204" pitchFamily="34" charset="0"/>
-              </a:rPr>
-              <a:t>Team needs consensus, not unanimity.</a:t>
-            </a:r>
-          </a:p>
-          <a:p>
-            <a:pPr marL="914400" lvl="1" indent="-457200">
-              <a:buFont typeface="Wingdings" panose="05000000000000000000" pitchFamily="2" charset="2"/>
-              <a:buChar char="ü"/>
-            </a:pPr>
-            <a:r>
-              <a:rPr lang="en-US" sz="2800" dirty="0" smtClean="0">
-                <a:solidFill>
-                  <a:prstClr val="black"/>
-                </a:solidFill>
-                <a:latin typeface="Arial" panose="020B0604020202020204" pitchFamily="34" charset="0"/>
-                <a:cs typeface="Arial" panose="020B0604020202020204" pitchFamily="34" charset="0"/>
-              </a:rPr>
-              <a:t>Try building consensus, if it is lacking.  </a:t>
-            </a:r>
-          </a:p>
-          <a:p>
-            <a:pPr marL="1371600" lvl="2" indent="-457200">
-              <a:buFont typeface="Wingdings" panose="05000000000000000000" pitchFamily="2" charset="2"/>
-              <a:buChar char="ü"/>
-            </a:pPr>
-            <a:r>
-              <a:rPr lang="en-US" sz="2800" dirty="0" smtClean="0">
-                <a:solidFill>
-                  <a:prstClr val="black"/>
-                </a:solidFill>
-                <a:latin typeface="Arial" panose="020B0604020202020204" pitchFamily="34" charset="0"/>
-                <a:cs typeface="Arial" panose="020B0604020202020204" pitchFamily="34" charset="0"/>
-              </a:rPr>
-              <a:t>Lunch &amp; Learns.  </a:t>
-            </a:r>
-            <a:r>
-              <a:rPr lang="en-US" sz="2800" dirty="0" smtClean="0">
-                <a:solidFill>
-                  <a:prstClr val="black"/>
-                </a:solidFill>
-                <a:latin typeface="Arial" panose="020B0604020202020204" pitchFamily="34" charset="0"/>
-                <a:cs typeface="Arial" panose="020B0604020202020204" pitchFamily="34" charset="0"/>
-                <a:sym typeface="Wingdings" panose="05000000000000000000" pitchFamily="2" charset="2"/>
-              </a:rPr>
-              <a:t></a:t>
-            </a:r>
-          </a:p>
-          <a:p>
-            <a:pPr marL="1371600" lvl="2" indent="-457200">
-              <a:buFont typeface="Wingdings" panose="05000000000000000000" pitchFamily="2" charset="2"/>
-              <a:buChar char="ü"/>
-            </a:pPr>
-            <a:r>
-              <a:rPr lang="en-US" sz="2800" dirty="0" smtClean="0">
-                <a:solidFill>
-                  <a:prstClr val="black"/>
-                </a:solidFill>
-                <a:latin typeface="Arial" panose="020B0604020202020204" pitchFamily="34" charset="0"/>
-                <a:cs typeface="Arial" panose="020B0604020202020204" pitchFamily="34" charset="0"/>
-                <a:sym typeface="Wingdings" panose="05000000000000000000" pitchFamily="2" charset="2"/>
-              </a:rPr>
-              <a:t>“Spike &amp; demo” for one app or component</a:t>
-            </a:r>
-            <a:endParaRPr lang="en-US" sz="2800" dirty="0">
-              <a:solidFill>
-                <a:prstClr val="black"/>
-              </a:solidFill>
-              <a:latin typeface="Arial" panose="020B0604020202020204" pitchFamily="34" charset="0"/>
-              <a:cs typeface="Arial" panose="020B0604020202020204" pitchFamily="34" charset="0"/>
-            </a:endParaRPr>
-          </a:p>
-          <a:p>
-            <a:pPr lvl="1"/>
-            <a:endParaRPr lang="en-US" sz="2800" dirty="0" smtClean="0"/>
-          </a:p>
-        </p:txBody>
-      </p:sp>
-    </p:spTree>
-    <p:extLst>
-      <p:ext uri="{BB962C8B-B14F-4D97-AF65-F5344CB8AC3E}">
-        <p14:creationId xmlns:p14="http://schemas.microsoft.com/office/powerpoint/2010/main" val="490219162"/>
-      </p:ext>
-    </p:extLst>
-  </p:cSld>
-  <p:clrMapOvr>
-    <a:masterClrMapping/>
-  </p:clrMapOvr>
-  <p:timing>
-    <p:tnLst>
-      <p:par>
-        <p:cTn id="1" dur="indefinite" restart="never" nodeType="tmRoot"/>
-      </p:par>
-    </p:tnLst>
-  </p:timing>
-</p:sld>
-</file>
-
-<file path=ppt/slides/slide14.xml><?xml version="1.0" encoding="utf-8"?>
-<p:sld xmlns:a="http://schemas.openxmlformats.org/drawingml/2006/main" xmlns:r="http://schemas.openxmlformats.org/officeDocument/2006/relationships" xmlns:p="http://schemas.openxmlformats.org/presentationml/2006/main">
-  <p:cSld>
-    <p:spTree>
-      <p:nvGrpSpPr>
-        <p:cNvPr id="1" name=""/>
-        <p:cNvGrpSpPr/>
-        <p:nvPr/>
-      </p:nvGrpSpPr>
-      <p:grpSpPr>
-        <a:xfrm>
-          <a:off x="0" y="0"/>
-          <a:ext cx="0" cy="0"/>
-          <a:chOff x="0" y="0"/>
-          <a:chExt cx="0" cy="0"/>
-        </a:xfrm>
-      </p:grpSpPr>
-      <p:sp>
-        <p:nvSpPr>
-          <p:cNvPr id="2" name="Title 1"/>
-          <p:cNvSpPr>
-            <a:spLocks noGrp="1"/>
-          </p:cNvSpPr>
-          <p:nvPr>
-            <p:ph type="ctrTitle"/>
-          </p:nvPr>
-        </p:nvSpPr>
-        <p:spPr>
-          <a:xfrm>
-            <a:off x="-3340" y="241034"/>
-            <a:ext cx="9144000" cy="623917"/>
-          </a:xfrm>
-        </p:spPr>
-        <p:txBody>
-          <a:bodyPr/>
-          <a:lstStyle/>
-          <a:p>
-            <a:r>
               <a:rPr lang="en-US" dirty="0"/>
               <a:t>L</a:t>
             </a:r>
@@ -9314,6 +9086,287 @@
 </p:sld>
 </file>
 
+<file path=ppt/slides/slide14.xml><?xml version="1.0" encoding="utf-8"?>
+<p:sld xmlns:a="http://schemas.openxmlformats.org/drawingml/2006/main" xmlns:r="http://schemas.openxmlformats.org/officeDocument/2006/relationships" xmlns:p="http://schemas.openxmlformats.org/presentationml/2006/main">
+  <p:cSld>
+    <p:spTree>
+      <p:nvGrpSpPr>
+        <p:cNvPr id="1" name=""/>
+        <p:cNvGrpSpPr/>
+        <p:nvPr/>
+      </p:nvGrpSpPr>
+      <p:grpSpPr>
+        <a:xfrm>
+          <a:off x="0" y="0"/>
+          <a:ext cx="0" cy="0"/>
+          <a:chOff x="0" y="0"/>
+          <a:chExt cx="0" cy="0"/>
+        </a:xfrm>
+      </p:grpSpPr>
+      <p:sp>
+        <p:nvSpPr>
+          <p:cNvPr id="2" name="Title 1"/>
+          <p:cNvSpPr>
+            <a:spLocks noGrp="1"/>
+          </p:cNvSpPr>
+          <p:nvPr>
+            <p:ph type="ctrTitle"/>
+          </p:nvPr>
+        </p:nvSpPr>
+        <p:spPr>
+          <a:xfrm>
+            <a:off x="-3340" y="241034"/>
+            <a:ext cx="9144000" cy="623917"/>
+          </a:xfrm>
+        </p:spPr>
+        <p:txBody>
+          <a:bodyPr/>
+          <a:lstStyle/>
+          <a:p>
+            <a:r>
+              <a:rPr lang="en-US" dirty="0" smtClean="0"/>
+              <a:t>Common Concerns with TDD</a:t>
+            </a:r>
+            <a:endParaRPr lang="en-US" dirty="0"/>
+          </a:p>
+        </p:txBody>
+      </p:sp>
+      <p:sp>
+        <p:nvSpPr>
+          <p:cNvPr id="3" name="TextBox 2"/>
+          <p:cNvSpPr txBox="1"/>
+          <p:nvPr/>
+        </p:nvSpPr>
+        <p:spPr>
+          <a:xfrm>
+            <a:off x="457200" y="1184032"/>
+            <a:ext cx="8381999" cy="5693866"/>
+          </a:xfrm>
+          <a:prstGeom prst="rect">
+            <a:avLst/>
+          </a:prstGeom>
+          <a:noFill/>
+        </p:spPr>
+        <p:txBody>
+          <a:bodyPr wrap="square" rtlCol="0">
+            <a:spAutoFit/>
+          </a:bodyPr>
+          <a:lstStyle/>
+          <a:p>
+            <a:pPr marL="457200" indent="-457200">
+              <a:buFont typeface="Arial" panose="020B0604020202020204" pitchFamily="34" charset="0"/>
+              <a:buChar char="•"/>
+            </a:pPr>
+            <a:r>
+              <a:rPr lang="en-US" sz="2800" dirty="0" smtClean="0"/>
+              <a:t>“It’s not scalable”</a:t>
+            </a:r>
+          </a:p>
+          <a:p>
+            <a:pPr marL="914400" lvl="1" indent="-457200">
+              <a:buFont typeface="Arial" panose="020B0604020202020204" pitchFamily="34" charset="0"/>
+              <a:buChar char="•"/>
+            </a:pPr>
+            <a:r>
+              <a:rPr lang="en-US" sz="2800" dirty="0" smtClean="0">
+                <a:solidFill>
+                  <a:prstClr val="black"/>
+                </a:solidFill>
+                <a:latin typeface="Arial" panose="020B0604020202020204" pitchFamily="34" charset="0"/>
+                <a:cs typeface="Arial" panose="020B0604020202020204" pitchFamily="34" charset="0"/>
+              </a:rPr>
+              <a:t>Tests take too long to write and/or run</a:t>
+            </a:r>
+          </a:p>
+          <a:p>
+            <a:pPr marL="914400" lvl="1" indent="-457200">
+              <a:buFont typeface="Wingdings" panose="05000000000000000000" pitchFamily="2" charset="2"/>
+              <a:buChar char="ü"/>
+            </a:pPr>
+            <a:r>
+              <a:rPr lang="en-US" sz="2800" dirty="0" smtClean="0">
+                <a:solidFill>
+                  <a:prstClr val="black"/>
+                </a:solidFill>
+                <a:latin typeface="Arial" panose="020B0604020202020204" pitchFamily="34" charset="0"/>
+                <a:cs typeface="Arial" panose="020B0604020202020204" pitchFamily="34" charset="0"/>
+              </a:rPr>
+              <a:t>Work around and through scalability</a:t>
+            </a:r>
+          </a:p>
+          <a:p>
+            <a:pPr marL="457200" indent="-457200">
+              <a:buFont typeface="Arial" panose="020B0604020202020204" pitchFamily="34" charset="0"/>
+              <a:buChar char="•"/>
+            </a:pPr>
+            <a:r>
+              <a:rPr lang="en-US" sz="2800" dirty="0" smtClean="0">
+                <a:solidFill>
+                  <a:prstClr val="black"/>
+                </a:solidFill>
+                <a:latin typeface="Arial" panose="020B0604020202020204" pitchFamily="34" charset="0"/>
+                <a:cs typeface="Arial" panose="020B0604020202020204" pitchFamily="34" charset="0"/>
+              </a:rPr>
+              <a:t>“We need 100% test coverage”</a:t>
+            </a:r>
+          </a:p>
+          <a:p>
+            <a:pPr marL="914400" lvl="1" indent="-457200">
+              <a:buFont typeface="Wingdings" panose="05000000000000000000" pitchFamily="2" charset="2"/>
+              <a:buChar char="ü"/>
+            </a:pPr>
+            <a:r>
+              <a:rPr lang="en-US" sz="2800" dirty="0" smtClean="0">
+                <a:solidFill>
+                  <a:prstClr val="black"/>
+                </a:solidFill>
+                <a:latin typeface="Arial" panose="020B0604020202020204" pitchFamily="34" charset="0"/>
+                <a:cs typeface="Arial" panose="020B0604020202020204" pitchFamily="34" charset="0"/>
+              </a:rPr>
+              <a:t>Well, then more is better, so let’s start.</a:t>
+            </a:r>
+          </a:p>
+          <a:p>
+            <a:pPr marL="914400" lvl="1" indent="-457200">
+              <a:buFont typeface="Wingdings" panose="05000000000000000000" pitchFamily="2" charset="2"/>
+              <a:buChar char="ü"/>
+            </a:pPr>
+            <a:r>
+              <a:rPr lang="en-US" sz="2800" dirty="0" smtClean="0">
+                <a:solidFill>
+                  <a:prstClr val="black"/>
+                </a:solidFill>
+                <a:latin typeface="Arial" panose="020B0604020202020204" pitchFamily="34" charset="0"/>
+                <a:cs typeface="Arial" panose="020B0604020202020204" pitchFamily="34" charset="0"/>
+              </a:rPr>
+              <a:t>What you need is to guide current work and protect it from regressions.  (See Feathers)</a:t>
+            </a:r>
+          </a:p>
+          <a:p>
+            <a:pPr marL="457200" indent="-457200">
+              <a:buFont typeface="Arial" panose="020B0604020202020204" pitchFamily="34" charset="0"/>
+              <a:buChar char="•"/>
+            </a:pPr>
+            <a:r>
+              <a:rPr lang="en-US" sz="2800" dirty="0" smtClean="0">
+                <a:solidFill>
+                  <a:prstClr val="black"/>
+                </a:solidFill>
+                <a:latin typeface="Arial" panose="020B0604020202020204" pitchFamily="34" charset="0"/>
+                <a:cs typeface="Arial" panose="020B0604020202020204" pitchFamily="34" charset="0"/>
+              </a:rPr>
+              <a:t>Everyone’s not utilizing TDD</a:t>
+            </a:r>
+          </a:p>
+          <a:p>
+            <a:pPr marL="914400" lvl="1" indent="-457200">
+              <a:buFont typeface="Wingdings" panose="05000000000000000000" pitchFamily="2" charset="2"/>
+              <a:buChar char="ü"/>
+            </a:pPr>
+            <a:r>
+              <a:rPr lang="en-US" sz="2800" dirty="0" smtClean="0">
+                <a:solidFill>
+                  <a:prstClr val="black"/>
+                </a:solidFill>
+                <a:latin typeface="Arial" panose="020B0604020202020204" pitchFamily="34" charset="0"/>
+                <a:cs typeface="Arial" panose="020B0604020202020204" pitchFamily="34" charset="0"/>
+              </a:rPr>
+              <a:t>Team needs consensus, not unanimity.</a:t>
+            </a:r>
+          </a:p>
+          <a:p>
+            <a:pPr marL="914400" lvl="1" indent="-457200">
+              <a:buFont typeface="Wingdings" panose="05000000000000000000" pitchFamily="2" charset="2"/>
+              <a:buChar char="ü"/>
+            </a:pPr>
+            <a:r>
+              <a:rPr lang="en-US" sz="2800" dirty="0" smtClean="0">
+                <a:solidFill>
+                  <a:prstClr val="black"/>
+                </a:solidFill>
+                <a:latin typeface="Arial" panose="020B0604020202020204" pitchFamily="34" charset="0"/>
+                <a:cs typeface="Arial" panose="020B0604020202020204" pitchFamily="34" charset="0"/>
+              </a:rPr>
+              <a:t>Try building consensus, if it is lacking.  </a:t>
+            </a:r>
+          </a:p>
+          <a:p>
+            <a:pPr marL="1371600" lvl="2" indent="-457200">
+              <a:buFont typeface="Wingdings" panose="05000000000000000000" pitchFamily="2" charset="2"/>
+              <a:buChar char="ü"/>
+            </a:pPr>
+            <a:r>
+              <a:rPr lang="en-US" sz="2800" dirty="0" smtClean="0">
+                <a:solidFill>
+                  <a:prstClr val="black"/>
+                </a:solidFill>
+                <a:latin typeface="Arial" panose="020B0604020202020204" pitchFamily="34" charset="0"/>
+                <a:cs typeface="Arial" panose="020B0604020202020204" pitchFamily="34" charset="0"/>
+              </a:rPr>
+              <a:t>Lunch &amp; Learns.  </a:t>
+            </a:r>
+            <a:r>
+              <a:rPr lang="en-US" sz="2800" dirty="0" smtClean="0">
+                <a:solidFill>
+                  <a:prstClr val="black"/>
+                </a:solidFill>
+                <a:latin typeface="Arial" panose="020B0604020202020204" pitchFamily="34" charset="0"/>
+                <a:cs typeface="Arial" panose="020B0604020202020204" pitchFamily="34" charset="0"/>
+                <a:sym typeface="Wingdings" panose="05000000000000000000" pitchFamily="2" charset="2"/>
+              </a:rPr>
+              <a:t></a:t>
+            </a:r>
+          </a:p>
+          <a:p>
+            <a:pPr marL="1371600" lvl="2" indent="-457200">
+              <a:buFont typeface="Wingdings" panose="05000000000000000000" pitchFamily="2" charset="2"/>
+              <a:buChar char="ü"/>
+            </a:pPr>
+            <a:r>
+              <a:rPr lang="en-US" sz="2800" dirty="0" smtClean="0">
+                <a:solidFill>
+                  <a:prstClr val="black"/>
+                </a:solidFill>
+                <a:latin typeface="Arial" panose="020B0604020202020204" pitchFamily="34" charset="0"/>
+                <a:cs typeface="Arial" panose="020B0604020202020204" pitchFamily="34" charset="0"/>
+                <a:sym typeface="Wingdings" panose="05000000000000000000" pitchFamily="2" charset="2"/>
+              </a:rPr>
+              <a:t>“Spike &amp; demo” for one app or component</a:t>
+            </a:r>
+            <a:endParaRPr lang="en-US" sz="2800" dirty="0">
+              <a:solidFill>
+                <a:prstClr val="black"/>
+              </a:solidFill>
+              <a:latin typeface="Arial" panose="020B0604020202020204" pitchFamily="34" charset="0"/>
+              <a:cs typeface="Arial" panose="020B0604020202020204" pitchFamily="34" charset="0"/>
+            </a:endParaRPr>
+          </a:p>
+          <a:p>
+            <a:pPr lvl="1"/>
+            <a:endParaRPr lang="en-US" sz="2800" dirty="0" smtClean="0"/>
+          </a:p>
+        </p:txBody>
+      </p:sp>
+    </p:spTree>
+    <p:extLst>
+      <p:ext uri="{BB962C8B-B14F-4D97-AF65-F5344CB8AC3E}">
+        <p14:creationId xmlns:p14="http://schemas.microsoft.com/office/powerpoint/2010/main" val="490219162"/>
+      </p:ext>
+    </p:extLst>
+  </p:cSld>
+  <p:clrMapOvr>
+    <a:masterClrMapping/>
+  </p:clrMapOvr>
+  <p:timing>
+    <p:tnLst>
+      <p:par>
+        <p:cTn id="1" dur="indefinite" restart="never" nodeType="tmRoot"/>
+      </p:par>
+    </p:tnLst>
+  </p:timing>
+</p:sld>
+</file>
+
 <file path=ppt/slides/slide15.xml><?xml version="1.0" encoding="utf-8"?>
 <p:sld xmlns:a="http://schemas.openxmlformats.org/drawingml/2006/main" xmlns:r="http://schemas.openxmlformats.org/officeDocument/2006/relationships" xmlns:p="http://schemas.openxmlformats.org/presentationml/2006/main">
   <p:cSld>
@@ -9635,7 +9688,7 @@
       </p:grpSpPr>
       <p:sp>
         <p:nvSpPr>
-          <p:cNvPr id="2" name="Title 1"/>
+          <p:cNvPr id="5" name="Title 4"/>
           <p:cNvSpPr>
             <a:spLocks noGrp="1"/>
           </p:cNvSpPr>
@@ -9643,19 +9696,14 @@
             <p:ph type="ctrTitle"/>
           </p:nvPr>
         </p:nvSpPr>
-        <p:spPr>
-          <a:xfrm>
-            <a:off x="-3340" y="241034"/>
-            <a:ext cx="9144000" cy="623917"/>
-          </a:xfrm>
-        </p:spPr>
+        <p:spPr/>
         <p:txBody>
           <a:bodyPr/>
           <a:lstStyle/>
           <a:p>
             <a:r>
               <a:rPr lang="en-US" dirty="0" smtClean="0"/>
-              <a:t>Questions &amp; Discussion</a:t>
+              <a:t>More Information</a:t>
             </a:r>
             <a:endParaRPr lang="en-US" dirty="0"/>
           </a:p>
@@ -9663,123 +9711,350 @@
       </p:sp>
       <p:sp>
         <p:nvSpPr>
-          <p:cNvPr id="3" name="TextBox 2"/>
-          <p:cNvSpPr txBox="1"/>
+          <p:cNvPr id="6" name="Rectangle 5"/>
+          <p:cNvSpPr/>
           <p:nvPr/>
         </p:nvSpPr>
         <p:spPr>
           <a:xfrm>
-            <a:off x="524435" y="1711570"/>
-            <a:ext cx="8027893" cy="3970318"/>
+            <a:off x="751840" y="1234216"/>
+            <a:ext cx="7620000" cy="4770537"/>
           </a:xfrm>
           <a:prstGeom prst="rect">
             <a:avLst/>
           </a:prstGeom>
-          <a:noFill/>
         </p:spPr>
         <p:txBody>
-          <a:bodyPr wrap="square" rtlCol="0">
+          <a:bodyPr wrap="square">
             <a:spAutoFit/>
           </a:bodyPr>
           <a:lstStyle/>
           <a:p>
-            <a:pPr marL="457200" indent="-457200">
-              <a:buFont typeface="Arial" panose="020B0604020202020204" pitchFamily="34" charset="0"/>
-              <a:buChar char="•"/>
-            </a:pPr>
-            <a:r>
-              <a:rPr lang="en-US" sz="2800" dirty="0" smtClean="0"/>
-              <a:t>Your Questions?</a:t>
-            </a:r>
-          </a:p>
-          <a:p>
-            <a:pPr marL="457200" indent="-457200">
-              <a:buFont typeface="Arial" panose="020B0604020202020204" pitchFamily="34" charset="0"/>
-              <a:buChar char="•"/>
-            </a:pPr>
-            <a:endParaRPr lang="en-US" sz="2800" dirty="0" smtClean="0"/>
-          </a:p>
-          <a:p>
-            <a:pPr marL="457200" indent="-457200">
-              <a:buFont typeface="Arial" panose="020B0604020202020204" pitchFamily="34" charset="0"/>
-              <a:buChar char="•"/>
-            </a:pPr>
-            <a:r>
-              <a:rPr lang="en-US" sz="2800" dirty="0" smtClean="0"/>
-              <a:t>Our Question – Next steps?</a:t>
-            </a:r>
-          </a:p>
-          <a:p>
-            <a:pPr marL="914400" lvl="1" indent="-457200">
-              <a:buFont typeface="Arial" panose="020B0604020202020204" pitchFamily="34" charset="0"/>
-              <a:buChar char="•"/>
-            </a:pPr>
-            <a:r>
-              <a:rPr lang="en-US" sz="2800" dirty="0" smtClean="0"/>
-              <a:t>Future topics?</a:t>
-            </a:r>
-          </a:p>
-          <a:p>
-            <a:pPr marL="1371600" lvl="2" indent="-457200">
-              <a:buFont typeface="Arial" panose="020B0604020202020204" pitchFamily="34" charset="0"/>
-              <a:buChar char="•"/>
-            </a:pPr>
-            <a:r>
-              <a:rPr lang="en-US" sz="2800" dirty="0" smtClean="0"/>
-              <a:t>Unit TDD?</a:t>
-            </a:r>
-          </a:p>
-          <a:p>
-            <a:pPr marL="1371600" lvl="2" indent="-457200">
-              <a:buFont typeface="Arial" panose="020B0604020202020204" pitchFamily="34" charset="0"/>
-              <a:buChar char="•"/>
-            </a:pPr>
-            <a:r>
-              <a:rPr lang="en-US" sz="2800" dirty="0" smtClean="0"/>
-              <a:t>Working with Legacy Code?</a:t>
-            </a:r>
-          </a:p>
-          <a:p>
-            <a:pPr marL="1371600" lvl="2" indent="-457200">
-              <a:buFont typeface="Arial" panose="020B0604020202020204" pitchFamily="34" charset="0"/>
-              <a:buChar char="•"/>
-            </a:pPr>
-            <a:r>
-              <a:rPr lang="en-US" sz="2800" dirty="0" smtClean="0"/>
-              <a:t>Real-world technology?</a:t>
-            </a:r>
-            <a:br>
-              <a:rPr lang="en-US" sz="2800" dirty="0" smtClean="0"/>
-            </a:br>
-            <a:r>
-              <a:rPr lang="en-US" sz="2800" dirty="0" smtClean="0"/>
-              <a:t>(Mocks, Web, DB, </a:t>
-            </a:r>
-            <a:r>
-              <a:rPr lang="en-US" sz="2800" dirty="0" err="1" smtClean="0"/>
-              <a:t>asynch</a:t>
-            </a:r>
-            <a:r>
-              <a:rPr lang="en-US" sz="2800" dirty="0" smtClean="0"/>
-              <a:t>., etc.)</a:t>
-            </a:r>
-          </a:p>
-          <a:p>
-            <a:pPr marL="914400" lvl="1" indent="-457200">
-              <a:buFont typeface="Arial" panose="020B0604020202020204" pitchFamily="34" charset="0"/>
-              <a:buChar char="•"/>
-            </a:pPr>
-            <a:r>
-              <a:rPr lang="en-US" sz="2800" dirty="0" smtClean="0"/>
-              <a:t>Open Source Project?</a:t>
-            </a:r>
+            <a:pPr marL="342900" indent="-342900">
+              <a:buFont typeface="Arial" panose="020B0604020202020204" pitchFamily="34" charset="0"/>
+              <a:buChar char="•"/>
+            </a:pPr>
+            <a:r>
+              <a:rPr lang="en-US" sz="2000" dirty="0"/>
+              <a:t>ATDD/TDD </a:t>
+            </a:r>
+            <a:r>
+              <a:rPr lang="en-US" sz="2000" dirty="0" smtClean="0"/>
+              <a:t>Tools</a:t>
+            </a:r>
+          </a:p>
+          <a:p>
+            <a:pPr marL="800100" lvl="1" indent="-342900">
+              <a:buFont typeface="Courier New" panose="02070309020205020404" pitchFamily="49" charset="0"/>
+              <a:buChar char="o"/>
+            </a:pPr>
+            <a:r>
+              <a:rPr lang="en-US" sz="1600" u="sng" dirty="0">
+                <a:hlinkClick r:id="rId3"/>
+              </a:rPr>
+              <a:t>https://cucumber.io</a:t>
+            </a:r>
+            <a:r>
+              <a:rPr lang="en-US" sz="1600" u="sng" dirty="0" smtClean="0">
+                <a:hlinkClick r:id="rId3"/>
+              </a:rPr>
+              <a:t>/</a:t>
+            </a:r>
+            <a:endParaRPr lang="en-US" sz="1600" u="sng" dirty="0" smtClean="0"/>
+          </a:p>
+          <a:p>
+            <a:pPr marL="800100" lvl="1" indent="-342900">
+              <a:buFont typeface="Courier New" panose="02070309020205020404" pitchFamily="49" charset="0"/>
+              <a:buChar char="o"/>
+            </a:pPr>
+            <a:r>
+              <a:rPr lang="en-US" sz="1600" u="sng" dirty="0">
+                <a:hlinkClick r:id="rId4"/>
+              </a:rPr>
+              <a:t>http://</a:t>
+            </a:r>
+            <a:r>
+              <a:rPr lang="en-US" sz="1600" u="sng" dirty="0" smtClean="0">
+                <a:hlinkClick r:id="rId4"/>
+              </a:rPr>
+              <a:t>spockframework.github.io/spock/docs/1.0/index.html</a:t>
+            </a:r>
+            <a:endParaRPr lang="en-US" sz="1600" u="sng" dirty="0" smtClean="0"/>
+          </a:p>
+          <a:p>
+            <a:pPr marL="800100" lvl="1" indent="-342900">
+              <a:buFont typeface="Courier New" panose="02070309020205020404" pitchFamily="49" charset="0"/>
+              <a:buChar char="o"/>
+            </a:pPr>
+            <a:r>
+              <a:rPr lang="en-US" sz="1600" u="sng" dirty="0">
+                <a:hlinkClick r:id="rId5"/>
+              </a:rPr>
+              <a:t>http://</a:t>
+            </a:r>
+            <a:r>
+              <a:rPr lang="en-US" sz="1600" u="sng" dirty="0" smtClean="0">
+                <a:hlinkClick r:id="rId5"/>
+              </a:rPr>
+              <a:t>www.fitnesse.org/FrontPage</a:t>
+            </a:r>
+            <a:r>
+              <a:rPr lang="en-US" sz="2000" u="sng" dirty="0" smtClean="0"/>
+              <a:t> </a:t>
+            </a:r>
+          </a:p>
+          <a:p>
+            <a:pPr marL="800100" lvl="1" indent="-342900">
+              <a:buFont typeface="Courier New" panose="02070309020205020404" pitchFamily="49" charset="0"/>
+              <a:buChar char="o"/>
+            </a:pPr>
+            <a:endParaRPr lang="en-US" sz="2000" u="sng" dirty="0"/>
+          </a:p>
+          <a:p>
+            <a:pPr marL="342900" indent="-342900">
+              <a:buFont typeface="Arial" panose="020B0604020202020204" pitchFamily="34" charset="0"/>
+              <a:buChar char="•"/>
+            </a:pPr>
+            <a:r>
+              <a:rPr lang="en-US" sz="2000" dirty="0" smtClean="0"/>
+              <a:t>ATDD/TDD How-to</a:t>
+            </a:r>
+            <a:endParaRPr lang="en-US" sz="2000" dirty="0"/>
+          </a:p>
+          <a:p>
+            <a:pPr marL="800100" lvl="1" indent="-342900">
+              <a:buFont typeface="Courier New" panose="02070309020205020404" pitchFamily="49" charset="0"/>
+              <a:buChar char="o"/>
+            </a:pPr>
+            <a:r>
+              <a:rPr lang="en-US" sz="1600" dirty="0">
+                <a:hlinkClick r:id="rId6"/>
+              </a:rPr>
+              <a:t>Growing Object Oriented Software Guided by Tests</a:t>
+            </a:r>
+            <a:r>
+              <a:rPr lang="en-US" sz="1600" dirty="0"/>
+              <a:t>, by Steve Freeman &amp; Nat Pryce</a:t>
+            </a:r>
+          </a:p>
+          <a:p>
+            <a:pPr marL="800100" lvl="1" indent="-342900">
+              <a:buFont typeface="Courier New" panose="02070309020205020404" pitchFamily="49" charset="0"/>
+              <a:buChar char="o"/>
+            </a:pPr>
+            <a:r>
+              <a:rPr lang="en-US" sz="1600" dirty="0">
+                <a:hlinkClick r:id="rId7"/>
+              </a:rPr>
+              <a:t>The Cucumber </a:t>
+            </a:r>
+            <a:r>
+              <a:rPr lang="en-US" sz="1600" dirty="0" smtClean="0">
+                <a:hlinkClick r:id="rId7"/>
+              </a:rPr>
+              <a:t>Book</a:t>
+            </a:r>
+            <a:r>
+              <a:rPr lang="en-US" sz="1600" dirty="0">
+                <a:hlinkClick r:id="rId7"/>
+              </a:rPr>
+              <a:t>: Behavior-Driven Development for Testers and Developers</a:t>
+            </a:r>
+            <a:r>
+              <a:rPr lang="en-US" sz="1600" dirty="0"/>
+              <a:t>, by Matt Wynne, </a:t>
+            </a:r>
+            <a:r>
+              <a:rPr lang="en-US" sz="1600" dirty="0" err="1"/>
+              <a:t>Aslak</a:t>
+            </a:r>
+            <a:r>
+              <a:rPr lang="en-US" sz="1600" dirty="0"/>
+              <a:t> </a:t>
+            </a:r>
+            <a:r>
+              <a:rPr lang="en-US" sz="1600" dirty="0" err="1"/>
+              <a:t>Hellesǿy</a:t>
+            </a:r>
+            <a:r>
+              <a:rPr lang="en-US" sz="1600" dirty="0"/>
+              <a:t> </a:t>
+            </a:r>
+            <a:endParaRPr lang="en-US" sz="1600" dirty="0" smtClean="0"/>
+          </a:p>
+          <a:p>
+            <a:pPr marL="800100" lvl="1" indent="-342900">
+              <a:buFont typeface="Courier New" panose="02070309020205020404" pitchFamily="49" charset="0"/>
+              <a:buChar char="o"/>
+            </a:pPr>
+            <a:r>
+              <a:rPr lang="en-US" sz="1600" dirty="0" smtClean="0">
+                <a:hlinkClick r:id="rId7"/>
+              </a:rPr>
+              <a:t>The Cucumber </a:t>
+            </a:r>
+            <a:r>
+              <a:rPr lang="en-US" sz="1600" b="1" dirty="0" smtClean="0">
+                <a:hlinkClick r:id="rId7"/>
+              </a:rPr>
+              <a:t>For Java </a:t>
+            </a:r>
+            <a:r>
+              <a:rPr lang="en-US" sz="1600" dirty="0" smtClean="0">
+                <a:hlinkClick r:id="rId7"/>
+              </a:rPr>
+              <a:t>Book: </a:t>
+            </a:r>
+            <a:r>
+              <a:rPr lang="en-US" sz="1600" dirty="0">
+                <a:hlinkClick r:id="rId7"/>
+              </a:rPr>
+              <a:t>Behavior-Driven Development for Testers and Developers</a:t>
+            </a:r>
+            <a:r>
+              <a:rPr lang="en-US" sz="1600" dirty="0"/>
+              <a:t>, by </a:t>
+            </a:r>
+            <a:r>
+              <a:rPr lang="en-US" sz="1600" dirty="0" err="1"/>
+              <a:t>Seb</a:t>
+            </a:r>
+            <a:r>
+              <a:rPr lang="en-US" sz="1600" dirty="0"/>
+              <a:t> </a:t>
+            </a:r>
+            <a:r>
+              <a:rPr lang="en-US" sz="1600" dirty="0" smtClean="0"/>
+              <a:t>Rose, Matt </a:t>
+            </a:r>
+            <a:r>
+              <a:rPr lang="en-US" sz="1600" dirty="0"/>
+              <a:t>Wynne, and </a:t>
+            </a:r>
+            <a:r>
+              <a:rPr lang="en-US" sz="1600" dirty="0" err="1" smtClean="0"/>
+              <a:t>Aslak</a:t>
+            </a:r>
+            <a:r>
+              <a:rPr lang="en-US" sz="1600" dirty="0" smtClean="0"/>
+              <a:t> </a:t>
+            </a:r>
+            <a:r>
+              <a:rPr lang="en-US" sz="1600" dirty="0" err="1" smtClean="0"/>
+              <a:t>Hellesǿy</a:t>
+            </a:r>
+            <a:endParaRPr lang="en-US" sz="1600" dirty="0" smtClean="0"/>
+          </a:p>
+          <a:p>
+            <a:pPr marL="800100" lvl="1" indent="-342900">
+              <a:buFont typeface="Courier New" panose="02070309020205020404" pitchFamily="49" charset="0"/>
+              <a:buChar char="o"/>
+            </a:pPr>
+            <a:r>
+              <a:rPr lang="en-US" sz="1600" dirty="0" smtClean="0">
+                <a:hlinkClick r:id="rId8"/>
+              </a:rPr>
+              <a:t>Cucumber </a:t>
+            </a:r>
+            <a:r>
+              <a:rPr lang="en-US" sz="1600" dirty="0" err="1" smtClean="0">
+                <a:hlinkClick r:id="rId8"/>
+              </a:rPr>
+              <a:t>Recipies</a:t>
+            </a:r>
+            <a:r>
+              <a:rPr lang="en-US" sz="1600" dirty="0" smtClean="0">
+                <a:hlinkClick r:id="rId8"/>
+              </a:rPr>
+              <a:t>:  Automate Anything with BDD Tools and Techniques</a:t>
+            </a:r>
+            <a:r>
+              <a:rPr lang="en-US" sz="1600" dirty="0" smtClean="0"/>
+              <a:t>, by Ian Dees, Matt Wynne, and </a:t>
+            </a:r>
+            <a:r>
+              <a:rPr lang="en-US" sz="1600" dirty="0" err="1" smtClean="0"/>
+              <a:t>Aslak</a:t>
+            </a:r>
+            <a:r>
+              <a:rPr lang="en-US" sz="1600" dirty="0" smtClean="0"/>
+              <a:t> </a:t>
+            </a:r>
+            <a:r>
+              <a:rPr lang="en-US" sz="1600" dirty="0" err="1" smtClean="0"/>
+              <a:t>Hellesǿy</a:t>
+            </a:r>
+            <a:endParaRPr lang="en-US" sz="1600" u="sng" dirty="0" smtClean="0"/>
+          </a:p>
+          <a:p>
+            <a:pPr marL="800100" lvl="1" indent="-342900">
+              <a:buFont typeface="Courier New" panose="02070309020205020404" pitchFamily="49" charset="0"/>
+              <a:buChar char="o"/>
+            </a:pPr>
+            <a:r>
+              <a:rPr lang="en-US" sz="1600" dirty="0" smtClean="0"/>
+              <a:t>Ward Cunningham’s </a:t>
+            </a:r>
+            <a:r>
+              <a:rPr lang="en-US" sz="1600" dirty="0"/>
+              <a:t>C2 wiki: </a:t>
+            </a:r>
+            <a:r>
+              <a:rPr lang="en-US" sz="1600" dirty="0">
+                <a:hlinkClick r:id="rId9"/>
+              </a:rPr>
+              <a:t>http://</a:t>
+            </a:r>
+            <a:r>
+              <a:rPr lang="en-US" sz="1600" dirty="0" smtClean="0">
+                <a:hlinkClick r:id="rId9"/>
+              </a:rPr>
+              <a:t>c2.com/cgi/wiki?TestDrivenDevelopment</a:t>
+            </a:r>
+            <a:r>
+              <a:rPr lang="en-US" sz="1600" dirty="0" smtClean="0"/>
+              <a:t> </a:t>
+            </a:r>
+          </a:p>
+          <a:p>
+            <a:pPr marL="800100" lvl="1" indent="-342900">
+              <a:buFont typeface="Courier New" panose="02070309020205020404" pitchFamily="49" charset="0"/>
+              <a:buChar char="o"/>
+            </a:pPr>
+            <a:r>
+              <a:rPr lang="en-US" sz="1600" dirty="0" smtClean="0">
+                <a:hlinkClick r:id="rId10"/>
+              </a:rPr>
+              <a:t>Test Driven Development By Example</a:t>
+            </a:r>
+            <a:r>
+              <a:rPr lang="en-US" sz="1600" dirty="0" smtClean="0"/>
+              <a:t>, by Kent Beck</a:t>
+            </a:r>
+          </a:p>
+          <a:p>
+            <a:pPr marL="800100" lvl="1" indent="-342900">
+              <a:buFont typeface="Courier New" panose="02070309020205020404" pitchFamily="49" charset="0"/>
+              <a:buChar char="o"/>
+            </a:pPr>
+            <a:r>
+              <a:rPr lang="en-US" sz="1600" dirty="0" smtClean="0">
+                <a:hlinkClick r:id="rId11"/>
+              </a:rPr>
+              <a:t>Working Effectively with Legacy Code</a:t>
+            </a:r>
+            <a:r>
+              <a:rPr lang="en-US" sz="1600" dirty="0" smtClean="0"/>
+              <a:t>, by Michael Feathers</a:t>
+            </a:r>
+            <a:endParaRPr lang="en-US" sz="1600" u="sng" dirty="0" smtClean="0"/>
           </a:p>
         </p:txBody>
       </p:sp>
     </p:spTree>
     <p:extLst>
       <p:ext uri="{BB962C8B-B14F-4D97-AF65-F5344CB8AC3E}">
-        <p14:creationId xmlns:p14="http://schemas.microsoft.com/office/powerpoint/2010/main" val="2282141227"/>
+        <p14:creationId xmlns:p14="http://schemas.microsoft.com/office/powerpoint/2010/main" val="134157889"/>
       </p:ext>
     </p:extLst>
   </p:cSld>
@@ -9835,65 +10110,131 @@
           <a:p>
             <a:r>
               <a:rPr lang="en-US" dirty="0" smtClean="0"/>
-              <a:t>60</a:t>
-            </a:r>
-            <a:r>
-              <a:rPr lang="en-US" baseline="30000" dirty="0" smtClean="0"/>
-              <a:t>th</a:t>
-            </a:r>
-            <a:r>
-              <a:rPr lang="en-US" dirty="0" smtClean="0"/>
-              <a:t> Minute: feedback</a:t>
+              <a:t>Questions &amp; Discussion</a:t>
             </a:r>
             <a:endParaRPr lang="en-US" dirty="0"/>
           </a:p>
         </p:txBody>
       </p:sp>
-      <p:pic>
-        <p:nvPicPr>
-          <p:cNvPr id="1029" name="Picture 5" descr="C:\Users\arecord27272\AppData\Local\Microsoft\Windows\Temporary Internet Files\Content.IE5\2POWQ8G7\questions[1].jpg"/>
-          <p:cNvPicPr>
-            <a:picLocks noChangeAspect="1" noChangeArrowheads="1"/>
-          </p:cNvPicPr>
+      <p:sp>
+        <p:nvSpPr>
+          <p:cNvPr id="3" name="TextBox 2"/>
+          <p:cNvSpPr txBox="1"/>
           <p:nvPr/>
-        </p:nvPicPr>
-        <p:blipFill>
-          <a:blip r:embed="rId3">
-            <a:extLst>
-              <a:ext uri="{28A0092B-C50C-407E-A947-70E740481C1C}">
-                <a14:useLocalDpi xmlns:a14="http://schemas.microsoft.com/office/drawing/2010/main" val="0"/>
-              </a:ext>
-            </a:extLst>
-          </a:blip>
-          <a:srcRect/>
-          <a:stretch>
-            <a:fillRect/>
-          </a:stretch>
-        </p:blipFill>
-        <p:spPr bwMode="auto">
+        </p:nvSpPr>
+        <p:spPr>
           <a:xfrm>
-            <a:off x="2323783" y="1864678"/>
-            <a:ext cx="4699000" cy="2997200"/>
+            <a:off x="524435" y="1711570"/>
+            <a:ext cx="8027893" cy="3970318"/>
           </a:xfrm>
           <a:prstGeom prst="rect">
             <a:avLst/>
           </a:prstGeom>
           <a:noFill/>
-          <a:extLst>
-            <a:ext uri="{909E8E84-426E-40DD-AFC4-6F175D3DCCD1}">
-              <a14:hiddenFill xmlns:a14="http://schemas.microsoft.com/office/drawing/2010/main">
-                <a:solidFill>
-                  <a:srgbClr val="FFFFFF"/>
-                </a:solidFill>
-              </a14:hiddenFill>
-            </a:ext>
-          </a:extLst>
         </p:spPr>
-      </p:pic>
+        <p:txBody>
+          <a:bodyPr wrap="square" rtlCol="0">
+            <a:spAutoFit/>
+          </a:bodyPr>
+          <a:lstStyle/>
+          <a:p>
+            <a:pPr marL="457200" indent="-457200">
+              <a:buFont typeface="Arial" panose="020B0604020202020204" pitchFamily="34" charset="0"/>
+              <a:buChar char="•"/>
+            </a:pPr>
+            <a:r>
+              <a:rPr lang="en-US" sz="2800" dirty="0" smtClean="0"/>
+              <a:t>Your Questions?</a:t>
+            </a:r>
+          </a:p>
+          <a:p>
+            <a:pPr marL="457200" indent="-457200">
+              <a:buFont typeface="Arial" panose="020B0604020202020204" pitchFamily="34" charset="0"/>
+              <a:buChar char="•"/>
+            </a:pPr>
+            <a:endParaRPr lang="en-US" sz="2800" dirty="0" smtClean="0"/>
+          </a:p>
+          <a:p>
+            <a:pPr marL="457200" indent="-457200">
+              <a:buFont typeface="Arial" panose="020B0604020202020204" pitchFamily="34" charset="0"/>
+              <a:buChar char="•"/>
+            </a:pPr>
+            <a:r>
+              <a:rPr lang="en-US" sz="2800" dirty="0" smtClean="0"/>
+              <a:t>Our Question – Next steps?</a:t>
+            </a:r>
+          </a:p>
+          <a:p>
+            <a:pPr marL="914400" lvl="1" indent="-457200">
+              <a:buFont typeface="Arial" panose="020B0604020202020204" pitchFamily="34" charset="0"/>
+              <a:buChar char="•"/>
+            </a:pPr>
+            <a:r>
+              <a:rPr lang="en-US" sz="2800" dirty="0" smtClean="0"/>
+              <a:t>Future topics?</a:t>
+            </a:r>
+          </a:p>
+          <a:p>
+            <a:pPr marL="1371600" lvl="2" indent="-457200">
+              <a:buFont typeface="Arial" panose="020B0604020202020204" pitchFamily="34" charset="0"/>
+              <a:buChar char="•"/>
+            </a:pPr>
+            <a:r>
+              <a:rPr lang="en-US" sz="2800" dirty="0" smtClean="0"/>
+              <a:t>Unit TDD?</a:t>
+            </a:r>
+          </a:p>
+          <a:p>
+            <a:pPr marL="1371600" lvl="2" indent="-457200">
+              <a:buFont typeface="Arial" panose="020B0604020202020204" pitchFamily="34" charset="0"/>
+              <a:buChar char="•"/>
+            </a:pPr>
+            <a:r>
+              <a:rPr lang="en-US" sz="2800" dirty="0" smtClean="0"/>
+              <a:t>Working with Legacy Code?</a:t>
+            </a:r>
+          </a:p>
+          <a:p>
+            <a:pPr marL="1371600" lvl="2" indent="-457200">
+              <a:buFont typeface="Arial" panose="020B0604020202020204" pitchFamily="34" charset="0"/>
+              <a:buChar char="•"/>
+            </a:pPr>
+            <a:r>
+              <a:rPr lang="en-US" sz="2800" dirty="0" smtClean="0"/>
+              <a:t>Real-world technology?</a:t>
+            </a:r>
+            <a:br>
+              <a:rPr lang="en-US" sz="2800" dirty="0" smtClean="0"/>
+            </a:br>
+            <a:r>
+              <a:rPr lang="en-US" sz="2800" dirty="0" smtClean="0"/>
+              <a:t>(Mocks, Web, DB, </a:t>
+            </a:r>
+            <a:r>
+              <a:rPr lang="en-US" sz="2800" dirty="0" err="1" smtClean="0"/>
+              <a:t>asynch</a:t>
+            </a:r>
+            <a:r>
+              <a:rPr lang="en-US" sz="2800" dirty="0" smtClean="0"/>
+              <a:t>., etc.)</a:t>
+            </a:r>
+          </a:p>
+          <a:p>
+            <a:pPr marL="914400" lvl="1" indent="-457200">
+              <a:buFont typeface="Arial" panose="020B0604020202020204" pitchFamily="34" charset="0"/>
+              <a:buChar char="•"/>
+            </a:pPr>
+            <a:r>
+              <a:rPr lang="en-US" sz="2800" dirty="0" smtClean="0"/>
+              <a:t>Open Source Project?</a:t>
+            </a:r>
+          </a:p>
+        </p:txBody>
+      </p:sp>
     </p:spTree>
     <p:extLst>
       <p:ext uri="{BB962C8B-B14F-4D97-AF65-F5344CB8AC3E}">
-        <p14:creationId xmlns:p14="http://schemas.microsoft.com/office/powerpoint/2010/main" val="3131825279"/>
+        <p14:creationId xmlns:p14="http://schemas.microsoft.com/office/powerpoint/2010/main" val="2282141227"/>
       </p:ext>
     </p:extLst>
   </p:cSld>
@@ -9939,7 +10280,7 @@
         </p:nvSpPr>
         <p:spPr>
           <a:xfrm>
-            <a:off x="0" y="2821674"/>
+            <a:off x="-3340" y="241034"/>
             <a:ext cx="9144000" cy="623917"/>
           </a:xfrm>
         </p:spPr>
@@ -9949,449 +10290,65 @@
           <a:p>
             <a:r>
               <a:rPr lang="en-US" dirty="0" smtClean="0"/>
-              <a:t>Appendix</a:t>
+              <a:t>60</a:t>
+            </a:r>
+            <a:r>
+              <a:rPr lang="en-US" baseline="30000" dirty="0" smtClean="0"/>
+              <a:t>th</a:t>
+            </a:r>
+            <a:r>
+              <a:rPr lang="en-US" dirty="0" smtClean="0"/>
+              <a:t> Minute: feedback</a:t>
             </a:r>
             <a:endParaRPr lang="en-US" dirty="0"/>
           </a:p>
         </p:txBody>
       </p:sp>
-    </p:spTree>
-    <p:extLst>
-      <p:ext uri="{BB962C8B-B14F-4D97-AF65-F5344CB8AC3E}">
-        <p14:creationId xmlns:p14="http://schemas.microsoft.com/office/powerpoint/2010/main" val="36540371"/>
-      </p:ext>
-    </p:extLst>
-  </p:cSld>
-  <p:clrMapOvr>
-    <a:masterClrMapping/>
-  </p:clrMapOvr>
-  <p:timing>
-    <p:tnLst>
-      <p:par>
-        <p:cTn id="1" dur="indefinite" restart="never" nodeType="tmRoot"/>
-      </p:par>
-    </p:tnLst>
-  </p:timing>
-</p:sld>
-</file>
-
-<file path=ppt/slides/slide19.xml><?xml version="1.0" encoding="utf-8"?>
-<p:sld xmlns:a="http://schemas.openxmlformats.org/drawingml/2006/main" xmlns:r="http://schemas.openxmlformats.org/officeDocument/2006/relationships" xmlns:p="http://schemas.openxmlformats.org/presentationml/2006/main">
-  <p:cSld>
-    <p:spTree>
-      <p:nvGrpSpPr>
-        <p:cNvPr id="1" name=""/>
-        <p:cNvGrpSpPr/>
-        <p:nvPr/>
-      </p:nvGrpSpPr>
-      <p:grpSpPr>
-        <a:xfrm>
-          <a:off x="0" y="0"/>
-          <a:ext cx="0" cy="0"/>
-          <a:chOff x="0" y="0"/>
-          <a:chExt cx="0" cy="0"/>
-        </a:xfrm>
-      </p:grpSpPr>
-      <p:sp>
-        <p:nvSpPr>
-          <p:cNvPr id="5" name="Title 4"/>
-          <p:cNvSpPr>
-            <a:spLocks noGrp="1"/>
-          </p:cNvSpPr>
-          <p:nvPr>
-            <p:ph type="ctrTitle"/>
-          </p:nvPr>
-        </p:nvSpPr>
-        <p:spPr/>
-        <p:txBody>
-          <a:bodyPr/>
-          <a:lstStyle/>
-          <a:p>
-            <a:r>
-              <a:rPr lang="en-US" dirty="0" smtClean="0"/>
-              <a:t>More Information</a:t>
-            </a:r>
-            <a:endParaRPr lang="en-US" dirty="0"/>
-          </a:p>
-        </p:txBody>
-      </p:sp>
-      <p:sp>
-        <p:nvSpPr>
-          <p:cNvPr id="6" name="Rectangle 5"/>
-          <p:cNvSpPr/>
+      <p:pic>
+        <p:nvPicPr>
+          <p:cNvPr id="1029" name="Picture 5" descr="C:\Users\arecord27272\AppData\Local\Microsoft\Windows\Temporary Internet Files\Content.IE5\2POWQ8G7\questions[1].jpg"/>
+          <p:cNvPicPr>
+            <a:picLocks noChangeAspect="1" noChangeArrowheads="1"/>
+          </p:cNvPicPr>
           <p:nvPr/>
-        </p:nvSpPr>
-        <p:spPr>
+        </p:nvPicPr>
+        <p:blipFill>
+          <a:blip r:embed="rId3">
+            <a:extLst>
+              <a:ext uri="{28A0092B-C50C-407E-A947-70E740481C1C}">
+                <a14:useLocalDpi xmlns:a14="http://schemas.microsoft.com/office/drawing/2010/main" val="0"/>
+              </a:ext>
+            </a:extLst>
+          </a:blip>
+          <a:srcRect/>
+          <a:stretch>
+            <a:fillRect/>
+          </a:stretch>
+        </p:blipFill>
+        <p:spPr bwMode="auto">
           <a:xfrm>
-            <a:off x="751840" y="1234216"/>
-            <a:ext cx="7620000" cy="4770537"/>
+            <a:off x="2323783" y="1864678"/>
+            <a:ext cx="4699000" cy="2997200"/>
           </a:xfrm>
           <a:prstGeom prst="rect">
             <a:avLst/>
           </a:prstGeom>
+          <a:noFill/>
+          <a:extLst>
+            <a:ext uri="{909E8E84-426E-40DD-AFC4-6F175D3DCCD1}">
+              <a14:hiddenFill xmlns:a14="http://schemas.microsoft.com/office/drawing/2010/main">
+                <a:solidFill>
+                  <a:srgbClr val="FFFFFF"/>
+                </a:solidFill>
+              </a14:hiddenFill>
+            </a:ext>
+          </a:extLst>
         </p:spPr>
-        <p:txBody>
-          <a:bodyPr wrap="square">
-            <a:spAutoFit/>
-          </a:bodyPr>
-          <a:lstStyle/>
-          <a:p>
-            <a:pPr marL="342900" indent="-342900">
-              <a:buFont typeface="Arial" panose="020B0604020202020204" pitchFamily="34" charset="0"/>
-              <a:buChar char="•"/>
-            </a:pPr>
-            <a:r>
-              <a:rPr lang="en-US" sz="2000" dirty="0"/>
-              <a:t>ATDD/TDD </a:t>
-            </a:r>
-            <a:r>
-              <a:rPr lang="en-US" sz="2000" dirty="0" smtClean="0"/>
-              <a:t>T</a:t>
-            </a:r>
-            <a:r>
-              <a:rPr lang="en-US" sz="2000" dirty="0" smtClean="0"/>
-              <a:t>ools</a:t>
-            </a:r>
-            <a:endParaRPr lang="en-US" sz="2000" dirty="0" smtClean="0"/>
-          </a:p>
-          <a:p>
-            <a:pPr marL="800100" lvl="1" indent="-342900">
-              <a:buFont typeface="Courier New" panose="02070309020205020404" pitchFamily="49" charset="0"/>
-              <a:buChar char="o"/>
-            </a:pPr>
-            <a:r>
-              <a:rPr lang="en-US" sz="1600" u="sng" dirty="0">
-                <a:hlinkClick r:id="rId3"/>
-              </a:rPr>
-              <a:t>https://cucumber.io</a:t>
-            </a:r>
-            <a:r>
-              <a:rPr lang="en-US" sz="1600" u="sng" dirty="0" smtClean="0">
-                <a:hlinkClick r:id="rId3"/>
-              </a:rPr>
-              <a:t>/</a:t>
-            </a:r>
-            <a:endParaRPr lang="en-US" sz="1600" u="sng" dirty="0" smtClean="0"/>
-          </a:p>
-          <a:p>
-            <a:pPr marL="800100" lvl="1" indent="-342900">
-              <a:buFont typeface="Courier New" panose="02070309020205020404" pitchFamily="49" charset="0"/>
-              <a:buChar char="o"/>
-            </a:pPr>
-            <a:r>
-              <a:rPr lang="en-US" sz="1600" u="sng" dirty="0">
-                <a:hlinkClick r:id="rId4"/>
-              </a:rPr>
-              <a:t>http://</a:t>
-            </a:r>
-            <a:r>
-              <a:rPr lang="en-US" sz="1600" u="sng" dirty="0" smtClean="0">
-                <a:hlinkClick r:id="rId4"/>
-              </a:rPr>
-              <a:t>spockframework.github.io/spock/docs/1.0/index.html</a:t>
-            </a:r>
-            <a:endParaRPr lang="en-US" sz="1600" u="sng" dirty="0" smtClean="0"/>
-          </a:p>
-          <a:p>
-            <a:pPr marL="800100" lvl="1" indent="-342900">
-              <a:buFont typeface="Courier New" panose="02070309020205020404" pitchFamily="49" charset="0"/>
-              <a:buChar char="o"/>
-            </a:pPr>
-            <a:r>
-              <a:rPr lang="en-US" sz="1600" u="sng" dirty="0">
-                <a:hlinkClick r:id="rId5"/>
-              </a:rPr>
-              <a:t>http://</a:t>
-            </a:r>
-            <a:r>
-              <a:rPr lang="en-US" sz="1600" u="sng" dirty="0" smtClean="0">
-                <a:hlinkClick r:id="rId5"/>
-              </a:rPr>
-              <a:t>www.fitnesse.org/FrontPage</a:t>
-            </a:r>
-            <a:r>
-              <a:rPr lang="en-US" sz="2000" u="sng" dirty="0" smtClean="0"/>
-              <a:t> </a:t>
-            </a:r>
-          </a:p>
-          <a:p>
-            <a:pPr marL="800100" lvl="1" indent="-342900">
-              <a:buFont typeface="Courier New" panose="02070309020205020404" pitchFamily="49" charset="0"/>
-              <a:buChar char="o"/>
-            </a:pPr>
-            <a:endParaRPr lang="en-US" sz="2000" u="sng" dirty="0"/>
-          </a:p>
-          <a:p>
-            <a:pPr marL="342900" indent="-342900">
-              <a:buFont typeface="Arial" panose="020B0604020202020204" pitchFamily="34" charset="0"/>
-              <a:buChar char="•"/>
-            </a:pPr>
-            <a:r>
-              <a:rPr lang="en-US" sz="2000" dirty="0" smtClean="0"/>
-              <a:t>ATDD/TDD </a:t>
-            </a:r>
-            <a:r>
-              <a:rPr lang="en-US" sz="2000" dirty="0" smtClean="0"/>
-              <a:t>How-to</a:t>
-            </a:r>
-            <a:endParaRPr lang="en-US" sz="2000" dirty="0"/>
-          </a:p>
-          <a:p>
-            <a:pPr marL="800100" lvl="1" indent="-342900">
-              <a:buFont typeface="Courier New" panose="02070309020205020404" pitchFamily="49" charset="0"/>
-              <a:buChar char="o"/>
-            </a:pPr>
-            <a:r>
-              <a:rPr lang="en-US" sz="1600" dirty="0">
-                <a:hlinkClick r:id="rId6"/>
-              </a:rPr>
-              <a:t>Growing Object Oriented Software Guided by Tests</a:t>
-            </a:r>
-            <a:r>
-              <a:rPr lang="en-US" sz="1600" dirty="0"/>
-              <a:t>, by Steve Freeman &amp; Nat Pryce</a:t>
-            </a:r>
-          </a:p>
-          <a:p>
-            <a:pPr marL="800100" lvl="1" indent="-342900">
-              <a:buFont typeface="Courier New" panose="02070309020205020404" pitchFamily="49" charset="0"/>
-              <a:buChar char="o"/>
-            </a:pPr>
-            <a:r>
-              <a:rPr lang="en-US" sz="1600" dirty="0">
-                <a:hlinkClick r:id="rId7"/>
-              </a:rPr>
-              <a:t>The Cucumber </a:t>
-            </a:r>
-            <a:r>
-              <a:rPr lang="en-US" sz="1600" dirty="0" smtClean="0">
-                <a:hlinkClick r:id="rId7"/>
-              </a:rPr>
-              <a:t>Book</a:t>
-            </a:r>
-            <a:r>
-              <a:rPr lang="en-US" sz="1600" dirty="0">
-                <a:hlinkClick r:id="rId7"/>
-              </a:rPr>
-              <a:t>: Behavior-Driven Development for Testers and Developers</a:t>
-            </a:r>
-            <a:r>
-              <a:rPr lang="en-US" sz="1600" dirty="0"/>
-              <a:t>, by Matt Wynne, </a:t>
-            </a:r>
-            <a:r>
-              <a:rPr lang="en-US" sz="1600" dirty="0" err="1"/>
-              <a:t>Aslak</a:t>
-            </a:r>
-            <a:r>
-              <a:rPr lang="en-US" sz="1600" dirty="0"/>
-              <a:t> </a:t>
-            </a:r>
-            <a:r>
-              <a:rPr lang="en-US" sz="1600" dirty="0" err="1"/>
-              <a:t>Hellesǿy</a:t>
-            </a:r>
-            <a:r>
-              <a:rPr lang="en-US" sz="1600" dirty="0"/>
-              <a:t> </a:t>
-            </a:r>
-            <a:endParaRPr lang="en-US" sz="1600" dirty="0" smtClean="0"/>
-          </a:p>
-          <a:p>
-            <a:pPr marL="800100" lvl="1" indent="-342900">
-              <a:buFont typeface="Courier New" panose="02070309020205020404" pitchFamily="49" charset="0"/>
-              <a:buChar char="o"/>
-            </a:pPr>
-            <a:r>
-              <a:rPr lang="en-US" sz="1600" dirty="0" smtClean="0">
-                <a:hlinkClick r:id="rId7"/>
-              </a:rPr>
-              <a:t>The Cucumber </a:t>
-            </a:r>
-            <a:r>
-              <a:rPr lang="en-US" sz="1600" b="1" dirty="0" smtClean="0">
-                <a:hlinkClick r:id="rId7"/>
-              </a:rPr>
-              <a:t>For Java </a:t>
-            </a:r>
-            <a:r>
-              <a:rPr lang="en-US" sz="1600" dirty="0" smtClean="0">
-                <a:hlinkClick r:id="rId7"/>
-              </a:rPr>
-              <a:t>Book: </a:t>
-            </a:r>
-            <a:r>
-              <a:rPr lang="en-US" sz="1600" dirty="0">
-                <a:hlinkClick r:id="rId7"/>
-              </a:rPr>
-              <a:t>Behavior-Driven Development for Testers and Developers</a:t>
-            </a:r>
-            <a:r>
-              <a:rPr lang="en-US" sz="1600" dirty="0"/>
-              <a:t>, by </a:t>
-            </a:r>
-            <a:r>
-              <a:rPr lang="en-US" sz="1600" dirty="0" err="1"/>
-              <a:t>Seb</a:t>
-            </a:r>
-            <a:r>
-              <a:rPr lang="en-US" sz="1600" dirty="0"/>
-              <a:t> </a:t>
-            </a:r>
-            <a:r>
-              <a:rPr lang="en-US" sz="1600" dirty="0" smtClean="0"/>
-              <a:t>Rose, Matt </a:t>
-            </a:r>
-            <a:r>
-              <a:rPr lang="en-US" sz="1600" dirty="0"/>
-              <a:t>Wynne, and </a:t>
-            </a:r>
-            <a:r>
-              <a:rPr lang="en-US" sz="1600" dirty="0" err="1" smtClean="0"/>
-              <a:t>Aslak</a:t>
-            </a:r>
-            <a:r>
-              <a:rPr lang="en-US" sz="1600" dirty="0" smtClean="0"/>
-              <a:t> </a:t>
-            </a:r>
-            <a:r>
-              <a:rPr lang="en-US" sz="1600" dirty="0" err="1" smtClean="0"/>
-              <a:t>Hellesǿy</a:t>
-            </a:r>
-            <a:endParaRPr lang="en-US" sz="1600" dirty="0" smtClean="0"/>
-          </a:p>
-          <a:p>
-            <a:pPr marL="800100" lvl="1" indent="-342900">
-              <a:buFont typeface="Courier New" panose="02070309020205020404" pitchFamily="49" charset="0"/>
-              <a:buChar char="o"/>
-            </a:pPr>
-            <a:r>
-              <a:rPr lang="en-US" sz="1600" dirty="0" smtClean="0">
-                <a:hlinkClick r:id="rId8"/>
-              </a:rPr>
-              <a:t>Cucumber </a:t>
-            </a:r>
-            <a:r>
-              <a:rPr lang="en-US" sz="1600" dirty="0" err="1" smtClean="0">
-                <a:hlinkClick r:id="rId8"/>
-              </a:rPr>
-              <a:t>Recipies</a:t>
-            </a:r>
-            <a:r>
-              <a:rPr lang="en-US" sz="1600" dirty="0" smtClean="0">
-                <a:hlinkClick r:id="rId8"/>
-              </a:rPr>
-              <a:t>:  Automate </a:t>
-            </a:r>
-            <a:r>
-              <a:rPr lang="en-US" sz="1600" dirty="0" smtClean="0">
-                <a:hlinkClick r:id="rId8"/>
-              </a:rPr>
-              <a:t>Anything </a:t>
-            </a:r>
-            <a:r>
-              <a:rPr lang="en-US" sz="1600" dirty="0" smtClean="0">
-                <a:hlinkClick r:id="rId8"/>
-              </a:rPr>
-              <a:t>with BDD Tools and Techniques</a:t>
-            </a:r>
-            <a:r>
-              <a:rPr lang="en-US" sz="1600" dirty="0" smtClean="0"/>
-              <a:t>, by Ian Dees, Matt Wynne, and </a:t>
-            </a:r>
-            <a:r>
-              <a:rPr lang="en-US" sz="1600" dirty="0" err="1" smtClean="0"/>
-              <a:t>Aslak</a:t>
-            </a:r>
-            <a:r>
-              <a:rPr lang="en-US" sz="1600" dirty="0" smtClean="0"/>
-              <a:t> </a:t>
-            </a:r>
-            <a:r>
-              <a:rPr lang="en-US" sz="1600" dirty="0" err="1" smtClean="0"/>
-              <a:t>Hellesǿy</a:t>
-            </a:r>
-            <a:endParaRPr lang="en-US" sz="1600" u="sng" dirty="0" smtClean="0"/>
-          </a:p>
-          <a:p>
-            <a:pPr marL="800100" lvl="1" indent="-342900">
-              <a:buFont typeface="Courier New" panose="02070309020205020404" pitchFamily="49" charset="0"/>
-              <a:buChar char="o"/>
-            </a:pPr>
-            <a:r>
-              <a:rPr lang="en-US" sz="1600" dirty="0" smtClean="0"/>
-              <a:t>Ward Cunningham’s </a:t>
-            </a:r>
-            <a:r>
-              <a:rPr lang="en-US" sz="1600" dirty="0"/>
-              <a:t>C2 wiki: </a:t>
-            </a:r>
-            <a:r>
-              <a:rPr lang="en-US" sz="1600" dirty="0">
-                <a:hlinkClick r:id="rId9"/>
-              </a:rPr>
-              <a:t>http://</a:t>
-            </a:r>
-            <a:r>
-              <a:rPr lang="en-US" sz="1600" dirty="0" smtClean="0">
-                <a:hlinkClick r:id="rId9"/>
-              </a:rPr>
-              <a:t>c2.com/cgi/wiki?TestDrivenDevelopment</a:t>
-            </a:r>
-            <a:r>
-              <a:rPr lang="en-US" sz="1600" dirty="0" smtClean="0"/>
-              <a:t> </a:t>
-            </a:r>
-          </a:p>
-          <a:p>
-            <a:pPr marL="800100" lvl="1" indent="-342900">
-              <a:buFont typeface="Courier New" panose="02070309020205020404" pitchFamily="49" charset="0"/>
-              <a:buChar char="o"/>
-            </a:pPr>
-            <a:r>
-              <a:rPr lang="en-US" sz="1600" dirty="0" smtClean="0">
-                <a:hlinkClick r:id="rId10"/>
-              </a:rPr>
-              <a:t>Test Driven </a:t>
-            </a:r>
-            <a:r>
-              <a:rPr lang="en-US" sz="1600" dirty="0" smtClean="0">
-                <a:hlinkClick r:id="rId10"/>
-              </a:rPr>
-              <a:t>Development By Example</a:t>
-            </a:r>
-            <a:r>
-              <a:rPr lang="en-US" sz="1600" dirty="0" smtClean="0"/>
-              <a:t>, </a:t>
-            </a:r>
-            <a:r>
-              <a:rPr lang="en-US" sz="1600" dirty="0" smtClean="0"/>
-              <a:t>by Kent Beck</a:t>
-            </a:r>
-          </a:p>
-          <a:p>
-            <a:pPr marL="800100" lvl="1" indent="-342900">
-              <a:buFont typeface="Courier New" panose="02070309020205020404" pitchFamily="49" charset="0"/>
-              <a:buChar char="o"/>
-            </a:pPr>
-            <a:r>
-              <a:rPr lang="en-US" sz="1600" dirty="0" smtClean="0">
-                <a:hlinkClick r:id="rId11"/>
-              </a:rPr>
-              <a:t>Working Effectively with Legacy Code</a:t>
-            </a:r>
-            <a:r>
-              <a:rPr lang="en-US" sz="1600" dirty="0" smtClean="0"/>
-              <a:t>, by Michael Feathers</a:t>
-            </a:r>
-            <a:endParaRPr lang="en-US" sz="1600" u="sng" dirty="0" smtClean="0"/>
-          </a:p>
-        </p:txBody>
-      </p:sp>
+      </p:pic>
     </p:spTree>
     <p:extLst>
       <p:ext uri="{BB962C8B-B14F-4D97-AF65-F5344CB8AC3E}">
-        <p14:creationId xmlns:p14="http://schemas.microsoft.com/office/powerpoint/2010/main" val="134157889"/>
+        <p14:creationId xmlns:p14="http://schemas.microsoft.com/office/powerpoint/2010/main" val="3131825279"/>
       </p:ext>
     </p:extLst>
   </p:cSld>
@@ -14708,18 +14665,18 @@
 </file>
 
 <file path=customXml/item1.xml><?xml version="1.0" encoding="utf-8"?>
-<p:properties xmlns:p="http://schemas.microsoft.com/office/2006/metadata/properties" xmlns:xsi="http://www.w3.org/2001/XMLSchema-instance">
-  <documentManagement/>
-</p:properties>
-</file>
-
-<file path=customXml/item2.xml><?xml version="1.0" encoding="utf-8"?>
 <?mso-contentType ?>
 <FormTemplates xmlns="http://schemas.microsoft.com/sharepoint/v3/contenttype/forms">
   <Display>DocumentLibraryForm</Display>
   <Edit>DocumentLibraryForm</Edit>
   <New>DocumentLibraryForm</New>
 </FormTemplates>
+</file>
+
+<file path=customXml/item2.xml><?xml version="1.0" encoding="utf-8"?>
+<p:properties xmlns:p="http://schemas.microsoft.com/office/2006/metadata/properties" xmlns:xsi="http://www.w3.org/2001/XMLSchema-instance">
+  <documentManagement/>
+</p:properties>
 </file>
 
 <file path=customXml/item3.xml><?xml version="1.0" encoding="utf-8"?>
@@ -14772,6 +14729,14 @@
 </file>
 
 <file path=customXml/itemProps1.xml><?xml version="1.0" encoding="utf-8"?>
+<ds:datastoreItem xmlns:ds="http://schemas.openxmlformats.org/officeDocument/2006/customXml" ds:itemID="{7FD9A7D6-067B-4743-A0EF-B168F7D01ADB}">
+  <ds:schemaRefs>
+    <ds:schemaRef ds:uri="http://schemas.microsoft.com/sharepoint/v3/contenttype/forms"/>
+  </ds:schemaRefs>
+</ds:datastoreItem>
+</file>
+
+<file path=customXml/itemProps2.xml><?xml version="1.0" encoding="utf-8"?>
 <ds:datastoreItem xmlns:ds="http://schemas.openxmlformats.org/officeDocument/2006/customXml" ds:itemID="{A06689F3-4B38-45F6-AEEA-96699B64EAA5}">
   <ds:schemaRefs>
     <ds:schemaRef ds:uri="http://schemas.microsoft.com/office/2006/metadata/properties"/>
@@ -14781,14 +14746,6 @@
     <ds:schemaRef ds:uri="http://purl.org/dc/dcmitype/"/>
     <ds:schemaRef ds:uri="http://purl.org/dc/elements/1.1/"/>
     <ds:schemaRef ds:uri="http://www.w3.org/XML/1998/namespace"/>
-  </ds:schemaRefs>
-</ds:datastoreItem>
-</file>
-
-<file path=customXml/itemProps2.xml><?xml version="1.0" encoding="utf-8"?>
-<ds:datastoreItem xmlns:ds="http://schemas.openxmlformats.org/officeDocument/2006/customXml" ds:itemID="{7FD9A7D6-067B-4743-A0EF-B168F7D01ADB}">
-  <ds:schemaRefs>
-    <ds:schemaRef ds:uri="http://schemas.microsoft.com/sharepoint/v3/contenttype/forms"/>
   </ds:schemaRefs>
 </ds:datastoreItem>
 </file>

</xml_diff>